<commit_message>
made few changes to presentation slides
</commit_message>
<xml_diff>
--- a/VMBR_Presentation.pptx
+++ b/VMBR_Presentation.pptx
@@ -4,6 +4,9 @@
   <p:sldMasterIdLst>
     <p:sldMasterId id="2147483660" r:id="rId1"/>
   </p:sldMasterIdLst>
+  <p:notesMasterIdLst>
+    <p:notesMasterId r:id="rId15"/>
+  </p:notesMasterIdLst>
   <p:sldIdLst>
     <p:sldId id="256" r:id="rId2"/>
     <p:sldId id="257" r:id="rId3"/>
@@ -13,9 +16,11 @@
     <p:sldId id="260" r:id="rId7"/>
     <p:sldId id="264" r:id="rId8"/>
     <p:sldId id="261" r:id="rId9"/>
-    <p:sldId id="263" r:id="rId10"/>
-    <p:sldId id="265" r:id="rId11"/>
-    <p:sldId id="266" r:id="rId12"/>
+    <p:sldId id="267" r:id="rId10"/>
+    <p:sldId id="268" r:id="rId11"/>
+    <p:sldId id="263" r:id="rId12"/>
+    <p:sldId id="265" r:id="rId13"/>
+    <p:sldId id="266" r:id="rId14"/>
   </p:sldIdLst>
   <p:sldSz cx="9144000" cy="6858000" type="screen4x3"/>
   <p:notesSz cx="6858000" cy="9144000"/>
@@ -117,6 +122,797 @@
 </p:presentation>
 </file>
 
+<file path=ppt/notesMasters/notesMaster1.xml><?xml version="1.0" encoding="utf-8"?>
+<p:notesMaster xmlns:a="http://schemas.openxmlformats.org/drawingml/2006/main" xmlns:r="http://schemas.openxmlformats.org/officeDocument/2006/relationships" xmlns:p="http://schemas.openxmlformats.org/presentationml/2006/main">
+  <p:cSld>
+    <p:bg>
+      <p:bgRef idx="1001">
+        <a:schemeClr val="bg1"/>
+      </p:bgRef>
+    </p:bg>
+    <p:spTree>
+      <p:nvGrpSpPr>
+        <p:cNvPr id="1" name=""/>
+        <p:cNvGrpSpPr/>
+        <p:nvPr/>
+      </p:nvGrpSpPr>
+      <p:grpSpPr>
+        <a:xfrm>
+          <a:off x="0" y="0"/>
+          <a:ext cx="0" cy="0"/>
+          <a:chOff x="0" y="0"/>
+          <a:chExt cx="0" cy="0"/>
+        </a:xfrm>
+      </p:grpSpPr>
+      <p:sp>
+        <p:nvSpPr>
+          <p:cNvPr id="2" name="Header Placeholder 1"/>
+          <p:cNvSpPr>
+            <a:spLocks noGrp="1"/>
+          </p:cNvSpPr>
+          <p:nvPr>
+            <p:ph type="hdr" sz="quarter"/>
+          </p:nvPr>
+        </p:nvSpPr>
+        <p:spPr>
+          <a:xfrm>
+            <a:off x="0" y="0"/>
+            <a:ext cx="2971800" cy="457200"/>
+          </a:xfrm>
+          <a:prstGeom prst="rect">
+            <a:avLst/>
+          </a:prstGeom>
+        </p:spPr>
+        <p:txBody>
+          <a:bodyPr vert="horz" lIns="91440" tIns="45720" rIns="91440" bIns="45720" rtlCol="0"/>
+          <a:lstStyle>
+            <a:lvl1pPr algn="l">
+              <a:defRPr sz="1200"/>
+            </a:lvl1pPr>
+          </a:lstStyle>
+          <a:p>
+            <a:endParaRPr lang="en-US"/>
+          </a:p>
+        </p:txBody>
+      </p:sp>
+      <p:sp>
+        <p:nvSpPr>
+          <p:cNvPr id="3" name="Date Placeholder 2"/>
+          <p:cNvSpPr>
+            <a:spLocks noGrp="1"/>
+          </p:cNvSpPr>
+          <p:nvPr>
+            <p:ph type="dt" idx="1"/>
+          </p:nvPr>
+        </p:nvSpPr>
+        <p:spPr>
+          <a:xfrm>
+            <a:off x="3884613" y="0"/>
+            <a:ext cx="2971800" cy="457200"/>
+          </a:xfrm>
+          <a:prstGeom prst="rect">
+            <a:avLst/>
+          </a:prstGeom>
+        </p:spPr>
+        <p:txBody>
+          <a:bodyPr vert="horz" lIns="91440" tIns="45720" rIns="91440" bIns="45720" rtlCol="0"/>
+          <a:lstStyle>
+            <a:lvl1pPr algn="r">
+              <a:defRPr sz="1200"/>
+            </a:lvl1pPr>
+          </a:lstStyle>
+          <a:p>
+            <a:fld id="{433E2ACD-1F68-4C8F-9506-7149504EC2F1}" type="datetimeFigureOut">
+              <a:rPr lang="en-US" smtClean="0"/>
+              <a:t>4/20/2013</a:t>
+            </a:fld>
+            <a:endParaRPr lang="en-US"/>
+          </a:p>
+        </p:txBody>
+      </p:sp>
+      <p:sp>
+        <p:nvSpPr>
+          <p:cNvPr id="4" name="Slide Image Placeholder 3"/>
+          <p:cNvSpPr>
+            <a:spLocks noGrp="1" noRot="1" noChangeAspect="1"/>
+          </p:cNvSpPr>
+          <p:nvPr>
+            <p:ph type="sldImg" idx="2"/>
+          </p:nvPr>
+        </p:nvSpPr>
+        <p:spPr>
+          <a:xfrm>
+            <a:off x="1143000" y="685800"/>
+            <a:ext cx="4572000" cy="3429000"/>
+          </a:xfrm>
+          <a:prstGeom prst="rect">
+            <a:avLst/>
+          </a:prstGeom>
+          <a:noFill/>
+          <a:ln w="12700">
+            <a:solidFill>
+              <a:prstClr val="black"/>
+            </a:solidFill>
+          </a:ln>
+        </p:spPr>
+        <p:txBody>
+          <a:bodyPr vert="horz" lIns="91440" tIns="45720" rIns="91440" bIns="45720" rtlCol="0" anchor="ctr"/>
+          <a:lstStyle/>
+          <a:p>
+            <a:endParaRPr lang="en-US"/>
+          </a:p>
+        </p:txBody>
+      </p:sp>
+      <p:sp>
+        <p:nvSpPr>
+          <p:cNvPr id="5" name="Notes Placeholder 4"/>
+          <p:cNvSpPr>
+            <a:spLocks noGrp="1"/>
+          </p:cNvSpPr>
+          <p:nvPr>
+            <p:ph type="body" sz="quarter" idx="3"/>
+          </p:nvPr>
+        </p:nvSpPr>
+        <p:spPr>
+          <a:xfrm>
+            <a:off x="685800" y="4343400"/>
+            <a:ext cx="5486400" cy="4114800"/>
+          </a:xfrm>
+          <a:prstGeom prst="rect">
+            <a:avLst/>
+          </a:prstGeom>
+        </p:spPr>
+        <p:txBody>
+          <a:bodyPr vert="horz" lIns="91440" tIns="45720" rIns="91440" bIns="45720" rtlCol="0">
+            <a:normAutofit/>
+          </a:bodyPr>
+          <a:lstStyle/>
+          <a:p>
+            <a:pPr lvl="0"/>
+            <a:r>
+              <a:rPr lang="en-US" smtClean="0"/>
+              <a:t>Click to edit Master text styles</a:t>
+            </a:r>
+          </a:p>
+          <a:p>
+            <a:pPr lvl="1"/>
+            <a:r>
+              <a:rPr lang="en-US" smtClean="0"/>
+              <a:t>Second level</a:t>
+            </a:r>
+          </a:p>
+          <a:p>
+            <a:pPr lvl="2"/>
+            <a:r>
+              <a:rPr lang="en-US" smtClean="0"/>
+              <a:t>Third level</a:t>
+            </a:r>
+          </a:p>
+          <a:p>
+            <a:pPr lvl="3"/>
+            <a:r>
+              <a:rPr lang="en-US" smtClean="0"/>
+              <a:t>Fourth level</a:t>
+            </a:r>
+          </a:p>
+          <a:p>
+            <a:pPr lvl="4"/>
+            <a:r>
+              <a:rPr lang="en-US" smtClean="0"/>
+              <a:t>Fifth level</a:t>
+            </a:r>
+            <a:endParaRPr lang="en-US"/>
+          </a:p>
+        </p:txBody>
+      </p:sp>
+      <p:sp>
+        <p:nvSpPr>
+          <p:cNvPr id="6" name="Footer Placeholder 5"/>
+          <p:cNvSpPr>
+            <a:spLocks noGrp="1"/>
+          </p:cNvSpPr>
+          <p:nvPr>
+            <p:ph type="ftr" sz="quarter" idx="4"/>
+          </p:nvPr>
+        </p:nvSpPr>
+        <p:spPr>
+          <a:xfrm>
+            <a:off x="0" y="8685213"/>
+            <a:ext cx="2971800" cy="457200"/>
+          </a:xfrm>
+          <a:prstGeom prst="rect">
+            <a:avLst/>
+          </a:prstGeom>
+        </p:spPr>
+        <p:txBody>
+          <a:bodyPr vert="horz" lIns="91440" tIns="45720" rIns="91440" bIns="45720" rtlCol="0" anchor="b"/>
+          <a:lstStyle>
+            <a:lvl1pPr algn="l">
+              <a:defRPr sz="1200"/>
+            </a:lvl1pPr>
+          </a:lstStyle>
+          <a:p>
+            <a:endParaRPr lang="en-US"/>
+          </a:p>
+        </p:txBody>
+      </p:sp>
+      <p:sp>
+        <p:nvSpPr>
+          <p:cNvPr id="7" name="Slide Number Placeholder 6"/>
+          <p:cNvSpPr>
+            <a:spLocks noGrp="1"/>
+          </p:cNvSpPr>
+          <p:nvPr>
+            <p:ph type="sldNum" sz="quarter" idx="5"/>
+          </p:nvPr>
+        </p:nvSpPr>
+        <p:spPr>
+          <a:xfrm>
+            <a:off x="3884613" y="8685213"/>
+            <a:ext cx="2971800" cy="457200"/>
+          </a:xfrm>
+          <a:prstGeom prst="rect">
+            <a:avLst/>
+          </a:prstGeom>
+        </p:spPr>
+        <p:txBody>
+          <a:bodyPr vert="horz" lIns="91440" tIns="45720" rIns="91440" bIns="45720" rtlCol="0" anchor="b"/>
+          <a:lstStyle>
+            <a:lvl1pPr algn="r">
+              <a:defRPr sz="1200"/>
+            </a:lvl1pPr>
+          </a:lstStyle>
+          <a:p>
+            <a:fld id="{72141A60-0A97-4B4C-A98B-2EDC5A7E8FE4}" type="slidenum">
+              <a:rPr lang="en-US" smtClean="0"/>
+              <a:t>‹#›</a:t>
+            </a:fld>
+            <a:endParaRPr lang="en-US"/>
+          </a:p>
+        </p:txBody>
+      </p:sp>
+    </p:spTree>
+  </p:cSld>
+  <p:clrMap bg1="lt1" tx1="dk1" bg2="lt2" tx2="dk2" accent1="accent1" accent2="accent2" accent3="accent3" accent4="accent4" accent5="accent5" accent6="accent6" hlink="hlink" folHlink="folHlink"/>
+  <p:notesStyle>
+    <a:lvl1pPr marL="0" algn="l" defTabSz="914400" rtl="0" eaLnBrk="1" latinLnBrk="0" hangingPunct="1">
+      <a:defRPr sz="1200" kern="1200">
+        <a:solidFill>
+          <a:schemeClr val="tx1"/>
+        </a:solidFill>
+        <a:latin typeface="+mn-lt"/>
+        <a:ea typeface="+mn-ea"/>
+        <a:cs typeface="+mn-cs"/>
+      </a:defRPr>
+    </a:lvl1pPr>
+    <a:lvl2pPr marL="457200" algn="l" defTabSz="914400" rtl="0" eaLnBrk="1" latinLnBrk="0" hangingPunct="1">
+      <a:defRPr sz="1200" kern="1200">
+        <a:solidFill>
+          <a:schemeClr val="tx1"/>
+        </a:solidFill>
+        <a:latin typeface="+mn-lt"/>
+        <a:ea typeface="+mn-ea"/>
+        <a:cs typeface="+mn-cs"/>
+      </a:defRPr>
+    </a:lvl2pPr>
+    <a:lvl3pPr marL="914400" algn="l" defTabSz="914400" rtl="0" eaLnBrk="1" latinLnBrk="0" hangingPunct="1">
+      <a:defRPr sz="1200" kern="1200">
+        <a:solidFill>
+          <a:schemeClr val="tx1"/>
+        </a:solidFill>
+        <a:latin typeface="+mn-lt"/>
+        <a:ea typeface="+mn-ea"/>
+        <a:cs typeface="+mn-cs"/>
+      </a:defRPr>
+    </a:lvl3pPr>
+    <a:lvl4pPr marL="1371600" algn="l" defTabSz="914400" rtl="0" eaLnBrk="1" latinLnBrk="0" hangingPunct="1">
+      <a:defRPr sz="1200" kern="1200">
+        <a:solidFill>
+          <a:schemeClr val="tx1"/>
+        </a:solidFill>
+        <a:latin typeface="+mn-lt"/>
+        <a:ea typeface="+mn-ea"/>
+        <a:cs typeface="+mn-cs"/>
+      </a:defRPr>
+    </a:lvl4pPr>
+    <a:lvl5pPr marL="1828800" algn="l" defTabSz="914400" rtl="0" eaLnBrk="1" latinLnBrk="0" hangingPunct="1">
+      <a:defRPr sz="1200" kern="1200">
+        <a:solidFill>
+          <a:schemeClr val="tx1"/>
+        </a:solidFill>
+        <a:latin typeface="+mn-lt"/>
+        <a:ea typeface="+mn-ea"/>
+        <a:cs typeface="+mn-cs"/>
+      </a:defRPr>
+    </a:lvl5pPr>
+    <a:lvl6pPr marL="2286000" algn="l" defTabSz="914400" rtl="0" eaLnBrk="1" latinLnBrk="0" hangingPunct="1">
+      <a:defRPr sz="1200" kern="1200">
+        <a:solidFill>
+          <a:schemeClr val="tx1"/>
+        </a:solidFill>
+        <a:latin typeface="+mn-lt"/>
+        <a:ea typeface="+mn-ea"/>
+        <a:cs typeface="+mn-cs"/>
+      </a:defRPr>
+    </a:lvl6pPr>
+    <a:lvl7pPr marL="2743200" algn="l" defTabSz="914400" rtl="0" eaLnBrk="1" latinLnBrk="0" hangingPunct="1">
+      <a:defRPr sz="1200" kern="1200">
+        <a:solidFill>
+          <a:schemeClr val="tx1"/>
+        </a:solidFill>
+        <a:latin typeface="+mn-lt"/>
+        <a:ea typeface="+mn-ea"/>
+        <a:cs typeface="+mn-cs"/>
+      </a:defRPr>
+    </a:lvl7pPr>
+    <a:lvl8pPr marL="3200400" algn="l" defTabSz="914400" rtl="0" eaLnBrk="1" latinLnBrk="0" hangingPunct="1">
+      <a:defRPr sz="1200" kern="1200">
+        <a:solidFill>
+          <a:schemeClr val="tx1"/>
+        </a:solidFill>
+        <a:latin typeface="+mn-lt"/>
+        <a:ea typeface="+mn-ea"/>
+        <a:cs typeface="+mn-cs"/>
+      </a:defRPr>
+    </a:lvl8pPr>
+    <a:lvl9pPr marL="3657600" algn="l" defTabSz="914400" rtl="0" eaLnBrk="1" latinLnBrk="0" hangingPunct="1">
+      <a:defRPr sz="1200" kern="1200">
+        <a:solidFill>
+          <a:schemeClr val="tx1"/>
+        </a:solidFill>
+        <a:latin typeface="+mn-lt"/>
+        <a:ea typeface="+mn-ea"/>
+        <a:cs typeface="+mn-cs"/>
+      </a:defRPr>
+    </a:lvl9pPr>
+  </p:notesStyle>
+</p:notesMaster>
+</file>
+
+<file path=ppt/notesSlides/notesSlide1.xml><?xml version="1.0" encoding="utf-8"?>
+<p:notes xmlns:a="http://schemas.openxmlformats.org/drawingml/2006/main" xmlns:r="http://schemas.openxmlformats.org/officeDocument/2006/relationships" xmlns:p="http://schemas.openxmlformats.org/presentationml/2006/main">
+  <p:cSld>
+    <p:spTree>
+      <p:nvGrpSpPr>
+        <p:cNvPr id="1" name=""/>
+        <p:cNvGrpSpPr/>
+        <p:nvPr/>
+      </p:nvGrpSpPr>
+      <p:grpSpPr>
+        <a:xfrm>
+          <a:off x="0" y="0"/>
+          <a:ext cx="0" cy="0"/>
+          <a:chOff x="0" y="0"/>
+          <a:chExt cx="0" cy="0"/>
+        </a:xfrm>
+      </p:grpSpPr>
+      <p:sp>
+        <p:nvSpPr>
+          <p:cNvPr id="2" name="Slide Image Placeholder 1"/>
+          <p:cNvSpPr>
+            <a:spLocks noGrp="1" noRot="1" noChangeAspect="1"/>
+          </p:cNvSpPr>
+          <p:nvPr>
+            <p:ph type="sldImg"/>
+          </p:nvPr>
+        </p:nvSpPr>
+        <p:spPr/>
+      </p:sp>
+      <p:sp>
+        <p:nvSpPr>
+          <p:cNvPr id="3" name="Notes Placeholder 2"/>
+          <p:cNvSpPr>
+            <a:spLocks noGrp="1"/>
+          </p:cNvSpPr>
+          <p:nvPr>
+            <p:ph type="body" idx="1"/>
+          </p:nvPr>
+        </p:nvSpPr>
+        <p:spPr/>
+        <p:txBody>
+          <a:bodyPr>
+            <a:normAutofit/>
+          </a:bodyPr>
+          <a:lstStyle/>
+          <a:p>
+            <a:pPr marL="228600" indent="-228600">
+              <a:buAutoNum type="arabicPeriod"/>
+            </a:pPr>
+            <a:r>
+              <a:rPr lang="en-US" dirty="0" smtClean="0"/>
+              <a:t>Detectors that run below the VMBR can see the state of the VMBR because their view of the system does not go through the VMBR’s virtualization layer. </a:t>
+            </a:r>
+          </a:p>
+          <a:p>
+            <a:pPr marL="228600" indent="-228600">
+              <a:buAutoNum type="arabicPeriod"/>
+            </a:pPr>
+            <a:r>
+              <a:rPr lang="en-US" dirty="0" smtClean="0"/>
+              <a:t>Such detection software can read physical memory or disk and look for signatures or anomalies that indicate the presence of a VMBR, such as a modified boot sequence. </a:t>
+            </a:r>
+          </a:p>
+          <a:p>
+            <a:pPr marL="228600" indent="-228600">
+              <a:buAutoNum type="arabicPeriod"/>
+            </a:pPr>
+            <a:r>
+              <a:rPr lang="en-US" dirty="0" smtClean="0"/>
+              <a:t>Researchers (Intel, AMD and Copilot all) propose hardware that can be used to develop and deploy low-layer security software that would run beneath a VMBR. </a:t>
+            </a:r>
+          </a:p>
+          <a:p>
+            <a:pPr marL="228600" indent="-228600">
+              <a:buAutoNum type="arabicPeriod"/>
+            </a:pPr>
+            <a:r>
+              <a:rPr lang="en-US" dirty="0" smtClean="0"/>
+              <a:t>A valid way to gain control below the VMBR is to boot from a safe medium such as CD-ROM, USB drive or network boot server. This boot code can run on the system before the VMBR loads and can view the VMBR’s quiescent disk state. </a:t>
+            </a:r>
+          </a:p>
+          <a:p>
+            <a:pPr marL="228600" indent="-228600">
+              <a:buAutoNum type="arabicPeriod"/>
+            </a:pPr>
+            <a:r>
+              <a:rPr lang="en-US" dirty="0" smtClean="0"/>
+              <a:t>VMBRs can avoid booting from safe medium by emulating system shutdowns and reboots, thus it’s a good practice to physically unplug the machine before attempting to boot from safe medium. </a:t>
+            </a:r>
+          </a:p>
+          <a:p>
+            <a:pPr marL="228600" indent="-228600">
+              <a:buAutoNum type="arabicPeriod"/>
+            </a:pPr>
+            <a:r>
+              <a:rPr lang="en-US" dirty="0" smtClean="0"/>
+              <a:t>Using a secure VMM, king et al. implemented an enhanced version of secure boot which can prevent VMBR installations. The goal of the secure boot system is to provide attestation for existing boot components, such as dist master boot record, the file </a:t>
+            </a:r>
+            <a:r>
+              <a:rPr lang="en-US" dirty="0" err="1" smtClean="0"/>
+              <a:t>systems’s</a:t>
+            </a:r>
+            <a:r>
+              <a:rPr lang="en-US" dirty="0" smtClean="0"/>
+              <a:t> boot </a:t>
+            </a:r>
+            <a:r>
+              <a:rPr lang="en-US" dirty="0" err="1" smtClean="0"/>
+              <a:t>sectorand</a:t>
+            </a:r>
+            <a:r>
+              <a:rPr lang="en-US" dirty="0" smtClean="0"/>
+              <a:t> the OS’s boot loader and also to allow the legitimate updates of these components. </a:t>
+            </a:r>
+            <a:endParaRPr lang="en-US" dirty="0"/>
+          </a:p>
+        </p:txBody>
+      </p:sp>
+      <p:sp>
+        <p:nvSpPr>
+          <p:cNvPr id="4" name="Slide Number Placeholder 3"/>
+          <p:cNvSpPr>
+            <a:spLocks noGrp="1"/>
+          </p:cNvSpPr>
+          <p:nvPr>
+            <p:ph type="sldNum" sz="quarter" idx="10"/>
+          </p:nvPr>
+        </p:nvSpPr>
+        <p:spPr/>
+        <p:txBody>
+          <a:bodyPr/>
+          <a:lstStyle/>
+          <a:p>
+            <a:fld id="{72141A60-0A97-4B4C-A98B-2EDC5A7E8FE4}" type="slidenum">
+              <a:rPr lang="en-US" smtClean="0"/>
+              <a:t>9</a:t>
+            </a:fld>
+            <a:endParaRPr lang="en-US"/>
+          </a:p>
+        </p:txBody>
+      </p:sp>
+    </p:spTree>
+  </p:cSld>
+  <p:clrMapOvr>
+    <a:masterClrMapping/>
+  </p:clrMapOvr>
+</p:notes>
+</file>
+
+<file path=ppt/notesSlides/notesSlide2.xml><?xml version="1.0" encoding="utf-8"?>
+<p:notes xmlns:a="http://schemas.openxmlformats.org/drawingml/2006/main" xmlns:r="http://schemas.openxmlformats.org/officeDocument/2006/relationships" xmlns:p="http://schemas.openxmlformats.org/presentationml/2006/main">
+  <p:cSld>
+    <p:spTree>
+      <p:nvGrpSpPr>
+        <p:cNvPr id="1" name=""/>
+        <p:cNvGrpSpPr/>
+        <p:nvPr/>
+      </p:nvGrpSpPr>
+      <p:grpSpPr>
+        <a:xfrm>
+          <a:off x="0" y="0"/>
+          <a:ext cx="0" cy="0"/>
+          <a:chOff x="0" y="0"/>
+          <a:chExt cx="0" cy="0"/>
+        </a:xfrm>
+      </p:grpSpPr>
+      <p:sp>
+        <p:nvSpPr>
+          <p:cNvPr id="2" name="Slide Image Placeholder 1"/>
+          <p:cNvSpPr>
+            <a:spLocks noGrp="1" noRot="1" noChangeAspect="1"/>
+          </p:cNvSpPr>
+          <p:nvPr>
+            <p:ph type="sldImg"/>
+          </p:nvPr>
+        </p:nvSpPr>
+        <p:spPr/>
+      </p:sp>
+      <p:sp>
+        <p:nvSpPr>
+          <p:cNvPr id="3" name="Notes Placeholder 2"/>
+          <p:cNvSpPr>
+            <a:spLocks noGrp="1"/>
+          </p:cNvSpPr>
+          <p:nvPr>
+            <p:ph type="body" idx="1"/>
+          </p:nvPr>
+        </p:nvSpPr>
+        <p:spPr/>
+        <p:txBody>
+          <a:bodyPr>
+            <a:normAutofit/>
+          </a:bodyPr>
+          <a:lstStyle/>
+          <a:p>
+            <a:r>
+              <a:rPr lang="en-US" dirty="0" smtClean="0"/>
+              <a:t>1. A VMBR adds CPU overhead to trap and emulate privileged instructions, as well as to run any malicious services. These timing differences can be noticed by software running in the virtual machine by comparing the running time of benchmarks against wall-clock time. </a:t>
+            </a:r>
+          </a:p>
+          <a:p>
+            <a:endParaRPr lang="en-US" dirty="0"/>
+          </a:p>
+          <a:p>
+            <a:r>
+              <a:rPr lang="en-US" dirty="0" smtClean="0"/>
+              <a:t>2. An approach used was a program that required the entire machines memory of disk space. VMBR was able to hide its space overhead in several ways and this method didn’t prove to be that good (paging some data to disk for memory and bad sector trick for disk). </a:t>
+            </a:r>
+          </a:p>
+          <a:p>
+            <a:endParaRPr lang="en-US" dirty="0"/>
+          </a:p>
+          <a:p>
+            <a:r>
+              <a:rPr lang="en-US" dirty="0" smtClean="0"/>
+              <a:t>3. </a:t>
+            </a:r>
+            <a:endParaRPr lang="en-US" dirty="0"/>
+          </a:p>
+        </p:txBody>
+      </p:sp>
+      <p:sp>
+        <p:nvSpPr>
+          <p:cNvPr id="4" name="Slide Number Placeholder 3"/>
+          <p:cNvSpPr>
+            <a:spLocks noGrp="1"/>
+          </p:cNvSpPr>
+          <p:nvPr>
+            <p:ph type="sldNum" sz="quarter" idx="10"/>
+          </p:nvPr>
+        </p:nvSpPr>
+        <p:spPr/>
+        <p:txBody>
+          <a:bodyPr/>
+          <a:lstStyle/>
+          <a:p>
+            <a:fld id="{72141A60-0A97-4B4C-A98B-2EDC5A7E8FE4}" type="slidenum">
+              <a:rPr lang="en-US" smtClean="0"/>
+              <a:t>10</a:t>
+            </a:fld>
+            <a:endParaRPr lang="en-US"/>
+          </a:p>
+        </p:txBody>
+      </p:sp>
+    </p:spTree>
+  </p:cSld>
+  <p:clrMapOvr>
+    <a:masterClrMapping/>
+  </p:clrMapOvr>
+</p:notes>
+</file>
+
+<file path=ppt/notesSlides/notesSlide3.xml><?xml version="1.0" encoding="utf-8"?>
+<p:notes xmlns:a="http://schemas.openxmlformats.org/drawingml/2006/main" xmlns:r="http://schemas.openxmlformats.org/officeDocument/2006/relationships" xmlns:p="http://schemas.openxmlformats.org/presentationml/2006/main">
+  <p:cSld>
+    <p:spTree>
+      <p:nvGrpSpPr>
+        <p:cNvPr id="1" name=""/>
+        <p:cNvGrpSpPr/>
+        <p:nvPr/>
+      </p:nvGrpSpPr>
+      <p:grpSpPr>
+        <a:xfrm>
+          <a:off x="0" y="0"/>
+          <a:ext cx="0" cy="0"/>
+          <a:chOff x="0" y="0"/>
+          <a:chExt cx="0" cy="0"/>
+        </a:xfrm>
+      </p:grpSpPr>
+      <p:sp>
+        <p:nvSpPr>
+          <p:cNvPr id="2" name="Slide Image Placeholder 1"/>
+          <p:cNvSpPr>
+            <a:spLocks noGrp="1" noRot="1" noChangeAspect="1"/>
+          </p:cNvSpPr>
+          <p:nvPr>
+            <p:ph type="sldImg"/>
+          </p:nvPr>
+        </p:nvSpPr>
+        <p:spPr/>
+      </p:sp>
+      <p:sp>
+        <p:nvSpPr>
+          <p:cNvPr id="3" name="Notes Placeholder 2"/>
+          <p:cNvSpPr>
+            <a:spLocks noGrp="1"/>
+          </p:cNvSpPr>
+          <p:nvPr>
+            <p:ph type="body" idx="1"/>
+          </p:nvPr>
+        </p:nvSpPr>
+        <p:spPr/>
+        <p:txBody>
+          <a:bodyPr>
+            <a:normAutofit/>
+          </a:bodyPr>
+          <a:lstStyle/>
+          <a:p>
+            <a:pPr marL="228600" indent="-228600">
+              <a:buAutoNum type="arabicPeriod"/>
+            </a:pPr>
+            <a:r>
+              <a:rPr lang="en-US" dirty="0" smtClean="0"/>
+              <a:t>Hooks </a:t>
+            </a:r>
+            <a:r>
+              <a:rPr lang="en-US" dirty="0"/>
+              <a:t>are blocks of code that intercept events, function calls, or </a:t>
+            </a:r>
+            <a:r>
+              <a:rPr lang="en-US" dirty="0" smtClean="0"/>
+              <a:t>messages. Hooking is employed by </a:t>
+            </a:r>
+            <a:r>
+              <a:rPr lang="en-US" dirty="0" err="1" smtClean="0"/>
+              <a:t>rootkits</a:t>
+            </a:r>
+            <a:r>
+              <a:rPr lang="en-US" dirty="0" smtClean="0"/>
+              <a:t> to evade detection. Hooking modifies the flow of control and hides the presence of modification. </a:t>
+            </a:r>
+          </a:p>
+          <a:p>
+            <a:pPr marL="228600" indent="-228600"/>
+            <a:r>
+              <a:rPr lang="en-US" dirty="0"/>
+              <a:t>	</a:t>
+            </a:r>
+            <a:r>
+              <a:rPr lang="en-US" dirty="0" err="1" smtClean="0"/>
+              <a:t>Hooksafe</a:t>
+            </a:r>
+            <a:r>
+              <a:rPr lang="en-US" dirty="0" smtClean="0"/>
+              <a:t> provides a hypervisor based system to protect kernel hooks from being attacked by </a:t>
+            </a:r>
+            <a:r>
+              <a:rPr lang="en-US" dirty="0" err="1" smtClean="0"/>
+              <a:t>rootkits</a:t>
+            </a:r>
+            <a:r>
+              <a:rPr lang="en-US" dirty="0" smtClean="0"/>
+              <a:t>. </a:t>
+            </a:r>
+            <a:r>
+              <a:rPr lang="en-US" dirty="0" err="1" smtClean="0"/>
+              <a:t>Hooksafe</a:t>
+            </a:r>
+            <a:r>
+              <a:rPr lang="en-US" dirty="0" smtClean="0"/>
+              <a:t> monitors the possible hooks(write access) for modifications. It provides a hook indirection layer to regulate access to hooks in kernel. </a:t>
+            </a:r>
+          </a:p>
+          <a:p>
+            <a:pPr marL="228600" indent="-228600"/>
+            <a:r>
+              <a:rPr lang="en-US" dirty="0" smtClean="0"/>
+              <a:t>2. </a:t>
+            </a:r>
+            <a:r>
+              <a:rPr lang="en-US" dirty="0" err="1" smtClean="0"/>
+              <a:t>SecVisor</a:t>
+            </a:r>
+            <a:r>
+              <a:rPr lang="en-US" dirty="0" smtClean="0"/>
+              <a:t> </a:t>
+            </a:r>
+            <a:r>
+              <a:rPr lang="en-US" dirty="0"/>
+              <a:t>protects the integrity of code in OS kernels by preventing </a:t>
+            </a:r>
+            <a:r>
+              <a:rPr lang="en-US" dirty="0" smtClean="0"/>
+              <a:t>unauthorized </a:t>
+            </a:r>
+          </a:p>
+          <a:p>
+            <a:pPr marL="228600" indent="-228600"/>
+            <a:r>
+              <a:rPr lang="en-US" dirty="0"/>
+              <a:t> </a:t>
+            </a:r>
+            <a:r>
+              <a:rPr lang="en-US" dirty="0" smtClean="0"/>
+              <a:t>    modifications </a:t>
+            </a:r>
+            <a:r>
+              <a:rPr lang="en-US" dirty="0"/>
+              <a:t>to the code via a user specified approval </a:t>
+            </a:r>
+            <a:r>
+              <a:rPr lang="en-US" dirty="0" smtClean="0"/>
+              <a:t>policy.</a:t>
+            </a:r>
+          </a:p>
+          <a:p>
+            <a:pPr marL="228600" indent="-228600">
+              <a:buAutoNum type="arabicPeriod" startAt="3"/>
+            </a:pPr>
+            <a:r>
+              <a:rPr lang="en-US" dirty="0" smtClean="0"/>
+              <a:t>NICKLE uses VMM for restricting access to the Kernel space. NICKLE module lies in the VMM layer and enforces that the guest OS kernel cannot access the shadow memory. At runtime, any instruction executed in the shadow space must be fetched from the shadow memory, which contains authenticated instructions. </a:t>
+            </a:r>
+            <a:endParaRPr lang="en-US" smtClean="0"/>
+          </a:p>
+          <a:p>
+            <a:pPr marL="228600" indent="-228600">
+              <a:buAutoNum type="arabicPeriod" startAt="3"/>
+            </a:pPr>
+            <a:endParaRPr lang="en-US" dirty="0"/>
+          </a:p>
+        </p:txBody>
+      </p:sp>
+      <p:sp>
+        <p:nvSpPr>
+          <p:cNvPr id="4" name="Slide Number Placeholder 3"/>
+          <p:cNvSpPr>
+            <a:spLocks noGrp="1"/>
+          </p:cNvSpPr>
+          <p:nvPr>
+            <p:ph type="sldNum" sz="quarter" idx="10"/>
+          </p:nvPr>
+        </p:nvSpPr>
+        <p:spPr/>
+        <p:txBody>
+          <a:bodyPr/>
+          <a:lstStyle/>
+          <a:p>
+            <a:fld id="{72141A60-0A97-4B4C-A98B-2EDC5A7E8FE4}" type="slidenum">
+              <a:rPr lang="en-US" smtClean="0"/>
+              <a:t>11</a:t>
+            </a:fld>
+            <a:endParaRPr lang="en-US"/>
+          </a:p>
+        </p:txBody>
+      </p:sp>
+    </p:spTree>
+  </p:cSld>
+  <p:clrMapOvr>
+    <a:masterClrMapping/>
+  </p:clrMapOvr>
+</p:notes>
+</file>
+
 <file path=ppt/slideLayouts/slideLayout1.xml><?xml version="1.0" encoding="utf-8"?>
 <p:sldLayout xmlns:a="http://schemas.openxmlformats.org/drawingml/2006/main" xmlns:r="http://schemas.openxmlformats.org/officeDocument/2006/relationships" xmlns:p="http://schemas.openxmlformats.org/presentationml/2006/main" showMasterSp="0" type="title" preserve="1">
   <p:cSld name="Title Slide">
@@ -242,7 +1038,8 @@
           <a:p>
             <a:fld id="{B016CCD6-CAA2-4041-8C9A-E9376DD8C3A2}" type="datetimeFigureOut">
               <a:rPr lang="en-US" smtClean="0"/>
-              <a:t>4/19/2013</a:t>
+              <a:pPr/>
+              <a:t>4/20/2013</a:t>
             </a:fld>
             <a:endParaRPr lang="en-US"/>
           </a:p>
@@ -499,6 +1296,7 @@
           <a:p>
             <a:fld id="{79510822-FDAC-4AF7-B795-6E8C56E1E7AC}" type="slidenum">
               <a:rPr lang="en-US" smtClean="0"/>
+              <a:pPr/>
               <a:t>‹#›</a:t>
             </a:fld>
             <a:endParaRPr lang="en-US"/>
@@ -875,7 +1673,8 @@
           <a:p>
             <a:fld id="{B016CCD6-CAA2-4041-8C9A-E9376DD8C3A2}" type="datetimeFigureOut">
               <a:rPr lang="en-US" smtClean="0"/>
-              <a:t>4/19/2013</a:t>
+              <a:pPr/>
+              <a:t>4/20/2013</a:t>
             </a:fld>
             <a:endParaRPr lang="en-US"/>
           </a:p>
@@ -917,6 +1716,7 @@
           <a:p>
             <a:fld id="{79510822-FDAC-4AF7-B795-6E8C56E1E7AC}" type="slidenum">
               <a:rPr lang="en-US" smtClean="0"/>
+              <a:pPr/>
               <a:t>‹#›</a:t>
             </a:fld>
             <a:endParaRPr lang="en-US"/>
@@ -1152,7 +1952,8 @@
           <a:p>
             <a:fld id="{B016CCD6-CAA2-4041-8C9A-E9376DD8C3A2}" type="datetimeFigureOut">
               <a:rPr lang="en-US" smtClean="0"/>
-              <a:t>4/19/2013</a:t>
+              <a:pPr/>
+              <a:t>4/20/2013</a:t>
             </a:fld>
             <a:endParaRPr lang="en-US"/>
           </a:p>
@@ -1194,6 +1995,7 @@
           <a:p>
             <a:fld id="{79510822-FDAC-4AF7-B795-6E8C56E1E7AC}" type="slidenum">
               <a:rPr lang="en-US" smtClean="0"/>
+              <a:pPr/>
               <a:t>‹#›</a:t>
             </a:fld>
             <a:endParaRPr lang="en-US"/>
@@ -1317,7 +2119,8 @@
           <a:p>
             <a:fld id="{B016CCD6-CAA2-4041-8C9A-E9376DD8C3A2}" type="datetimeFigureOut">
               <a:rPr lang="en-US" smtClean="0"/>
-              <a:t>4/19/2013</a:t>
+              <a:pPr/>
+              <a:t>4/20/2013</a:t>
             </a:fld>
             <a:endParaRPr lang="en-US"/>
           </a:p>
@@ -1359,6 +2162,7 @@
           <a:p>
             <a:fld id="{79510822-FDAC-4AF7-B795-6E8C56E1E7AC}" type="slidenum">
               <a:rPr lang="en-US" smtClean="0"/>
+              <a:pPr/>
               <a:t>‹#›</a:t>
             </a:fld>
             <a:endParaRPr lang="en-US"/>
@@ -1498,7 +2302,8 @@
           <a:p>
             <a:fld id="{B016CCD6-CAA2-4041-8C9A-E9376DD8C3A2}" type="datetimeFigureOut">
               <a:rPr lang="en-US" smtClean="0"/>
-              <a:t>4/19/2013</a:t>
+              <a:pPr/>
+              <a:t>4/20/2013</a:t>
             </a:fld>
             <a:endParaRPr lang="en-US"/>
           </a:p>
@@ -1637,6 +2442,7 @@
           <a:p>
             <a:fld id="{79510822-FDAC-4AF7-B795-6E8C56E1E7AC}" type="slidenum">
               <a:rPr lang="en-US" smtClean="0"/>
+              <a:pPr/>
               <a:t>‹#›</a:t>
             </a:fld>
             <a:endParaRPr lang="en-US"/>
@@ -2143,7 +2949,8 @@
           <a:p>
             <a:fld id="{B016CCD6-CAA2-4041-8C9A-E9376DD8C3A2}" type="datetimeFigureOut">
               <a:rPr lang="en-US" smtClean="0"/>
-              <a:t>4/19/2013</a:t>
+              <a:pPr/>
+              <a:t>4/20/2013</a:t>
             </a:fld>
             <a:endParaRPr lang="en-US"/>
           </a:p>
@@ -2185,6 +2992,7 @@
           <a:p>
             <a:fld id="{79510822-FDAC-4AF7-B795-6E8C56E1E7AC}" type="slidenum">
               <a:rPr lang="en-US" smtClean="0"/>
+              <a:pPr/>
               <a:t>‹#›</a:t>
             </a:fld>
             <a:endParaRPr lang="en-US"/>
@@ -2569,7 +3377,8 @@
           <a:p>
             <a:fld id="{B016CCD6-CAA2-4041-8C9A-E9376DD8C3A2}" type="datetimeFigureOut">
               <a:rPr lang="en-US" smtClean="0"/>
-              <a:t>4/19/2013</a:t>
+              <a:pPr/>
+              <a:t>4/20/2013</a:t>
             </a:fld>
             <a:endParaRPr lang="en-US"/>
           </a:p>
@@ -2611,6 +3420,7 @@
           <a:p>
             <a:fld id="{79510822-FDAC-4AF7-B795-6E8C56E1E7AC}" type="slidenum">
               <a:rPr lang="en-US" smtClean="0"/>
+              <a:pPr/>
               <a:t>‹#›</a:t>
             </a:fld>
             <a:endParaRPr lang="en-US"/>
@@ -2682,7 +3492,8 @@
           <a:p>
             <a:fld id="{B016CCD6-CAA2-4041-8C9A-E9376DD8C3A2}" type="datetimeFigureOut">
               <a:rPr lang="en-US" smtClean="0"/>
-              <a:t>4/19/2013</a:t>
+              <a:pPr/>
+              <a:t>4/20/2013</a:t>
             </a:fld>
             <a:endParaRPr lang="en-US"/>
           </a:p>
@@ -2724,6 +3535,7 @@
           <a:p>
             <a:fld id="{79510822-FDAC-4AF7-B795-6E8C56E1E7AC}" type="slidenum">
               <a:rPr lang="en-US" smtClean="0"/>
+              <a:pPr/>
               <a:t>‹#›</a:t>
             </a:fld>
             <a:endParaRPr lang="en-US"/>
@@ -2863,7 +3675,8 @@
           <a:p>
             <a:fld id="{B016CCD6-CAA2-4041-8C9A-E9376DD8C3A2}" type="datetimeFigureOut">
               <a:rPr lang="en-US" smtClean="0"/>
-              <a:t>4/19/2013</a:t>
+              <a:pPr/>
+              <a:t>4/20/2013</a:t>
             </a:fld>
             <a:endParaRPr lang="en-US"/>
           </a:p>
@@ -2905,6 +3718,7 @@
           <a:p>
             <a:fld id="{79510822-FDAC-4AF7-B795-6E8C56E1E7AC}" type="slidenum">
               <a:rPr lang="en-US" smtClean="0"/>
+              <a:pPr/>
               <a:t>‹#›</a:t>
             </a:fld>
             <a:endParaRPr lang="en-US"/>
@@ -3129,7 +3943,8 @@
           <a:p>
             <a:fld id="{B016CCD6-CAA2-4041-8C9A-E9376DD8C3A2}" type="datetimeFigureOut">
               <a:rPr lang="en-US" smtClean="0"/>
-              <a:t>4/19/2013</a:t>
+              <a:pPr/>
+              <a:t>4/20/2013</a:t>
             </a:fld>
             <a:endParaRPr lang="en-US"/>
           </a:p>
@@ -3171,6 +3986,7 @@
           <a:p>
             <a:fld id="{79510822-FDAC-4AF7-B795-6E8C56E1E7AC}" type="slidenum">
               <a:rPr lang="en-US" smtClean="0"/>
+              <a:pPr/>
               <a:t>‹#›</a:t>
             </a:fld>
             <a:endParaRPr lang="en-US"/>
@@ -3599,7 +4415,8 @@
           <a:p>
             <a:fld id="{B016CCD6-CAA2-4041-8C9A-E9376DD8C3A2}" type="datetimeFigureOut">
               <a:rPr lang="en-US" smtClean="0"/>
-              <a:t>4/19/2013</a:t>
+              <a:pPr/>
+              <a:t>4/20/2013</a:t>
             </a:fld>
             <a:endParaRPr lang="en-US"/>
           </a:p>
@@ -3622,6 +4439,7 @@
           <a:p>
             <a:fld id="{79510822-FDAC-4AF7-B795-6E8C56E1E7AC}" type="slidenum">
               <a:rPr lang="en-US" smtClean="0"/>
+              <a:pPr/>
               <a:t>‹#›</a:t>
             </a:fld>
             <a:endParaRPr lang="en-US"/>
@@ -4159,7 +4977,8 @@
           <a:p>
             <a:fld id="{B016CCD6-CAA2-4041-8C9A-E9376DD8C3A2}" type="datetimeFigureOut">
               <a:rPr lang="en-US" smtClean="0"/>
-              <a:t>4/19/2013</a:t>
+              <a:pPr/>
+              <a:t>4/20/2013</a:t>
             </a:fld>
             <a:endParaRPr lang="en-US"/>
           </a:p>
@@ -4233,6 +5052,7 @@
           <a:p>
             <a:fld id="{79510822-FDAC-4AF7-B795-6E8C56E1E7AC}" type="slidenum">
               <a:rPr lang="en-US" smtClean="0"/>
+              <a:pPr/>
               <a:t>‹#›</a:t>
             </a:fld>
             <a:endParaRPr lang="en-US"/>
@@ -4750,7 +5570,7 @@
     </p:spTree>
     <p:extLst>
       <p:ext uri="{BB962C8B-B14F-4D97-AF65-F5344CB8AC3E}">
-        <p14:creationId xmlns:p14="http://schemas.microsoft.com/office/powerpoint/2010/main" val="2462047465"/>
+        <p14:creationId xmlns="" xmlns:p14="http://schemas.microsoft.com/office/powerpoint/2010/main" val="2462047465"/>
       </p:ext>
     </p:extLst>
   </p:cSld>
@@ -4794,7 +5614,11 @@
           <a:p>
             <a:r>
               <a:rPr lang="en-US" dirty="0" smtClean="0"/>
-              <a:t>Paladin</a:t>
+              <a:t>Security software above </a:t>
+            </a:r>
+            <a:r>
+              <a:rPr lang="en-US" dirty="0" err="1" smtClean="0"/>
+              <a:t>VMBr</a:t>
             </a:r>
             <a:endParaRPr lang="en-US" dirty="0"/>
           </a:p>
@@ -4817,18 +5641,37 @@
           <a:p>
             <a:r>
               <a:rPr lang="en-US" dirty="0" smtClean="0"/>
-              <a:t>Prashanta</a:t>
+              <a:t>Can software running above the VMBR detect its presence?????</a:t>
+            </a:r>
+          </a:p>
+          <a:p>
+            <a:r>
+              <a:rPr lang="en-US" dirty="0" smtClean="0"/>
+              <a:t>CPU time</a:t>
+            </a:r>
+          </a:p>
+          <a:p>
+            <a:r>
+              <a:rPr lang="en-US" dirty="0" smtClean="0"/>
+              <a:t>Memory and Disk space</a:t>
+            </a:r>
+          </a:p>
+          <a:p>
+            <a:r>
+              <a:rPr lang="en-US" dirty="0" smtClean="0"/>
+              <a:t>Variety of I/O devices </a:t>
+            </a:r>
+          </a:p>
+          <a:p>
+            <a:r>
+              <a:rPr lang="en-US" dirty="0" smtClean="0"/>
+              <a:t>Imperfect source of x86 processors</a:t>
             </a:r>
             <a:endParaRPr lang="en-US" dirty="0"/>
           </a:p>
         </p:txBody>
       </p:sp>
     </p:spTree>
-    <p:extLst>
-      <p:ext uri="{BB962C8B-B14F-4D97-AF65-F5344CB8AC3E}">
-        <p14:creationId xmlns:p14="http://schemas.microsoft.com/office/powerpoint/2010/main" val="1247059405"/>
-      </p:ext>
-    </p:extLst>
   </p:cSld>
   <p:clrMapOvr>
     <a:masterClrMapping/>
@@ -4870,7 +5713,7 @@
           <a:p>
             <a:r>
               <a:rPr lang="en-US" dirty="0" smtClean="0"/>
-              <a:t>Conclusion/Questions</a:t>
+              <a:t>Existing Detectors</a:t>
             </a:r>
             <a:endParaRPr lang="en-US" dirty="0"/>
           </a:p>
@@ -4891,14 +5734,194 @@
           <a:bodyPr/>
           <a:lstStyle/>
           <a:p>
-            <a:endParaRPr lang="en-US"/>
+            <a:r>
+              <a:rPr lang="en-US" dirty="0" err="1" smtClean="0"/>
+              <a:t>Hooksafe</a:t>
+            </a:r>
+            <a:endParaRPr lang="en-US" dirty="0" smtClean="0"/>
+          </a:p>
+          <a:p>
+            <a:r>
+              <a:rPr lang="en-US" dirty="0" err="1" smtClean="0"/>
+              <a:t>SecVisor</a:t>
+            </a:r>
+            <a:endParaRPr lang="en-US" dirty="0" smtClean="0"/>
+          </a:p>
+          <a:p>
+            <a:r>
+              <a:rPr lang="en-US" dirty="0" smtClean="0"/>
+              <a:t>NICKLE</a:t>
+            </a:r>
+            <a:endParaRPr lang="en-US" dirty="0" smtClean="0"/>
+          </a:p>
+          <a:p>
+            <a:r>
+              <a:rPr lang="en-US" dirty="0" smtClean="0"/>
+              <a:t>Red Pill </a:t>
+            </a:r>
+            <a:endParaRPr lang="en-US" dirty="0" smtClean="0"/>
+          </a:p>
+          <a:p>
+            <a:r>
+              <a:rPr lang="en-US" dirty="0" smtClean="0"/>
+              <a:t>Paladin</a:t>
+            </a:r>
+            <a:endParaRPr lang="en-US" dirty="0"/>
           </a:p>
         </p:txBody>
       </p:sp>
     </p:spTree>
     <p:extLst>
       <p:ext uri="{BB962C8B-B14F-4D97-AF65-F5344CB8AC3E}">
-        <p14:creationId xmlns:p14="http://schemas.microsoft.com/office/powerpoint/2010/main" val="949291844"/>
+        <p14:creationId xmlns="" xmlns:p14="http://schemas.microsoft.com/office/powerpoint/2010/main" val="3327195953"/>
+      </p:ext>
+    </p:extLst>
+  </p:cSld>
+  <p:clrMapOvr>
+    <a:masterClrMapping/>
+  </p:clrMapOvr>
+</p:sld>
+</file>
+
+<file path=ppt/slides/slide12.xml><?xml version="1.0" encoding="utf-8"?>
+<p:sld xmlns:a="http://schemas.openxmlformats.org/drawingml/2006/main" xmlns:r="http://schemas.openxmlformats.org/officeDocument/2006/relationships" xmlns:p="http://schemas.openxmlformats.org/presentationml/2006/main">
+  <p:cSld>
+    <p:spTree>
+      <p:nvGrpSpPr>
+        <p:cNvPr id="1" name=""/>
+        <p:cNvGrpSpPr/>
+        <p:nvPr/>
+      </p:nvGrpSpPr>
+      <p:grpSpPr>
+        <a:xfrm>
+          <a:off x="0" y="0"/>
+          <a:ext cx="0" cy="0"/>
+          <a:chOff x="0" y="0"/>
+          <a:chExt cx="0" cy="0"/>
+        </a:xfrm>
+      </p:grpSpPr>
+      <p:sp>
+        <p:nvSpPr>
+          <p:cNvPr id="2" name="Title 1"/>
+          <p:cNvSpPr>
+            <a:spLocks noGrp="1"/>
+          </p:cNvSpPr>
+          <p:nvPr>
+            <p:ph type="title"/>
+          </p:nvPr>
+        </p:nvSpPr>
+        <p:spPr/>
+        <p:txBody>
+          <a:bodyPr/>
+          <a:lstStyle/>
+          <a:p>
+            <a:r>
+              <a:rPr lang="en-US" dirty="0" smtClean="0"/>
+              <a:t>Paladin</a:t>
+            </a:r>
+            <a:endParaRPr lang="en-US" dirty="0"/>
+          </a:p>
+        </p:txBody>
+      </p:sp>
+      <p:sp>
+        <p:nvSpPr>
+          <p:cNvPr id="3" name="Content Placeholder 2"/>
+          <p:cNvSpPr>
+            <a:spLocks noGrp="1"/>
+          </p:cNvSpPr>
+          <p:nvPr>
+            <p:ph idx="1"/>
+          </p:nvPr>
+        </p:nvSpPr>
+        <p:spPr/>
+        <p:txBody>
+          <a:bodyPr/>
+          <a:lstStyle/>
+          <a:p>
+            <a:r>
+              <a:rPr lang="en-US" dirty="0" smtClean="0"/>
+              <a:t>Prashanta</a:t>
+            </a:r>
+            <a:endParaRPr lang="en-US" dirty="0"/>
+          </a:p>
+        </p:txBody>
+      </p:sp>
+    </p:spTree>
+    <p:extLst>
+      <p:ext uri="{BB962C8B-B14F-4D97-AF65-F5344CB8AC3E}">
+        <p14:creationId xmlns="" xmlns:p14="http://schemas.microsoft.com/office/powerpoint/2010/main" val="1247059405"/>
+      </p:ext>
+    </p:extLst>
+  </p:cSld>
+  <p:clrMapOvr>
+    <a:masterClrMapping/>
+  </p:clrMapOvr>
+</p:sld>
+</file>
+
+<file path=ppt/slides/slide13.xml><?xml version="1.0" encoding="utf-8"?>
+<p:sld xmlns:a="http://schemas.openxmlformats.org/drawingml/2006/main" xmlns:r="http://schemas.openxmlformats.org/officeDocument/2006/relationships" xmlns:p="http://schemas.openxmlformats.org/presentationml/2006/main">
+  <p:cSld>
+    <p:spTree>
+      <p:nvGrpSpPr>
+        <p:cNvPr id="1" name=""/>
+        <p:cNvGrpSpPr/>
+        <p:nvPr/>
+      </p:nvGrpSpPr>
+      <p:grpSpPr>
+        <a:xfrm>
+          <a:off x="0" y="0"/>
+          <a:ext cx="0" cy="0"/>
+          <a:chOff x="0" y="0"/>
+          <a:chExt cx="0" cy="0"/>
+        </a:xfrm>
+      </p:grpSpPr>
+      <p:sp>
+        <p:nvSpPr>
+          <p:cNvPr id="2" name="Title 1"/>
+          <p:cNvSpPr>
+            <a:spLocks noGrp="1"/>
+          </p:cNvSpPr>
+          <p:nvPr>
+            <p:ph type="title"/>
+          </p:nvPr>
+        </p:nvSpPr>
+        <p:spPr/>
+        <p:txBody>
+          <a:bodyPr/>
+          <a:lstStyle/>
+          <a:p>
+            <a:r>
+              <a:rPr lang="en-US" dirty="0" smtClean="0"/>
+              <a:t>Conclusion/Questions</a:t>
+            </a:r>
+            <a:endParaRPr lang="en-US" dirty="0"/>
+          </a:p>
+        </p:txBody>
+      </p:sp>
+      <p:sp>
+        <p:nvSpPr>
+          <p:cNvPr id="3" name="Content Placeholder 2"/>
+          <p:cNvSpPr>
+            <a:spLocks noGrp="1"/>
+          </p:cNvSpPr>
+          <p:nvPr>
+            <p:ph idx="1"/>
+          </p:nvPr>
+        </p:nvSpPr>
+        <p:spPr/>
+        <p:txBody>
+          <a:bodyPr/>
+          <a:lstStyle/>
+          <a:p>
+            <a:endParaRPr lang="en-US"/>
+          </a:p>
+        </p:txBody>
+      </p:sp>
+    </p:spTree>
+    <p:extLst>
+      <p:ext uri="{BB962C8B-B14F-4D97-AF65-F5344CB8AC3E}">
+        <p14:creationId xmlns="" xmlns:p14="http://schemas.microsoft.com/office/powerpoint/2010/main" val="949291844"/>
       </p:ext>
     </p:extLst>
   </p:cSld>
@@ -4971,11 +5994,7 @@
           <a:p>
             <a:r>
               <a:rPr lang="en-US" dirty="0" smtClean="0"/>
-              <a:t>Rootkit </a:t>
-            </a:r>
-            <a:r>
-              <a:rPr lang="en-US" dirty="0" smtClean="0"/>
-              <a:t>overview </a:t>
+              <a:t>Rootkit overview </a:t>
             </a:r>
           </a:p>
           <a:p>
@@ -4990,7 +6009,7 @@
     </p:spTree>
     <p:extLst>
       <p:ext uri="{BB962C8B-B14F-4D97-AF65-F5344CB8AC3E}">
-        <p14:creationId xmlns:p14="http://schemas.microsoft.com/office/powerpoint/2010/main" val="2590845106"/>
+        <p14:creationId xmlns="" xmlns:p14="http://schemas.microsoft.com/office/powerpoint/2010/main" val="2590845106"/>
       </p:ext>
     </p:extLst>
   </p:cSld>
@@ -5065,7 +6084,7 @@
     </p:spTree>
     <p:extLst>
       <p:ext uri="{BB962C8B-B14F-4D97-AF65-F5344CB8AC3E}">
-        <p14:creationId xmlns:p14="http://schemas.microsoft.com/office/powerpoint/2010/main" val="1666392369"/>
+        <p14:creationId xmlns="" xmlns:p14="http://schemas.microsoft.com/office/powerpoint/2010/main" val="1666392369"/>
       </p:ext>
     </p:extLst>
   </p:cSld>
@@ -5141,7 +6160,7 @@
     </p:spTree>
     <p:extLst>
       <p:ext uri="{BB962C8B-B14F-4D97-AF65-F5344CB8AC3E}">
-        <p14:creationId xmlns:p14="http://schemas.microsoft.com/office/powerpoint/2010/main" val="2346653610"/>
+        <p14:creationId xmlns="" xmlns:p14="http://schemas.microsoft.com/office/powerpoint/2010/main" val="2346653610"/>
       </p:ext>
     </p:extLst>
   </p:cSld>
@@ -5217,7 +6236,7 @@
     </p:spTree>
     <p:extLst>
       <p:ext uri="{BB962C8B-B14F-4D97-AF65-F5344CB8AC3E}">
-        <p14:creationId xmlns:p14="http://schemas.microsoft.com/office/powerpoint/2010/main" val="2687441504"/>
+        <p14:creationId xmlns="" xmlns:p14="http://schemas.microsoft.com/office/powerpoint/2010/main" val="2687441504"/>
       </p:ext>
     </p:extLst>
   </p:cSld>
@@ -5293,7 +6312,7 @@
     </p:spTree>
     <p:extLst>
       <p:ext uri="{BB962C8B-B14F-4D97-AF65-F5344CB8AC3E}">
-        <p14:creationId xmlns:p14="http://schemas.microsoft.com/office/powerpoint/2010/main" val="1607849096"/>
+        <p14:creationId xmlns="" xmlns:p14="http://schemas.microsoft.com/office/powerpoint/2010/main" val="1607849096"/>
       </p:ext>
     </p:extLst>
   </p:cSld>
@@ -5382,7 +6401,7 @@
     </p:spTree>
     <p:extLst>
       <p:ext uri="{BB962C8B-B14F-4D97-AF65-F5344CB8AC3E}">
-        <p14:creationId xmlns:p14="http://schemas.microsoft.com/office/powerpoint/2010/main" val="2405789898"/>
+        <p14:creationId xmlns="" xmlns:p14="http://schemas.microsoft.com/office/powerpoint/2010/main" val="2405789898"/>
       </p:ext>
     </p:extLst>
   </p:cSld>
@@ -5449,8 +6468,32 @@
           <a:p>
             <a:r>
               <a:rPr lang="en-US" dirty="0" smtClean="0"/>
-              <a:t>Prashanta</a:t>
-            </a:r>
+              <a:t>Two Ways:</a:t>
+            </a:r>
+          </a:p>
+          <a:p>
+            <a:endParaRPr lang="en-US" dirty="0" smtClean="0"/>
+          </a:p>
+          <a:p>
+            <a:pPr lvl="1"/>
+            <a:r>
+              <a:rPr lang="en-US" dirty="0" smtClean="0"/>
+              <a:t>Security software </a:t>
+            </a:r>
+            <a:r>
+              <a:rPr lang="en-US" dirty="0" smtClean="0"/>
+              <a:t>below the VMBR</a:t>
+            </a:r>
+          </a:p>
+          <a:p>
+            <a:pPr lvl="1"/>
+            <a:r>
+              <a:rPr lang="en-US" dirty="0" smtClean="0"/>
+              <a:t>Security  software above the VMBR</a:t>
+            </a:r>
+          </a:p>
+          <a:p>
+            <a:pPr lvl="1"/>
             <a:endParaRPr lang="en-US" dirty="0"/>
           </a:p>
         </p:txBody>
@@ -5458,7 +6501,7 @@
     </p:spTree>
     <p:extLst>
       <p:ext uri="{BB962C8B-B14F-4D97-AF65-F5344CB8AC3E}">
-        <p14:creationId xmlns:p14="http://schemas.microsoft.com/office/powerpoint/2010/main" val="19357863"/>
+        <p14:creationId xmlns="" xmlns:p14="http://schemas.microsoft.com/office/powerpoint/2010/main" val="19357863"/>
       </p:ext>
     </p:extLst>
   </p:cSld>
@@ -5502,7 +6545,11 @@
           <a:p>
             <a:r>
               <a:rPr lang="en-US" dirty="0" smtClean="0"/>
-              <a:t>Existing Detectors</a:t>
+              <a:t>Security software below </a:t>
+            </a:r>
+            <a:r>
+              <a:rPr lang="en-US" dirty="0" err="1" smtClean="0"/>
+              <a:t>vmbr</a:t>
             </a:r>
             <a:endParaRPr lang="en-US" dirty="0"/>
           </a:p>
@@ -5525,45 +6572,54 @@
           <a:p>
             <a:r>
               <a:rPr lang="en-US" dirty="0" smtClean="0"/>
-              <a:t>Prashanta</a:t>
-            </a:r>
+              <a:t>Can see the state of VMBR</a:t>
+            </a:r>
+          </a:p>
+          <a:p>
+            <a:r>
+              <a:rPr lang="en-US" dirty="0" smtClean="0"/>
+              <a:t>Read physical memory of disk and look for signatures and anomalies that indicate the presence of VMBR</a:t>
+            </a:r>
+          </a:p>
+          <a:p>
+            <a:r>
+              <a:rPr lang="en-US" dirty="0" smtClean="0"/>
+              <a:t>Use secure hardware</a:t>
+            </a:r>
+          </a:p>
+          <a:p>
+            <a:r>
+              <a:rPr lang="en-US" dirty="0" smtClean="0"/>
+              <a:t>Boot from safe medium </a:t>
+            </a:r>
+          </a:p>
+          <a:p>
+            <a:r>
+              <a:rPr lang="en-US" dirty="0" smtClean="0"/>
+              <a:t>Physically unplug the machine before reboot</a:t>
+            </a:r>
+          </a:p>
+          <a:p>
+            <a:r>
+              <a:rPr lang="en-US" dirty="0" smtClean="0"/>
+              <a:t>Use  secure VMM</a:t>
+            </a:r>
+          </a:p>
+          <a:p>
+            <a:pPr>
+              <a:buNone/>
+            </a:pPr>
             <a:endParaRPr lang="en-US" dirty="0" smtClean="0"/>
           </a:p>
           <a:p>
-            <a:r>
-              <a:rPr lang="en-US" dirty="0" err="1" smtClean="0"/>
-              <a:t>Hooksafe</a:t>
-            </a:r>
             <a:endParaRPr lang="en-US" dirty="0" smtClean="0"/>
           </a:p>
           <a:p>
-            <a:r>
-              <a:rPr lang="en-US" dirty="0" smtClean="0"/>
-              <a:t>(Mention NICKLE and others)</a:t>
-            </a:r>
-          </a:p>
-          <a:p>
-            <a:r>
-              <a:rPr lang="en-US" dirty="0" smtClean="0"/>
-              <a:t>Red Pill (defense against blue pill)</a:t>
-            </a:r>
-            <a:endParaRPr lang="en-US" dirty="0" smtClean="0"/>
-          </a:p>
-          <a:p>
-            <a:r>
-              <a:rPr lang="en-US" dirty="0" smtClean="0"/>
-              <a:t>Paladin (lead into next slide)</a:t>
-            </a:r>
             <a:endParaRPr lang="en-US" dirty="0"/>
           </a:p>
         </p:txBody>
       </p:sp>
     </p:spTree>
-    <p:extLst>
-      <p:ext uri="{BB962C8B-B14F-4D97-AF65-F5344CB8AC3E}">
-        <p14:creationId xmlns:p14="http://schemas.microsoft.com/office/powerpoint/2010/main" val="3327195953"/>
-      </p:ext>
-    </p:extLst>
   </p:cSld>
   <p:clrMapOvr>
     <a:masterClrMapping/>
@@ -5887,4 +6943,287 @@
   <a:objectDefaults/>
   <a:extraClrSchemeLst/>
 </a:theme>
+</file>
+
+<file path=ppt/theme/theme2.xml><?xml version="1.0" encoding="utf-8"?>
+<a:theme xmlns:a="http://schemas.openxmlformats.org/drawingml/2006/main" name="Office Theme">
+  <a:themeElements>
+    <a:clrScheme name="Office">
+      <a:dk1>
+        <a:sysClr val="windowText" lastClr="000000"/>
+      </a:dk1>
+      <a:lt1>
+        <a:sysClr val="window" lastClr="FFFFFF"/>
+      </a:lt1>
+      <a:dk2>
+        <a:srgbClr val="1F497D"/>
+      </a:dk2>
+      <a:lt2>
+        <a:srgbClr val="EEECE1"/>
+      </a:lt2>
+      <a:accent1>
+        <a:srgbClr val="4F81BD"/>
+      </a:accent1>
+      <a:accent2>
+        <a:srgbClr val="C0504D"/>
+      </a:accent2>
+      <a:accent3>
+        <a:srgbClr val="9BBB59"/>
+      </a:accent3>
+      <a:accent4>
+        <a:srgbClr val="8064A2"/>
+      </a:accent4>
+      <a:accent5>
+        <a:srgbClr val="4BACC6"/>
+      </a:accent5>
+      <a:accent6>
+        <a:srgbClr val="F79646"/>
+      </a:accent6>
+      <a:hlink>
+        <a:srgbClr val="0000FF"/>
+      </a:hlink>
+      <a:folHlink>
+        <a:srgbClr val="800080"/>
+      </a:folHlink>
+    </a:clrScheme>
+    <a:fontScheme name="Office">
+      <a:majorFont>
+        <a:latin typeface="Calibri"/>
+        <a:ea typeface=""/>
+        <a:cs typeface=""/>
+        <a:font script="Jpan" typeface="ＭＳ Ｐゴシック"/>
+        <a:font script="Hang" typeface="맑은 고딕"/>
+        <a:font script="Hans" typeface="宋体"/>
+        <a:font script="Hant" typeface="新細明體"/>
+        <a:font script="Arab" typeface="Times New Roman"/>
+        <a:font script="Hebr" typeface="Times New Roman"/>
+        <a:font script="Thai" typeface="Angsana New"/>
+        <a:font script="Ethi" typeface="Nyala"/>
+        <a:font script="Beng" typeface="Vrinda"/>
+        <a:font script="Gujr" typeface="Shruti"/>
+        <a:font script="Khmr" typeface="MoolBoran"/>
+        <a:font script="Knda" typeface="Tunga"/>
+        <a:font script="Guru" typeface="Raavi"/>
+        <a:font script="Cans" typeface="Euphemia"/>
+        <a:font script="Cher" typeface="Plantagenet Cherokee"/>
+        <a:font script="Yiii" typeface="Microsoft Yi Baiti"/>
+        <a:font script="Tibt" typeface="Microsoft Himalaya"/>
+        <a:font script="Thaa" typeface="MV Boli"/>
+        <a:font script="Deva" typeface="Mangal"/>
+        <a:font script="Telu" typeface="Gautami"/>
+        <a:font script="Taml" typeface="Latha"/>
+        <a:font script="Syrc" typeface="Estrangelo Edessa"/>
+        <a:font script="Orya" typeface="Kalinga"/>
+        <a:font script="Mlym" typeface="Kartika"/>
+        <a:font script="Laoo" typeface="DokChampa"/>
+        <a:font script="Sinh" typeface="Iskoola Pota"/>
+        <a:font script="Mong" typeface="Mongolian Baiti"/>
+        <a:font script="Viet" typeface="Times New Roman"/>
+        <a:font script="Uigh" typeface="Microsoft Uighur"/>
+      </a:majorFont>
+      <a:minorFont>
+        <a:latin typeface="Calibri"/>
+        <a:ea typeface=""/>
+        <a:cs typeface=""/>
+        <a:font script="Jpan" typeface="ＭＳ Ｐゴシック"/>
+        <a:font script="Hang" typeface="맑은 고딕"/>
+        <a:font script="Hans" typeface="宋体"/>
+        <a:font script="Hant" typeface="新細明體"/>
+        <a:font script="Arab" typeface="Arial"/>
+        <a:font script="Hebr" typeface="Arial"/>
+        <a:font script="Thai" typeface="Cordia New"/>
+        <a:font script="Ethi" typeface="Nyala"/>
+        <a:font script="Beng" typeface="Vrinda"/>
+        <a:font script="Gujr" typeface="Shruti"/>
+        <a:font script="Khmr" typeface="DaunPenh"/>
+        <a:font script="Knda" typeface="Tunga"/>
+        <a:font script="Guru" typeface="Raavi"/>
+        <a:font script="Cans" typeface="Euphemia"/>
+        <a:font script="Cher" typeface="Plantagenet Cherokee"/>
+        <a:font script="Yiii" typeface="Microsoft Yi Baiti"/>
+        <a:font script="Tibt" typeface="Microsoft Himalaya"/>
+        <a:font script="Thaa" typeface="MV Boli"/>
+        <a:font script="Deva" typeface="Mangal"/>
+        <a:font script="Telu" typeface="Gautami"/>
+        <a:font script="Taml" typeface="Latha"/>
+        <a:font script="Syrc" typeface="Estrangelo Edessa"/>
+        <a:font script="Orya" typeface="Kalinga"/>
+        <a:font script="Mlym" typeface="Kartika"/>
+        <a:font script="Laoo" typeface="DokChampa"/>
+        <a:font script="Sinh" typeface="Iskoola Pota"/>
+        <a:font script="Mong" typeface="Mongolian Baiti"/>
+        <a:font script="Viet" typeface="Arial"/>
+        <a:font script="Uigh" typeface="Microsoft Uighur"/>
+      </a:minorFont>
+    </a:fontScheme>
+    <a:fmtScheme name="Office">
+      <a:fillStyleLst>
+        <a:solidFill>
+          <a:schemeClr val="phClr"/>
+        </a:solidFill>
+        <a:gradFill rotWithShape="1">
+          <a:gsLst>
+            <a:gs pos="0">
+              <a:schemeClr val="phClr">
+                <a:tint val="50000"/>
+                <a:satMod val="300000"/>
+              </a:schemeClr>
+            </a:gs>
+            <a:gs pos="35000">
+              <a:schemeClr val="phClr">
+                <a:tint val="37000"/>
+                <a:satMod val="300000"/>
+              </a:schemeClr>
+            </a:gs>
+            <a:gs pos="100000">
+              <a:schemeClr val="phClr">
+                <a:tint val="15000"/>
+                <a:satMod val="350000"/>
+              </a:schemeClr>
+            </a:gs>
+          </a:gsLst>
+          <a:lin ang="16200000" scaled="1"/>
+        </a:gradFill>
+        <a:gradFill rotWithShape="1">
+          <a:gsLst>
+            <a:gs pos="0">
+              <a:schemeClr val="phClr">
+                <a:shade val="51000"/>
+                <a:satMod val="130000"/>
+              </a:schemeClr>
+            </a:gs>
+            <a:gs pos="80000">
+              <a:schemeClr val="phClr">
+                <a:shade val="93000"/>
+                <a:satMod val="130000"/>
+              </a:schemeClr>
+            </a:gs>
+            <a:gs pos="100000">
+              <a:schemeClr val="phClr">
+                <a:shade val="94000"/>
+                <a:satMod val="135000"/>
+              </a:schemeClr>
+            </a:gs>
+          </a:gsLst>
+          <a:lin ang="16200000" scaled="0"/>
+        </a:gradFill>
+      </a:fillStyleLst>
+      <a:lnStyleLst>
+        <a:ln w="9525" cap="flat" cmpd="sng" algn="ctr">
+          <a:solidFill>
+            <a:schemeClr val="phClr">
+              <a:shade val="95000"/>
+              <a:satMod val="105000"/>
+            </a:schemeClr>
+          </a:solidFill>
+          <a:prstDash val="solid"/>
+        </a:ln>
+        <a:ln w="25400" cap="flat" cmpd="sng" algn="ctr">
+          <a:solidFill>
+            <a:schemeClr val="phClr"/>
+          </a:solidFill>
+          <a:prstDash val="solid"/>
+        </a:ln>
+        <a:ln w="38100" cap="flat" cmpd="sng" algn="ctr">
+          <a:solidFill>
+            <a:schemeClr val="phClr"/>
+          </a:solidFill>
+          <a:prstDash val="solid"/>
+        </a:ln>
+      </a:lnStyleLst>
+      <a:effectStyleLst>
+        <a:effectStyle>
+          <a:effectLst>
+            <a:outerShdw blurRad="40000" dist="20000" dir="5400000" rotWithShape="0">
+              <a:srgbClr val="000000">
+                <a:alpha val="38000"/>
+              </a:srgbClr>
+            </a:outerShdw>
+          </a:effectLst>
+        </a:effectStyle>
+        <a:effectStyle>
+          <a:effectLst>
+            <a:outerShdw blurRad="40000" dist="23000" dir="5400000" rotWithShape="0">
+              <a:srgbClr val="000000">
+                <a:alpha val="35000"/>
+              </a:srgbClr>
+            </a:outerShdw>
+          </a:effectLst>
+        </a:effectStyle>
+        <a:effectStyle>
+          <a:effectLst>
+            <a:outerShdw blurRad="40000" dist="23000" dir="5400000" rotWithShape="0">
+              <a:srgbClr val="000000">
+                <a:alpha val="35000"/>
+              </a:srgbClr>
+            </a:outerShdw>
+          </a:effectLst>
+          <a:scene3d>
+            <a:camera prst="orthographicFront">
+              <a:rot lat="0" lon="0" rev="0"/>
+            </a:camera>
+            <a:lightRig rig="threePt" dir="t">
+              <a:rot lat="0" lon="0" rev="1200000"/>
+            </a:lightRig>
+          </a:scene3d>
+          <a:sp3d>
+            <a:bevelT w="63500" h="25400"/>
+          </a:sp3d>
+        </a:effectStyle>
+      </a:effectStyleLst>
+      <a:bgFillStyleLst>
+        <a:solidFill>
+          <a:schemeClr val="phClr"/>
+        </a:solidFill>
+        <a:gradFill rotWithShape="1">
+          <a:gsLst>
+            <a:gs pos="0">
+              <a:schemeClr val="phClr">
+                <a:tint val="40000"/>
+                <a:satMod val="350000"/>
+              </a:schemeClr>
+            </a:gs>
+            <a:gs pos="40000">
+              <a:schemeClr val="phClr">
+                <a:tint val="45000"/>
+                <a:shade val="99000"/>
+                <a:satMod val="350000"/>
+              </a:schemeClr>
+            </a:gs>
+            <a:gs pos="100000">
+              <a:schemeClr val="phClr">
+                <a:shade val="20000"/>
+                <a:satMod val="255000"/>
+              </a:schemeClr>
+            </a:gs>
+          </a:gsLst>
+          <a:path path="circle">
+            <a:fillToRect l="50000" t="-80000" r="50000" b="180000"/>
+          </a:path>
+        </a:gradFill>
+        <a:gradFill rotWithShape="1">
+          <a:gsLst>
+            <a:gs pos="0">
+              <a:schemeClr val="phClr">
+                <a:tint val="80000"/>
+                <a:satMod val="300000"/>
+              </a:schemeClr>
+            </a:gs>
+            <a:gs pos="100000">
+              <a:schemeClr val="phClr">
+                <a:shade val="30000"/>
+                <a:satMod val="200000"/>
+              </a:schemeClr>
+            </a:gs>
+          </a:gsLst>
+          <a:path path="circle">
+            <a:fillToRect l="50000" t="50000" r="50000" b="50000"/>
+          </a:path>
+        </a:gradFill>
+      </a:bgFillStyleLst>
+    </a:fmtScheme>
+  </a:themeElements>
+  <a:objectDefaults/>
+  <a:extraClrSchemeLst/>
+</a:theme>
 </file>
</xml_diff>

<commit_message>
Added Virtual Machine and VMBR control parts
</commit_message>
<xml_diff>
--- a/VMBR_Presentation.pptx
+++ b/VMBR_Presentation.pptx
@@ -5,26 +5,27 @@
     <p:sldMasterId id="2147483660" r:id="rId1"/>
   </p:sldMasterIdLst>
   <p:notesMasterIdLst>
-    <p:notesMasterId r:id="rId19"/>
+    <p:notesMasterId r:id="rId20"/>
   </p:notesMasterIdLst>
   <p:sldIdLst>
     <p:sldId id="256" r:id="rId2"/>
     <p:sldId id="257" r:id="rId3"/>
-    <p:sldId id="258" r:id="rId4"/>
-    <p:sldId id="259" r:id="rId5"/>
-    <p:sldId id="262" r:id="rId6"/>
-    <p:sldId id="260" r:id="rId7"/>
-    <p:sldId id="264" r:id="rId8"/>
-    <p:sldId id="261" r:id="rId9"/>
-    <p:sldId id="267" r:id="rId10"/>
-    <p:sldId id="268" r:id="rId11"/>
-    <p:sldId id="263" r:id="rId12"/>
-    <p:sldId id="265" r:id="rId13"/>
-    <p:sldId id="270" r:id="rId14"/>
-    <p:sldId id="269" r:id="rId15"/>
-    <p:sldId id="271" r:id="rId16"/>
-    <p:sldId id="272" r:id="rId17"/>
-    <p:sldId id="266" r:id="rId18"/>
+    <p:sldId id="273" r:id="rId4"/>
+    <p:sldId id="274" r:id="rId5"/>
+    <p:sldId id="259" r:id="rId6"/>
+    <p:sldId id="262" r:id="rId7"/>
+    <p:sldId id="275" r:id="rId8"/>
+    <p:sldId id="264" r:id="rId9"/>
+    <p:sldId id="261" r:id="rId10"/>
+    <p:sldId id="267" r:id="rId11"/>
+    <p:sldId id="268" r:id="rId12"/>
+    <p:sldId id="263" r:id="rId13"/>
+    <p:sldId id="265" r:id="rId14"/>
+    <p:sldId id="270" r:id="rId15"/>
+    <p:sldId id="269" r:id="rId16"/>
+    <p:sldId id="271" r:id="rId17"/>
+    <p:sldId id="272" r:id="rId18"/>
+    <p:sldId id="266" r:id="rId19"/>
   </p:sldIdLst>
   <p:sldSz cx="9144000" cy="6858000" type="screen4x3"/>
   <p:notesSz cx="6858000" cy="9144000"/>
@@ -380,7 +381,7 @@
     </p:spTree>
     <p:extLst>
       <p:ext uri="{BB962C8B-B14F-4D97-AF65-F5344CB8AC3E}">
-        <p14:creationId xmlns:p14="http://schemas.microsoft.com/office/powerpoint/2010/main" xmlns="" val="846735352"/>
+        <p14:creationId xmlns:p14="http://schemas.microsoft.com/office/powerpoint/2010/main" val="846735352"/>
       </p:ext>
     </p:extLst>
   </p:cSld>
@@ -603,78 +604,12 @@
         </p:nvSpPr>
         <p:spPr/>
         <p:txBody>
-          <a:bodyPr>
-            <a:normAutofit/>
-          </a:bodyPr>
-          <a:lstStyle/>
-          <a:p>
-            <a:pPr marL="228600" indent="-228600">
-              <a:buAutoNum type="arabicPeriod"/>
-            </a:pPr>
-            <a:r>
-              <a:rPr lang="en-US" dirty="0" smtClean="0"/>
-              <a:t>Detectors that run below the VMBR can see the state of the VMBR because their view of the system does not go through the VMBR’s virtualization layer. </a:t>
-            </a:r>
-          </a:p>
-          <a:p>
-            <a:pPr marL="228600" indent="-228600">
-              <a:buAutoNum type="arabicPeriod"/>
-            </a:pPr>
-            <a:r>
-              <a:rPr lang="en-US" dirty="0" smtClean="0"/>
-              <a:t>Such detection software can read physical memory or disk and look for signatures or anomalies that indicate the presence of a VMBR, such as a modified boot sequence. </a:t>
-            </a:r>
-          </a:p>
-          <a:p>
-            <a:pPr marL="228600" indent="-228600">
-              <a:buAutoNum type="arabicPeriod"/>
-            </a:pPr>
-            <a:r>
-              <a:rPr lang="en-US" dirty="0" smtClean="0"/>
-              <a:t>Researchers (Intel, AMD and Copilot all) propose hardware that can be used to develop and deploy low-layer security software that would run beneath a VMBR. </a:t>
-            </a:r>
-          </a:p>
-          <a:p>
-            <a:pPr marL="228600" indent="-228600">
-              <a:buAutoNum type="arabicPeriod"/>
-            </a:pPr>
-            <a:r>
-              <a:rPr lang="en-US" dirty="0" smtClean="0"/>
-              <a:t>A valid way to gain control below the VMBR is to boot from a safe medium such as CD-ROM, USB drive or network boot server. This boot code can run on the system before the VMBR loads and can view the VMBR’s quiescent disk state. </a:t>
-            </a:r>
-          </a:p>
-          <a:p>
-            <a:pPr marL="228600" indent="-228600">
-              <a:buAutoNum type="arabicPeriod"/>
-            </a:pPr>
-            <a:r>
-              <a:rPr lang="en-US" dirty="0" smtClean="0"/>
-              <a:t>VMBRs can avoid booting from safe medium by emulating system shutdowns and reboots, thus it’s a good practice to physically unplug the machine before attempting to boot from safe medium. </a:t>
-            </a:r>
-          </a:p>
-          <a:p>
-            <a:pPr marL="228600" indent="-228600">
-              <a:buAutoNum type="arabicPeriod"/>
-            </a:pPr>
-            <a:r>
-              <a:rPr lang="en-US" dirty="0" smtClean="0"/>
-              <a:t>Using a secure VMM, king et al. implemented an enhanced version of secure boot which can prevent VMBR installations. The goal of the secure boot system is to provide attestation for existing boot components, such as dist master boot record, the file </a:t>
-            </a:r>
-            <a:r>
-              <a:rPr lang="en-US" dirty="0" err="1" smtClean="0"/>
-              <a:t>systems’s</a:t>
-            </a:r>
-            <a:r>
-              <a:rPr lang="en-US" dirty="0" smtClean="0"/>
-              <a:t> boot </a:t>
-            </a:r>
-            <a:r>
-              <a:rPr lang="en-US" dirty="0" err="1" smtClean="0"/>
-              <a:t>sectorand</a:t>
-            </a:r>
-            <a:r>
-              <a:rPr lang="en-US" dirty="0" smtClean="0"/>
-              <a:t> the OS’s boot loader and also to allow the legitimate updates of these components. </a:t>
+          <a:bodyPr/>
+          <a:lstStyle/>
+          <a:p>
+            <a:r>
+              <a:rPr lang="en-US" dirty="0" smtClean="0"/>
+              <a:t>Mike</a:t>
             </a:r>
             <a:endParaRPr lang="en-US" dirty="0"/>
           </a:p>
@@ -695,16 +630,20 @@
           <a:bodyPr/>
           <a:lstStyle/>
           <a:p>
-            <a:fld id="{72141A60-0A97-4B4C-A98B-2EDC5A7E8FE4}" type="slidenum">
-              <a:rPr lang="en-US" smtClean="0"/>
-              <a:pPr/>
-              <a:t>9</a:t>
+            <a:fld id="{FC4DA58B-212D-4CB1-A82C-2E2734039AFF}" type="slidenum">
+              <a:rPr lang="en-US" smtClean="0"/>
+              <a:t>3</a:t>
             </a:fld>
             <a:endParaRPr lang="en-US"/>
           </a:p>
         </p:txBody>
       </p:sp>
     </p:spTree>
+    <p:extLst>
+      <p:ext uri="{BB962C8B-B14F-4D97-AF65-F5344CB8AC3E}">
+        <p14:creationId xmlns:p14="http://schemas.microsoft.com/office/powerpoint/2010/main" val="875293555"/>
+      </p:ext>
+    </p:extLst>
   </p:cSld>
   <p:clrMapOvr>
     <a:masterClrMapping/>
@@ -753,34 +692,13 @@
         </p:nvSpPr>
         <p:spPr/>
         <p:txBody>
-          <a:bodyPr>
-            <a:normAutofit/>
-          </a:bodyPr>
-          <a:lstStyle/>
-          <a:p>
-            <a:r>
-              <a:rPr lang="en-US" dirty="0" smtClean="0"/>
-              <a:t>1. A VMBR adds CPU overhead to trap and emulate privileged instructions, as well as to run any malicious services. These timing differences can be noticed by software running in the virtual machine by comparing the running time of benchmarks against wall-clock time. </a:t>
-            </a:r>
-          </a:p>
-          <a:p>
-            <a:endParaRPr lang="en-US" dirty="0"/>
-          </a:p>
-          <a:p>
-            <a:r>
-              <a:rPr lang="en-US" dirty="0" smtClean="0"/>
-              <a:t>2. An approach used was a program that required the entire machines memory of disk space. VMBR was able to hide its space overhead in several ways and this method didn’t prove to be that good (paging some data to disk for memory and bad sector trick for disk). </a:t>
-            </a:r>
-          </a:p>
-          <a:p>
-            <a:endParaRPr lang="en-US" dirty="0"/>
-          </a:p>
-          <a:p>
-            <a:r>
-              <a:rPr lang="en-US" dirty="0" smtClean="0"/>
-              <a:t>3. </a:t>
-            </a:r>
-            <a:endParaRPr lang="en-US" dirty="0"/>
+          <a:bodyPr/>
+          <a:lstStyle/>
+          <a:p>
+            <a:r>
+              <a:rPr lang="en-US" dirty="0" smtClean="0"/>
+              <a:t>Mike</a:t>
+            </a:r>
           </a:p>
         </p:txBody>
       </p:sp>
@@ -799,16 +717,20 @@
           <a:bodyPr/>
           <a:lstStyle/>
           <a:p>
-            <a:fld id="{72141A60-0A97-4B4C-A98B-2EDC5A7E8FE4}" type="slidenum">
-              <a:rPr lang="en-US" smtClean="0"/>
-              <a:pPr/>
-              <a:t>10</a:t>
+            <a:fld id="{FC4DA58B-212D-4CB1-A82C-2E2734039AFF}" type="slidenum">
+              <a:rPr lang="en-US" smtClean="0"/>
+              <a:t>4</a:t>
             </a:fld>
             <a:endParaRPr lang="en-US"/>
           </a:p>
         </p:txBody>
       </p:sp>
     </p:spTree>
+    <p:extLst>
+      <p:ext uri="{BB962C8B-B14F-4D97-AF65-F5344CB8AC3E}">
+        <p14:creationId xmlns:p14="http://schemas.microsoft.com/office/powerpoint/2010/main" val="3004174998"/>
+      </p:ext>
+    </p:extLst>
   </p:cSld>
   <p:clrMapOvr>
     <a:masterClrMapping/>
@@ -857,122 +779,13 @@
         </p:nvSpPr>
         <p:spPr/>
         <p:txBody>
-          <a:bodyPr>
-            <a:normAutofit/>
-          </a:bodyPr>
-          <a:lstStyle/>
-          <a:p>
-            <a:pPr marL="228600" indent="-228600">
-              <a:buAutoNum type="arabicPeriod"/>
-            </a:pPr>
-            <a:r>
-              <a:rPr lang="en-US" dirty="0" smtClean="0"/>
-              <a:t>Hooks </a:t>
-            </a:r>
-            <a:r>
-              <a:rPr lang="en-US" dirty="0"/>
-              <a:t>are blocks of code that intercept events, function calls, or </a:t>
-            </a:r>
-            <a:r>
-              <a:rPr lang="en-US" dirty="0" smtClean="0"/>
-              <a:t>messages. Hooking is employed by </a:t>
-            </a:r>
-            <a:r>
-              <a:rPr lang="en-US" dirty="0" err="1" smtClean="0"/>
-              <a:t>rootkits</a:t>
-            </a:r>
-            <a:r>
-              <a:rPr lang="en-US" dirty="0" smtClean="0"/>
-              <a:t> to evade detection. Hooking modifies the flow of control and hides the presence of modification. </a:t>
-            </a:r>
-          </a:p>
-          <a:p>
-            <a:pPr marL="228600" indent="-228600"/>
-            <a:r>
-              <a:rPr lang="en-US" dirty="0"/>
-              <a:t>	</a:t>
-            </a:r>
-            <a:r>
-              <a:rPr lang="en-US" dirty="0" err="1" smtClean="0"/>
-              <a:t>Hooksafe</a:t>
-            </a:r>
-            <a:r>
-              <a:rPr lang="en-US" dirty="0" smtClean="0"/>
-              <a:t> provides a hypervisor based system to protect kernel hooks from being attacked by </a:t>
-            </a:r>
-            <a:r>
-              <a:rPr lang="en-US" dirty="0" err="1" smtClean="0"/>
-              <a:t>rootkits</a:t>
-            </a:r>
-            <a:r>
-              <a:rPr lang="en-US" dirty="0" smtClean="0"/>
-              <a:t>. </a:t>
-            </a:r>
-            <a:r>
-              <a:rPr lang="en-US" dirty="0" err="1" smtClean="0"/>
-              <a:t>Hooksafe</a:t>
-            </a:r>
-            <a:r>
-              <a:rPr lang="en-US" dirty="0" smtClean="0"/>
-              <a:t> monitors the possible hooks(write access) for modifications. It provides a hook indirection layer to regulate access to hooks in kernel. </a:t>
-            </a:r>
-          </a:p>
-          <a:p>
-            <a:pPr marL="228600" indent="-228600"/>
-            <a:r>
-              <a:rPr lang="en-US" dirty="0" smtClean="0"/>
-              <a:t>2. </a:t>
-            </a:r>
-            <a:r>
-              <a:rPr lang="en-US" dirty="0" err="1" smtClean="0"/>
-              <a:t>SecVisor</a:t>
-            </a:r>
-            <a:r>
-              <a:rPr lang="en-US" dirty="0" smtClean="0"/>
-              <a:t> </a:t>
-            </a:r>
-            <a:r>
-              <a:rPr lang="en-US" dirty="0"/>
-              <a:t>protects the integrity of code in OS kernels by preventing </a:t>
-            </a:r>
-            <a:r>
-              <a:rPr lang="en-US" dirty="0" smtClean="0"/>
-              <a:t>unauthorized </a:t>
-            </a:r>
-          </a:p>
-          <a:p>
-            <a:pPr marL="228600" indent="-228600"/>
-            <a:r>
-              <a:rPr lang="en-US" dirty="0"/>
-              <a:t> </a:t>
-            </a:r>
-            <a:r>
-              <a:rPr lang="en-US" dirty="0" smtClean="0"/>
-              <a:t>    modifications </a:t>
-            </a:r>
-            <a:r>
-              <a:rPr lang="en-US" dirty="0"/>
-              <a:t>to the code via a user specified approval </a:t>
-            </a:r>
-            <a:r>
-              <a:rPr lang="en-US" dirty="0" smtClean="0"/>
-              <a:t>policy.</a:t>
-            </a:r>
-          </a:p>
-          <a:p>
-            <a:pPr marL="228600" indent="-228600">
-              <a:buAutoNum type="arabicPeriod" startAt="3"/>
-            </a:pPr>
-            <a:r>
-              <a:rPr lang="en-US" dirty="0" smtClean="0"/>
-              <a:t>NICKLE uses VMM for restricting access to the Kernel space. NICKLE module lies in the VMM layer and enforces that the guest OS kernel cannot access the shadow memory. At runtime, any instruction executed in the shadow space must be fetched from the shadow memory, which contains authenticated instructions. </a:t>
-            </a:r>
-            <a:endParaRPr lang="en-US" smtClean="0"/>
-          </a:p>
-          <a:p>
-            <a:pPr marL="228600" indent="-228600">
-              <a:buAutoNum type="arabicPeriod" startAt="3"/>
-            </a:pPr>
+          <a:bodyPr/>
+          <a:lstStyle/>
+          <a:p>
+            <a:r>
+              <a:rPr lang="en-US" dirty="0" smtClean="0"/>
+              <a:t>Mike</a:t>
+            </a:r>
             <a:endParaRPr lang="en-US" dirty="0"/>
           </a:p>
         </p:txBody>
@@ -992,16 +805,20 @@
           <a:bodyPr/>
           <a:lstStyle/>
           <a:p>
-            <a:fld id="{72141A60-0A97-4B4C-A98B-2EDC5A7E8FE4}" type="slidenum">
-              <a:rPr lang="en-US" smtClean="0"/>
-              <a:pPr/>
-              <a:t>11</a:t>
+            <a:fld id="{FC4DA58B-212D-4CB1-A82C-2E2734039AFF}" type="slidenum">
+              <a:rPr lang="en-US" smtClean="0"/>
+              <a:t>7</a:t>
             </a:fld>
             <a:endParaRPr lang="en-US"/>
           </a:p>
         </p:txBody>
       </p:sp>
     </p:spTree>
+    <p:extLst>
+      <p:ext uri="{BB962C8B-B14F-4D97-AF65-F5344CB8AC3E}">
+        <p14:creationId xmlns:p14="http://schemas.microsoft.com/office/powerpoint/2010/main" val="2266588369"/>
+      </p:ext>
+    </p:extLst>
   </p:cSld>
   <p:clrMapOvr>
     <a:masterClrMapping/>
@@ -1055,51 +872,73 @@
           </a:bodyPr>
           <a:lstStyle/>
           <a:p>
-            <a:r>
-              <a:rPr lang="en-US" sz="1200" kern="1200" dirty="0" smtClean="0">
-                <a:solidFill>
-                  <a:schemeClr val="tx1"/>
-                </a:solidFill>
-                <a:latin typeface="+mn-lt"/>
-                <a:ea typeface="+mn-ea"/>
-                <a:cs typeface="+mn-cs"/>
-              </a:rPr>
-              <a:t>File access control policies protect the system utilities from being replaced by their </a:t>
-            </a:r>
-            <a:r>
-              <a:rPr lang="en-US" sz="1200" kern="1200" dirty="0" err="1" smtClean="0">
-                <a:solidFill>
-                  <a:schemeClr val="tx1"/>
-                </a:solidFill>
-                <a:latin typeface="+mn-lt"/>
-                <a:ea typeface="+mn-ea"/>
-                <a:cs typeface="+mn-cs"/>
-              </a:rPr>
-              <a:t>trojaned</a:t>
-            </a:r>
-            <a:r>
-              <a:rPr lang="en-US" sz="1200" kern="1200" dirty="0" smtClean="0">
-                <a:solidFill>
-                  <a:schemeClr val="tx1"/>
-                </a:solidFill>
-                <a:latin typeface="+mn-lt"/>
-                <a:ea typeface="+mn-ea"/>
-                <a:cs typeface="+mn-cs"/>
-              </a:rPr>
-              <a:t> counterparts. </a:t>
-            </a:r>
-          </a:p>
-          <a:p>
-            <a:r>
-              <a:rPr lang="en-US" sz="1200" kern="1200" smtClean="0">
-                <a:solidFill>
-                  <a:schemeClr val="tx1"/>
-                </a:solidFill>
-                <a:latin typeface="+mn-lt"/>
-                <a:ea typeface="+mn-ea"/>
-                <a:cs typeface="+mn-cs"/>
-              </a:rPr>
-              <a:t>Memory access control policies protect the kernel code and data structures from being overwritten in memory.</a:t>
+            <a:pPr marL="228600" indent="-228600">
+              <a:buAutoNum type="arabicPeriod"/>
+            </a:pPr>
+            <a:r>
+              <a:rPr lang="en-US" dirty="0" smtClean="0"/>
+              <a:t>Detectors that run below the VMBR can see the state of the VMBR because their view of the system does not go through the VMBR’s virtualization layer. </a:t>
+            </a:r>
+          </a:p>
+          <a:p>
+            <a:pPr marL="228600" indent="-228600">
+              <a:buAutoNum type="arabicPeriod"/>
+            </a:pPr>
+            <a:r>
+              <a:rPr lang="en-US" dirty="0" smtClean="0"/>
+              <a:t>Such detection software can read physical memory or disk and look for signatures or anomalies that indicate the presence of a VMBR, such as a modified boot sequence. </a:t>
+            </a:r>
+          </a:p>
+          <a:p>
+            <a:pPr marL="228600" indent="-228600">
+              <a:buAutoNum type="arabicPeriod"/>
+            </a:pPr>
+            <a:r>
+              <a:rPr lang="en-US" dirty="0" smtClean="0"/>
+              <a:t>Researchers (Intel, AMD and Copilot all) propose hardware that can be used to develop and deploy low-layer security software that would run beneath a VMBR. </a:t>
+            </a:r>
+          </a:p>
+          <a:p>
+            <a:pPr marL="228600" indent="-228600">
+              <a:buAutoNum type="arabicPeriod"/>
+            </a:pPr>
+            <a:r>
+              <a:rPr lang="en-US" dirty="0" smtClean="0"/>
+              <a:t>A valid way to gain control below the VMBR is to boot from a safe medium such as CD-ROM, USB drive or network boot server. This boot code can run on the system before the VMBR loads and can view the VMBR’s quiescent disk state. </a:t>
+            </a:r>
+          </a:p>
+          <a:p>
+            <a:pPr marL="228600" indent="-228600">
+              <a:buAutoNum type="arabicPeriod"/>
+            </a:pPr>
+            <a:r>
+              <a:rPr lang="en-US" dirty="0" smtClean="0"/>
+              <a:t>VMBRs can avoid booting from safe medium by emulating system shutdowns and reboots, thus it’s a good practice to physically unplug the machine before attempting to boot from safe medium. </a:t>
+            </a:r>
+          </a:p>
+          <a:p>
+            <a:pPr marL="228600" indent="-228600">
+              <a:buAutoNum type="arabicPeriod"/>
+            </a:pPr>
+            <a:r>
+              <a:rPr lang="en-US" dirty="0" smtClean="0"/>
+              <a:t>Using a secure VMM, king et al. implemented an enhanced version of secure boot which can prevent VMBR installations. The goal of the secure boot system is to provide attestation for existing boot components, such as dist master boot record, the file </a:t>
+            </a:r>
+            <a:r>
+              <a:rPr lang="en-US" dirty="0" err="1" smtClean="0"/>
+              <a:t>systems’s</a:t>
+            </a:r>
+            <a:r>
+              <a:rPr lang="en-US" dirty="0" smtClean="0"/>
+              <a:t> boot </a:t>
+            </a:r>
+            <a:r>
+              <a:rPr lang="en-US" dirty="0" err="1" smtClean="0"/>
+              <a:t>sectorand</a:t>
+            </a:r>
+            <a:r>
+              <a:rPr lang="en-US" dirty="0" smtClean="0"/>
+              <a:t> the OS’s boot loader and also to allow the legitimate updates of these components. </a:t>
             </a:r>
             <a:endParaRPr lang="en-US" dirty="0"/>
           </a:p>
@@ -1123,7 +962,7 @@
             <a:fld id="{72141A60-0A97-4B4C-A98B-2EDC5A7E8FE4}" type="slidenum">
               <a:rPr lang="en-US" smtClean="0"/>
               <a:pPr/>
-              <a:t>13</a:t>
+              <a:t>10</a:t>
             </a:fld>
             <a:endParaRPr lang="en-US"/>
           </a:p>
@@ -1185,6 +1024,431 @@
           <a:p>
             <a:r>
               <a:rPr lang="en-US" dirty="0" smtClean="0"/>
+              <a:t>1. A VMBR adds CPU overhead to trap and emulate privileged instructions, as well as to run any malicious services. These timing differences can be noticed by software running in the virtual machine by comparing the running time of benchmarks against wall-clock time. </a:t>
+            </a:r>
+          </a:p>
+          <a:p>
+            <a:endParaRPr lang="en-US" dirty="0"/>
+          </a:p>
+          <a:p>
+            <a:r>
+              <a:rPr lang="en-US" dirty="0" smtClean="0"/>
+              <a:t>2. An approach used was a program that required the entire machines memory of disk space. VMBR was able to hide its space overhead in several ways and this method didn’t prove to be that good (paging some data to disk for memory and bad sector trick for disk). </a:t>
+            </a:r>
+          </a:p>
+          <a:p>
+            <a:endParaRPr lang="en-US" dirty="0"/>
+          </a:p>
+          <a:p>
+            <a:r>
+              <a:rPr lang="en-US" dirty="0" smtClean="0"/>
+              <a:t>3. </a:t>
+            </a:r>
+            <a:endParaRPr lang="en-US" dirty="0"/>
+          </a:p>
+        </p:txBody>
+      </p:sp>
+      <p:sp>
+        <p:nvSpPr>
+          <p:cNvPr id="4" name="Slide Number Placeholder 3"/>
+          <p:cNvSpPr>
+            <a:spLocks noGrp="1"/>
+          </p:cNvSpPr>
+          <p:nvPr>
+            <p:ph type="sldNum" sz="quarter" idx="10"/>
+          </p:nvPr>
+        </p:nvSpPr>
+        <p:spPr/>
+        <p:txBody>
+          <a:bodyPr/>
+          <a:lstStyle/>
+          <a:p>
+            <a:fld id="{72141A60-0A97-4B4C-A98B-2EDC5A7E8FE4}" type="slidenum">
+              <a:rPr lang="en-US" smtClean="0"/>
+              <a:pPr/>
+              <a:t>11</a:t>
+            </a:fld>
+            <a:endParaRPr lang="en-US"/>
+          </a:p>
+        </p:txBody>
+      </p:sp>
+    </p:spTree>
+  </p:cSld>
+  <p:clrMapOvr>
+    <a:masterClrMapping/>
+  </p:clrMapOvr>
+</p:notes>
+</file>
+
+<file path=ppt/notesSlides/notesSlide7.xml><?xml version="1.0" encoding="utf-8"?>
+<p:notes xmlns:a="http://schemas.openxmlformats.org/drawingml/2006/main" xmlns:r="http://schemas.openxmlformats.org/officeDocument/2006/relationships" xmlns:p="http://schemas.openxmlformats.org/presentationml/2006/main">
+  <p:cSld>
+    <p:spTree>
+      <p:nvGrpSpPr>
+        <p:cNvPr id="1" name=""/>
+        <p:cNvGrpSpPr/>
+        <p:nvPr/>
+      </p:nvGrpSpPr>
+      <p:grpSpPr>
+        <a:xfrm>
+          <a:off x="0" y="0"/>
+          <a:ext cx="0" cy="0"/>
+          <a:chOff x="0" y="0"/>
+          <a:chExt cx="0" cy="0"/>
+        </a:xfrm>
+      </p:grpSpPr>
+      <p:sp>
+        <p:nvSpPr>
+          <p:cNvPr id="2" name="Slide Image Placeholder 1"/>
+          <p:cNvSpPr>
+            <a:spLocks noGrp="1" noRot="1" noChangeAspect="1"/>
+          </p:cNvSpPr>
+          <p:nvPr>
+            <p:ph type="sldImg"/>
+          </p:nvPr>
+        </p:nvSpPr>
+        <p:spPr/>
+      </p:sp>
+      <p:sp>
+        <p:nvSpPr>
+          <p:cNvPr id="3" name="Notes Placeholder 2"/>
+          <p:cNvSpPr>
+            <a:spLocks noGrp="1"/>
+          </p:cNvSpPr>
+          <p:nvPr>
+            <p:ph type="body" idx="1"/>
+          </p:nvPr>
+        </p:nvSpPr>
+        <p:spPr/>
+        <p:txBody>
+          <a:bodyPr>
+            <a:normAutofit/>
+          </a:bodyPr>
+          <a:lstStyle/>
+          <a:p>
+            <a:pPr marL="228600" indent="-228600">
+              <a:buAutoNum type="arabicPeriod"/>
+            </a:pPr>
+            <a:r>
+              <a:rPr lang="en-US" dirty="0" smtClean="0"/>
+              <a:t>Hooks </a:t>
+            </a:r>
+            <a:r>
+              <a:rPr lang="en-US" dirty="0"/>
+              <a:t>are blocks of code that intercept events, function calls, or </a:t>
+            </a:r>
+            <a:r>
+              <a:rPr lang="en-US" dirty="0" smtClean="0"/>
+              <a:t>messages. Hooking is employed by </a:t>
+            </a:r>
+            <a:r>
+              <a:rPr lang="en-US" dirty="0" err="1" smtClean="0"/>
+              <a:t>rootkits</a:t>
+            </a:r>
+            <a:r>
+              <a:rPr lang="en-US" dirty="0" smtClean="0"/>
+              <a:t> to evade detection. Hooking modifies the flow of control and hides the presence of modification. </a:t>
+            </a:r>
+          </a:p>
+          <a:p>
+            <a:pPr marL="228600" indent="-228600"/>
+            <a:r>
+              <a:rPr lang="en-US" dirty="0"/>
+              <a:t>	</a:t>
+            </a:r>
+            <a:r>
+              <a:rPr lang="en-US" dirty="0" err="1" smtClean="0"/>
+              <a:t>Hooksafe</a:t>
+            </a:r>
+            <a:r>
+              <a:rPr lang="en-US" dirty="0" smtClean="0"/>
+              <a:t> provides a hypervisor based system to protect kernel hooks from being attacked by </a:t>
+            </a:r>
+            <a:r>
+              <a:rPr lang="en-US" dirty="0" err="1" smtClean="0"/>
+              <a:t>rootkits</a:t>
+            </a:r>
+            <a:r>
+              <a:rPr lang="en-US" dirty="0" smtClean="0"/>
+              <a:t>. </a:t>
+            </a:r>
+            <a:r>
+              <a:rPr lang="en-US" dirty="0" err="1" smtClean="0"/>
+              <a:t>Hooksafe</a:t>
+            </a:r>
+            <a:r>
+              <a:rPr lang="en-US" dirty="0" smtClean="0"/>
+              <a:t> monitors the possible hooks(write access) for modifications. It provides a hook indirection layer to regulate access to hooks in kernel. </a:t>
+            </a:r>
+          </a:p>
+          <a:p>
+            <a:pPr marL="228600" indent="-228600"/>
+            <a:r>
+              <a:rPr lang="en-US" dirty="0" smtClean="0"/>
+              <a:t>2. </a:t>
+            </a:r>
+            <a:r>
+              <a:rPr lang="en-US" dirty="0" err="1" smtClean="0"/>
+              <a:t>SecVisor</a:t>
+            </a:r>
+            <a:r>
+              <a:rPr lang="en-US" dirty="0" smtClean="0"/>
+              <a:t> </a:t>
+            </a:r>
+            <a:r>
+              <a:rPr lang="en-US" dirty="0"/>
+              <a:t>protects the integrity of code in OS kernels by preventing </a:t>
+            </a:r>
+            <a:r>
+              <a:rPr lang="en-US" dirty="0" smtClean="0"/>
+              <a:t>unauthorized </a:t>
+            </a:r>
+          </a:p>
+          <a:p>
+            <a:pPr marL="228600" indent="-228600"/>
+            <a:r>
+              <a:rPr lang="en-US" dirty="0"/>
+              <a:t> </a:t>
+            </a:r>
+            <a:r>
+              <a:rPr lang="en-US" dirty="0" smtClean="0"/>
+              <a:t>    modifications </a:t>
+            </a:r>
+            <a:r>
+              <a:rPr lang="en-US" dirty="0"/>
+              <a:t>to the code via a user specified approval </a:t>
+            </a:r>
+            <a:r>
+              <a:rPr lang="en-US" dirty="0" smtClean="0"/>
+              <a:t>policy.</a:t>
+            </a:r>
+          </a:p>
+          <a:p>
+            <a:pPr marL="228600" indent="-228600">
+              <a:buAutoNum type="arabicPeriod" startAt="3"/>
+            </a:pPr>
+            <a:r>
+              <a:rPr lang="en-US" dirty="0" smtClean="0"/>
+              <a:t>NICKLE uses VMM for restricting access to the Kernel space. NICKLE module lies in the VMM layer and enforces that the guest OS kernel cannot access the shadow memory. At runtime, any instruction executed in the shadow space must be fetched from the shadow memory, which contains authenticated instructions. </a:t>
+            </a:r>
+            <a:endParaRPr lang="en-US" smtClean="0"/>
+          </a:p>
+          <a:p>
+            <a:pPr marL="228600" indent="-228600">
+              <a:buAutoNum type="arabicPeriod" startAt="3"/>
+            </a:pPr>
+            <a:endParaRPr lang="en-US" dirty="0"/>
+          </a:p>
+        </p:txBody>
+      </p:sp>
+      <p:sp>
+        <p:nvSpPr>
+          <p:cNvPr id="4" name="Slide Number Placeholder 3"/>
+          <p:cNvSpPr>
+            <a:spLocks noGrp="1"/>
+          </p:cNvSpPr>
+          <p:nvPr>
+            <p:ph type="sldNum" sz="quarter" idx="10"/>
+          </p:nvPr>
+        </p:nvSpPr>
+        <p:spPr/>
+        <p:txBody>
+          <a:bodyPr/>
+          <a:lstStyle/>
+          <a:p>
+            <a:fld id="{72141A60-0A97-4B4C-A98B-2EDC5A7E8FE4}" type="slidenum">
+              <a:rPr lang="en-US" smtClean="0"/>
+              <a:pPr/>
+              <a:t>12</a:t>
+            </a:fld>
+            <a:endParaRPr lang="en-US"/>
+          </a:p>
+        </p:txBody>
+      </p:sp>
+    </p:spTree>
+  </p:cSld>
+  <p:clrMapOvr>
+    <a:masterClrMapping/>
+  </p:clrMapOvr>
+</p:notes>
+</file>
+
+<file path=ppt/notesSlides/notesSlide8.xml><?xml version="1.0" encoding="utf-8"?>
+<p:notes xmlns:a="http://schemas.openxmlformats.org/drawingml/2006/main" xmlns:r="http://schemas.openxmlformats.org/officeDocument/2006/relationships" xmlns:p="http://schemas.openxmlformats.org/presentationml/2006/main">
+  <p:cSld>
+    <p:spTree>
+      <p:nvGrpSpPr>
+        <p:cNvPr id="1" name=""/>
+        <p:cNvGrpSpPr/>
+        <p:nvPr/>
+      </p:nvGrpSpPr>
+      <p:grpSpPr>
+        <a:xfrm>
+          <a:off x="0" y="0"/>
+          <a:ext cx="0" cy="0"/>
+          <a:chOff x="0" y="0"/>
+          <a:chExt cx="0" cy="0"/>
+        </a:xfrm>
+      </p:grpSpPr>
+      <p:sp>
+        <p:nvSpPr>
+          <p:cNvPr id="2" name="Slide Image Placeholder 1"/>
+          <p:cNvSpPr>
+            <a:spLocks noGrp="1" noRot="1" noChangeAspect="1"/>
+          </p:cNvSpPr>
+          <p:nvPr>
+            <p:ph type="sldImg"/>
+          </p:nvPr>
+        </p:nvSpPr>
+        <p:spPr/>
+      </p:sp>
+      <p:sp>
+        <p:nvSpPr>
+          <p:cNvPr id="3" name="Notes Placeholder 2"/>
+          <p:cNvSpPr>
+            <a:spLocks noGrp="1"/>
+          </p:cNvSpPr>
+          <p:nvPr>
+            <p:ph type="body" idx="1"/>
+          </p:nvPr>
+        </p:nvSpPr>
+        <p:spPr/>
+        <p:txBody>
+          <a:bodyPr>
+            <a:normAutofit/>
+          </a:bodyPr>
+          <a:lstStyle/>
+          <a:p>
+            <a:r>
+              <a:rPr lang="en-US" sz="1200" kern="1200" dirty="0" smtClean="0">
+                <a:solidFill>
+                  <a:schemeClr val="tx1"/>
+                </a:solidFill>
+                <a:latin typeface="+mn-lt"/>
+                <a:ea typeface="+mn-ea"/>
+                <a:cs typeface="+mn-cs"/>
+              </a:rPr>
+              <a:t>File access control policies protect the system utilities from being replaced by their </a:t>
+            </a:r>
+            <a:r>
+              <a:rPr lang="en-US" sz="1200" kern="1200" dirty="0" err="1" smtClean="0">
+                <a:solidFill>
+                  <a:schemeClr val="tx1"/>
+                </a:solidFill>
+                <a:latin typeface="+mn-lt"/>
+                <a:ea typeface="+mn-ea"/>
+                <a:cs typeface="+mn-cs"/>
+              </a:rPr>
+              <a:t>trojaned</a:t>
+            </a:r>
+            <a:r>
+              <a:rPr lang="en-US" sz="1200" kern="1200" dirty="0" smtClean="0">
+                <a:solidFill>
+                  <a:schemeClr val="tx1"/>
+                </a:solidFill>
+                <a:latin typeface="+mn-lt"/>
+                <a:ea typeface="+mn-ea"/>
+                <a:cs typeface="+mn-cs"/>
+              </a:rPr>
+              <a:t> counterparts. </a:t>
+            </a:r>
+          </a:p>
+          <a:p>
+            <a:r>
+              <a:rPr lang="en-US" sz="1200" kern="1200" smtClean="0">
+                <a:solidFill>
+                  <a:schemeClr val="tx1"/>
+                </a:solidFill>
+                <a:latin typeface="+mn-lt"/>
+                <a:ea typeface="+mn-ea"/>
+                <a:cs typeface="+mn-cs"/>
+              </a:rPr>
+              <a:t>Memory access control policies protect the kernel code and data structures from being overwritten in memory.</a:t>
+            </a:r>
+            <a:endParaRPr lang="en-US" dirty="0"/>
+          </a:p>
+        </p:txBody>
+      </p:sp>
+      <p:sp>
+        <p:nvSpPr>
+          <p:cNvPr id="4" name="Slide Number Placeholder 3"/>
+          <p:cNvSpPr>
+            <a:spLocks noGrp="1"/>
+          </p:cNvSpPr>
+          <p:nvPr>
+            <p:ph type="sldNum" sz="quarter" idx="10"/>
+          </p:nvPr>
+        </p:nvSpPr>
+        <p:spPr/>
+        <p:txBody>
+          <a:bodyPr/>
+          <a:lstStyle/>
+          <a:p>
+            <a:fld id="{72141A60-0A97-4B4C-A98B-2EDC5A7E8FE4}" type="slidenum">
+              <a:rPr lang="en-US" smtClean="0"/>
+              <a:pPr/>
+              <a:t>14</a:t>
+            </a:fld>
+            <a:endParaRPr lang="en-US"/>
+          </a:p>
+        </p:txBody>
+      </p:sp>
+    </p:spTree>
+  </p:cSld>
+  <p:clrMapOvr>
+    <a:masterClrMapping/>
+  </p:clrMapOvr>
+</p:notes>
+</file>
+
+<file path=ppt/notesSlides/notesSlide9.xml><?xml version="1.0" encoding="utf-8"?>
+<p:notes xmlns:a="http://schemas.openxmlformats.org/drawingml/2006/main" xmlns:r="http://schemas.openxmlformats.org/officeDocument/2006/relationships" xmlns:p="http://schemas.openxmlformats.org/presentationml/2006/main">
+  <p:cSld>
+    <p:spTree>
+      <p:nvGrpSpPr>
+        <p:cNvPr id="1" name=""/>
+        <p:cNvGrpSpPr/>
+        <p:nvPr/>
+      </p:nvGrpSpPr>
+      <p:grpSpPr>
+        <a:xfrm>
+          <a:off x="0" y="0"/>
+          <a:ext cx="0" cy="0"/>
+          <a:chOff x="0" y="0"/>
+          <a:chExt cx="0" cy="0"/>
+        </a:xfrm>
+      </p:grpSpPr>
+      <p:sp>
+        <p:nvSpPr>
+          <p:cNvPr id="2" name="Slide Image Placeholder 1"/>
+          <p:cNvSpPr>
+            <a:spLocks noGrp="1" noRot="1" noChangeAspect="1"/>
+          </p:cNvSpPr>
+          <p:nvPr>
+            <p:ph type="sldImg"/>
+          </p:nvPr>
+        </p:nvSpPr>
+        <p:spPr/>
+      </p:sp>
+      <p:sp>
+        <p:nvSpPr>
+          <p:cNvPr id="3" name="Notes Placeholder 2"/>
+          <p:cNvSpPr>
+            <a:spLocks noGrp="1"/>
+          </p:cNvSpPr>
+          <p:nvPr>
+            <p:ph type="body" idx="1"/>
+          </p:nvPr>
+        </p:nvSpPr>
+        <p:spPr/>
+        <p:txBody>
+          <a:bodyPr>
+            <a:normAutofit/>
+          </a:bodyPr>
+          <a:lstStyle/>
+          <a:p>
+            <a:r>
+              <a:rPr lang="en-US" dirty="0" smtClean="0"/>
               <a:t>Paladin comprises of several components like the modified form of </a:t>
             </a:r>
             <a:r>
@@ -1250,7 +1514,7 @@
             <a:fld id="{72141A60-0A97-4B4C-A98B-2EDC5A7E8FE4}" type="slidenum">
               <a:rPr lang="en-US" smtClean="0"/>
               <a:pPr/>
-              <a:t>16</a:t>
+              <a:t>17</a:t>
             </a:fld>
             <a:endParaRPr lang="en-US"/>
           </a:p>
@@ -5921,7 +6185,7 @@
     </p:spTree>
     <p:extLst>
       <p:ext uri="{BB962C8B-B14F-4D97-AF65-F5344CB8AC3E}">
-        <p14:creationId xmlns:p14="http://schemas.microsoft.com/office/powerpoint/2010/main" xmlns="" val="2462047465"/>
+        <p14:creationId xmlns:p14="http://schemas.microsoft.com/office/powerpoint/2010/main" val="2462047465"/>
       </p:ext>
     </p:extLst>
   </p:cSld>
@@ -5972,11 +6236,11 @@
           <a:p>
             <a:r>
               <a:rPr lang="en-US" dirty="0" smtClean="0"/>
-              <a:t>Security software above </a:t>
+              <a:t>Security software below </a:t>
             </a:r>
             <a:r>
               <a:rPr lang="en-US" dirty="0" err="1" smtClean="0"/>
-              <a:t>VMBr</a:t>
+              <a:t>vmbr</a:t>
             </a:r>
             <a:endParaRPr lang="en-US" dirty="0"/>
           </a:p>
@@ -5999,32 +6263,49 @@
           <a:p>
             <a:r>
               <a:rPr lang="en-US" dirty="0" smtClean="0"/>
-              <a:t>Can software running above the VMBR detect its presence?????</a:t>
-            </a:r>
-          </a:p>
-          <a:p>
-            <a:r>
-              <a:rPr lang="en-US" dirty="0" smtClean="0"/>
-              <a:t>CPU time</a:t>
-            </a:r>
-          </a:p>
-          <a:p>
-            <a:r>
-              <a:rPr lang="en-US" dirty="0" smtClean="0"/>
-              <a:t>Memory and Disk space</a:t>
-            </a:r>
-          </a:p>
-          <a:p>
-            <a:r>
-              <a:rPr lang="en-US" dirty="0" smtClean="0"/>
-              <a:t>Variety of I/O devices </a:t>
-            </a:r>
-          </a:p>
-          <a:p>
-            <a:r>
-              <a:rPr lang="en-US" dirty="0" smtClean="0"/>
-              <a:t>Imperfect source of x86 processors</a:t>
-            </a:r>
+              <a:t>Can see the state of VMBR</a:t>
+            </a:r>
+          </a:p>
+          <a:p>
+            <a:r>
+              <a:rPr lang="en-US" dirty="0" smtClean="0"/>
+              <a:t>Read physical memory of disk and look for signatures and anomalies that indicate the presence of VMBR</a:t>
+            </a:r>
+          </a:p>
+          <a:p>
+            <a:r>
+              <a:rPr lang="en-US" dirty="0" smtClean="0"/>
+              <a:t>Use secure hardware</a:t>
+            </a:r>
+          </a:p>
+          <a:p>
+            <a:r>
+              <a:rPr lang="en-US" dirty="0" smtClean="0"/>
+              <a:t>Boot from safe medium </a:t>
+            </a:r>
+          </a:p>
+          <a:p>
+            <a:r>
+              <a:rPr lang="en-US" dirty="0" smtClean="0"/>
+              <a:t>Physically unplug the machine before reboot</a:t>
+            </a:r>
+          </a:p>
+          <a:p>
+            <a:r>
+              <a:rPr lang="en-US" dirty="0" smtClean="0"/>
+              <a:t>Use  secure VMM</a:t>
+            </a:r>
+          </a:p>
+          <a:p>
+            <a:pPr>
+              <a:buNone/>
+            </a:pPr>
+            <a:endParaRPr lang="en-US" dirty="0" smtClean="0"/>
+          </a:p>
+          <a:p>
+            <a:endParaRPr lang="en-US" dirty="0" smtClean="0"/>
+          </a:p>
+          <a:p>
             <a:endParaRPr lang="en-US" dirty="0"/>
           </a:p>
         </p:txBody>
@@ -6078,7 +6359,11 @@
           <a:p>
             <a:r>
               <a:rPr lang="en-US" dirty="0" smtClean="0"/>
-              <a:t>Existing Detectors</a:t>
+              <a:t>Security software above </a:t>
+            </a:r>
+            <a:r>
+              <a:rPr lang="en-US" dirty="0" err="1" smtClean="0"/>
+              <a:t>VMBr</a:t>
             </a:r>
             <a:endParaRPr lang="en-US" dirty="0"/>
           </a:p>
@@ -6100,45 +6385,38 @@
           <a:lstStyle/>
           <a:p>
             <a:r>
-              <a:rPr lang="en-US" dirty="0" err="1" smtClean="0"/>
-              <a:t>Hooksafe</a:t>
-            </a:r>
-            <a:endParaRPr lang="en-US" dirty="0" smtClean="0"/>
-          </a:p>
-          <a:p>
-            <a:r>
-              <a:rPr lang="en-US" dirty="0" err="1" smtClean="0"/>
-              <a:t>SecVisor</a:t>
-            </a:r>
-            <a:endParaRPr lang="en-US" dirty="0" smtClean="0"/>
-          </a:p>
-          <a:p>
-            <a:r>
-              <a:rPr lang="en-US" dirty="0" smtClean="0"/>
-              <a:t>NICKLE</a:t>
-            </a:r>
-          </a:p>
-          <a:p>
-            <a:r>
-              <a:rPr lang="en-US" dirty="0" smtClean="0"/>
-              <a:t>Red Pill </a:t>
-            </a:r>
-          </a:p>
-          <a:p>
-            <a:r>
-              <a:rPr lang="en-US" dirty="0" smtClean="0"/>
-              <a:t>Paladin</a:t>
+              <a:rPr lang="en-US" dirty="0" smtClean="0"/>
+              <a:t>Can software running above the VMBR detect its presence?????</a:t>
+            </a:r>
+          </a:p>
+          <a:p>
+            <a:r>
+              <a:rPr lang="en-US" dirty="0" smtClean="0"/>
+              <a:t>CPU time</a:t>
+            </a:r>
+          </a:p>
+          <a:p>
+            <a:r>
+              <a:rPr lang="en-US" dirty="0" smtClean="0"/>
+              <a:t>Memory and Disk space</a:t>
+            </a:r>
+          </a:p>
+          <a:p>
+            <a:r>
+              <a:rPr lang="en-US" dirty="0" smtClean="0"/>
+              <a:t>Variety of I/O devices </a:t>
+            </a:r>
+          </a:p>
+          <a:p>
+            <a:r>
+              <a:rPr lang="en-US" dirty="0" smtClean="0"/>
+              <a:t>Imperfect source of x86 processors</a:t>
             </a:r>
             <a:endParaRPr lang="en-US" dirty="0"/>
           </a:p>
         </p:txBody>
       </p:sp>
     </p:spTree>
-    <p:extLst>
-      <p:ext uri="{BB962C8B-B14F-4D97-AF65-F5344CB8AC3E}">
-        <p14:creationId xmlns:p14="http://schemas.microsoft.com/office/powerpoint/2010/main" xmlns="" val="3327195953"/>
-      </p:ext>
-    </p:extLst>
   </p:cSld>
   <p:clrMapOvr>
     <a:masterClrMapping/>
@@ -6187,60 +6465,56 @@
           <a:p>
             <a:r>
               <a:rPr lang="en-US" dirty="0" smtClean="0"/>
+              <a:t>Existing Detectors</a:t>
+            </a:r>
+            <a:endParaRPr lang="en-US" dirty="0"/>
+          </a:p>
+        </p:txBody>
+      </p:sp>
+      <p:sp>
+        <p:nvSpPr>
+          <p:cNvPr id="3" name="Content Placeholder 2"/>
+          <p:cNvSpPr>
+            <a:spLocks noGrp="1"/>
+          </p:cNvSpPr>
+          <p:nvPr>
+            <p:ph idx="1"/>
+          </p:nvPr>
+        </p:nvSpPr>
+        <p:spPr/>
+        <p:txBody>
+          <a:bodyPr/>
+          <a:lstStyle/>
+          <a:p>
+            <a:r>
+              <a:rPr lang="en-US" dirty="0" err="1" smtClean="0"/>
+              <a:t>Hooksafe</a:t>
+            </a:r>
+            <a:endParaRPr lang="en-US" dirty="0" smtClean="0"/>
+          </a:p>
+          <a:p>
+            <a:r>
+              <a:rPr lang="en-US" dirty="0" err="1" smtClean="0"/>
+              <a:t>SecVisor</a:t>
+            </a:r>
+            <a:endParaRPr lang="en-US" dirty="0" smtClean="0"/>
+          </a:p>
+          <a:p>
+            <a:r>
+              <a:rPr lang="en-US" dirty="0" smtClean="0"/>
+              <a:t>NICKLE</a:t>
+            </a:r>
+          </a:p>
+          <a:p>
+            <a:r>
+              <a:rPr lang="en-US" dirty="0" smtClean="0"/>
+              <a:t>Red Pill </a:t>
+            </a:r>
+          </a:p>
+          <a:p>
+            <a:r>
+              <a:rPr lang="en-US" dirty="0" smtClean="0"/>
               <a:t>Paladin</a:t>
-            </a:r>
-            <a:endParaRPr lang="en-US" dirty="0"/>
-          </a:p>
-        </p:txBody>
-      </p:sp>
-      <p:sp>
-        <p:nvSpPr>
-          <p:cNvPr id="3" name="Content Placeholder 2"/>
-          <p:cNvSpPr>
-            <a:spLocks noGrp="1"/>
-          </p:cNvSpPr>
-          <p:nvPr>
-            <p:ph idx="1"/>
-          </p:nvPr>
-        </p:nvSpPr>
-        <p:spPr/>
-        <p:txBody>
-          <a:bodyPr/>
-          <a:lstStyle/>
-          <a:p>
-            <a:r>
-              <a:rPr lang="en-US" dirty="0" smtClean="0"/>
-              <a:t>Approach</a:t>
-            </a:r>
-          </a:p>
-          <a:p>
-            <a:pPr lvl="1"/>
-            <a:r>
-              <a:rPr lang="en-US" dirty="0" smtClean="0"/>
-              <a:t>Prevention and Detection</a:t>
-            </a:r>
-          </a:p>
-          <a:p>
-            <a:pPr lvl="1"/>
-            <a:r>
-              <a:rPr lang="en-US" dirty="0" smtClean="0"/>
-              <a:t>Tracking </a:t>
-            </a:r>
-          </a:p>
-          <a:p>
-            <a:pPr lvl="1"/>
-            <a:r>
-              <a:rPr lang="en-US" dirty="0" smtClean="0"/>
-              <a:t>Containment</a:t>
-            </a:r>
-          </a:p>
-          <a:p>
-            <a:pPr>
-              <a:buNone/>
-            </a:pPr>
-            <a:r>
-              <a:rPr lang="en-US" dirty="0" smtClean="0"/>
-              <a:t>		</a:t>
             </a:r>
             <a:endParaRPr lang="en-US" dirty="0"/>
           </a:p>
@@ -6249,7 +6523,7 @@
     </p:spTree>
     <p:extLst>
       <p:ext uri="{BB962C8B-B14F-4D97-AF65-F5344CB8AC3E}">
-        <p14:creationId xmlns:p14="http://schemas.microsoft.com/office/powerpoint/2010/main" xmlns="" val="1247059405"/>
+        <p14:creationId xmlns:p14="http://schemas.microsoft.com/office/powerpoint/2010/main" val="3327195953"/>
       </p:ext>
     </p:extLst>
   </p:cSld>
@@ -6300,6 +6574,119 @@
           <a:p>
             <a:r>
               <a:rPr lang="en-US" dirty="0" smtClean="0"/>
+              <a:t>Paladin</a:t>
+            </a:r>
+            <a:endParaRPr lang="en-US" dirty="0"/>
+          </a:p>
+        </p:txBody>
+      </p:sp>
+      <p:sp>
+        <p:nvSpPr>
+          <p:cNvPr id="3" name="Content Placeholder 2"/>
+          <p:cNvSpPr>
+            <a:spLocks noGrp="1"/>
+          </p:cNvSpPr>
+          <p:nvPr>
+            <p:ph idx="1"/>
+          </p:nvPr>
+        </p:nvSpPr>
+        <p:spPr/>
+        <p:txBody>
+          <a:bodyPr/>
+          <a:lstStyle/>
+          <a:p>
+            <a:r>
+              <a:rPr lang="en-US" dirty="0" smtClean="0"/>
+              <a:t>Approach</a:t>
+            </a:r>
+          </a:p>
+          <a:p>
+            <a:pPr lvl="1"/>
+            <a:r>
+              <a:rPr lang="en-US" dirty="0" smtClean="0"/>
+              <a:t>Prevention and Detection</a:t>
+            </a:r>
+          </a:p>
+          <a:p>
+            <a:pPr lvl="1"/>
+            <a:r>
+              <a:rPr lang="en-US" dirty="0" smtClean="0"/>
+              <a:t>Tracking </a:t>
+            </a:r>
+          </a:p>
+          <a:p>
+            <a:pPr lvl="1"/>
+            <a:r>
+              <a:rPr lang="en-US" dirty="0" smtClean="0"/>
+              <a:t>Containment</a:t>
+            </a:r>
+          </a:p>
+          <a:p>
+            <a:pPr>
+              <a:buNone/>
+            </a:pPr>
+            <a:r>
+              <a:rPr lang="en-US" dirty="0" smtClean="0"/>
+              <a:t>		</a:t>
+            </a:r>
+            <a:endParaRPr lang="en-US" dirty="0"/>
+          </a:p>
+        </p:txBody>
+      </p:sp>
+    </p:spTree>
+    <p:extLst>
+      <p:ext uri="{BB962C8B-B14F-4D97-AF65-F5344CB8AC3E}">
+        <p14:creationId xmlns:p14="http://schemas.microsoft.com/office/powerpoint/2010/main" val="1247059405"/>
+      </p:ext>
+    </p:extLst>
+  </p:cSld>
+  <p:clrMapOvr>
+    <a:masterClrMapping/>
+  </p:clrMapOvr>
+  <p:timing>
+    <p:tnLst>
+      <p:par>
+        <p:cTn id="1" dur="indefinite" restart="never" nodeType="tmRoot"/>
+      </p:par>
+    </p:tnLst>
+  </p:timing>
+</p:sld>
+</file>
+
+<file path=ppt/slides/slide14.xml><?xml version="1.0" encoding="utf-8"?>
+<p:sld xmlns:a="http://schemas.openxmlformats.org/drawingml/2006/main" xmlns:r="http://schemas.openxmlformats.org/officeDocument/2006/relationships" xmlns:p="http://schemas.openxmlformats.org/presentationml/2006/main">
+  <p:cSld>
+    <p:spTree>
+      <p:nvGrpSpPr>
+        <p:cNvPr id="1" name=""/>
+        <p:cNvGrpSpPr/>
+        <p:nvPr/>
+      </p:nvGrpSpPr>
+      <p:grpSpPr>
+        <a:xfrm>
+          <a:off x="0" y="0"/>
+          <a:ext cx="0" cy="0"/>
+          <a:chOff x="0" y="0"/>
+          <a:chExt cx="0" cy="0"/>
+        </a:xfrm>
+      </p:grpSpPr>
+      <p:sp>
+        <p:nvSpPr>
+          <p:cNvPr id="2" name="Title 1"/>
+          <p:cNvSpPr>
+            <a:spLocks noGrp="1"/>
+          </p:cNvSpPr>
+          <p:nvPr>
+            <p:ph type="title"/>
+          </p:nvPr>
+        </p:nvSpPr>
+        <p:spPr/>
+        <p:txBody>
+          <a:bodyPr/>
+          <a:lstStyle/>
+          <a:p>
+            <a:r>
+              <a:rPr lang="en-US" dirty="0" smtClean="0"/>
               <a:t>Prevention and Detection</a:t>
             </a:r>
             <a:endParaRPr lang="en-US" dirty="0"/>
@@ -6347,7 +6734,7 @@
 </p:sld>
 </file>
 
-<file path=ppt/slides/slide14.xml><?xml version="1.0" encoding="utf-8"?>
+<file path=ppt/slides/slide15.xml><?xml version="1.0" encoding="utf-8"?>
 <p:sld xmlns:a="http://schemas.openxmlformats.org/drawingml/2006/main" xmlns:r="http://schemas.openxmlformats.org/officeDocument/2006/relationships" xmlns:p="http://schemas.openxmlformats.org/presentationml/2006/main">
   <p:cSld>
     <p:spTree>
@@ -6443,7 +6830,7 @@
 </p:sld>
 </file>
 
-<file path=ppt/slides/slide15.xml><?xml version="1.0" encoding="utf-8"?>
+<file path=ppt/slides/slide16.xml><?xml version="1.0" encoding="utf-8"?>
 <p:sld xmlns:a="http://schemas.openxmlformats.org/drawingml/2006/main" xmlns:r="http://schemas.openxmlformats.org/officeDocument/2006/relationships" xmlns:p="http://schemas.openxmlformats.org/presentationml/2006/main">
   <p:cSld>
     <p:spTree>
@@ -6556,7 +6943,7 @@
 </p:sld>
 </file>
 
-<file path=ppt/slides/slide16.xml><?xml version="1.0" encoding="utf-8"?>
+<file path=ppt/slides/slide17.xml><?xml version="1.0" encoding="utf-8"?>
 <p:sld xmlns:a="http://schemas.openxmlformats.org/drawingml/2006/main" xmlns:r="http://schemas.openxmlformats.org/officeDocument/2006/relationships" xmlns:p="http://schemas.openxmlformats.org/presentationml/2006/main">
   <p:cSld>
     <p:spTree>
@@ -6636,7 +7023,7 @@
 </p:sld>
 </file>
 
-<file path=ppt/slides/slide17.xml><?xml version="1.0" encoding="utf-8"?>
+<file path=ppt/slides/slide18.xml><?xml version="1.0" encoding="utf-8"?>
 <p:sld xmlns:a="http://schemas.openxmlformats.org/drawingml/2006/main" xmlns:r="http://schemas.openxmlformats.org/officeDocument/2006/relationships" xmlns:p="http://schemas.openxmlformats.org/presentationml/2006/main">
   <p:cSld>
     <p:spTree>
@@ -6698,7 +7085,7 @@
     </p:spTree>
     <p:extLst>
       <p:ext uri="{BB962C8B-B14F-4D97-AF65-F5344CB8AC3E}">
-        <p14:creationId xmlns:p14="http://schemas.microsoft.com/office/powerpoint/2010/main" xmlns="" val="949291844"/>
+        <p14:creationId xmlns:p14="http://schemas.microsoft.com/office/powerpoint/2010/main" val="949291844"/>
       </p:ext>
     </p:extLst>
   </p:cSld>
@@ -6821,7 +7208,7 @@
     </p:spTree>
     <p:extLst>
       <p:ext uri="{BB962C8B-B14F-4D97-AF65-F5344CB8AC3E}">
-        <p14:creationId xmlns:p14="http://schemas.microsoft.com/office/powerpoint/2010/main" xmlns="" val="2590845106"/>
+        <p14:creationId xmlns:p14="http://schemas.microsoft.com/office/powerpoint/2010/main" val="2590845106"/>
       </p:ext>
     </p:extLst>
   </p:cSld>
@@ -6890,12 +7277,90 @@
         </p:nvSpPr>
         <p:spPr/>
         <p:txBody>
-          <a:bodyPr/>
-          <a:lstStyle/>
-          <a:p>
-            <a:r>
-              <a:rPr lang="en-US" dirty="0" smtClean="0"/>
-              <a:t>Mike’s stuff, graphics</a:t>
+          <a:bodyPr>
+            <a:normAutofit lnSpcReduction="10000"/>
+          </a:bodyPr>
+          <a:lstStyle/>
+          <a:p>
+            <a:r>
+              <a:rPr lang="en-US" dirty="0" smtClean="0"/>
+              <a:t>Create a completely isolated OS on one computer</a:t>
+            </a:r>
+          </a:p>
+          <a:p>
+            <a:pPr lvl="1"/>
+            <a:r>
+              <a:rPr lang="en-US" dirty="0" smtClean="0"/>
+              <a:t>Saves time and money</a:t>
+            </a:r>
+          </a:p>
+          <a:p>
+            <a:endParaRPr lang="en-US" dirty="0" smtClean="0"/>
+          </a:p>
+          <a:p>
+            <a:r>
+              <a:rPr lang="en-US" dirty="0" smtClean="0"/>
+              <a:t>Two Different Types of Virtual Machines</a:t>
+            </a:r>
+          </a:p>
+          <a:p>
+            <a:pPr lvl="1"/>
+            <a:r>
+              <a:rPr lang="en-US" dirty="0" smtClean="0"/>
+              <a:t>Emulated (System) VMs</a:t>
+            </a:r>
+          </a:p>
+          <a:p>
+            <a:pPr lvl="2"/>
+            <a:r>
+              <a:rPr lang="en-US" dirty="0" smtClean="0"/>
+              <a:t>Provides better separation</a:t>
+            </a:r>
+          </a:p>
+          <a:p>
+            <a:pPr lvl="2"/>
+            <a:r>
+              <a:rPr lang="en-US" dirty="0" smtClean="0"/>
+              <a:t>Significantly slower</a:t>
+            </a:r>
+          </a:p>
+          <a:p>
+            <a:pPr lvl="1"/>
+            <a:r>
+              <a:rPr lang="en-US" dirty="0"/>
+              <a:t>Virtualized (Process) </a:t>
+            </a:r>
+            <a:r>
+              <a:rPr lang="en-US" dirty="0" smtClean="0"/>
+              <a:t>VMs</a:t>
+            </a:r>
+          </a:p>
+          <a:p>
+            <a:pPr lvl="2"/>
+            <a:r>
+              <a:rPr lang="en-US" dirty="0" smtClean="0"/>
+              <a:t>Uses same hardware as the Host OS</a:t>
+            </a:r>
+          </a:p>
+          <a:p>
+            <a:pPr lvl="2"/>
+            <a:r>
+              <a:rPr lang="en-US" dirty="0" smtClean="0"/>
+              <a:t>Single process</a:t>
+            </a:r>
+          </a:p>
+          <a:p>
+            <a:pPr lvl="2"/>
+            <a:r>
+              <a:rPr lang="en-US" dirty="0" smtClean="0"/>
+              <a:t>Faster</a:t>
+            </a:r>
+          </a:p>
+          <a:p>
+            <a:pPr lvl="2"/>
+            <a:r>
+              <a:rPr lang="en-US" dirty="0" smtClean="0"/>
+              <a:t>Target of VMBRs</a:t>
             </a:r>
           </a:p>
         </p:txBody>
@@ -6903,7 +7368,7 @@
     </p:spTree>
     <p:extLst>
       <p:ext uri="{BB962C8B-B14F-4D97-AF65-F5344CB8AC3E}">
-        <p14:creationId xmlns:p14="http://schemas.microsoft.com/office/powerpoint/2010/main" xmlns="" val="1666392369"/>
+        <p14:creationId xmlns:p14="http://schemas.microsoft.com/office/powerpoint/2010/main" val="587743907"/>
       </p:ext>
     </p:extLst>
   </p:cSld>
@@ -6954,136 +7419,121 @@
           <a:p>
             <a:r>
               <a:rPr lang="en-US" dirty="0" smtClean="0"/>
-              <a:t>Installation</a:t>
+              <a:t>Virtual Machines Cont.</a:t>
             </a:r>
             <a:endParaRPr lang="en-US" dirty="0"/>
           </a:p>
         </p:txBody>
       </p:sp>
-      <p:sp>
-        <p:nvSpPr>
-          <p:cNvPr id="3" name="Content Placeholder 2"/>
-          <p:cNvSpPr>
-            <a:spLocks noGrp="1"/>
-          </p:cNvSpPr>
-          <p:nvPr>
-            <p:ph idx="1"/>
-          </p:nvPr>
-        </p:nvSpPr>
-        <p:spPr/>
-        <p:txBody>
-          <a:bodyPr>
-            <a:normAutofit/>
-          </a:bodyPr>
-          <a:lstStyle/>
-          <a:p>
-            <a:pPr lvl="0"/>
-            <a:r>
-              <a:rPr lang="en-US" dirty="0"/>
-              <a:t>Obtain root privileges/access to kernel mode </a:t>
-            </a:r>
-            <a:endParaRPr lang="en-US" sz="2000" dirty="0"/>
-          </a:p>
-          <a:p>
-            <a:pPr lvl="0"/>
-            <a:r>
-              <a:rPr lang="en-US" dirty="0"/>
-              <a:t>Install virtual machine rootkit on disk</a:t>
-            </a:r>
-            <a:endParaRPr lang="en-US" sz="2000" dirty="0"/>
-          </a:p>
-          <a:p>
-            <a:pPr lvl="0"/>
-            <a:r>
-              <a:rPr lang="en-US" dirty="0"/>
-              <a:t>Modify system boot records to ensure rootkit runs before the target OS</a:t>
-            </a:r>
-            <a:endParaRPr lang="en-US" sz="2000" dirty="0"/>
-          </a:p>
-          <a:p>
-            <a:pPr lvl="1"/>
-            <a:r>
-              <a:rPr lang="en-US" dirty="0" smtClean="0"/>
-              <a:t>Done during </a:t>
-            </a:r>
-            <a:r>
-              <a:rPr lang="en-US" dirty="0"/>
-              <a:t>final stages of </a:t>
-            </a:r>
-            <a:r>
-              <a:rPr lang="en-US" dirty="0" smtClean="0"/>
-              <a:t>shutdown so modifications won’t be detected by anti-malware applications</a:t>
-            </a:r>
-            <a:endParaRPr lang="en-US" sz="1800" dirty="0" smtClean="0"/>
-          </a:p>
-          <a:p>
-            <a:pPr lvl="0"/>
-            <a:r>
-              <a:rPr lang="en-US" dirty="0" smtClean="0"/>
-              <a:t>Target </a:t>
-            </a:r>
-            <a:r>
-              <a:rPr lang="en-US" dirty="0"/>
-              <a:t>system’s disk space </a:t>
-            </a:r>
-            <a:r>
-              <a:rPr lang="en-US" dirty="0" smtClean="0"/>
-              <a:t>contained </a:t>
-            </a:r>
-            <a:r>
-              <a:rPr lang="en-US" dirty="0"/>
-              <a:t>i</a:t>
-            </a:r>
-            <a:r>
-              <a:rPr lang="en-US" dirty="0" smtClean="0"/>
-              <a:t>n </a:t>
-            </a:r>
-            <a:r>
-              <a:rPr lang="en-US" dirty="0"/>
-              <a:t>virtual disk, VMM translates address to equivalent location on physical </a:t>
-            </a:r>
-            <a:r>
-              <a:rPr lang="en-US" dirty="0" smtClean="0"/>
-              <a:t>disk</a:t>
-            </a:r>
-          </a:p>
-          <a:p>
-            <a:pPr lvl="1"/>
-            <a:r>
-              <a:rPr lang="en-US" dirty="0" smtClean="0"/>
-              <a:t>Target </a:t>
-            </a:r>
-            <a:r>
-              <a:rPr lang="en-US" dirty="0"/>
-              <a:t>System no longer has access to physical </a:t>
-            </a:r>
-            <a:r>
-              <a:rPr lang="en-US" dirty="0" smtClean="0"/>
-              <a:t>disk</a:t>
-            </a:r>
-          </a:p>
-          <a:p>
-            <a:pPr lvl="1"/>
-            <a:r>
-              <a:rPr lang="en-US" dirty="0"/>
-              <a:t>R</a:t>
-            </a:r>
-            <a:r>
-              <a:rPr lang="en-US" dirty="0" smtClean="0"/>
-              <a:t>ootkit </a:t>
-            </a:r>
-            <a:r>
-              <a:rPr lang="en-US" dirty="0"/>
-              <a:t>has control of the system</a:t>
-            </a:r>
-            <a:endParaRPr lang="en-US" sz="1600" dirty="0"/>
-          </a:p>
-        </p:txBody>
-      </p:sp>
+      <p:grpSp>
+        <p:nvGrpSpPr>
+          <p:cNvPr id="7" name="Group 6"/>
+          <p:cNvGrpSpPr/>
+          <p:nvPr/>
+        </p:nvGrpSpPr>
+        <p:grpSpPr>
+          <a:xfrm>
+            <a:off x="844554" y="2286000"/>
+            <a:ext cx="7461246" cy="3871455"/>
+            <a:chOff x="762000" y="2600941"/>
+            <a:chExt cx="7461246" cy="3871455"/>
+          </a:xfrm>
+        </p:grpSpPr>
+        <p:pic>
+          <p:nvPicPr>
+            <p:cNvPr id="4" name="Picture 3"/>
+            <p:cNvPicPr>
+              <a:picLocks noChangeAspect="1"/>
+            </p:cNvPicPr>
+            <p:nvPr/>
+          </p:nvPicPr>
+          <p:blipFill>
+            <a:blip r:embed="rId3">
+              <a:extLst>
+                <a:ext uri="{28A0092B-C50C-407E-A947-70E740481C1C}">
+                  <a14:useLocalDpi xmlns:a14="http://schemas.microsoft.com/office/drawing/2010/main" val="0"/>
+                </a:ext>
+              </a:extLst>
+            </a:blip>
+            <a:stretch>
+              <a:fillRect/>
+            </a:stretch>
+          </p:blipFill>
+          <p:spPr>
+            <a:xfrm>
+              <a:off x="762000" y="3200400"/>
+              <a:ext cx="7461246" cy="3271996"/>
+            </a:xfrm>
+            <a:prstGeom prst="rect">
+              <a:avLst/>
+            </a:prstGeom>
+          </p:spPr>
+        </p:pic>
+        <p:sp>
+          <p:nvSpPr>
+            <p:cNvPr id="5" name="TextBox 4"/>
+            <p:cNvSpPr txBox="1"/>
+            <p:nvPr/>
+          </p:nvSpPr>
+          <p:spPr>
+            <a:xfrm>
+              <a:off x="1524000" y="2600941"/>
+              <a:ext cx="2087431" cy="584775"/>
+            </a:xfrm>
+            <a:prstGeom prst="rect">
+              <a:avLst/>
+            </a:prstGeom>
+            <a:noFill/>
+          </p:spPr>
+          <p:txBody>
+            <a:bodyPr wrap="none" rtlCol="0">
+              <a:spAutoFit/>
+            </a:bodyPr>
+            <a:lstStyle/>
+            <a:p>
+              <a:r>
+                <a:rPr lang="en-US" sz="3200" dirty="0" smtClean="0"/>
+                <a:t>Emulated</a:t>
+              </a:r>
+              <a:endParaRPr lang="en-US" sz="3200" dirty="0"/>
+            </a:p>
+          </p:txBody>
+        </p:sp>
+        <p:sp>
+          <p:nvSpPr>
+            <p:cNvPr id="6" name="TextBox 5"/>
+            <p:cNvSpPr txBox="1"/>
+            <p:nvPr/>
+          </p:nvSpPr>
+          <p:spPr>
+            <a:xfrm>
+              <a:off x="5486400" y="2600941"/>
+              <a:ext cx="2233304" cy="584775"/>
+            </a:xfrm>
+            <a:prstGeom prst="rect">
+              <a:avLst/>
+            </a:prstGeom>
+            <a:noFill/>
+          </p:spPr>
+          <p:txBody>
+            <a:bodyPr wrap="none" rtlCol="0">
+              <a:spAutoFit/>
+            </a:bodyPr>
+            <a:lstStyle/>
+            <a:p>
+              <a:r>
+                <a:rPr lang="en-US" sz="3200" dirty="0" smtClean="0"/>
+                <a:t>Virtualized</a:t>
+              </a:r>
+              <a:endParaRPr lang="en-US" dirty="0" smtClean="0"/>
+            </a:p>
+          </p:txBody>
+        </p:sp>
+      </p:grpSp>
     </p:spTree>
     <p:extLst>
       <p:ext uri="{BB962C8B-B14F-4D97-AF65-F5344CB8AC3E}">
-        <p14:creationId xmlns:p14="http://schemas.microsoft.com/office/powerpoint/2010/main" xmlns="" val="2346653610"/>
+        <p14:creationId xmlns:p14="http://schemas.microsoft.com/office/powerpoint/2010/main" val="194774585"/>
       </p:ext>
     </p:extLst>
   </p:cSld>
@@ -7134,7 +7584,7 @@
           <a:p>
             <a:r>
               <a:rPr lang="en-US" dirty="0" smtClean="0"/>
-              <a:t>Forms of Attack</a:t>
+              <a:t>Installation</a:t>
             </a:r>
             <a:endParaRPr lang="en-US" dirty="0"/>
           </a:p>
@@ -7160,95 +7610,110 @@
             <a:pPr lvl="0"/>
             <a:r>
               <a:rPr lang="en-US" dirty="0"/>
-              <a:t>No interaction with target system</a:t>
+              <a:t>Obtain root privileges/access to kernel mode </a:t>
             </a:r>
             <a:endParaRPr lang="en-US" sz="2000" dirty="0"/>
           </a:p>
           <a:p>
+            <a:pPr lvl="0"/>
+            <a:r>
+              <a:rPr lang="en-US" dirty="0"/>
+              <a:t>Install virtual machine rootkit on disk</a:t>
+            </a:r>
+            <a:endParaRPr lang="en-US" sz="2000" dirty="0"/>
+          </a:p>
+          <a:p>
+            <a:pPr lvl="0"/>
+            <a:r>
+              <a:rPr lang="en-US" dirty="0"/>
+              <a:t>Modify system boot records to ensure rootkit runs before the target OS</a:t>
+            </a:r>
+            <a:endParaRPr lang="en-US" sz="2000" dirty="0"/>
+          </a:p>
+          <a:p>
             <a:pPr lvl="1"/>
             <a:r>
               <a:rPr lang="en-US" dirty="0" smtClean="0"/>
-              <a:t>Spam </a:t>
+              <a:t>Done during </a:t>
             </a:r>
             <a:r>
               <a:rPr lang="en-US" dirty="0"/>
-              <a:t>relays, denial of service zombies, phishing web </a:t>
-            </a:r>
-            <a:r>
-              <a:rPr lang="en-US" dirty="0" smtClean="0"/>
-              <a:t>servers, etc.</a:t>
-            </a:r>
-            <a:endParaRPr lang="en-US" sz="1800" dirty="0"/>
+              <a:t>final stages of </a:t>
+            </a:r>
+            <a:r>
+              <a:rPr lang="en-US" dirty="0" smtClean="0"/>
+              <a:t>shutdown so modifications won’t be detected by anti-malware applications</a:t>
+            </a:r>
+            <a:endParaRPr lang="en-US" sz="1800" dirty="0" smtClean="0"/>
           </a:p>
           <a:p>
             <a:pPr lvl="0"/>
             <a:r>
+              <a:rPr lang="en-US" dirty="0" smtClean="0"/>
+              <a:t>Target </a:t>
+            </a:r>
+            <a:r>
               <a:rPr lang="en-US" dirty="0"/>
-              <a:t>Target system </a:t>
-            </a:r>
-            <a:r>
-              <a:rPr lang="en-US" dirty="0" smtClean="0"/>
-              <a:t>observers</a:t>
+              <a:t>system’s disk space </a:t>
+            </a:r>
+            <a:r>
+              <a:rPr lang="en-US" dirty="0" smtClean="0"/>
+              <a:t>contained </a:t>
+            </a:r>
+            <a:r>
+              <a:rPr lang="en-US" dirty="0"/>
+              <a:t>i</a:t>
+            </a:r>
+            <a:r>
+              <a:rPr lang="en-US" dirty="0" smtClean="0"/>
+              <a:t>n </a:t>
+            </a:r>
+            <a:r>
+              <a:rPr lang="en-US" dirty="0"/>
+              <a:t>virtual disk, VMM translates address to equivalent location on physical </a:t>
+            </a:r>
+            <a:r>
+              <a:rPr lang="en-US" dirty="0" smtClean="0"/>
+              <a:t>disk</a:t>
             </a:r>
           </a:p>
           <a:p>
             <a:pPr lvl="1"/>
             <a:r>
               <a:rPr lang="en-US" dirty="0" smtClean="0"/>
-              <a:t>Logging </a:t>
+              <a:t>Target </a:t>
             </a:r>
             <a:r>
               <a:rPr lang="en-US" dirty="0"/>
-              <a:t>of hardware-level data via modification of VMM’s device emulation software</a:t>
-            </a:r>
-            <a:endParaRPr lang="en-US" sz="1400" dirty="0"/>
+              <a:t>System no longer has access to physical </a:t>
+            </a:r>
+            <a:r>
+              <a:rPr lang="en-US" dirty="0" smtClean="0"/>
+              <a:t>disk</a:t>
+            </a:r>
           </a:p>
           <a:p>
             <a:pPr lvl="1"/>
             <a:r>
               <a:rPr lang="en-US" dirty="0"/>
-              <a:t>Virtual machine introspection</a:t>
-            </a:r>
-            <a:endParaRPr lang="en-US" sz="1800" dirty="0"/>
-          </a:p>
-          <a:p>
-            <a:pPr lvl="0"/>
+              <a:t>R</a:t>
+            </a:r>
+            <a:r>
+              <a:rPr lang="en-US" dirty="0" smtClean="0"/>
+              <a:t>ootkit </a:t>
+            </a:r>
             <a:r>
               <a:rPr lang="en-US" dirty="0"/>
-              <a:t>Target system modifiers</a:t>
-            </a:r>
-            <a:endParaRPr lang="en-US" sz="2000" dirty="0"/>
-          </a:p>
-          <a:p>
-            <a:pPr lvl="1"/>
-            <a:r>
-              <a:rPr lang="en-US" dirty="0" smtClean="0"/>
-              <a:t>Modifying </a:t>
-            </a:r>
-            <a:r>
-              <a:rPr lang="en-US" dirty="0"/>
-              <a:t>network communication, e-mails, </a:t>
-            </a:r>
-            <a:r>
-              <a:rPr lang="en-US" dirty="0" smtClean="0"/>
-              <a:t>target applications, etc.</a:t>
-            </a:r>
-            <a:endParaRPr lang="en-US" sz="1800" dirty="0"/>
-          </a:p>
-          <a:p>
-            <a:pPr lvl="1"/>
-            <a:r>
-              <a:rPr lang="en-US" dirty="0"/>
-              <a:t>Virtual machine introspection</a:t>
-            </a:r>
-            <a:endParaRPr lang="en-US" sz="1800" dirty="0"/>
+              <a:t>has control of the system</a:t>
+            </a:r>
+            <a:endParaRPr lang="en-US" sz="1600" dirty="0"/>
           </a:p>
         </p:txBody>
       </p:sp>
     </p:spTree>
     <p:extLst>
       <p:ext uri="{BB962C8B-B14F-4D97-AF65-F5344CB8AC3E}">
-        <p14:creationId xmlns:p14="http://schemas.microsoft.com/office/powerpoint/2010/main" xmlns="" val="2687441504"/>
+        <p14:creationId xmlns:p14="http://schemas.microsoft.com/office/powerpoint/2010/main" val="2346653610"/>
       </p:ext>
     </p:extLst>
   </p:cSld>
@@ -7299,7 +7764,7 @@
           <a:p>
             <a:r>
               <a:rPr lang="en-US" dirty="0" smtClean="0"/>
-              <a:t>How it Maintains Control</a:t>
+              <a:t>Forms of Attack</a:t>
             </a:r>
             <a:endParaRPr lang="en-US" dirty="0"/>
           </a:p>
@@ -7317,21 +7782,103 @@
         </p:nvSpPr>
         <p:spPr/>
         <p:txBody>
-          <a:bodyPr/>
-          <a:lstStyle/>
-          <a:p>
-            <a:r>
-              <a:rPr lang="en-US" dirty="0" smtClean="0"/>
-              <a:t>Mike</a:t>
-            </a:r>
-            <a:endParaRPr lang="en-US" dirty="0"/>
+          <a:bodyPr>
+            <a:normAutofit/>
+          </a:bodyPr>
+          <a:lstStyle/>
+          <a:p>
+            <a:pPr lvl="0"/>
+            <a:r>
+              <a:rPr lang="en-US" dirty="0"/>
+              <a:t>No interaction with target system</a:t>
+            </a:r>
+            <a:endParaRPr lang="en-US" sz="2000" dirty="0"/>
+          </a:p>
+          <a:p>
+            <a:pPr lvl="1"/>
+            <a:r>
+              <a:rPr lang="en-US" dirty="0" smtClean="0"/>
+              <a:t>Spam </a:t>
+            </a:r>
+            <a:r>
+              <a:rPr lang="en-US" dirty="0"/>
+              <a:t>relays, denial of service zombies, phishing web </a:t>
+            </a:r>
+            <a:r>
+              <a:rPr lang="en-US" dirty="0" smtClean="0"/>
+              <a:t>servers, etc.</a:t>
+            </a:r>
+            <a:endParaRPr lang="en-US" sz="1800" dirty="0"/>
+          </a:p>
+          <a:p>
+            <a:pPr lvl="0"/>
+            <a:r>
+              <a:rPr lang="en-US" dirty="0"/>
+              <a:t>Target system </a:t>
+            </a:r>
+            <a:r>
+              <a:rPr lang="en-US" dirty="0" smtClean="0"/>
+              <a:t>observers</a:t>
+            </a:r>
+          </a:p>
+          <a:p>
+            <a:pPr lvl="1"/>
+            <a:r>
+              <a:rPr lang="en-US" dirty="0" smtClean="0"/>
+              <a:t>Logging </a:t>
+            </a:r>
+            <a:r>
+              <a:rPr lang="en-US" dirty="0"/>
+              <a:t>of hardware-level data via modification of VMM’s device emulation software</a:t>
+            </a:r>
+            <a:endParaRPr lang="en-US" sz="1400" dirty="0"/>
+          </a:p>
+          <a:p>
+            <a:pPr lvl="1"/>
+            <a:r>
+              <a:rPr lang="en-US" dirty="0"/>
+              <a:t>Virtual machine introspection</a:t>
+            </a:r>
+            <a:endParaRPr lang="en-US" sz="1800" dirty="0"/>
+          </a:p>
+          <a:p>
+            <a:pPr lvl="0"/>
+            <a:r>
+              <a:rPr lang="en-US" dirty="0"/>
+              <a:t>Target system modifiers</a:t>
+            </a:r>
+            <a:endParaRPr lang="en-US" sz="2000" dirty="0"/>
+          </a:p>
+          <a:p>
+            <a:pPr lvl="1"/>
+            <a:r>
+              <a:rPr lang="en-US" dirty="0" smtClean="0"/>
+              <a:t>Modifying </a:t>
+            </a:r>
+            <a:r>
+              <a:rPr lang="en-US" dirty="0"/>
+              <a:t>network communication, e-mails, </a:t>
+            </a:r>
+            <a:r>
+              <a:rPr lang="en-US" dirty="0" smtClean="0"/>
+              <a:t>target applications, etc.</a:t>
+            </a:r>
+            <a:endParaRPr lang="en-US" sz="1800" dirty="0"/>
+          </a:p>
+          <a:p>
+            <a:pPr lvl="1"/>
+            <a:r>
+              <a:rPr lang="en-US" dirty="0"/>
+              <a:t>Virtual machine introspection</a:t>
+            </a:r>
+            <a:endParaRPr lang="en-US" sz="1800" dirty="0"/>
           </a:p>
         </p:txBody>
       </p:sp>
     </p:spTree>
     <p:extLst>
       <p:ext uri="{BB962C8B-B14F-4D97-AF65-F5344CB8AC3E}">
-        <p14:creationId xmlns:p14="http://schemas.microsoft.com/office/powerpoint/2010/main" xmlns="" val="1607849096"/>
+        <p14:creationId xmlns:p14="http://schemas.microsoft.com/office/powerpoint/2010/main" val="2687441504"/>
       </p:ext>
     </p:extLst>
   </p:cSld>
@@ -7382,7 +7929,33 @@
           <a:p>
             <a:r>
               <a:rPr lang="en-US" dirty="0" smtClean="0"/>
-              <a:t>Existing Rootkits</a:t>
+              <a:t>How VMBR Maintains </a:t>
+            </a:r>
+            <a:r>
+              <a:rPr lang="en-US" dirty="0"/>
+              <a:t>Control</a:t>
+            </a:r>
+          </a:p>
+        </p:txBody>
+      </p:sp>
+      <p:sp>
+        <p:nvSpPr>
+          <p:cNvPr id="3" name="Text Placeholder 2"/>
+          <p:cNvSpPr>
+            <a:spLocks noGrp="1"/>
+          </p:cNvSpPr>
+          <p:nvPr>
+            <p:ph type="body" idx="1"/>
+          </p:nvPr>
+        </p:nvSpPr>
+        <p:spPr/>
+        <p:txBody>
+          <a:bodyPr/>
+          <a:lstStyle/>
+          <a:p>
+            <a:r>
+              <a:rPr lang="en-US" dirty="0" smtClean="0"/>
+              <a:t>Control</a:t>
             </a:r>
             <a:endParaRPr lang="en-US" dirty="0"/>
           </a:p>
@@ -7390,12 +7963,66 @@
       </p:sp>
       <p:sp>
         <p:nvSpPr>
-          <p:cNvPr id="3" name="Content Placeholder 2"/>
-          <p:cNvSpPr>
-            <a:spLocks noGrp="1"/>
-          </p:cNvSpPr>
-          <p:nvPr>
-            <p:ph idx="1"/>
+          <p:cNvPr id="4" name="Content Placeholder 3"/>
+          <p:cNvSpPr>
+            <a:spLocks noGrp="1"/>
+          </p:cNvSpPr>
+          <p:nvPr>
+            <p:ph sz="half" idx="2"/>
+          </p:nvPr>
+        </p:nvSpPr>
+        <p:spPr/>
+        <p:txBody>
+          <a:bodyPr>
+            <a:normAutofit/>
+          </a:bodyPr>
+          <a:lstStyle/>
+          <a:p>
+            <a:r>
+              <a:rPr lang="en-US" dirty="0" smtClean="0"/>
+              <a:t>Restarting only the virtual hardware</a:t>
+            </a:r>
+          </a:p>
+          <a:p>
+            <a:pPr lvl="1"/>
+            <a:r>
+              <a:rPr lang="en-US" dirty="0" smtClean="0"/>
+              <a:t>Prevents physical hardware from restarting</a:t>
+            </a:r>
+          </a:p>
+          <a:p>
+            <a:r>
+              <a:rPr lang="en-US" dirty="0" smtClean="0"/>
+              <a:t>Emulating system shutdowns</a:t>
+            </a:r>
+          </a:p>
+          <a:p>
+            <a:pPr lvl="1"/>
+            <a:r>
+              <a:rPr lang="en-US" dirty="0" smtClean="0"/>
+              <a:t>Low-power state</a:t>
+            </a:r>
+          </a:p>
+          <a:p>
+            <a:pPr lvl="1"/>
+            <a:r>
+              <a:rPr lang="en-US" dirty="0" smtClean="0"/>
+              <a:t>VMBR lives inside the contents of RAM</a:t>
+            </a:r>
+          </a:p>
+          <a:p>
+            <a:endParaRPr lang="en-US" dirty="0"/>
+          </a:p>
+        </p:txBody>
+      </p:sp>
+      <p:sp>
+        <p:nvSpPr>
+          <p:cNvPr id="5" name="Text Placeholder 4"/>
+          <p:cNvSpPr>
+            <a:spLocks noGrp="1"/>
+          </p:cNvSpPr>
+          <p:nvPr>
+            <p:ph type="body" sz="quarter" idx="3"/>
           </p:nvPr>
         </p:nvSpPr>
         <p:spPr/>
@@ -7405,20 +8032,50 @@
           <a:p>
             <a:r>
               <a:rPr lang="en-US" dirty="0" smtClean="0"/>
-              <a:t>Mike</a:t>
-            </a:r>
-          </a:p>
-          <a:p>
-            <a:r>
-              <a:rPr lang="en-US" dirty="0" err="1" smtClean="0"/>
-              <a:t>SubVirt</a:t>
-            </a:r>
-            <a:endParaRPr lang="en-US" dirty="0" smtClean="0"/>
-          </a:p>
-          <a:p>
-            <a:r>
-              <a:rPr lang="en-US" dirty="0" err="1" smtClean="0"/>
-              <a:t>BluePill</a:t>
+              <a:t>Stealth</a:t>
+            </a:r>
+            <a:endParaRPr lang="en-US" dirty="0"/>
+          </a:p>
+        </p:txBody>
+      </p:sp>
+      <p:sp>
+        <p:nvSpPr>
+          <p:cNvPr id="6" name="Content Placeholder 5"/>
+          <p:cNvSpPr>
+            <a:spLocks noGrp="1"/>
+          </p:cNvSpPr>
+          <p:nvPr>
+            <p:ph sz="quarter" idx="4"/>
+          </p:nvPr>
+        </p:nvSpPr>
+        <p:spPr/>
+        <p:txBody>
+          <a:bodyPr/>
+          <a:lstStyle/>
+          <a:p>
+            <a:r>
+              <a:rPr lang="en-US" dirty="0" smtClean="0"/>
+              <a:t>Manipulate antivirus code</a:t>
+            </a:r>
+          </a:p>
+          <a:p>
+            <a:pPr lvl="1"/>
+            <a:r>
+              <a:rPr lang="en-US" dirty="0" smtClean="0"/>
+              <a:t>Deems antivirus completely useless</a:t>
+            </a:r>
+          </a:p>
+          <a:p>
+            <a:r>
+              <a:rPr lang="en-US" dirty="0" smtClean="0"/>
+              <a:t>Running behind the scenes</a:t>
+            </a:r>
+          </a:p>
+          <a:p>
+            <a:pPr lvl="1"/>
+            <a:r>
+              <a:rPr lang="en-US" dirty="0" smtClean="0"/>
+              <a:t>Running undetected by the humans and OS alike</a:t>
             </a:r>
             <a:endParaRPr lang="en-US" dirty="0"/>
           </a:p>
@@ -7427,7 +8084,7 @@
     </p:spTree>
     <p:extLst>
       <p:ext uri="{BB962C8B-B14F-4D97-AF65-F5344CB8AC3E}">
-        <p14:creationId xmlns:p14="http://schemas.microsoft.com/office/powerpoint/2010/main" xmlns="" val="2405789898"/>
+        <p14:creationId xmlns:p14="http://schemas.microsoft.com/office/powerpoint/2010/main" val="1249372831"/>
       </p:ext>
     </p:extLst>
   </p:cSld>
@@ -7478,7 +8135,7 @@
           <a:p>
             <a:r>
               <a:rPr lang="en-US" dirty="0" smtClean="0"/>
-              <a:t>Methods of Defense</a:t>
+              <a:t>Existing Rootkits</a:t>
             </a:r>
             <a:endParaRPr lang="en-US" dirty="0"/>
           </a:p>
@@ -7501,28 +8158,21 @@
           <a:p>
             <a:r>
               <a:rPr lang="en-US" dirty="0" smtClean="0"/>
-              <a:t>Two Ways:</a:t>
-            </a:r>
-          </a:p>
-          <a:p>
+              <a:t>Mike</a:t>
+            </a:r>
+          </a:p>
+          <a:p>
+            <a:r>
+              <a:rPr lang="en-US" dirty="0" err="1" smtClean="0"/>
+              <a:t>SubVirt</a:t>
+            </a:r>
             <a:endParaRPr lang="en-US" dirty="0" smtClean="0"/>
           </a:p>
           <a:p>
-            <a:pPr lvl="1"/>
-            <a:r>
-              <a:rPr lang="en-US" dirty="0" smtClean="0"/>
-              <a:t>Security software below the VMBR</a:t>
-            </a:r>
-          </a:p>
-          <a:p>
-            <a:pPr lvl="1"/>
-            <a:r>
-              <a:rPr lang="en-US" dirty="0" smtClean="0"/>
-              <a:t>Security  software above the VMBR</a:t>
-            </a:r>
-          </a:p>
-          <a:p>
-            <a:pPr lvl="1"/>
+            <a:r>
+              <a:rPr lang="en-US" dirty="0" err="1" smtClean="0"/>
+              <a:t>BluePill</a:t>
+            </a:r>
             <a:endParaRPr lang="en-US" dirty="0"/>
           </a:p>
         </p:txBody>
@@ -7530,7 +8180,7 @@
     </p:spTree>
     <p:extLst>
       <p:ext uri="{BB962C8B-B14F-4D97-AF65-F5344CB8AC3E}">
-        <p14:creationId xmlns:p14="http://schemas.microsoft.com/office/powerpoint/2010/main" xmlns="" val="19357863"/>
+        <p14:creationId xmlns:p14="http://schemas.microsoft.com/office/powerpoint/2010/main" val="2405789898"/>
       </p:ext>
     </p:extLst>
   </p:cSld>
@@ -7581,11 +8231,7 @@
           <a:p>
             <a:r>
               <a:rPr lang="en-US" dirty="0" smtClean="0"/>
-              <a:t>Security software below </a:t>
-            </a:r>
-            <a:r>
-              <a:rPr lang="en-US" dirty="0" err="1" smtClean="0"/>
-              <a:t>vmbr</a:t>
+              <a:t>Methods of Defense</a:t>
             </a:r>
             <a:endParaRPr lang="en-US" dirty="0"/>
           </a:p>
@@ -7608,54 +8254,38 @@
           <a:p>
             <a:r>
               <a:rPr lang="en-US" dirty="0" smtClean="0"/>
-              <a:t>Can see the state of VMBR</a:t>
-            </a:r>
-          </a:p>
-          <a:p>
-            <a:r>
-              <a:rPr lang="en-US" dirty="0" smtClean="0"/>
-              <a:t>Read physical memory of disk and look for signatures and anomalies that indicate the presence of VMBR</a:t>
-            </a:r>
-          </a:p>
-          <a:p>
-            <a:r>
-              <a:rPr lang="en-US" dirty="0" smtClean="0"/>
-              <a:t>Use secure hardware</a:t>
-            </a:r>
-          </a:p>
-          <a:p>
-            <a:r>
-              <a:rPr lang="en-US" dirty="0" smtClean="0"/>
-              <a:t>Boot from safe medium </a:t>
-            </a:r>
-          </a:p>
-          <a:p>
-            <a:r>
-              <a:rPr lang="en-US" dirty="0" smtClean="0"/>
-              <a:t>Physically unplug the machine before reboot</a:t>
-            </a:r>
-          </a:p>
-          <a:p>
-            <a:r>
-              <a:rPr lang="en-US" dirty="0" smtClean="0"/>
-              <a:t>Use  secure VMM</a:t>
-            </a:r>
-          </a:p>
-          <a:p>
-            <a:pPr>
-              <a:buNone/>
-            </a:pPr>
+              <a:t>Two Ways:</a:t>
+            </a:r>
+          </a:p>
+          <a:p>
             <a:endParaRPr lang="en-US" dirty="0" smtClean="0"/>
           </a:p>
           <a:p>
-            <a:endParaRPr lang="en-US" dirty="0" smtClean="0"/>
-          </a:p>
-          <a:p>
+            <a:pPr lvl="1"/>
+            <a:r>
+              <a:rPr lang="en-US" dirty="0" smtClean="0"/>
+              <a:t>Security software below the VMBR</a:t>
+            </a:r>
+          </a:p>
+          <a:p>
+            <a:pPr lvl="1"/>
+            <a:r>
+              <a:rPr lang="en-US" dirty="0" smtClean="0"/>
+              <a:t>Security  software above the VMBR</a:t>
+            </a:r>
+          </a:p>
+          <a:p>
+            <a:pPr lvl="1"/>
             <a:endParaRPr lang="en-US" dirty="0"/>
           </a:p>
         </p:txBody>
       </p:sp>
     </p:spTree>
+    <p:extLst>
+      <p:ext uri="{BB962C8B-B14F-4D97-AF65-F5344CB8AC3E}">
+        <p14:creationId xmlns:p14="http://schemas.microsoft.com/office/powerpoint/2010/main" val="19357863"/>
+      </p:ext>
+    </p:extLst>
   </p:cSld>
   <p:clrMapOvr>
     <a:masterClrMapping/>

</xml_diff>

<commit_message>
Added existing rootkit slide
</commit_message>
<xml_diff>
--- a/VMBR_Presentation.pptx
+++ b/VMBR_Presentation.pptx
@@ -563,6 +563,133 @@
 </p:notes>
 </file>
 
+<file path=ppt/notesSlides/notesSlide10.xml><?xml version="1.0" encoding="utf-8"?>
+<p:notes xmlns:a="http://schemas.openxmlformats.org/drawingml/2006/main" xmlns:r="http://schemas.openxmlformats.org/officeDocument/2006/relationships" xmlns:p="http://schemas.openxmlformats.org/presentationml/2006/main">
+  <p:cSld>
+    <p:spTree>
+      <p:nvGrpSpPr>
+        <p:cNvPr id="1" name=""/>
+        <p:cNvGrpSpPr/>
+        <p:nvPr/>
+      </p:nvGrpSpPr>
+      <p:grpSpPr>
+        <a:xfrm>
+          <a:off x="0" y="0"/>
+          <a:ext cx="0" cy="0"/>
+          <a:chOff x="0" y="0"/>
+          <a:chExt cx="0" cy="0"/>
+        </a:xfrm>
+      </p:grpSpPr>
+      <p:sp>
+        <p:nvSpPr>
+          <p:cNvPr id="2" name="Slide Image Placeholder 1"/>
+          <p:cNvSpPr>
+            <a:spLocks noGrp="1" noRot="1" noChangeAspect="1"/>
+          </p:cNvSpPr>
+          <p:nvPr>
+            <p:ph type="sldImg"/>
+          </p:nvPr>
+        </p:nvSpPr>
+        <p:spPr/>
+      </p:sp>
+      <p:sp>
+        <p:nvSpPr>
+          <p:cNvPr id="3" name="Notes Placeholder 2"/>
+          <p:cNvSpPr>
+            <a:spLocks noGrp="1"/>
+          </p:cNvSpPr>
+          <p:nvPr>
+            <p:ph type="body" idx="1"/>
+          </p:nvPr>
+        </p:nvSpPr>
+        <p:spPr/>
+        <p:txBody>
+          <a:bodyPr>
+            <a:normAutofit/>
+          </a:bodyPr>
+          <a:lstStyle/>
+          <a:p>
+            <a:r>
+              <a:rPr lang="en-US" dirty="0" smtClean="0"/>
+              <a:t>Paladin comprises of several components like the modified form of </a:t>
+            </a:r>
+            <a:r>
+              <a:rPr lang="en-US" dirty="0" err="1" smtClean="0"/>
+              <a:t>Vmware</a:t>
+            </a:r>
+            <a:r>
+              <a:rPr lang="en-US" dirty="0" smtClean="0"/>
+              <a:t> Workstation, Paladin App, the driver and the database. </a:t>
+            </a:r>
+            <a:r>
+              <a:rPr lang="en-US" dirty="0" err="1" smtClean="0"/>
+              <a:t>VMApp</a:t>
+            </a:r>
+            <a:r>
+              <a:rPr lang="en-US" dirty="0" smtClean="0"/>
+              <a:t> and the VMM are a part of the VMware Workstation software. </a:t>
+            </a:r>
+          </a:p>
+          <a:p>
+            <a:endParaRPr lang="en-US" dirty="0" smtClean="0"/>
+          </a:p>
+          <a:p>
+            <a:r>
+              <a:rPr lang="en-US" dirty="0" smtClean="0"/>
+              <a:t>VMM forwards file and process related system calls to </a:t>
+            </a:r>
+            <a:r>
+              <a:rPr lang="en-US" dirty="0" err="1" smtClean="0"/>
+              <a:t>PaladinApp</a:t>
+            </a:r>
+            <a:r>
+              <a:rPr lang="en-US" dirty="0" smtClean="0"/>
+              <a:t>. These are used to update the dependency tree, stored in the database. If the violation of a given access control policy is intercepted by the VMM, it notifies the </a:t>
+            </a:r>
+            <a:r>
+              <a:rPr lang="en-US" dirty="0" err="1" smtClean="0"/>
+              <a:t>PaladinApp</a:t>
+            </a:r>
+            <a:r>
+              <a:rPr lang="en-US" dirty="0" smtClean="0"/>
+              <a:t>, which in turn initiates the containment procedure. </a:t>
+            </a:r>
+            <a:endParaRPr lang="en-US" dirty="0"/>
+          </a:p>
+        </p:txBody>
+      </p:sp>
+      <p:sp>
+        <p:nvSpPr>
+          <p:cNvPr id="4" name="Slide Number Placeholder 3"/>
+          <p:cNvSpPr>
+            <a:spLocks noGrp="1"/>
+          </p:cNvSpPr>
+          <p:nvPr>
+            <p:ph type="sldNum" sz="quarter" idx="10"/>
+          </p:nvPr>
+        </p:nvSpPr>
+        <p:spPr/>
+        <p:txBody>
+          <a:bodyPr/>
+          <a:lstStyle/>
+          <a:p>
+            <a:fld id="{72141A60-0A97-4B4C-A98B-2EDC5A7E8FE4}" type="slidenum">
+              <a:rPr lang="en-US" smtClean="0"/>
+              <a:pPr/>
+              <a:t>17</a:t>
+            </a:fld>
+            <a:endParaRPr lang="en-US"/>
+          </a:p>
+        </p:txBody>
+      </p:sp>
+    </p:spTree>
+  </p:cSld>
+  <p:clrMapOvr>
+    <a:masterClrMapping/>
+  </p:clrMapOvr>
+</p:notes>
+</file>
+
 <file path=ppt/notesSlides/notesSlide2.xml><?xml version="1.0" encoding="utf-8"?>
 <p:notes xmlns:a="http://schemas.openxmlformats.org/drawingml/2006/main" xmlns:r="http://schemas.openxmlformats.org/officeDocument/2006/relationships" xmlns:p="http://schemas.openxmlformats.org/presentationml/2006/main">
   <p:cSld>
@@ -867,78 +994,12 @@
         </p:nvSpPr>
         <p:spPr/>
         <p:txBody>
-          <a:bodyPr>
-            <a:normAutofit/>
-          </a:bodyPr>
-          <a:lstStyle/>
-          <a:p>
-            <a:pPr marL="228600" indent="-228600">
-              <a:buAutoNum type="arabicPeriod"/>
-            </a:pPr>
-            <a:r>
-              <a:rPr lang="en-US" dirty="0" smtClean="0"/>
-              <a:t>Detectors that run below the VMBR can see the state of the VMBR because their view of the system does not go through the VMBR’s virtualization layer. </a:t>
-            </a:r>
-          </a:p>
-          <a:p>
-            <a:pPr marL="228600" indent="-228600">
-              <a:buAutoNum type="arabicPeriod"/>
-            </a:pPr>
-            <a:r>
-              <a:rPr lang="en-US" dirty="0" smtClean="0"/>
-              <a:t>Such detection software can read physical memory or disk and look for signatures or anomalies that indicate the presence of a VMBR, such as a modified boot sequence. </a:t>
-            </a:r>
-          </a:p>
-          <a:p>
-            <a:pPr marL="228600" indent="-228600">
-              <a:buAutoNum type="arabicPeriod"/>
-            </a:pPr>
-            <a:r>
-              <a:rPr lang="en-US" dirty="0" smtClean="0"/>
-              <a:t>Researchers (Intel, AMD and Copilot all) propose hardware that can be used to develop and deploy low-layer security software that would run beneath a VMBR. </a:t>
-            </a:r>
-          </a:p>
-          <a:p>
-            <a:pPr marL="228600" indent="-228600">
-              <a:buAutoNum type="arabicPeriod"/>
-            </a:pPr>
-            <a:r>
-              <a:rPr lang="en-US" dirty="0" smtClean="0"/>
-              <a:t>A valid way to gain control below the VMBR is to boot from a safe medium such as CD-ROM, USB drive or network boot server. This boot code can run on the system before the VMBR loads and can view the VMBR’s quiescent disk state. </a:t>
-            </a:r>
-          </a:p>
-          <a:p>
-            <a:pPr marL="228600" indent="-228600">
-              <a:buAutoNum type="arabicPeriod"/>
-            </a:pPr>
-            <a:r>
-              <a:rPr lang="en-US" dirty="0" smtClean="0"/>
-              <a:t>VMBRs can avoid booting from safe medium by emulating system shutdowns and reboots, thus it’s a good practice to physically unplug the machine before attempting to boot from safe medium. </a:t>
-            </a:r>
-          </a:p>
-          <a:p>
-            <a:pPr marL="228600" indent="-228600">
-              <a:buAutoNum type="arabicPeriod"/>
-            </a:pPr>
-            <a:r>
-              <a:rPr lang="en-US" dirty="0" smtClean="0"/>
-              <a:t>Using a secure VMM, king et al. implemented an enhanced version of secure boot which can prevent VMBR installations. The goal of the secure boot system is to provide attestation for existing boot components, such as dist master boot record, the file </a:t>
-            </a:r>
-            <a:r>
-              <a:rPr lang="en-US" dirty="0" err="1" smtClean="0"/>
-              <a:t>systems’s</a:t>
-            </a:r>
-            <a:r>
-              <a:rPr lang="en-US" dirty="0" smtClean="0"/>
-              <a:t> boot </a:t>
-            </a:r>
-            <a:r>
-              <a:rPr lang="en-US" dirty="0" err="1" smtClean="0"/>
-              <a:t>sectorand</a:t>
-            </a:r>
-            <a:r>
-              <a:rPr lang="en-US" dirty="0" smtClean="0"/>
-              <a:t> the OS’s boot loader and also to allow the legitimate updates of these components. </a:t>
+          <a:bodyPr/>
+          <a:lstStyle/>
+          <a:p>
+            <a:r>
+              <a:rPr lang="en-US" dirty="0" smtClean="0"/>
+              <a:t>Mike</a:t>
             </a:r>
             <a:endParaRPr lang="en-US" dirty="0"/>
           </a:p>
@@ -962,13 +1023,18 @@
             <a:fld id="{72141A60-0A97-4B4C-A98B-2EDC5A7E8FE4}" type="slidenum">
               <a:rPr lang="en-US" smtClean="0"/>
               <a:pPr/>
-              <a:t>10</a:t>
+              <a:t>8</a:t>
             </a:fld>
             <a:endParaRPr lang="en-US"/>
           </a:p>
         </p:txBody>
       </p:sp>
     </p:spTree>
+    <p:extLst>
+      <p:ext uri="{BB962C8B-B14F-4D97-AF65-F5344CB8AC3E}">
+        <p14:creationId xmlns:p14="http://schemas.microsoft.com/office/powerpoint/2010/main" val="2598429233"/>
+      </p:ext>
+    </p:extLst>
   </p:cSld>
   <p:clrMapOvr>
     <a:masterClrMapping/>
@@ -1022,30 +1088,76 @@
           </a:bodyPr>
           <a:lstStyle/>
           <a:p>
-            <a:r>
-              <a:rPr lang="en-US" dirty="0" smtClean="0"/>
-              <a:t>1. A VMBR adds CPU overhead to trap and emulate privileged instructions, as well as to run any malicious services. These timing differences can be noticed by software running in the virtual machine by comparing the running time of benchmarks against wall-clock time. </a:t>
-            </a:r>
-          </a:p>
-          <a:p>
+            <a:pPr marL="228600" indent="-228600">
+              <a:buAutoNum type="arabicPeriod"/>
+            </a:pPr>
+            <a:r>
+              <a:rPr lang="en-US" dirty="0" smtClean="0"/>
+              <a:t>Detectors that run below the VMBR can see the state of the VMBR because their view of the system does not go through the VMBR’s virtualization layer. </a:t>
+            </a:r>
+          </a:p>
+          <a:p>
+            <a:pPr marL="228600" indent="-228600">
+              <a:buAutoNum type="arabicPeriod"/>
+            </a:pPr>
+            <a:r>
+              <a:rPr lang="en-US" dirty="0" smtClean="0"/>
+              <a:t>Such detection software can read physical memory or disk and look for signatures or anomalies that indicate the presence of a VMBR, such as a modified boot sequence. </a:t>
+            </a:r>
+          </a:p>
+          <a:p>
+            <a:pPr marL="228600" indent="-228600">
+              <a:buAutoNum type="arabicPeriod"/>
+            </a:pPr>
+            <a:r>
+              <a:rPr lang="en-US" dirty="0" smtClean="0"/>
+              <a:t>Researchers (Intel, AMD and Copilot all) propose hardware that can be used to develop and deploy low-layer security software that would run beneath a VMBR. </a:t>
+            </a:r>
+          </a:p>
+          <a:p>
+            <a:pPr marL="228600" indent="-228600">
+              <a:buAutoNum type="arabicPeriod"/>
+            </a:pPr>
+            <a:r>
+              <a:rPr lang="en-US" dirty="0" smtClean="0"/>
+              <a:t>A valid way to gain control below the VMBR is to boot from a safe medium such as CD-ROM, USB drive or network boot server. This boot code can run on the system before the VMBR loads and can view the VMBR’s quiescent disk state. </a:t>
+            </a:r>
+          </a:p>
+          <a:p>
+            <a:pPr marL="228600" indent="-228600">
+              <a:buAutoNum type="arabicPeriod"/>
+            </a:pPr>
+            <a:r>
+              <a:rPr lang="en-US" dirty="0" smtClean="0"/>
+              <a:t>VMBRs can avoid booting from safe medium by emulating system shutdowns and reboots, thus it’s a good practice to physically unplug the machine before attempting to boot from safe medium. </a:t>
+            </a:r>
+          </a:p>
+          <a:p>
+            <a:pPr marL="228600" indent="-228600">
+              <a:buAutoNum type="arabicPeriod"/>
+            </a:pPr>
+            <a:r>
+              <a:rPr lang="en-US" dirty="0" smtClean="0"/>
+              <a:t>Using a secure VMM, king et al. implemented an enhanced version of secure boot which can prevent VMBR installations. The goal of the secure boot system is to provide attestation for existing boot components, such as dist master boot record, the file </a:t>
+            </a:r>
+            <a:r>
+              <a:rPr lang="en-US" dirty="0" err="1" smtClean="0"/>
+              <a:t>systems’s</a:t>
+            </a:r>
+            <a:r>
+              <a:rPr lang="en-US" dirty="0" smtClean="0"/>
+              <a:t> boot </a:t>
+            </a:r>
+            <a:r>
+              <a:rPr lang="en-US" dirty="0" err="1" smtClean="0"/>
+              <a:t>sectorand</a:t>
+            </a:r>
+            <a:r>
+              <a:rPr lang="en-US" dirty="0" smtClean="0"/>
+              <a:t> the OS’s boot loader and also to allow the legitimate updates of these components. </a:t>
+            </a:r>
             <a:endParaRPr lang="en-US" dirty="0"/>
           </a:p>
-          <a:p>
-            <a:r>
-              <a:rPr lang="en-US" dirty="0" smtClean="0"/>
-              <a:t>2. An approach used was a program that required the entire machines memory of disk space. VMBR was able to hide its space overhead in several ways and this method didn’t prove to be that good (paging some data to disk for memory and bad sector trick for disk). </a:t>
-            </a:r>
-          </a:p>
-          <a:p>
-            <a:endParaRPr lang="en-US" dirty="0"/>
-          </a:p>
-          <a:p>
-            <a:r>
-              <a:rPr lang="en-US" dirty="0" smtClean="0"/>
-              <a:t>3. </a:t>
-            </a:r>
-            <a:endParaRPr lang="en-US" dirty="0"/>
-          </a:p>
         </p:txBody>
       </p:sp>
       <p:sp>
@@ -1066,7 +1178,7 @@
             <a:fld id="{72141A60-0A97-4B4C-A98B-2EDC5A7E8FE4}" type="slidenum">
               <a:rPr lang="en-US" smtClean="0"/>
               <a:pPr/>
-              <a:t>11</a:t>
+              <a:t>10</a:t>
             </a:fld>
             <a:endParaRPr lang="en-US"/>
           </a:p>
@@ -1126,119 +1238,30 @@
           </a:bodyPr>
           <a:lstStyle/>
           <a:p>
-            <a:pPr marL="228600" indent="-228600">
-              <a:buAutoNum type="arabicPeriod"/>
-            </a:pPr>
-            <a:r>
-              <a:rPr lang="en-US" dirty="0" smtClean="0"/>
-              <a:t>Hooks </a:t>
-            </a:r>
-            <a:r>
-              <a:rPr lang="en-US" dirty="0"/>
-              <a:t>are blocks of code that intercept events, function calls, or </a:t>
-            </a:r>
-            <a:r>
-              <a:rPr lang="en-US" dirty="0" smtClean="0"/>
-              <a:t>messages. Hooking is employed by </a:t>
-            </a:r>
-            <a:r>
-              <a:rPr lang="en-US" dirty="0" err="1" smtClean="0"/>
-              <a:t>rootkits</a:t>
-            </a:r>
-            <a:r>
-              <a:rPr lang="en-US" dirty="0" smtClean="0"/>
-              <a:t> to evade detection. Hooking modifies the flow of control and hides the presence of modification. </a:t>
-            </a:r>
-          </a:p>
-          <a:p>
-            <a:pPr marL="228600" indent="-228600"/>
-            <a:r>
-              <a:rPr lang="en-US" dirty="0"/>
-              <a:t>	</a:t>
-            </a:r>
-            <a:r>
-              <a:rPr lang="en-US" dirty="0" err="1" smtClean="0"/>
-              <a:t>Hooksafe</a:t>
-            </a:r>
-            <a:r>
-              <a:rPr lang="en-US" dirty="0" smtClean="0"/>
-              <a:t> provides a hypervisor based system to protect kernel hooks from being attacked by </a:t>
-            </a:r>
-            <a:r>
-              <a:rPr lang="en-US" dirty="0" err="1" smtClean="0"/>
-              <a:t>rootkits</a:t>
-            </a:r>
-            <a:r>
-              <a:rPr lang="en-US" dirty="0" smtClean="0"/>
-              <a:t>. </a:t>
-            </a:r>
-            <a:r>
-              <a:rPr lang="en-US" dirty="0" err="1" smtClean="0"/>
-              <a:t>Hooksafe</a:t>
-            </a:r>
-            <a:r>
-              <a:rPr lang="en-US" dirty="0" smtClean="0"/>
-              <a:t> monitors the possible hooks(write access) for modifications. It provides a hook indirection layer to regulate access to hooks in kernel. </a:t>
-            </a:r>
-          </a:p>
-          <a:p>
-            <a:pPr marL="228600" indent="-228600"/>
-            <a:r>
-              <a:rPr lang="en-US" dirty="0" smtClean="0"/>
-              <a:t>2. </a:t>
-            </a:r>
-            <a:r>
-              <a:rPr lang="en-US" dirty="0" err="1" smtClean="0"/>
-              <a:t>SecVisor</a:t>
-            </a:r>
-            <a:r>
-              <a:rPr lang="en-US" dirty="0" smtClean="0"/>
-              <a:t> </a:t>
-            </a:r>
-            <a:r>
-              <a:rPr lang="en-US" dirty="0"/>
-              <a:t>protects the integrity of code in OS kernels by preventing </a:t>
-            </a:r>
-            <a:r>
-              <a:rPr lang="en-US" dirty="0" smtClean="0"/>
-              <a:t>unauthorized </a:t>
-            </a:r>
-          </a:p>
-          <a:p>
-            <a:pPr marL="228600" indent="-228600"/>
-            <a:r>
-              <a:rPr lang="en-US" dirty="0"/>
-              <a:t> </a:t>
-            </a:r>
-            <a:r>
-              <a:rPr lang="en-US" dirty="0" smtClean="0"/>
-              <a:t>    modifications </a:t>
-            </a:r>
-            <a:r>
-              <a:rPr lang="en-US" dirty="0"/>
-              <a:t>to the code via a user specified approval </a:t>
-            </a:r>
-            <a:r>
-              <a:rPr lang="en-US" dirty="0" smtClean="0"/>
-              <a:t>policy.</a:t>
-            </a:r>
-          </a:p>
-          <a:p>
-            <a:pPr marL="228600" indent="-228600">
-              <a:buAutoNum type="arabicPeriod" startAt="3"/>
-            </a:pPr>
-            <a:r>
-              <a:rPr lang="en-US" dirty="0" smtClean="0"/>
-              <a:t>NICKLE uses VMM for restricting access to the Kernel space. NICKLE module lies in the VMM layer and enforces that the guest OS kernel cannot access the shadow memory. At runtime, any instruction executed in the shadow space must be fetched from the shadow memory, which contains authenticated instructions. </a:t>
-            </a:r>
-            <a:endParaRPr lang="en-US" smtClean="0"/>
-          </a:p>
-          <a:p>
-            <a:pPr marL="228600" indent="-228600">
-              <a:buAutoNum type="arabicPeriod" startAt="3"/>
-            </a:pPr>
+            <a:r>
+              <a:rPr lang="en-US" dirty="0" smtClean="0"/>
+              <a:t>1. A VMBR adds CPU overhead to trap and emulate privileged instructions, as well as to run any malicious services. These timing differences can be noticed by software running in the virtual machine by comparing the running time of benchmarks against wall-clock time. </a:t>
+            </a:r>
+          </a:p>
+          <a:p>
             <a:endParaRPr lang="en-US" dirty="0"/>
           </a:p>
+          <a:p>
+            <a:r>
+              <a:rPr lang="en-US" dirty="0" smtClean="0"/>
+              <a:t>2. An approach used was a program that required the entire machines memory of disk space. VMBR was able to hide its space overhead in several ways and this method didn’t prove to be that good (paging some data to disk for memory and bad sector trick for disk). </a:t>
+            </a:r>
+          </a:p>
+          <a:p>
+            <a:endParaRPr lang="en-US" dirty="0"/>
+          </a:p>
+          <a:p>
+            <a:r>
+              <a:rPr lang="en-US" dirty="0" smtClean="0"/>
+              <a:t>3. </a:t>
+            </a:r>
+            <a:endParaRPr lang="en-US" dirty="0"/>
+          </a:p>
         </p:txBody>
       </p:sp>
       <p:sp>
@@ -1259,7 +1282,7 @@
             <a:fld id="{72141A60-0A97-4B4C-A98B-2EDC5A7E8FE4}" type="slidenum">
               <a:rPr lang="en-US" smtClean="0"/>
               <a:pPr/>
-              <a:t>12</a:t>
+              <a:t>11</a:t>
             </a:fld>
             <a:endParaRPr lang="en-US"/>
           </a:p>
@@ -1319,52 +1342,117 @@
           </a:bodyPr>
           <a:lstStyle/>
           <a:p>
-            <a:r>
-              <a:rPr lang="en-US" sz="1200" kern="1200" dirty="0" smtClean="0">
-                <a:solidFill>
-                  <a:schemeClr val="tx1"/>
-                </a:solidFill>
-                <a:latin typeface="+mn-lt"/>
-                <a:ea typeface="+mn-ea"/>
-                <a:cs typeface="+mn-cs"/>
-              </a:rPr>
-              <a:t>File access control policies protect the system utilities from being replaced by their </a:t>
-            </a:r>
-            <a:r>
-              <a:rPr lang="en-US" sz="1200" kern="1200" dirty="0" err="1" smtClean="0">
-                <a:solidFill>
-                  <a:schemeClr val="tx1"/>
-                </a:solidFill>
-                <a:latin typeface="+mn-lt"/>
-                <a:ea typeface="+mn-ea"/>
-                <a:cs typeface="+mn-cs"/>
-              </a:rPr>
-              <a:t>trojaned</a:t>
-            </a:r>
-            <a:r>
-              <a:rPr lang="en-US" sz="1200" kern="1200" dirty="0" smtClean="0">
-                <a:solidFill>
-                  <a:schemeClr val="tx1"/>
-                </a:solidFill>
-                <a:latin typeface="+mn-lt"/>
-                <a:ea typeface="+mn-ea"/>
-                <a:cs typeface="+mn-cs"/>
-              </a:rPr>
-              <a:t> counterparts. </a:t>
-            </a:r>
-          </a:p>
-          <a:p>
-            <a:r>
-              <a:rPr lang="en-US" sz="1200" kern="1200" smtClean="0">
-                <a:solidFill>
-                  <a:schemeClr val="tx1"/>
-                </a:solidFill>
-                <a:latin typeface="+mn-lt"/>
-                <a:ea typeface="+mn-ea"/>
-                <a:cs typeface="+mn-cs"/>
-              </a:rPr>
-              <a:t>Memory access control policies protect the kernel code and data structures from being overwritten in memory.</a:t>
-            </a:r>
+            <a:pPr marL="228600" indent="-228600">
+              <a:buAutoNum type="arabicPeriod"/>
+            </a:pPr>
+            <a:r>
+              <a:rPr lang="en-US" dirty="0" smtClean="0"/>
+              <a:t>Hooks </a:t>
+            </a:r>
+            <a:r>
+              <a:rPr lang="en-US" dirty="0"/>
+              <a:t>are blocks of code that intercept events, function calls, or </a:t>
+            </a:r>
+            <a:r>
+              <a:rPr lang="en-US" dirty="0" smtClean="0"/>
+              <a:t>messages. Hooking is employed by </a:t>
+            </a:r>
+            <a:r>
+              <a:rPr lang="en-US" dirty="0" err="1" smtClean="0"/>
+              <a:t>rootkits</a:t>
+            </a:r>
+            <a:r>
+              <a:rPr lang="en-US" dirty="0" smtClean="0"/>
+              <a:t> to evade detection. Hooking modifies the flow of control and hides the presence of modification. </a:t>
+            </a:r>
+          </a:p>
+          <a:p>
+            <a:pPr marL="228600" indent="-228600"/>
+            <a:r>
+              <a:rPr lang="en-US" dirty="0"/>
+              <a:t>	</a:t>
+            </a:r>
+            <a:r>
+              <a:rPr lang="en-US" dirty="0" err="1" smtClean="0"/>
+              <a:t>Hooksafe</a:t>
+            </a:r>
+            <a:r>
+              <a:rPr lang="en-US" dirty="0" smtClean="0"/>
+              <a:t> provides a hypervisor based system to protect kernel hooks from being attacked by </a:t>
+            </a:r>
+            <a:r>
+              <a:rPr lang="en-US" dirty="0" err="1" smtClean="0"/>
+              <a:t>rootkits</a:t>
+            </a:r>
+            <a:r>
+              <a:rPr lang="en-US" dirty="0" smtClean="0"/>
+              <a:t>. </a:t>
+            </a:r>
+            <a:r>
+              <a:rPr lang="en-US" dirty="0" err="1" smtClean="0"/>
+              <a:t>Hooksafe</a:t>
+            </a:r>
+            <a:r>
+              <a:rPr lang="en-US" dirty="0" smtClean="0"/>
+              <a:t> monitors the possible hooks(write access) for modifications. It provides a hook indirection layer to regulate access to hooks in kernel. </a:t>
+            </a:r>
+          </a:p>
+          <a:p>
+            <a:pPr marL="228600" indent="-228600"/>
+            <a:r>
+              <a:rPr lang="en-US" dirty="0" smtClean="0"/>
+              <a:t>2. </a:t>
+            </a:r>
+            <a:r>
+              <a:rPr lang="en-US" dirty="0" err="1" smtClean="0"/>
+              <a:t>SecVisor</a:t>
+            </a:r>
+            <a:r>
+              <a:rPr lang="en-US" dirty="0" smtClean="0"/>
+              <a:t> </a:t>
+            </a:r>
+            <a:r>
+              <a:rPr lang="en-US" dirty="0"/>
+              <a:t>protects the integrity of code in OS kernels by preventing </a:t>
+            </a:r>
+            <a:r>
+              <a:rPr lang="en-US" dirty="0" smtClean="0"/>
+              <a:t>unauthorized </a:t>
+            </a:r>
+          </a:p>
+          <a:p>
+            <a:pPr marL="228600" indent="-228600"/>
+            <a:r>
+              <a:rPr lang="en-US" dirty="0"/>
+              <a:t> </a:t>
+            </a:r>
+            <a:r>
+              <a:rPr lang="en-US" dirty="0" smtClean="0"/>
+              <a:t>    modifications </a:t>
+            </a:r>
+            <a:r>
+              <a:rPr lang="en-US" dirty="0"/>
+              <a:t>to the code via a user specified approval </a:t>
+            </a:r>
+            <a:r>
+              <a:rPr lang="en-US" dirty="0" smtClean="0"/>
+              <a:t>policy.</a:t>
+            </a:r>
+          </a:p>
+          <a:p>
+            <a:pPr marL="228600" indent="-228600">
+              <a:buAutoNum type="arabicPeriod" startAt="3"/>
+            </a:pPr>
+            <a:r>
+              <a:rPr lang="en-US" dirty="0" smtClean="0"/>
+              <a:t>NICKLE uses VMM for restricting access to the Kernel space. NICKLE module lies in the VMM layer and enforces that the guest OS kernel cannot access the shadow memory. At runtime, any instruction executed in the shadow space must be fetched from the shadow memory, which contains authenticated instructions. </a:t>
+            </a:r>
+            <a:endParaRPr lang="en-US" smtClean="0"/>
+          </a:p>
+          <a:p>
+            <a:pPr marL="228600" indent="-228600">
+              <a:buAutoNum type="arabicPeriod" startAt="3"/>
+            </a:pPr>
             <a:endParaRPr lang="en-US" dirty="0"/>
           </a:p>
         </p:txBody>
@@ -1387,7 +1475,7 @@
             <a:fld id="{72141A60-0A97-4B4C-A98B-2EDC5A7E8FE4}" type="slidenum">
               <a:rPr lang="en-US" smtClean="0"/>
               <a:pPr/>
-              <a:t>14</a:t>
+              <a:t>12</a:t>
             </a:fld>
             <a:endParaRPr lang="en-US"/>
           </a:p>
@@ -1448,49 +1536,50 @@
           <a:lstStyle/>
           <a:p>
             <a:r>
-              <a:rPr lang="en-US" dirty="0" smtClean="0"/>
-              <a:t>Paladin comprises of several components like the modified form of </a:t>
-            </a:r>
-            <a:r>
-              <a:rPr lang="en-US" dirty="0" err="1" smtClean="0"/>
-              <a:t>Vmware</a:t>
-            </a:r>
-            <a:r>
-              <a:rPr lang="en-US" dirty="0" smtClean="0"/>
-              <a:t> Workstation, Paladin App, the driver and the database. </a:t>
-            </a:r>
-            <a:r>
-              <a:rPr lang="en-US" dirty="0" err="1" smtClean="0"/>
-              <a:t>VMApp</a:t>
-            </a:r>
-            <a:r>
-              <a:rPr lang="en-US" dirty="0" smtClean="0"/>
-              <a:t> and the VMM are a part of the VMware Workstation software. </a:t>
-            </a:r>
-          </a:p>
-          <a:p>
-            <a:endParaRPr lang="en-US" dirty="0" smtClean="0"/>
-          </a:p>
-          <a:p>
-            <a:r>
-              <a:rPr lang="en-US" dirty="0" smtClean="0"/>
-              <a:t>VMM forwards file and process related system calls to </a:t>
-            </a:r>
-            <a:r>
-              <a:rPr lang="en-US" dirty="0" err="1" smtClean="0"/>
-              <a:t>PaladinApp</a:t>
-            </a:r>
-            <a:r>
-              <a:rPr lang="en-US" dirty="0" smtClean="0"/>
-              <a:t>. These are used to update the dependency tree, stored in the database. If the violation of a given access control policy is intercepted by the VMM, it notifies the </a:t>
-            </a:r>
-            <a:r>
-              <a:rPr lang="en-US" dirty="0" err="1" smtClean="0"/>
-              <a:t>PaladinApp</a:t>
-            </a:r>
-            <a:r>
-              <a:rPr lang="en-US" dirty="0" smtClean="0"/>
-              <a:t>, which in turn initiates the containment procedure. </a:t>
+              <a:rPr lang="en-US" sz="1200" kern="1200" dirty="0" smtClean="0">
+                <a:solidFill>
+                  <a:schemeClr val="tx1"/>
+                </a:solidFill>
+                <a:latin typeface="+mn-lt"/>
+                <a:ea typeface="+mn-ea"/>
+                <a:cs typeface="+mn-cs"/>
+              </a:rPr>
+              <a:t>File access control policies protect the system utilities from being replaced by their </a:t>
+            </a:r>
+            <a:r>
+              <a:rPr lang="en-US" sz="1200" kern="1200" dirty="0" err="1" smtClean="0">
+                <a:solidFill>
+                  <a:schemeClr val="tx1"/>
+                </a:solidFill>
+                <a:latin typeface="+mn-lt"/>
+                <a:ea typeface="+mn-ea"/>
+                <a:cs typeface="+mn-cs"/>
+              </a:rPr>
+              <a:t>trojaned</a:t>
+            </a:r>
+            <a:r>
+              <a:rPr lang="en-US" sz="1200" kern="1200" dirty="0" smtClean="0">
+                <a:solidFill>
+                  <a:schemeClr val="tx1"/>
+                </a:solidFill>
+                <a:latin typeface="+mn-lt"/>
+                <a:ea typeface="+mn-ea"/>
+                <a:cs typeface="+mn-cs"/>
+              </a:rPr>
+              <a:t> counterparts. </a:t>
+            </a:r>
+          </a:p>
+          <a:p>
+            <a:r>
+              <a:rPr lang="en-US" sz="1200" kern="1200" smtClean="0">
+                <a:solidFill>
+                  <a:schemeClr val="tx1"/>
+                </a:solidFill>
+                <a:latin typeface="+mn-lt"/>
+                <a:ea typeface="+mn-ea"/>
+                <a:cs typeface="+mn-cs"/>
+              </a:rPr>
+              <a:t>Memory access control policies protect the kernel code and data structures from being overwritten in memory.</a:t>
             </a:r>
             <a:endParaRPr lang="en-US" dirty="0"/>
           </a:p>
@@ -1514,7 +1603,7 @@
             <a:fld id="{72141A60-0A97-4B4C-A98B-2EDC5A7E8FE4}" type="slidenum">
               <a:rPr lang="en-US" smtClean="0"/>
               <a:pPr/>
-              <a:t>17</a:t>
+              <a:t>14</a:t>
             </a:fld>
             <a:endParaRPr lang="en-US"/>
           </a:p>
@@ -8158,10 +8247,12 @@
           <a:p>
             <a:r>
               <a:rPr lang="en-US" dirty="0" smtClean="0"/>
-              <a:t>Mike</a:t>
-            </a:r>
-          </a:p>
-          <a:p>
+              <a:t>Two experimental VMBRs</a:t>
+            </a:r>
+            <a:endParaRPr lang="en-US" dirty="0"/>
+          </a:p>
+          <a:p>
+            <a:pPr lvl="1"/>
             <a:r>
               <a:rPr lang="en-US" dirty="0" err="1" smtClean="0"/>
               <a:t>SubVirt</a:t>
@@ -8169,11 +8260,90 @@
             <a:endParaRPr lang="en-US" dirty="0" smtClean="0"/>
           </a:p>
           <a:p>
+            <a:pPr lvl="2"/>
+            <a:r>
+              <a:rPr lang="en-US" dirty="0" smtClean="0"/>
+              <a:t>Created by Microsoft researches at University of Michigan</a:t>
+            </a:r>
+            <a:endParaRPr lang="en-US" dirty="0" smtClean="0"/>
+          </a:p>
+          <a:p>
+            <a:pPr lvl="2"/>
+            <a:r>
+              <a:rPr lang="en-US" dirty="0" smtClean="0"/>
+              <a:t>Adds another layer in between Host OS and Guest OS (VMM)</a:t>
+            </a:r>
+          </a:p>
+          <a:p>
+            <a:pPr lvl="2"/>
+            <a:r>
+              <a:rPr lang="en-US" dirty="0" smtClean="0"/>
+              <a:t>Targets x86 systems</a:t>
+            </a:r>
+            <a:endParaRPr lang="en-US" dirty="0" smtClean="0"/>
+          </a:p>
+          <a:p>
+            <a:pPr lvl="1"/>
             <a:r>
               <a:rPr lang="en-US" dirty="0" err="1" smtClean="0"/>
               <a:t>BluePill</a:t>
             </a:r>
-            <a:endParaRPr lang="en-US" dirty="0"/>
+            <a:endParaRPr lang="en-US" dirty="0" smtClean="0"/>
+          </a:p>
+          <a:p>
+            <a:pPr lvl="2"/>
+            <a:r>
+              <a:rPr lang="en-US" dirty="0" smtClean="0"/>
+              <a:t>Created by a Polish security </a:t>
+            </a:r>
+            <a:r>
+              <a:rPr lang="en-US" dirty="0"/>
+              <a:t>r</a:t>
+            </a:r>
+            <a:r>
+              <a:rPr lang="en-US" dirty="0" smtClean="0"/>
+              <a:t>esearcher Joanna </a:t>
+            </a:r>
+            <a:r>
+              <a:rPr lang="en-US" dirty="0" err="1" smtClean="0"/>
+              <a:t>Rutkowska</a:t>
+            </a:r>
+            <a:endParaRPr lang="en-US" dirty="0" smtClean="0"/>
+          </a:p>
+          <a:p>
+            <a:pPr lvl="2"/>
+            <a:r>
+              <a:rPr lang="en-US" dirty="0" smtClean="0"/>
+              <a:t>Code publicly known</a:t>
+            </a:r>
+          </a:p>
+          <a:p>
+            <a:pPr lvl="2"/>
+            <a:r>
+              <a:rPr lang="en-US" dirty="0" smtClean="0"/>
+              <a:t>Exploits AMD64 SVM (Secure Virtual Machine) extensions</a:t>
+            </a:r>
+          </a:p>
+          <a:p>
+            <a:pPr lvl="2"/>
+            <a:r>
+              <a:rPr lang="en-US" dirty="0" smtClean="0"/>
+              <a:t>Installs itself on the fly</a:t>
+            </a:r>
+          </a:p>
+          <a:p>
+            <a:pPr lvl="2"/>
+            <a:r>
+              <a:rPr lang="en-US" dirty="0" smtClean="0"/>
+              <a:t>Does not survive system reboot</a:t>
+            </a:r>
+          </a:p>
+          <a:p>
+            <a:pPr lvl="3"/>
+            <a:r>
+              <a:rPr lang="en-US" dirty="0" smtClean="0"/>
+              <a:t>Still effective because servers are rarely restarted anyways</a:t>
+            </a:r>
           </a:p>
         </p:txBody>
       </p:sp>

</xml_diff>

<commit_message>
added notes to my slides and a picture slide for installation
</commit_message>
<xml_diff>
--- a/VMBR_Presentation.pptx
+++ b/VMBR_Presentation.pptx
@@ -5,7 +5,7 @@
     <p:sldMasterId id="2147483660" r:id="rId1"/>
   </p:sldMasterIdLst>
   <p:notesMasterIdLst>
-    <p:notesMasterId r:id="rId20"/>
+    <p:notesMasterId r:id="rId21"/>
   </p:notesMasterIdLst>
   <p:sldIdLst>
     <p:sldId id="256" r:id="rId2"/>
@@ -13,19 +13,20 @@
     <p:sldId id="273" r:id="rId4"/>
     <p:sldId id="274" r:id="rId5"/>
     <p:sldId id="259" r:id="rId6"/>
-    <p:sldId id="262" r:id="rId7"/>
-    <p:sldId id="275" r:id="rId8"/>
-    <p:sldId id="264" r:id="rId9"/>
-    <p:sldId id="261" r:id="rId10"/>
-    <p:sldId id="267" r:id="rId11"/>
-    <p:sldId id="268" r:id="rId12"/>
-    <p:sldId id="263" r:id="rId13"/>
-    <p:sldId id="265" r:id="rId14"/>
-    <p:sldId id="270" r:id="rId15"/>
-    <p:sldId id="269" r:id="rId16"/>
-    <p:sldId id="271" r:id="rId17"/>
-    <p:sldId id="272" r:id="rId18"/>
-    <p:sldId id="266" r:id="rId19"/>
+    <p:sldId id="276" r:id="rId7"/>
+    <p:sldId id="262" r:id="rId8"/>
+    <p:sldId id="275" r:id="rId9"/>
+    <p:sldId id="264" r:id="rId10"/>
+    <p:sldId id="261" r:id="rId11"/>
+    <p:sldId id="267" r:id="rId12"/>
+    <p:sldId id="268" r:id="rId13"/>
+    <p:sldId id="263" r:id="rId14"/>
+    <p:sldId id="265" r:id="rId15"/>
+    <p:sldId id="270" r:id="rId16"/>
+    <p:sldId id="269" r:id="rId17"/>
+    <p:sldId id="271" r:id="rId18"/>
+    <p:sldId id="272" r:id="rId19"/>
+    <p:sldId id="266" r:id="rId20"/>
   </p:sldIdLst>
   <p:sldSz cx="9144000" cy="6858000" type="screen4x3"/>
   <p:notesSz cx="6858000" cy="9144000"/>
@@ -210,7 +211,7 @@
             <a:fld id="{433E2ACD-1F68-4C8F-9506-7149504EC2F1}" type="datetimeFigureOut">
               <a:rPr lang="en-US" smtClean="0"/>
               <a:pPr/>
-              <a:t>4/21/2013</a:t>
+              <a:t>4/22/2013</a:t>
             </a:fld>
             <a:endParaRPr lang="en-US"/>
           </a:p>
@@ -609,6 +610,581 @@
           </a:bodyPr>
           <a:lstStyle/>
           <a:p>
+            <a:pPr marL="228600" indent="-228600">
+              <a:buAutoNum type="arabicPeriod"/>
+            </a:pPr>
+            <a:r>
+              <a:rPr lang="en-US" dirty="0" smtClean="0"/>
+              <a:t>Detectors that run below the VMBR can see the state of the VMBR because their view of the system does not go through the VMBR’s virtualization layer. </a:t>
+            </a:r>
+          </a:p>
+          <a:p>
+            <a:pPr marL="228600" indent="-228600">
+              <a:buAutoNum type="arabicPeriod"/>
+            </a:pPr>
+            <a:r>
+              <a:rPr lang="en-US" dirty="0" smtClean="0"/>
+              <a:t>Such detection software can read physical memory or disk and look for signatures or anomalies that indicate the presence of a VMBR, such as a modified boot sequence. </a:t>
+            </a:r>
+          </a:p>
+          <a:p>
+            <a:pPr marL="228600" indent="-228600">
+              <a:buAutoNum type="arabicPeriod"/>
+            </a:pPr>
+            <a:r>
+              <a:rPr lang="en-US" dirty="0" smtClean="0"/>
+              <a:t>Researchers (Intel, AMD and Copilot all) propose hardware that can be used to develop and deploy low-layer security software that would run beneath a VMBR. </a:t>
+            </a:r>
+          </a:p>
+          <a:p>
+            <a:pPr marL="228600" indent="-228600">
+              <a:buAutoNum type="arabicPeriod"/>
+            </a:pPr>
+            <a:r>
+              <a:rPr lang="en-US" dirty="0" smtClean="0"/>
+              <a:t>A valid way to gain control below the VMBR is to boot from a safe medium such as CD-ROM, USB drive or network boot server. This boot code can run on the system before the VMBR loads and can view the VMBR’s quiescent disk state. </a:t>
+            </a:r>
+          </a:p>
+          <a:p>
+            <a:pPr marL="228600" indent="-228600">
+              <a:buAutoNum type="arabicPeriod"/>
+            </a:pPr>
+            <a:r>
+              <a:rPr lang="en-US" dirty="0" smtClean="0"/>
+              <a:t>VMBRs can avoid booting from safe medium by emulating system shutdowns and reboots, thus it’s a good practice to physically unplug the machine before attempting to boot from safe medium. </a:t>
+            </a:r>
+          </a:p>
+          <a:p>
+            <a:pPr marL="228600" indent="-228600">
+              <a:buAutoNum type="arabicPeriod"/>
+            </a:pPr>
+            <a:r>
+              <a:rPr lang="en-US" dirty="0" smtClean="0"/>
+              <a:t>Using a secure VMM, king et al. implemented an enhanced version of secure boot which can prevent VMBR installations. The goal of the secure boot system is to provide attestation for existing boot components, such as dist master boot record, the file </a:t>
+            </a:r>
+            <a:r>
+              <a:rPr lang="en-US" dirty="0" err="1" smtClean="0"/>
+              <a:t>systems’s</a:t>
+            </a:r>
+            <a:r>
+              <a:rPr lang="en-US" dirty="0" smtClean="0"/>
+              <a:t> boot </a:t>
+            </a:r>
+            <a:r>
+              <a:rPr lang="en-US" dirty="0" err="1" smtClean="0"/>
+              <a:t>sectorand</a:t>
+            </a:r>
+            <a:r>
+              <a:rPr lang="en-US" dirty="0" smtClean="0"/>
+              <a:t> the OS’s boot loader and also to allow the legitimate updates of these components. </a:t>
+            </a:r>
+            <a:endParaRPr lang="en-US" dirty="0"/>
+          </a:p>
+        </p:txBody>
+      </p:sp>
+      <p:sp>
+        <p:nvSpPr>
+          <p:cNvPr id="4" name="Slide Number Placeholder 3"/>
+          <p:cNvSpPr>
+            <a:spLocks noGrp="1"/>
+          </p:cNvSpPr>
+          <p:nvPr>
+            <p:ph type="sldNum" sz="quarter" idx="10"/>
+          </p:nvPr>
+        </p:nvSpPr>
+        <p:spPr/>
+        <p:txBody>
+          <a:bodyPr/>
+          <a:lstStyle/>
+          <a:p>
+            <a:fld id="{72141A60-0A97-4B4C-A98B-2EDC5A7E8FE4}" type="slidenum">
+              <a:rPr lang="en-US" smtClean="0"/>
+              <a:pPr/>
+              <a:t>11</a:t>
+            </a:fld>
+            <a:endParaRPr lang="en-US"/>
+          </a:p>
+        </p:txBody>
+      </p:sp>
+    </p:spTree>
+  </p:cSld>
+  <p:clrMapOvr>
+    <a:masterClrMapping/>
+  </p:clrMapOvr>
+</p:notes>
+</file>
+
+<file path=ppt/notesSlides/notesSlide11.xml><?xml version="1.0" encoding="utf-8"?>
+<p:notes xmlns:a="http://schemas.openxmlformats.org/drawingml/2006/main" xmlns:r="http://schemas.openxmlformats.org/officeDocument/2006/relationships" xmlns:p="http://schemas.openxmlformats.org/presentationml/2006/main">
+  <p:cSld>
+    <p:spTree>
+      <p:nvGrpSpPr>
+        <p:cNvPr id="1" name=""/>
+        <p:cNvGrpSpPr/>
+        <p:nvPr/>
+      </p:nvGrpSpPr>
+      <p:grpSpPr>
+        <a:xfrm>
+          <a:off x="0" y="0"/>
+          <a:ext cx="0" cy="0"/>
+          <a:chOff x="0" y="0"/>
+          <a:chExt cx="0" cy="0"/>
+        </a:xfrm>
+      </p:grpSpPr>
+      <p:sp>
+        <p:nvSpPr>
+          <p:cNvPr id="2" name="Slide Image Placeholder 1"/>
+          <p:cNvSpPr>
+            <a:spLocks noGrp="1" noRot="1" noChangeAspect="1"/>
+          </p:cNvSpPr>
+          <p:nvPr>
+            <p:ph type="sldImg"/>
+          </p:nvPr>
+        </p:nvSpPr>
+        <p:spPr/>
+      </p:sp>
+      <p:sp>
+        <p:nvSpPr>
+          <p:cNvPr id="3" name="Notes Placeholder 2"/>
+          <p:cNvSpPr>
+            <a:spLocks noGrp="1"/>
+          </p:cNvSpPr>
+          <p:nvPr>
+            <p:ph type="body" idx="1"/>
+          </p:nvPr>
+        </p:nvSpPr>
+        <p:spPr/>
+        <p:txBody>
+          <a:bodyPr>
+            <a:normAutofit/>
+          </a:bodyPr>
+          <a:lstStyle/>
+          <a:p>
+            <a:r>
+              <a:rPr lang="en-US" dirty="0" smtClean="0"/>
+              <a:t>1. A VMBR adds CPU overhead to trap and emulate privileged instructions, as well as to run any malicious services. These timing differences can be noticed by software running in the virtual machine by comparing the running time of benchmarks against wall-clock time. </a:t>
+            </a:r>
+          </a:p>
+          <a:p>
+            <a:endParaRPr lang="en-US" dirty="0"/>
+          </a:p>
+          <a:p>
+            <a:r>
+              <a:rPr lang="en-US" dirty="0" smtClean="0"/>
+              <a:t>2. An approach used was a program that required the entire machines memory of disk space. VMBR was able to hide its space overhead in several ways and this method didn’t prove to be that good (paging some data to disk for memory and bad sector trick for disk). </a:t>
+            </a:r>
+          </a:p>
+          <a:p>
+            <a:endParaRPr lang="en-US" dirty="0"/>
+          </a:p>
+          <a:p>
+            <a:r>
+              <a:rPr lang="en-US" dirty="0" smtClean="0"/>
+              <a:t>3. </a:t>
+            </a:r>
+            <a:endParaRPr lang="en-US" dirty="0"/>
+          </a:p>
+        </p:txBody>
+      </p:sp>
+      <p:sp>
+        <p:nvSpPr>
+          <p:cNvPr id="4" name="Slide Number Placeholder 3"/>
+          <p:cNvSpPr>
+            <a:spLocks noGrp="1"/>
+          </p:cNvSpPr>
+          <p:nvPr>
+            <p:ph type="sldNum" sz="quarter" idx="10"/>
+          </p:nvPr>
+        </p:nvSpPr>
+        <p:spPr/>
+        <p:txBody>
+          <a:bodyPr/>
+          <a:lstStyle/>
+          <a:p>
+            <a:fld id="{72141A60-0A97-4B4C-A98B-2EDC5A7E8FE4}" type="slidenum">
+              <a:rPr lang="en-US" smtClean="0"/>
+              <a:pPr/>
+              <a:t>12</a:t>
+            </a:fld>
+            <a:endParaRPr lang="en-US"/>
+          </a:p>
+        </p:txBody>
+      </p:sp>
+    </p:spTree>
+  </p:cSld>
+  <p:clrMapOvr>
+    <a:masterClrMapping/>
+  </p:clrMapOvr>
+</p:notes>
+</file>
+
+<file path=ppt/notesSlides/notesSlide12.xml><?xml version="1.0" encoding="utf-8"?>
+<p:notes xmlns:a="http://schemas.openxmlformats.org/drawingml/2006/main" xmlns:r="http://schemas.openxmlformats.org/officeDocument/2006/relationships" xmlns:p="http://schemas.openxmlformats.org/presentationml/2006/main">
+  <p:cSld>
+    <p:spTree>
+      <p:nvGrpSpPr>
+        <p:cNvPr id="1" name=""/>
+        <p:cNvGrpSpPr/>
+        <p:nvPr/>
+      </p:nvGrpSpPr>
+      <p:grpSpPr>
+        <a:xfrm>
+          <a:off x="0" y="0"/>
+          <a:ext cx="0" cy="0"/>
+          <a:chOff x="0" y="0"/>
+          <a:chExt cx="0" cy="0"/>
+        </a:xfrm>
+      </p:grpSpPr>
+      <p:sp>
+        <p:nvSpPr>
+          <p:cNvPr id="2" name="Slide Image Placeholder 1"/>
+          <p:cNvSpPr>
+            <a:spLocks noGrp="1" noRot="1" noChangeAspect="1"/>
+          </p:cNvSpPr>
+          <p:nvPr>
+            <p:ph type="sldImg"/>
+          </p:nvPr>
+        </p:nvSpPr>
+        <p:spPr/>
+      </p:sp>
+      <p:sp>
+        <p:nvSpPr>
+          <p:cNvPr id="3" name="Notes Placeholder 2"/>
+          <p:cNvSpPr>
+            <a:spLocks noGrp="1"/>
+          </p:cNvSpPr>
+          <p:nvPr>
+            <p:ph type="body" idx="1"/>
+          </p:nvPr>
+        </p:nvSpPr>
+        <p:spPr/>
+        <p:txBody>
+          <a:bodyPr>
+            <a:normAutofit/>
+          </a:bodyPr>
+          <a:lstStyle/>
+          <a:p>
+            <a:pPr marL="228600" indent="-228600">
+              <a:buAutoNum type="arabicPeriod"/>
+            </a:pPr>
+            <a:r>
+              <a:rPr lang="en-US" dirty="0" smtClean="0"/>
+              <a:t>Hooks </a:t>
+            </a:r>
+            <a:r>
+              <a:rPr lang="en-US" dirty="0"/>
+              <a:t>are blocks of code that intercept events, function calls, or </a:t>
+            </a:r>
+            <a:r>
+              <a:rPr lang="en-US" dirty="0" smtClean="0"/>
+              <a:t>messages. Hooking is employed by </a:t>
+            </a:r>
+            <a:r>
+              <a:rPr lang="en-US" dirty="0" err="1" smtClean="0"/>
+              <a:t>rootkits</a:t>
+            </a:r>
+            <a:r>
+              <a:rPr lang="en-US" dirty="0" smtClean="0"/>
+              <a:t> to evade detection. Hooking modifies the flow of control and hides the presence of modification. </a:t>
+            </a:r>
+          </a:p>
+          <a:p>
+            <a:pPr marL="228600" indent="-228600"/>
+            <a:r>
+              <a:rPr lang="en-US" dirty="0"/>
+              <a:t>	</a:t>
+            </a:r>
+            <a:r>
+              <a:rPr lang="en-US" dirty="0" err="1" smtClean="0"/>
+              <a:t>Hooksafe</a:t>
+            </a:r>
+            <a:r>
+              <a:rPr lang="en-US" dirty="0" smtClean="0"/>
+              <a:t> provides a hypervisor based system to protect kernel hooks from being attacked by </a:t>
+            </a:r>
+            <a:r>
+              <a:rPr lang="en-US" dirty="0" err="1" smtClean="0"/>
+              <a:t>rootkits</a:t>
+            </a:r>
+            <a:r>
+              <a:rPr lang="en-US" dirty="0" smtClean="0"/>
+              <a:t>. </a:t>
+            </a:r>
+            <a:r>
+              <a:rPr lang="en-US" dirty="0" err="1" smtClean="0"/>
+              <a:t>Hooksafe</a:t>
+            </a:r>
+            <a:r>
+              <a:rPr lang="en-US" dirty="0" smtClean="0"/>
+              <a:t> monitors the possible hooks(write access) for modifications. It provides a hook indirection layer to regulate access to hooks in kernel. </a:t>
+            </a:r>
+          </a:p>
+          <a:p>
+            <a:pPr marL="228600" indent="-228600"/>
+            <a:r>
+              <a:rPr lang="en-US" dirty="0" smtClean="0"/>
+              <a:t>2. </a:t>
+            </a:r>
+            <a:r>
+              <a:rPr lang="en-US" dirty="0" err="1" smtClean="0"/>
+              <a:t>SecVisor</a:t>
+            </a:r>
+            <a:r>
+              <a:rPr lang="en-US" dirty="0" smtClean="0"/>
+              <a:t> </a:t>
+            </a:r>
+            <a:r>
+              <a:rPr lang="en-US" dirty="0"/>
+              <a:t>protects the integrity of code in OS kernels by preventing </a:t>
+            </a:r>
+            <a:r>
+              <a:rPr lang="en-US" dirty="0" smtClean="0"/>
+              <a:t>unauthorized </a:t>
+            </a:r>
+          </a:p>
+          <a:p>
+            <a:pPr marL="228600" indent="-228600"/>
+            <a:r>
+              <a:rPr lang="en-US" dirty="0"/>
+              <a:t> </a:t>
+            </a:r>
+            <a:r>
+              <a:rPr lang="en-US" dirty="0" smtClean="0"/>
+              <a:t>    modifications </a:t>
+            </a:r>
+            <a:r>
+              <a:rPr lang="en-US" dirty="0"/>
+              <a:t>to the code via a user specified approval </a:t>
+            </a:r>
+            <a:r>
+              <a:rPr lang="en-US" dirty="0" smtClean="0"/>
+              <a:t>policy.</a:t>
+            </a:r>
+          </a:p>
+          <a:p>
+            <a:pPr marL="228600" indent="-228600">
+              <a:buAutoNum type="arabicPeriod" startAt="3"/>
+            </a:pPr>
+            <a:r>
+              <a:rPr lang="en-US" dirty="0" smtClean="0"/>
+              <a:t>NICKLE uses VMM for restricting access to the Kernel space. NICKLE module lies in the VMM layer and enforces that the guest OS kernel cannot access the shadow memory. At runtime, any instruction executed in the shadow space must be fetched from the shadow memory, which contains authenticated instructions. </a:t>
+            </a:r>
+            <a:endParaRPr lang="en-US" smtClean="0"/>
+          </a:p>
+          <a:p>
+            <a:pPr marL="228600" indent="-228600">
+              <a:buAutoNum type="arabicPeriod" startAt="3"/>
+            </a:pPr>
+            <a:endParaRPr lang="en-US" dirty="0"/>
+          </a:p>
+        </p:txBody>
+      </p:sp>
+      <p:sp>
+        <p:nvSpPr>
+          <p:cNvPr id="4" name="Slide Number Placeholder 3"/>
+          <p:cNvSpPr>
+            <a:spLocks noGrp="1"/>
+          </p:cNvSpPr>
+          <p:nvPr>
+            <p:ph type="sldNum" sz="quarter" idx="10"/>
+          </p:nvPr>
+        </p:nvSpPr>
+        <p:spPr/>
+        <p:txBody>
+          <a:bodyPr/>
+          <a:lstStyle/>
+          <a:p>
+            <a:fld id="{72141A60-0A97-4B4C-A98B-2EDC5A7E8FE4}" type="slidenum">
+              <a:rPr lang="en-US" smtClean="0"/>
+              <a:pPr/>
+              <a:t>13</a:t>
+            </a:fld>
+            <a:endParaRPr lang="en-US"/>
+          </a:p>
+        </p:txBody>
+      </p:sp>
+    </p:spTree>
+  </p:cSld>
+  <p:clrMapOvr>
+    <a:masterClrMapping/>
+  </p:clrMapOvr>
+</p:notes>
+</file>
+
+<file path=ppt/notesSlides/notesSlide13.xml><?xml version="1.0" encoding="utf-8"?>
+<p:notes xmlns:a="http://schemas.openxmlformats.org/drawingml/2006/main" xmlns:r="http://schemas.openxmlformats.org/officeDocument/2006/relationships" xmlns:p="http://schemas.openxmlformats.org/presentationml/2006/main">
+  <p:cSld>
+    <p:spTree>
+      <p:nvGrpSpPr>
+        <p:cNvPr id="1" name=""/>
+        <p:cNvGrpSpPr/>
+        <p:nvPr/>
+      </p:nvGrpSpPr>
+      <p:grpSpPr>
+        <a:xfrm>
+          <a:off x="0" y="0"/>
+          <a:ext cx="0" cy="0"/>
+          <a:chOff x="0" y="0"/>
+          <a:chExt cx="0" cy="0"/>
+        </a:xfrm>
+      </p:grpSpPr>
+      <p:sp>
+        <p:nvSpPr>
+          <p:cNvPr id="2" name="Slide Image Placeholder 1"/>
+          <p:cNvSpPr>
+            <a:spLocks noGrp="1" noRot="1" noChangeAspect="1"/>
+          </p:cNvSpPr>
+          <p:nvPr>
+            <p:ph type="sldImg"/>
+          </p:nvPr>
+        </p:nvSpPr>
+        <p:spPr/>
+      </p:sp>
+      <p:sp>
+        <p:nvSpPr>
+          <p:cNvPr id="3" name="Notes Placeholder 2"/>
+          <p:cNvSpPr>
+            <a:spLocks noGrp="1"/>
+          </p:cNvSpPr>
+          <p:nvPr>
+            <p:ph type="body" idx="1"/>
+          </p:nvPr>
+        </p:nvSpPr>
+        <p:spPr/>
+        <p:txBody>
+          <a:bodyPr>
+            <a:normAutofit/>
+          </a:bodyPr>
+          <a:lstStyle/>
+          <a:p>
+            <a:r>
+              <a:rPr lang="en-US" sz="1200" kern="1200" dirty="0" smtClean="0">
+                <a:solidFill>
+                  <a:schemeClr val="tx1"/>
+                </a:solidFill>
+                <a:latin typeface="+mn-lt"/>
+                <a:ea typeface="+mn-ea"/>
+                <a:cs typeface="+mn-cs"/>
+              </a:rPr>
+              <a:t>File access control policies protect the system utilities from being replaced by their </a:t>
+            </a:r>
+            <a:r>
+              <a:rPr lang="en-US" sz="1200" kern="1200" dirty="0" err="1" smtClean="0">
+                <a:solidFill>
+                  <a:schemeClr val="tx1"/>
+                </a:solidFill>
+                <a:latin typeface="+mn-lt"/>
+                <a:ea typeface="+mn-ea"/>
+                <a:cs typeface="+mn-cs"/>
+              </a:rPr>
+              <a:t>trojaned</a:t>
+            </a:r>
+            <a:r>
+              <a:rPr lang="en-US" sz="1200" kern="1200" dirty="0" smtClean="0">
+                <a:solidFill>
+                  <a:schemeClr val="tx1"/>
+                </a:solidFill>
+                <a:latin typeface="+mn-lt"/>
+                <a:ea typeface="+mn-ea"/>
+                <a:cs typeface="+mn-cs"/>
+              </a:rPr>
+              <a:t> counterparts. </a:t>
+            </a:r>
+          </a:p>
+          <a:p>
+            <a:r>
+              <a:rPr lang="en-US" sz="1200" kern="1200" smtClean="0">
+                <a:solidFill>
+                  <a:schemeClr val="tx1"/>
+                </a:solidFill>
+                <a:latin typeface="+mn-lt"/>
+                <a:ea typeface="+mn-ea"/>
+                <a:cs typeface="+mn-cs"/>
+              </a:rPr>
+              <a:t>Memory access control policies protect the kernel code and data structures from being overwritten in memory.</a:t>
+            </a:r>
+            <a:endParaRPr lang="en-US" dirty="0"/>
+          </a:p>
+        </p:txBody>
+      </p:sp>
+      <p:sp>
+        <p:nvSpPr>
+          <p:cNvPr id="4" name="Slide Number Placeholder 3"/>
+          <p:cNvSpPr>
+            <a:spLocks noGrp="1"/>
+          </p:cNvSpPr>
+          <p:nvPr>
+            <p:ph type="sldNum" sz="quarter" idx="10"/>
+          </p:nvPr>
+        </p:nvSpPr>
+        <p:spPr/>
+        <p:txBody>
+          <a:bodyPr/>
+          <a:lstStyle/>
+          <a:p>
+            <a:fld id="{72141A60-0A97-4B4C-A98B-2EDC5A7E8FE4}" type="slidenum">
+              <a:rPr lang="en-US" smtClean="0"/>
+              <a:pPr/>
+              <a:t>15</a:t>
+            </a:fld>
+            <a:endParaRPr lang="en-US"/>
+          </a:p>
+        </p:txBody>
+      </p:sp>
+    </p:spTree>
+  </p:cSld>
+  <p:clrMapOvr>
+    <a:masterClrMapping/>
+  </p:clrMapOvr>
+</p:notes>
+</file>
+
+<file path=ppt/notesSlides/notesSlide14.xml><?xml version="1.0" encoding="utf-8"?>
+<p:notes xmlns:a="http://schemas.openxmlformats.org/drawingml/2006/main" xmlns:r="http://schemas.openxmlformats.org/officeDocument/2006/relationships" xmlns:p="http://schemas.openxmlformats.org/presentationml/2006/main">
+  <p:cSld>
+    <p:spTree>
+      <p:nvGrpSpPr>
+        <p:cNvPr id="1" name=""/>
+        <p:cNvGrpSpPr/>
+        <p:nvPr/>
+      </p:nvGrpSpPr>
+      <p:grpSpPr>
+        <a:xfrm>
+          <a:off x="0" y="0"/>
+          <a:ext cx="0" cy="0"/>
+          <a:chOff x="0" y="0"/>
+          <a:chExt cx="0" cy="0"/>
+        </a:xfrm>
+      </p:grpSpPr>
+      <p:sp>
+        <p:nvSpPr>
+          <p:cNvPr id="2" name="Slide Image Placeholder 1"/>
+          <p:cNvSpPr>
+            <a:spLocks noGrp="1" noRot="1" noChangeAspect="1"/>
+          </p:cNvSpPr>
+          <p:nvPr>
+            <p:ph type="sldImg"/>
+          </p:nvPr>
+        </p:nvSpPr>
+        <p:spPr/>
+      </p:sp>
+      <p:sp>
+        <p:nvSpPr>
+          <p:cNvPr id="3" name="Notes Placeholder 2"/>
+          <p:cNvSpPr>
+            <a:spLocks noGrp="1"/>
+          </p:cNvSpPr>
+          <p:nvPr>
+            <p:ph type="body" idx="1"/>
+          </p:nvPr>
+        </p:nvSpPr>
+        <p:spPr/>
+        <p:txBody>
+          <a:bodyPr>
+            <a:normAutofit/>
+          </a:bodyPr>
+          <a:lstStyle/>
+          <a:p>
             <a:r>
               <a:rPr lang="en-US" dirty="0" smtClean="0"/>
               <a:t>Paladin comprises of several components like the modified form of </a:t>
@@ -676,7 +1252,7 @@
             <a:fld id="{72141A60-0A97-4B4C-A98B-2EDC5A7E8FE4}" type="slidenum">
               <a:rPr lang="en-US" smtClean="0"/>
               <a:pPr/>
-              <a:t>17</a:t>
+              <a:t>18</a:t>
             </a:fld>
             <a:endParaRPr lang="en-US"/>
           </a:p>
@@ -735,8 +1311,88 @@
           <a:lstStyle/>
           <a:p>
             <a:r>
-              <a:rPr lang="en-US" dirty="0" smtClean="0"/>
-              <a:t>Mike</a:t>
+              <a:rPr lang="en-US" b="1" dirty="0" smtClean="0"/>
+              <a:t>Rootkits</a:t>
+            </a:r>
+            <a:r>
+              <a:rPr lang="en-US" dirty="0" smtClean="0"/>
+              <a:t> </a:t>
+            </a:r>
+          </a:p>
+          <a:p>
+            <a:pPr lvl="1"/>
+            <a:r>
+              <a:rPr lang="en-US" dirty="0" smtClean="0"/>
+              <a:t>Enable continued privileged access to a computer, while actively hiding its presence from administrators</a:t>
+            </a:r>
+          </a:p>
+          <a:p>
+            <a:pPr lvl="1"/>
+            <a:r>
+              <a:rPr lang="en-US" dirty="0" smtClean="0"/>
+              <a:t>Have been around for over 20 years</a:t>
+            </a:r>
+          </a:p>
+          <a:p>
+            <a:pPr lvl="1"/>
+            <a:r>
+              <a:rPr lang="en-US" dirty="0" smtClean="0"/>
+              <a:t>Many rootkits and detectors/methods of prevention </a:t>
+            </a:r>
+          </a:p>
+          <a:p>
+            <a:r>
+              <a:rPr lang="en-US" b="1" dirty="0" smtClean="0"/>
+              <a:t>Virtual Machine Based Rootkits (VMBRs)</a:t>
+            </a:r>
+          </a:p>
+          <a:p>
+            <a:pPr lvl="1"/>
+            <a:r>
+              <a:rPr lang="en-US" dirty="0" smtClean="0"/>
+              <a:t>Virtual Machine Monitor (VMM) used to control target OS</a:t>
+            </a:r>
+          </a:p>
+          <a:p>
+            <a:pPr lvl="1"/>
+            <a:r>
+              <a:rPr lang="en-US" dirty="0" smtClean="0"/>
+              <a:t>Difficult to detect from inside the target OS because</a:t>
+            </a:r>
+            <a:r>
+              <a:rPr lang="en-US" baseline="0" dirty="0" smtClean="0"/>
+              <a:t> the target OS can’t see outside of the VMM</a:t>
+            </a:r>
+            <a:endParaRPr lang="en-US" dirty="0" smtClean="0"/>
+          </a:p>
+          <a:p>
+            <a:pPr lvl="1"/>
+            <a:r>
+              <a:rPr lang="en-US" dirty="0" smtClean="0"/>
+              <a:t>First proof-of-concept VMBR was introduced in 2006</a:t>
+            </a:r>
+            <a:r>
+              <a:rPr lang="en-US" baseline="0" dirty="0" smtClean="0"/>
+              <a:t> by Microsoft and the University of Michigan</a:t>
+            </a:r>
+            <a:endParaRPr lang="en-US" dirty="0" smtClean="0"/>
+          </a:p>
+          <a:p>
+            <a:pPr lvl="1"/>
+            <a:r>
+              <a:rPr lang="en-US" dirty="0" smtClean="0"/>
+              <a:t>There aren’t very many known VMBRs and only a</a:t>
+            </a:r>
+            <a:r>
+              <a:rPr lang="en-US" baseline="0" dirty="0" smtClean="0"/>
+              <a:t> few more detectors that can provide defense against them</a:t>
+            </a:r>
+          </a:p>
+          <a:p>
+            <a:pPr lvl="1"/>
+            <a:r>
+              <a:rPr lang="en-US" baseline="0" dirty="0" smtClean="0"/>
+              <a:t>	- We are going to talk about a few of these in this presentation, but first Mike will go over a little about Virtual Machines</a:t>
             </a:r>
             <a:endParaRPr lang="en-US" dirty="0"/>
           </a:p>
@@ -757,9 +1413,10 @@
           <a:bodyPr/>
           <a:lstStyle/>
           <a:p>
-            <a:fld id="{FC4DA58B-212D-4CB1-A82C-2E2734039AFF}" type="slidenum">
-              <a:rPr lang="en-US" smtClean="0"/>
-              <a:t>3</a:t>
+            <a:fld id="{72141A60-0A97-4B4C-A98B-2EDC5A7E8FE4}" type="slidenum">
+              <a:rPr lang="en-US" smtClean="0"/>
+              <a:pPr/>
+              <a:t>2</a:t>
             </a:fld>
             <a:endParaRPr lang="en-US"/>
           </a:p>
@@ -768,7 +1425,7 @@
     </p:spTree>
     <p:extLst>
       <p:ext uri="{BB962C8B-B14F-4D97-AF65-F5344CB8AC3E}">
-        <p14:creationId xmlns:p14="http://schemas.microsoft.com/office/powerpoint/2010/main" val="875293555"/>
+        <p14:creationId xmlns:p14="http://schemas.microsoft.com/office/powerpoint/2010/main" val="3098580096"/>
       </p:ext>
     </p:extLst>
   </p:cSld>
@@ -826,6 +1483,7 @@
               <a:rPr lang="en-US" dirty="0" smtClean="0"/>
               <a:t>Mike</a:t>
             </a:r>
+            <a:endParaRPr lang="en-US" dirty="0"/>
           </a:p>
         </p:txBody>
       </p:sp>
@@ -846,7 +1504,7 @@
           <a:p>
             <a:fld id="{FC4DA58B-212D-4CB1-A82C-2E2734039AFF}" type="slidenum">
               <a:rPr lang="en-US" smtClean="0"/>
-              <a:t>4</a:t>
+              <a:t>3</a:t>
             </a:fld>
             <a:endParaRPr lang="en-US"/>
           </a:p>
@@ -855,7 +1513,7 @@
     </p:spTree>
     <p:extLst>
       <p:ext uri="{BB962C8B-B14F-4D97-AF65-F5344CB8AC3E}">
-        <p14:creationId xmlns:p14="http://schemas.microsoft.com/office/powerpoint/2010/main" val="3004174998"/>
+        <p14:creationId xmlns:p14="http://schemas.microsoft.com/office/powerpoint/2010/main" val="875293555"/>
       </p:ext>
     </p:extLst>
   </p:cSld>
@@ -913,7 +1571,6 @@
               <a:rPr lang="en-US" dirty="0" smtClean="0"/>
               <a:t>Mike</a:t>
             </a:r>
-            <a:endParaRPr lang="en-US" dirty="0"/>
           </a:p>
         </p:txBody>
       </p:sp>
@@ -934,7 +1591,7 @@
           <a:p>
             <a:fld id="{FC4DA58B-212D-4CB1-A82C-2E2734039AFF}" type="slidenum">
               <a:rPr lang="en-US" smtClean="0"/>
-              <a:t>7</a:t>
+              <a:t>4</a:t>
             </a:fld>
             <a:endParaRPr lang="en-US"/>
           </a:p>
@@ -943,7 +1600,7 @@
     </p:spTree>
     <p:extLst>
       <p:ext uri="{BB962C8B-B14F-4D97-AF65-F5344CB8AC3E}">
-        <p14:creationId xmlns:p14="http://schemas.microsoft.com/office/powerpoint/2010/main" val="2266588369"/>
+        <p14:creationId xmlns:p14="http://schemas.microsoft.com/office/powerpoint/2010/main" val="3004174998"/>
       </p:ext>
     </p:extLst>
   </p:cSld>
@@ -999,7 +1656,142 @@
           <a:p>
             <a:r>
               <a:rPr lang="en-US" dirty="0" smtClean="0"/>
-              <a:t>Mike</a:t>
+              <a:t>1. Obtain root privileges: via </a:t>
+            </a:r>
+            <a:r>
+              <a:rPr lang="en-US" sz="1200" kern="1200" dirty="0" smtClean="0">
+                <a:solidFill>
+                  <a:schemeClr val="tx1"/>
+                </a:solidFill>
+                <a:effectLst/>
+                <a:latin typeface="+mn-lt"/>
+                <a:ea typeface="+mn-ea"/>
+                <a:cs typeface="+mn-cs"/>
+              </a:rPr>
+              <a:t>exploit a remote vulnerability, boot from a bad CD-ROM/DVD, malicious software installed with root privileges. </a:t>
+            </a:r>
+          </a:p>
+          <a:p>
+            <a:r>
+              <a:rPr lang="en-US" sz="1200" kern="1200" dirty="0" smtClean="0">
+                <a:solidFill>
+                  <a:schemeClr val="tx1"/>
+                </a:solidFill>
+                <a:effectLst/>
+                <a:latin typeface="+mn-lt"/>
+                <a:ea typeface="+mn-ea"/>
+                <a:cs typeface="+mn-cs"/>
+              </a:rPr>
+              <a:t>	Corrupt vendors could also sell this kind of information or exploit it themselves after selling the hardware to customers. </a:t>
+            </a:r>
+          </a:p>
+          <a:p>
+            <a:r>
+              <a:rPr lang="en-US" sz="1200" kern="1200" dirty="0" smtClean="0">
+                <a:solidFill>
+                  <a:schemeClr val="tx1"/>
+                </a:solidFill>
+                <a:effectLst/>
+                <a:latin typeface="+mn-lt"/>
+                <a:ea typeface="+mn-ea"/>
+                <a:cs typeface="+mn-cs"/>
+              </a:rPr>
+              <a:t>2.</a:t>
+            </a:r>
+            <a:r>
+              <a:rPr lang="en-US" sz="1200" kern="1200" baseline="0" dirty="0" smtClean="0">
+                <a:solidFill>
+                  <a:schemeClr val="tx1"/>
+                </a:solidFill>
+                <a:effectLst/>
+                <a:latin typeface="+mn-lt"/>
+                <a:ea typeface="+mn-ea"/>
+                <a:cs typeface="+mn-cs"/>
+              </a:rPr>
+              <a:t> Install via root privileges</a:t>
+            </a:r>
+          </a:p>
+          <a:p>
+            <a:r>
+              <a:rPr lang="en-US" sz="1200" kern="1200" baseline="0" dirty="0" smtClean="0">
+                <a:solidFill>
+                  <a:schemeClr val="tx1"/>
+                </a:solidFill>
+                <a:effectLst/>
+                <a:latin typeface="+mn-lt"/>
+                <a:ea typeface="+mn-ea"/>
+                <a:cs typeface="+mn-cs"/>
+              </a:rPr>
+              <a:t>3. Modify boot records in final stages of shutdown</a:t>
+            </a:r>
+          </a:p>
+          <a:p>
+            <a:r>
+              <a:rPr lang="en-US" sz="1200" kern="1200" baseline="0" dirty="0" smtClean="0">
+                <a:solidFill>
+                  <a:schemeClr val="tx1"/>
+                </a:solidFill>
+                <a:effectLst/>
+                <a:latin typeface="+mn-lt"/>
+                <a:ea typeface="+mn-ea"/>
+                <a:cs typeface="+mn-cs"/>
+              </a:rPr>
+              <a:t>	This is done here because anti-malware applications will have already been shut down and the VMBR can bypass those protections</a:t>
+            </a:r>
+          </a:p>
+          <a:p>
+            <a:r>
+              <a:rPr lang="en-US" sz="1200" kern="1200" baseline="0" dirty="0" smtClean="0">
+                <a:solidFill>
+                  <a:schemeClr val="tx1"/>
+                </a:solidFill>
+                <a:effectLst/>
+                <a:latin typeface="+mn-lt"/>
+                <a:ea typeface="+mn-ea"/>
+                <a:cs typeface="+mn-cs"/>
+              </a:rPr>
+              <a:t>4. Target System hoisted into VMM</a:t>
+            </a:r>
+          </a:p>
+          <a:p>
+            <a:r>
+              <a:rPr lang="en-US" sz="1200" kern="1200" baseline="0" dirty="0" smtClean="0">
+                <a:solidFill>
+                  <a:schemeClr val="tx1"/>
+                </a:solidFill>
+                <a:effectLst/>
+                <a:latin typeface="+mn-lt"/>
+                <a:ea typeface="+mn-ea"/>
+                <a:cs typeface="+mn-cs"/>
+              </a:rPr>
+              <a:t>	The VMBR puts the Target systems disk space in a virtual disk and translates the addresses to the actual physical disk at runtime</a:t>
+            </a:r>
+          </a:p>
+          <a:p>
+            <a:r>
+              <a:rPr lang="en-US" sz="1200" kern="1200" baseline="0" dirty="0" smtClean="0">
+                <a:solidFill>
+                  <a:schemeClr val="tx1"/>
+                </a:solidFill>
+                <a:effectLst/>
+                <a:latin typeface="+mn-lt"/>
+                <a:ea typeface="+mn-ea"/>
+                <a:cs typeface="+mn-cs"/>
+              </a:rPr>
+              <a:t>	</a:t>
+            </a:r>
+            <a:r>
+              <a:rPr lang="en-US" sz="1200" kern="1200" baseline="0" dirty="0" smtClean="0">
+                <a:solidFill>
+                  <a:schemeClr val="tx1"/>
+                </a:solidFill>
+                <a:effectLst/>
+                <a:latin typeface="+mn-lt"/>
+                <a:ea typeface="+mn-ea"/>
+                <a:cs typeface="+mn-cs"/>
+                <a:sym typeface="Wingdings" pitchFamily="2" charset="2"/>
+              </a:rPr>
+              <a:t>Rootkit has control of the system</a:t>
             </a:r>
             <a:endParaRPr lang="en-US" dirty="0"/>
           </a:p>
@@ -1023,7 +1815,7 @@
             <a:fld id="{72141A60-0A97-4B4C-A98B-2EDC5A7E8FE4}" type="slidenum">
               <a:rPr lang="en-US" smtClean="0"/>
               <a:pPr/>
-              <a:t>8</a:t>
+              <a:t>5</a:t>
             </a:fld>
             <a:endParaRPr lang="en-US"/>
           </a:p>
@@ -1032,7 +1824,7 @@
     </p:spTree>
     <p:extLst>
       <p:ext uri="{BB962C8B-B14F-4D97-AF65-F5344CB8AC3E}">
-        <p14:creationId xmlns:p14="http://schemas.microsoft.com/office/powerpoint/2010/main" val="2598429233"/>
+        <p14:creationId xmlns:p14="http://schemas.microsoft.com/office/powerpoint/2010/main" val="2757083414"/>
       </p:ext>
     </p:extLst>
   </p:cSld>
@@ -1083,78 +1875,16 @@
         </p:nvSpPr>
         <p:spPr/>
         <p:txBody>
-          <a:bodyPr>
-            <a:normAutofit/>
-          </a:bodyPr>
-          <a:lstStyle/>
-          <a:p>
-            <a:pPr marL="228600" indent="-228600">
-              <a:buAutoNum type="arabicPeriod"/>
-            </a:pPr>
-            <a:r>
-              <a:rPr lang="en-US" dirty="0" smtClean="0"/>
-              <a:t>Detectors that run below the VMBR can see the state of the VMBR because their view of the system does not go through the VMBR’s virtualization layer. </a:t>
-            </a:r>
-          </a:p>
-          <a:p>
-            <a:pPr marL="228600" indent="-228600">
-              <a:buAutoNum type="arabicPeriod"/>
-            </a:pPr>
-            <a:r>
-              <a:rPr lang="en-US" dirty="0" smtClean="0"/>
-              <a:t>Such detection software can read physical memory or disk and look for signatures or anomalies that indicate the presence of a VMBR, such as a modified boot sequence. </a:t>
-            </a:r>
-          </a:p>
-          <a:p>
-            <a:pPr marL="228600" indent="-228600">
-              <a:buAutoNum type="arabicPeriod"/>
-            </a:pPr>
-            <a:r>
-              <a:rPr lang="en-US" dirty="0" smtClean="0"/>
-              <a:t>Researchers (Intel, AMD and Copilot all) propose hardware that can be used to develop and deploy low-layer security software that would run beneath a VMBR. </a:t>
-            </a:r>
-          </a:p>
-          <a:p>
-            <a:pPr marL="228600" indent="-228600">
-              <a:buAutoNum type="arabicPeriod"/>
-            </a:pPr>
-            <a:r>
-              <a:rPr lang="en-US" dirty="0" smtClean="0"/>
-              <a:t>A valid way to gain control below the VMBR is to boot from a safe medium such as CD-ROM, USB drive or network boot server. This boot code can run on the system before the VMBR loads and can view the VMBR’s quiescent disk state. </a:t>
-            </a:r>
-          </a:p>
-          <a:p>
-            <a:pPr marL="228600" indent="-228600">
-              <a:buAutoNum type="arabicPeriod"/>
-            </a:pPr>
-            <a:r>
-              <a:rPr lang="en-US" dirty="0" smtClean="0"/>
-              <a:t>VMBRs can avoid booting from safe medium by emulating system shutdowns and reboots, thus it’s a good practice to physically unplug the machine before attempting to boot from safe medium. </a:t>
-            </a:r>
-          </a:p>
-          <a:p>
-            <a:pPr marL="228600" indent="-228600">
-              <a:buAutoNum type="arabicPeriod"/>
-            </a:pPr>
-            <a:r>
-              <a:rPr lang="en-US" dirty="0" smtClean="0"/>
-              <a:t>Using a secure VMM, king et al. implemented an enhanced version of secure boot which can prevent VMBR installations. The goal of the secure boot system is to provide attestation for existing boot components, such as dist master boot record, the file </a:t>
-            </a:r>
-            <a:r>
-              <a:rPr lang="en-US" dirty="0" err="1" smtClean="0"/>
-              <a:t>systems’s</a:t>
-            </a:r>
-            <a:r>
-              <a:rPr lang="en-US" dirty="0" smtClean="0"/>
-              <a:t> boot </a:t>
-            </a:r>
-            <a:r>
-              <a:rPr lang="en-US" dirty="0" err="1" smtClean="0"/>
-              <a:t>sectorand</a:t>
-            </a:r>
-            <a:r>
-              <a:rPr lang="en-US" dirty="0" smtClean="0"/>
-              <a:t> the OS’s boot loader and also to allow the legitimate updates of these components. </a:t>
+          <a:bodyPr/>
+          <a:lstStyle/>
+          <a:p>
+            <a:r>
+              <a:rPr lang="en-US" dirty="0" smtClean="0"/>
+              <a:t>Here there was no VM</a:t>
+            </a:r>
+            <a:r>
+              <a:rPr lang="en-US" baseline="0" dirty="0" smtClean="0"/>
+              <a:t> present before the installation. You can see how the VMM layer is installed directly on top of the hardware and the target OS is hoisted above it. This way the malicious services on the left are invisible to the target OS.</a:t>
             </a:r>
             <a:endParaRPr lang="en-US" dirty="0"/>
           </a:p>
@@ -1178,13 +1908,18 @@
             <a:fld id="{72141A60-0A97-4B4C-A98B-2EDC5A7E8FE4}" type="slidenum">
               <a:rPr lang="en-US" smtClean="0"/>
               <a:pPr/>
-              <a:t>10</a:t>
+              <a:t>6</a:t>
             </a:fld>
             <a:endParaRPr lang="en-US"/>
           </a:p>
         </p:txBody>
       </p:sp>
     </p:spTree>
+    <p:extLst>
+      <p:ext uri="{BB962C8B-B14F-4D97-AF65-F5344CB8AC3E}">
+        <p14:creationId xmlns:p14="http://schemas.microsoft.com/office/powerpoint/2010/main" val="3659421481"/>
+      </p:ext>
+    </p:extLst>
   </p:cSld>
   <p:clrMapOvr>
     <a:masterClrMapping/>
@@ -1233,34 +1968,171 @@
         </p:nvSpPr>
         <p:spPr/>
         <p:txBody>
-          <a:bodyPr>
-            <a:normAutofit/>
-          </a:bodyPr>
-          <a:lstStyle/>
-          <a:p>
-            <a:r>
-              <a:rPr lang="en-US" dirty="0" smtClean="0"/>
-              <a:t>1. A VMBR adds CPU overhead to trap and emulate privileged instructions, as well as to run any malicious services. These timing differences can be noticed by software running in the virtual machine by comparing the running time of benchmarks against wall-clock time. </a:t>
-            </a:r>
-          </a:p>
-          <a:p>
-            <a:endParaRPr lang="en-US" dirty="0"/>
-          </a:p>
-          <a:p>
-            <a:r>
-              <a:rPr lang="en-US" dirty="0" smtClean="0"/>
-              <a:t>2. An approach used was a program that required the entire machines memory of disk space. VMBR was able to hide its space overhead in several ways and this method didn’t prove to be that good (paging some data to disk for memory and bad sector trick for disk). </a:t>
-            </a:r>
-          </a:p>
-          <a:p>
-            <a:endParaRPr lang="en-US" dirty="0"/>
-          </a:p>
-          <a:p>
-            <a:r>
-              <a:rPr lang="en-US" dirty="0" smtClean="0"/>
-              <a:t>3. </a:t>
-            </a:r>
-            <a:endParaRPr lang="en-US" dirty="0"/>
+          <a:bodyPr/>
+          <a:lstStyle/>
+          <a:p>
+            <a:r>
+              <a:rPr lang="en-US" dirty="0" smtClean="0"/>
+              <a:t>A rootkit could technically be</a:t>
+            </a:r>
+            <a:r>
+              <a:rPr lang="en-US" baseline="0" dirty="0" smtClean="0"/>
+              <a:t> installed and do/cause no harm, but it is typically bundled with some sort of malware.</a:t>
+            </a:r>
+          </a:p>
+          <a:p>
+            <a:endParaRPr lang="en-US" baseline="0" dirty="0" smtClean="0"/>
+          </a:p>
+          <a:p>
+            <a:r>
+              <a:rPr lang="en-US" baseline="0" dirty="0" smtClean="0"/>
+              <a:t>There are three forms of attack:</a:t>
+            </a:r>
+          </a:p>
+          <a:p>
+            <a:pPr marL="228600" indent="-228600">
+              <a:buAutoNum type="arabicPeriod"/>
+            </a:pPr>
+            <a:r>
+              <a:rPr lang="en-US" baseline="0" dirty="0" smtClean="0"/>
+              <a:t>No interaction with the target system</a:t>
+            </a:r>
+          </a:p>
+          <a:p>
+            <a:pPr marL="628650" lvl="1" indent="-171450">
+              <a:buFontTx/>
+              <a:buChar char="-"/>
+            </a:pPr>
+            <a:r>
+              <a:rPr lang="en-US" baseline="0" dirty="0" smtClean="0"/>
+              <a:t>In this case the malicious services are carried out on a separate OS and ideally the target OS sees nothing</a:t>
+            </a:r>
+          </a:p>
+          <a:p>
+            <a:pPr marL="228600" lvl="0" indent="-228600">
+              <a:buFontTx/>
+              <a:buAutoNum type="arabicPeriod" startAt="2"/>
+            </a:pPr>
+            <a:r>
+              <a:rPr lang="en-US" baseline="0" dirty="0" smtClean="0"/>
+              <a:t>Target system observers </a:t>
+            </a:r>
+          </a:p>
+          <a:p>
+            <a:pPr marL="457200" lvl="1" indent="0">
+              <a:buFontTx/>
+              <a:buNone/>
+            </a:pPr>
+            <a:r>
+              <a:rPr lang="en-US" baseline="0" dirty="0" smtClean="0"/>
+              <a:t>-  Logging of hardware-level data</a:t>
+            </a:r>
+          </a:p>
+          <a:p>
+            <a:pPr marL="628650" lvl="1" indent="-171450">
+              <a:buFontTx/>
+              <a:buChar char="-"/>
+            </a:pPr>
+            <a:r>
+              <a:rPr lang="en-US" baseline="0" dirty="0" smtClean="0"/>
+              <a:t>Introspection: </a:t>
+            </a:r>
+          </a:p>
+          <a:p>
+            <a:pPr marL="1085850" marR="0" lvl="2" indent="-171450" algn="l" defTabSz="914400" rtl="0" eaLnBrk="1" fontAlgn="auto" latinLnBrk="0" hangingPunct="1">
+              <a:lnSpc>
+                <a:spcPct val="100000"/>
+              </a:lnSpc>
+              <a:spcBef>
+                <a:spcPts val="0"/>
+              </a:spcBef>
+              <a:spcAft>
+                <a:spcPts val="0"/>
+              </a:spcAft>
+              <a:buClrTx/>
+              <a:buSzTx/>
+              <a:buFontTx/>
+              <a:buChar char="-"/>
+              <a:tabLst/>
+              <a:defRPr/>
+            </a:pPr>
+            <a:r>
+              <a:rPr lang="en-US" sz="1200" b="0" i="0" u="none" strike="noStrike" kern="1200" baseline="0" dirty="0" smtClean="0">
+                <a:solidFill>
+                  <a:schemeClr val="tx1"/>
+                </a:solidFill>
+                <a:latin typeface="+mn-lt"/>
+                <a:ea typeface="+mn-ea"/>
+                <a:cs typeface="+mn-cs"/>
+              </a:rPr>
+              <a:t>techniques that enable VM service to understand and modify states and events within a guest</a:t>
+            </a:r>
+            <a:endParaRPr lang="en-US" baseline="0" dirty="0" smtClean="0"/>
+          </a:p>
+          <a:p>
+            <a:pPr marL="1085850" lvl="2" indent="-171450">
+              <a:buFontTx/>
+              <a:buChar char="-"/>
+            </a:pPr>
+            <a:r>
+              <a:rPr lang="en-US" baseline="0" dirty="0" smtClean="0"/>
+              <a:t>Normally used to increase security for VM users by closely monitoring the VM. But </a:t>
+            </a:r>
+            <a:r>
+              <a:rPr lang="en-US" sz="1200" kern="1200" baseline="0" dirty="0" smtClean="0">
+                <a:solidFill>
+                  <a:schemeClr val="tx1"/>
+                </a:solidFill>
+                <a:effectLst/>
+                <a:latin typeface="+mn-lt"/>
+                <a:ea typeface="+mn-ea"/>
+                <a:cs typeface="+mn-cs"/>
+              </a:rPr>
+              <a:t>M</a:t>
+            </a:r>
+            <a:r>
+              <a:rPr lang="en-US" sz="1200" kern="1200" dirty="0" smtClean="0">
+                <a:solidFill>
+                  <a:schemeClr val="tx1"/>
+                </a:solidFill>
+                <a:effectLst/>
+                <a:latin typeface="+mn-lt"/>
+                <a:ea typeface="+mn-ea"/>
+                <a:cs typeface="+mn-cs"/>
+              </a:rPr>
+              <a:t>alicious services can use it to reconstruct the data and abstractions from the target system when a VMBR is in control</a:t>
+            </a:r>
+            <a:endParaRPr lang="en-US" baseline="0" dirty="0" smtClean="0"/>
+          </a:p>
+          <a:p>
+            <a:pPr marL="228600" lvl="0" indent="-228600">
+              <a:buFontTx/>
+              <a:buAutoNum type="arabicPeriod" startAt="2"/>
+            </a:pPr>
+            <a:r>
+              <a:rPr lang="en-US" baseline="0" dirty="0" smtClean="0"/>
+              <a:t>Target system modifiers</a:t>
+            </a:r>
+          </a:p>
+          <a:p>
+            <a:pPr marL="628650" lvl="1" indent="-171450">
+              <a:buFontTx/>
+              <a:buChar char="-"/>
+            </a:pPr>
+            <a:r>
+              <a:rPr lang="en-US" baseline="0" dirty="0" smtClean="0"/>
+              <a:t>Network communication, tampering with emails etc.</a:t>
+            </a:r>
+          </a:p>
+          <a:p>
+            <a:pPr marL="628650" lvl="1" indent="-171450">
+              <a:buFontTx/>
+              <a:buChar char="-"/>
+            </a:pPr>
+            <a:r>
+              <a:rPr lang="en-US" baseline="0" dirty="0" smtClean="0"/>
+              <a:t>Introspection can also be used to modify the guest OS</a:t>
+            </a:r>
           </a:p>
         </p:txBody>
       </p:sp>
@@ -1282,13 +2154,18 @@
             <a:fld id="{72141A60-0A97-4B4C-A98B-2EDC5A7E8FE4}" type="slidenum">
               <a:rPr lang="en-US" smtClean="0"/>
               <a:pPr/>
-              <a:t>11</a:t>
+              <a:t>7</a:t>
             </a:fld>
             <a:endParaRPr lang="en-US"/>
           </a:p>
         </p:txBody>
       </p:sp>
     </p:spTree>
+    <p:extLst>
+      <p:ext uri="{BB962C8B-B14F-4D97-AF65-F5344CB8AC3E}">
+        <p14:creationId xmlns:p14="http://schemas.microsoft.com/office/powerpoint/2010/main" val="1153073892"/>
+      </p:ext>
+    </p:extLst>
   </p:cSld>
   <p:clrMapOvr>
     <a:masterClrMapping/>
@@ -1337,122 +2214,13 @@
         </p:nvSpPr>
         <p:spPr/>
         <p:txBody>
-          <a:bodyPr>
-            <a:normAutofit/>
-          </a:bodyPr>
-          <a:lstStyle/>
-          <a:p>
-            <a:pPr marL="228600" indent="-228600">
-              <a:buAutoNum type="arabicPeriod"/>
-            </a:pPr>
-            <a:r>
-              <a:rPr lang="en-US" dirty="0" smtClean="0"/>
-              <a:t>Hooks </a:t>
-            </a:r>
-            <a:r>
-              <a:rPr lang="en-US" dirty="0"/>
-              <a:t>are blocks of code that intercept events, function calls, or </a:t>
-            </a:r>
-            <a:r>
-              <a:rPr lang="en-US" dirty="0" smtClean="0"/>
-              <a:t>messages. Hooking is employed by </a:t>
-            </a:r>
-            <a:r>
-              <a:rPr lang="en-US" dirty="0" err="1" smtClean="0"/>
-              <a:t>rootkits</a:t>
-            </a:r>
-            <a:r>
-              <a:rPr lang="en-US" dirty="0" smtClean="0"/>
-              <a:t> to evade detection. Hooking modifies the flow of control and hides the presence of modification. </a:t>
-            </a:r>
-          </a:p>
-          <a:p>
-            <a:pPr marL="228600" indent="-228600"/>
-            <a:r>
-              <a:rPr lang="en-US" dirty="0"/>
-              <a:t>	</a:t>
-            </a:r>
-            <a:r>
-              <a:rPr lang="en-US" dirty="0" err="1" smtClean="0"/>
-              <a:t>Hooksafe</a:t>
-            </a:r>
-            <a:r>
-              <a:rPr lang="en-US" dirty="0" smtClean="0"/>
-              <a:t> provides a hypervisor based system to protect kernel hooks from being attacked by </a:t>
-            </a:r>
-            <a:r>
-              <a:rPr lang="en-US" dirty="0" err="1" smtClean="0"/>
-              <a:t>rootkits</a:t>
-            </a:r>
-            <a:r>
-              <a:rPr lang="en-US" dirty="0" smtClean="0"/>
-              <a:t>. </a:t>
-            </a:r>
-            <a:r>
-              <a:rPr lang="en-US" dirty="0" err="1" smtClean="0"/>
-              <a:t>Hooksafe</a:t>
-            </a:r>
-            <a:r>
-              <a:rPr lang="en-US" dirty="0" smtClean="0"/>
-              <a:t> monitors the possible hooks(write access) for modifications. It provides a hook indirection layer to regulate access to hooks in kernel. </a:t>
-            </a:r>
-          </a:p>
-          <a:p>
-            <a:pPr marL="228600" indent="-228600"/>
-            <a:r>
-              <a:rPr lang="en-US" dirty="0" smtClean="0"/>
-              <a:t>2. </a:t>
-            </a:r>
-            <a:r>
-              <a:rPr lang="en-US" dirty="0" err="1" smtClean="0"/>
-              <a:t>SecVisor</a:t>
-            </a:r>
-            <a:r>
-              <a:rPr lang="en-US" dirty="0" smtClean="0"/>
-              <a:t> </a:t>
-            </a:r>
-            <a:r>
-              <a:rPr lang="en-US" dirty="0"/>
-              <a:t>protects the integrity of code in OS kernels by preventing </a:t>
-            </a:r>
-            <a:r>
-              <a:rPr lang="en-US" dirty="0" smtClean="0"/>
-              <a:t>unauthorized </a:t>
-            </a:r>
-          </a:p>
-          <a:p>
-            <a:pPr marL="228600" indent="-228600"/>
-            <a:r>
-              <a:rPr lang="en-US" dirty="0"/>
-              <a:t> </a:t>
-            </a:r>
-            <a:r>
-              <a:rPr lang="en-US" dirty="0" smtClean="0"/>
-              <a:t>    modifications </a:t>
-            </a:r>
-            <a:r>
-              <a:rPr lang="en-US" dirty="0"/>
-              <a:t>to the code via a user specified approval </a:t>
-            </a:r>
-            <a:r>
-              <a:rPr lang="en-US" dirty="0" smtClean="0"/>
-              <a:t>policy.</a:t>
-            </a:r>
-          </a:p>
-          <a:p>
-            <a:pPr marL="228600" indent="-228600">
-              <a:buAutoNum type="arabicPeriod" startAt="3"/>
-            </a:pPr>
-            <a:r>
-              <a:rPr lang="en-US" dirty="0" smtClean="0"/>
-              <a:t>NICKLE uses VMM for restricting access to the Kernel space. NICKLE module lies in the VMM layer and enforces that the guest OS kernel cannot access the shadow memory. At runtime, any instruction executed in the shadow space must be fetched from the shadow memory, which contains authenticated instructions. </a:t>
-            </a:r>
-            <a:endParaRPr lang="en-US" smtClean="0"/>
-          </a:p>
-          <a:p>
-            <a:pPr marL="228600" indent="-228600">
-              <a:buAutoNum type="arabicPeriod" startAt="3"/>
-            </a:pPr>
+          <a:bodyPr/>
+          <a:lstStyle/>
+          <a:p>
+            <a:r>
+              <a:rPr lang="en-US" dirty="0" smtClean="0"/>
+              <a:t>Mike</a:t>
+            </a:r>
             <a:endParaRPr lang="en-US" dirty="0"/>
           </a:p>
         </p:txBody>
@@ -1472,16 +2240,20 @@
           <a:bodyPr/>
           <a:lstStyle/>
           <a:p>
-            <a:fld id="{72141A60-0A97-4B4C-A98B-2EDC5A7E8FE4}" type="slidenum">
-              <a:rPr lang="en-US" smtClean="0"/>
-              <a:pPr/>
-              <a:t>12</a:t>
+            <a:fld id="{FC4DA58B-212D-4CB1-A82C-2E2734039AFF}" type="slidenum">
+              <a:rPr lang="en-US" smtClean="0"/>
+              <a:t>8</a:t>
             </a:fld>
             <a:endParaRPr lang="en-US"/>
           </a:p>
         </p:txBody>
       </p:sp>
     </p:spTree>
+    <p:extLst>
+      <p:ext uri="{BB962C8B-B14F-4D97-AF65-F5344CB8AC3E}">
+        <p14:creationId xmlns:p14="http://schemas.microsoft.com/office/powerpoint/2010/main" val="2266588369"/>
+      </p:ext>
+    </p:extLst>
   </p:cSld>
   <p:clrMapOvr>
     <a:masterClrMapping/>
@@ -1530,56 +2302,12 @@
         </p:nvSpPr>
         <p:spPr/>
         <p:txBody>
-          <a:bodyPr>
-            <a:normAutofit/>
-          </a:bodyPr>
-          <a:lstStyle/>
-          <a:p>
-            <a:r>
-              <a:rPr lang="en-US" sz="1200" kern="1200" dirty="0" smtClean="0">
-                <a:solidFill>
-                  <a:schemeClr val="tx1"/>
-                </a:solidFill>
-                <a:latin typeface="+mn-lt"/>
-                <a:ea typeface="+mn-ea"/>
-                <a:cs typeface="+mn-cs"/>
-              </a:rPr>
-              <a:t>File access control policies protect the system utilities from being replaced by their </a:t>
-            </a:r>
-            <a:r>
-              <a:rPr lang="en-US" sz="1200" kern="1200" dirty="0" err="1" smtClean="0">
-                <a:solidFill>
-                  <a:schemeClr val="tx1"/>
-                </a:solidFill>
-                <a:latin typeface="+mn-lt"/>
-                <a:ea typeface="+mn-ea"/>
-                <a:cs typeface="+mn-cs"/>
-              </a:rPr>
-              <a:t>trojaned</a:t>
-            </a:r>
-            <a:r>
-              <a:rPr lang="en-US" sz="1200" kern="1200" dirty="0" smtClean="0">
-                <a:solidFill>
-                  <a:schemeClr val="tx1"/>
-                </a:solidFill>
-                <a:latin typeface="+mn-lt"/>
-                <a:ea typeface="+mn-ea"/>
-                <a:cs typeface="+mn-cs"/>
-              </a:rPr>
-              <a:t> counterparts. </a:t>
-            </a:r>
-          </a:p>
-          <a:p>
-            <a:r>
-              <a:rPr lang="en-US" sz="1200" kern="1200" smtClean="0">
-                <a:solidFill>
-                  <a:schemeClr val="tx1"/>
-                </a:solidFill>
-                <a:latin typeface="+mn-lt"/>
-                <a:ea typeface="+mn-ea"/>
-                <a:cs typeface="+mn-cs"/>
-              </a:rPr>
-              <a:t>Memory access control policies protect the kernel code and data structures from being overwritten in memory.</a:t>
+          <a:bodyPr/>
+          <a:lstStyle/>
+          <a:p>
+            <a:r>
+              <a:rPr lang="en-US" dirty="0" smtClean="0"/>
+              <a:t>Mike</a:t>
             </a:r>
             <a:endParaRPr lang="en-US" dirty="0"/>
           </a:p>
@@ -1603,13 +2331,18 @@
             <a:fld id="{72141A60-0A97-4B4C-A98B-2EDC5A7E8FE4}" type="slidenum">
               <a:rPr lang="en-US" smtClean="0"/>
               <a:pPr/>
-              <a:t>14</a:t>
+              <a:t>9</a:t>
             </a:fld>
             <a:endParaRPr lang="en-US"/>
           </a:p>
         </p:txBody>
       </p:sp>
     </p:spTree>
+    <p:extLst>
+      <p:ext uri="{BB962C8B-B14F-4D97-AF65-F5344CB8AC3E}">
+        <p14:creationId xmlns:p14="http://schemas.microsoft.com/office/powerpoint/2010/main" val="2598429233"/>
+      </p:ext>
+    </p:extLst>
   </p:cSld>
   <p:clrMapOvr>
     <a:masterClrMapping/>
@@ -1743,7 +2476,7 @@
             <a:fld id="{B016CCD6-CAA2-4041-8C9A-E9376DD8C3A2}" type="datetimeFigureOut">
               <a:rPr lang="en-US" smtClean="0"/>
               <a:pPr/>
-              <a:t>4/21/2013</a:t>
+              <a:t>4/22/2013</a:t>
             </a:fld>
             <a:endParaRPr lang="en-US"/>
           </a:p>
@@ -2378,7 +3111,7 @@
             <a:fld id="{B016CCD6-CAA2-4041-8C9A-E9376DD8C3A2}" type="datetimeFigureOut">
               <a:rPr lang="en-US" smtClean="0"/>
               <a:pPr/>
-              <a:t>4/21/2013</a:t>
+              <a:t>4/22/2013</a:t>
             </a:fld>
             <a:endParaRPr lang="en-US"/>
           </a:p>
@@ -2657,7 +3390,7 @@
             <a:fld id="{B016CCD6-CAA2-4041-8C9A-E9376DD8C3A2}" type="datetimeFigureOut">
               <a:rPr lang="en-US" smtClean="0"/>
               <a:pPr/>
-              <a:t>4/21/2013</a:t>
+              <a:t>4/22/2013</a:t>
             </a:fld>
             <a:endParaRPr lang="en-US"/>
           </a:p>
@@ -2824,7 +3557,7 @@
             <a:fld id="{B016CCD6-CAA2-4041-8C9A-E9376DD8C3A2}" type="datetimeFigureOut">
               <a:rPr lang="en-US" smtClean="0"/>
               <a:pPr/>
-              <a:t>4/21/2013</a:t>
+              <a:t>4/22/2013</a:t>
             </a:fld>
             <a:endParaRPr lang="en-US"/>
           </a:p>
@@ -3007,7 +3740,7 @@
             <a:fld id="{B016CCD6-CAA2-4041-8C9A-E9376DD8C3A2}" type="datetimeFigureOut">
               <a:rPr lang="en-US" smtClean="0"/>
               <a:pPr/>
-              <a:t>4/21/2013</a:t>
+              <a:t>4/22/2013</a:t>
             </a:fld>
             <a:endParaRPr lang="en-US"/>
           </a:p>
@@ -3654,7 +4387,7 @@
             <a:fld id="{B016CCD6-CAA2-4041-8C9A-E9376DD8C3A2}" type="datetimeFigureOut">
               <a:rPr lang="en-US" smtClean="0"/>
               <a:pPr/>
-              <a:t>4/21/2013</a:t>
+              <a:t>4/22/2013</a:t>
             </a:fld>
             <a:endParaRPr lang="en-US"/>
           </a:p>
@@ -4082,7 +4815,7 @@
             <a:fld id="{B016CCD6-CAA2-4041-8C9A-E9376DD8C3A2}" type="datetimeFigureOut">
               <a:rPr lang="en-US" smtClean="0"/>
               <a:pPr/>
-              <a:t>4/21/2013</a:t>
+              <a:t>4/22/2013</a:t>
             </a:fld>
             <a:endParaRPr lang="en-US"/>
           </a:p>
@@ -4197,7 +4930,7 @@
             <a:fld id="{B016CCD6-CAA2-4041-8C9A-E9376DD8C3A2}" type="datetimeFigureOut">
               <a:rPr lang="en-US" smtClean="0"/>
               <a:pPr/>
-              <a:t>4/21/2013</a:t>
+              <a:t>4/22/2013</a:t>
             </a:fld>
             <a:endParaRPr lang="en-US"/>
           </a:p>
@@ -4380,7 +5113,7 @@
             <a:fld id="{B016CCD6-CAA2-4041-8C9A-E9376DD8C3A2}" type="datetimeFigureOut">
               <a:rPr lang="en-US" smtClean="0"/>
               <a:pPr/>
-              <a:t>4/21/2013</a:t>
+              <a:t>4/22/2013</a:t>
             </a:fld>
             <a:endParaRPr lang="en-US"/>
           </a:p>
@@ -4648,7 +5381,7 @@
             <a:fld id="{B016CCD6-CAA2-4041-8C9A-E9376DD8C3A2}" type="datetimeFigureOut">
               <a:rPr lang="en-US" smtClean="0"/>
               <a:pPr/>
-              <a:t>4/21/2013</a:t>
+              <a:t>4/22/2013</a:t>
             </a:fld>
             <a:endParaRPr lang="en-US"/>
           </a:p>
@@ -5120,7 +5853,7 @@
             <a:fld id="{B016CCD6-CAA2-4041-8C9A-E9376DD8C3A2}" type="datetimeFigureOut">
               <a:rPr lang="en-US" smtClean="0"/>
               <a:pPr/>
-              <a:t>4/21/2013</a:t>
+              <a:t>4/22/2013</a:t>
             </a:fld>
             <a:endParaRPr lang="en-US"/>
           </a:p>
@@ -5682,7 +6415,7 @@
             <a:fld id="{B016CCD6-CAA2-4041-8C9A-E9376DD8C3A2}" type="datetimeFigureOut">
               <a:rPr lang="en-US" smtClean="0"/>
               <a:pPr/>
-              <a:t>4/21/2013</a:t>
+              <a:t>4/22/2013</a:t>
             </a:fld>
             <a:endParaRPr lang="en-US"/>
           </a:p>
@@ -6325,11 +7058,7 @@
           <a:p>
             <a:r>
               <a:rPr lang="en-US" dirty="0" smtClean="0"/>
-              <a:t>Security software below </a:t>
-            </a:r>
-            <a:r>
-              <a:rPr lang="en-US" dirty="0" err="1" smtClean="0"/>
-              <a:t>vmbr</a:t>
+              <a:t>Methods of Defense</a:t>
             </a:r>
             <a:endParaRPr lang="en-US" dirty="0"/>
           </a:p>
@@ -6352,54 +7081,38 @@
           <a:p>
             <a:r>
               <a:rPr lang="en-US" dirty="0" smtClean="0"/>
-              <a:t>Can see the state of VMBR</a:t>
-            </a:r>
-          </a:p>
-          <a:p>
-            <a:r>
-              <a:rPr lang="en-US" dirty="0" smtClean="0"/>
-              <a:t>Read physical memory of disk and look for signatures and anomalies that indicate the presence of VMBR</a:t>
-            </a:r>
-          </a:p>
-          <a:p>
-            <a:r>
-              <a:rPr lang="en-US" dirty="0" smtClean="0"/>
-              <a:t>Use secure hardware</a:t>
-            </a:r>
-          </a:p>
-          <a:p>
-            <a:r>
-              <a:rPr lang="en-US" dirty="0" smtClean="0"/>
-              <a:t>Boot from safe medium </a:t>
-            </a:r>
-          </a:p>
-          <a:p>
-            <a:r>
-              <a:rPr lang="en-US" dirty="0" smtClean="0"/>
-              <a:t>Physically unplug the machine before reboot</a:t>
-            </a:r>
-          </a:p>
-          <a:p>
-            <a:r>
-              <a:rPr lang="en-US" dirty="0" smtClean="0"/>
-              <a:t>Use  secure VMM</a:t>
-            </a:r>
-          </a:p>
-          <a:p>
-            <a:pPr>
-              <a:buNone/>
-            </a:pPr>
+              <a:t>Two Ways:</a:t>
+            </a:r>
+          </a:p>
+          <a:p>
             <a:endParaRPr lang="en-US" dirty="0" smtClean="0"/>
           </a:p>
           <a:p>
-            <a:endParaRPr lang="en-US" dirty="0" smtClean="0"/>
-          </a:p>
-          <a:p>
+            <a:pPr lvl="1"/>
+            <a:r>
+              <a:rPr lang="en-US" dirty="0" smtClean="0"/>
+              <a:t>Security software below the VMBR</a:t>
+            </a:r>
+          </a:p>
+          <a:p>
+            <a:pPr lvl="1"/>
+            <a:r>
+              <a:rPr lang="en-US" dirty="0" smtClean="0"/>
+              <a:t>Security  software above the VMBR</a:t>
+            </a:r>
+          </a:p>
+          <a:p>
+            <a:pPr lvl="1"/>
             <a:endParaRPr lang="en-US" dirty="0"/>
           </a:p>
         </p:txBody>
       </p:sp>
     </p:spTree>
+    <p:extLst>
+      <p:ext uri="{BB962C8B-B14F-4D97-AF65-F5344CB8AC3E}">
+        <p14:creationId xmlns:p14="http://schemas.microsoft.com/office/powerpoint/2010/main" val="19357863"/>
+      </p:ext>
+    </p:extLst>
   </p:cSld>
   <p:clrMapOvr>
     <a:masterClrMapping/>
@@ -6448,11 +7161,11 @@
           <a:p>
             <a:r>
               <a:rPr lang="en-US" dirty="0" smtClean="0"/>
-              <a:t>Security software above </a:t>
+              <a:t>Security software below </a:t>
             </a:r>
             <a:r>
               <a:rPr lang="en-US" dirty="0" err="1" smtClean="0"/>
-              <a:t>VMBr</a:t>
+              <a:t>vmbr</a:t>
             </a:r>
             <a:endParaRPr lang="en-US" dirty="0"/>
           </a:p>
@@ -6475,32 +7188,49 @@
           <a:p>
             <a:r>
               <a:rPr lang="en-US" dirty="0" smtClean="0"/>
-              <a:t>Can software running above the VMBR detect its presence?????</a:t>
-            </a:r>
-          </a:p>
-          <a:p>
-            <a:r>
-              <a:rPr lang="en-US" dirty="0" smtClean="0"/>
-              <a:t>CPU time</a:t>
-            </a:r>
-          </a:p>
-          <a:p>
-            <a:r>
-              <a:rPr lang="en-US" dirty="0" smtClean="0"/>
-              <a:t>Memory and Disk space</a:t>
-            </a:r>
-          </a:p>
-          <a:p>
-            <a:r>
-              <a:rPr lang="en-US" dirty="0" smtClean="0"/>
-              <a:t>Variety of I/O devices </a:t>
-            </a:r>
-          </a:p>
-          <a:p>
-            <a:r>
-              <a:rPr lang="en-US" dirty="0" smtClean="0"/>
-              <a:t>Imperfect source of x86 processors</a:t>
-            </a:r>
+              <a:t>Can see the state of VMBR</a:t>
+            </a:r>
+          </a:p>
+          <a:p>
+            <a:r>
+              <a:rPr lang="en-US" dirty="0" smtClean="0"/>
+              <a:t>Read physical memory of disk and look for signatures and anomalies that indicate the presence of VMBR</a:t>
+            </a:r>
+          </a:p>
+          <a:p>
+            <a:r>
+              <a:rPr lang="en-US" dirty="0" smtClean="0"/>
+              <a:t>Use secure hardware</a:t>
+            </a:r>
+          </a:p>
+          <a:p>
+            <a:r>
+              <a:rPr lang="en-US" dirty="0" smtClean="0"/>
+              <a:t>Boot from safe medium </a:t>
+            </a:r>
+          </a:p>
+          <a:p>
+            <a:r>
+              <a:rPr lang="en-US" dirty="0" smtClean="0"/>
+              <a:t>Physically unplug the machine before reboot</a:t>
+            </a:r>
+          </a:p>
+          <a:p>
+            <a:r>
+              <a:rPr lang="en-US" dirty="0" smtClean="0"/>
+              <a:t>Use  secure VMM</a:t>
+            </a:r>
+          </a:p>
+          <a:p>
+            <a:pPr>
+              <a:buNone/>
+            </a:pPr>
+            <a:endParaRPr lang="en-US" dirty="0" smtClean="0"/>
+          </a:p>
+          <a:p>
+            <a:endParaRPr lang="en-US" dirty="0" smtClean="0"/>
+          </a:p>
+          <a:p>
             <a:endParaRPr lang="en-US" dirty="0"/>
           </a:p>
         </p:txBody>
@@ -6554,7 +7284,11 @@
           <a:p>
             <a:r>
               <a:rPr lang="en-US" dirty="0" smtClean="0"/>
-              <a:t>Existing Detectors</a:t>
+              <a:t>Security software above </a:t>
+            </a:r>
+            <a:r>
+              <a:rPr lang="en-US" dirty="0" err="1" smtClean="0"/>
+              <a:t>VMBr</a:t>
             </a:r>
             <a:endParaRPr lang="en-US" dirty="0"/>
           </a:p>
@@ -6576,45 +7310,38 @@
           <a:lstStyle/>
           <a:p>
             <a:r>
-              <a:rPr lang="en-US" dirty="0" err="1" smtClean="0"/>
-              <a:t>Hooksafe</a:t>
-            </a:r>
-            <a:endParaRPr lang="en-US" dirty="0" smtClean="0"/>
-          </a:p>
-          <a:p>
-            <a:r>
-              <a:rPr lang="en-US" dirty="0" err="1" smtClean="0"/>
-              <a:t>SecVisor</a:t>
-            </a:r>
-            <a:endParaRPr lang="en-US" dirty="0" smtClean="0"/>
-          </a:p>
-          <a:p>
-            <a:r>
-              <a:rPr lang="en-US" dirty="0" smtClean="0"/>
-              <a:t>NICKLE</a:t>
-            </a:r>
-          </a:p>
-          <a:p>
-            <a:r>
-              <a:rPr lang="en-US" dirty="0" smtClean="0"/>
-              <a:t>Red Pill </a:t>
-            </a:r>
-          </a:p>
-          <a:p>
-            <a:r>
-              <a:rPr lang="en-US" dirty="0" smtClean="0"/>
-              <a:t>Paladin</a:t>
+              <a:rPr lang="en-US" dirty="0" smtClean="0"/>
+              <a:t>Can software running above the VMBR detect its presence?????</a:t>
+            </a:r>
+          </a:p>
+          <a:p>
+            <a:r>
+              <a:rPr lang="en-US" dirty="0" smtClean="0"/>
+              <a:t>CPU time</a:t>
+            </a:r>
+          </a:p>
+          <a:p>
+            <a:r>
+              <a:rPr lang="en-US" dirty="0" smtClean="0"/>
+              <a:t>Memory and Disk space</a:t>
+            </a:r>
+          </a:p>
+          <a:p>
+            <a:r>
+              <a:rPr lang="en-US" dirty="0" smtClean="0"/>
+              <a:t>Variety of I/O devices </a:t>
+            </a:r>
+          </a:p>
+          <a:p>
+            <a:r>
+              <a:rPr lang="en-US" dirty="0" smtClean="0"/>
+              <a:t>Imperfect source of x86 processors</a:t>
             </a:r>
             <a:endParaRPr lang="en-US" dirty="0"/>
           </a:p>
         </p:txBody>
       </p:sp>
     </p:spTree>
-    <p:extLst>
-      <p:ext uri="{BB962C8B-B14F-4D97-AF65-F5344CB8AC3E}">
-        <p14:creationId xmlns:p14="http://schemas.microsoft.com/office/powerpoint/2010/main" val="3327195953"/>
-      </p:ext>
-    </p:extLst>
   </p:cSld>
   <p:clrMapOvr>
     <a:masterClrMapping/>
@@ -6663,60 +7390,56 @@
           <a:p>
             <a:r>
               <a:rPr lang="en-US" dirty="0" smtClean="0"/>
+              <a:t>Existing Detectors</a:t>
+            </a:r>
+            <a:endParaRPr lang="en-US" dirty="0"/>
+          </a:p>
+        </p:txBody>
+      </p:sp>
+      <p:sp>
+        <p:nvSpPr>
+          <p:cNvPr id="3" name="Content Placeholder 2"/>
+          <p:cNvSpPr>
+            <a:spLocks noGrp="1"/>
+          </p:cNvSpPr>
+          <p:nvPr>
+            <p:ph idx="1"/>
+          </p:nvPr>
+        </p:nvSpPr>
+        <p:spPr/>
+        <p:txBody>
+          <a:bodyPr/>
+          <a:lstStyle/>
+          <a:p>
+            <a:r>
+              <a:rPr lang="en-US" dirty="0" err="1" smtClean="0"/>
+              <a:t>Hooksafe</a:t>
+            </a:r>
+            <a:endParaRPr lang="en-US" dirty="0" smtClean="0"/>
+          </a:p>
+          <a:p>
+            <a:r>
+              <a:rPr lang="en-US" dirty="0" err="1" smtClean="0"/>
+              <a:t>SecVisor</a:t>
+            </a:r>
+            <a:endParaRPr lang="en-US" dirty="0" smtClean="0"/>
+          </a:p>
+          <a:p>
+            <a:r>
+              <a:rPr lang="en-US" dirty="0" smtClean="0"/>
+              <a:t>NICKLE</a:t>
+            </a:r>
+          </a:p>
+          <a:p>
+            <a:r>
+              <a:rPr lang="en-US" dirty="0" smtClean="0"/>
+              <a:t>Red Pill </a:t>
+            </a:r>
+          </a:p>
+          <a:p>
+            <a:r>
+              <a:rPr lang="en-US" dirty="0" smtClean="0"/>
               <a:t>Paladin</a:t>
-            </a:r>
-            <a:endParaRPr lang="en-US" dirty="0"/>
-          </a:p>
-        </p:txBody>
-      </p:sp>
-      <p:sp>
-        <p:nvSpPr>
-          <p:cNvPr id="3" name="Content Placeholder 2"/>
-          <p:cNvSpPr>
-            <a:spLocks noGrp="1"/>
-          </p:cNvSpPr>
-          <p:nvPr>
-            <p:ph idx="1"/>
-          </p:nvPr>
-        </p:nvSpPr>
-        <p:spPr/>
-        <p:txBody>
-          <a:bodyPr/>
-          <a:lstStyle/>
-          <a:p>
-            <a:r>
-              <a:rPr lang="en-US" dirty="0" smtClean="0"/>
-              <a:t>Approach</a:t>
-            </a:r>
-          </a:p>
-          <a:p>
-            <a:pPr lvl="1"/>
-            <a:r>
-              <a:rPr lang="en-US" dirty="0" smtClean="0"/>
-              <a:t>Prevention and Detection</a:t>
-            </a:r>
-          </a:p>
-          <a:p>
-            <a:pPr lvl="1"/>
-            <a:r>
-              <a:rPr lang="en-US" dirty="0" smtClean="0"/>
-              <a:t>Tracking </a:t>
-            </a:r>
-          </a:p>
-          <a:p>
-            <a:pPr lvl="1"/>
-            <a:r>
-              <a:rPr lang="en-US" dirty="0" smtClean="0"/>
-              <a:t>Containment</a:t>
-            </a:r>
-          </a:p>
-          <a:p>
-            <a:pPr>
-              <a:buNone/>
-            </a:pPr>
-            <a:r>
-              <a:rPr lang="en-US" dirty="0" smtClean="0"/>
-              <a:t>		</a:t>
             </a:r>
             <a:endParaRPr lang="en-US" dirty="0"/>
           </a:p>
@@ -6725,7 +7448,7 @@
     </p:spTree>
     <p:extLst>
       <p:ext uri="{BB962C8B-B14F-4D97-AF65-F5344CB8AC3E}">
-        <p14:creationId xmlns:p14="http://schemas.microsoft.com/office/powerpoint/2010/main" val="1247059405"/>
+        <p14:creationId xmlns:p14="http://schemas.microsoft.com/office/powerpoint/2010/main" val="3327195953"/>
       </p:ext>
     </p:extLst>
   </p:cSld>
@@ -6776,6 +7499,119 @@
           <a:p>
             <a:r>
               <a:rPr lang="en-US" dirty="0" smtClean="0"/>
+              <a:t>Paladin</a:t>
+            </a:r>
+            <a:endParaRPr lang="en-US" dirty="0"/>
+          </a:p>
+        </p:txBody>
+      </p:sp>
+      <p:sp>
+        <p:nvSpPr>
+          <p:cNvPr id="3" name="Content Placeholder 2"/>
+          <p:cNvSpPr>
+            <a:spLocks noGrp="1"/>
+          </p:cNvSpPr>
+          <p:nvPr>
+            <p:ph idx="1"/>
+          </p:nvPr>
+        </p:nvSpPr>
+        <p:spPr/>
+        <p:txBody>
+          <a:bodyPr/>
+          <a:lstStyle/>
+          <a:p>
+            <a:r>
+              <a:rPr lang="en-US" dirty="0" smtClean="0"/>
+              <a:t>Approach</a:t>
+            </a:r>
+          </a:p>
+          <a:p>
+            <a:pPr lvl="1"/>
+            <a:r>
+              <a:rPr lang="en-US" dirty="0" smtClean="0"/>
+              <a:t>Prevention and Detection</a:t>
+            </a:r>
+          </a:p>
+          <a:p>
+            <a:pPr lvl="1"/>
+            <a:r>
+              <a:rPr lang="en-US" dirty="0" smtClean="0"/>
+              <a:t>Tracking </a:t>
+            </a:r>
+          </a:p>
+          <a:p>
+            <a:pPr lvl="1"/>
+            <a:r>
+              <a:rPr lang="en-US" dirty="0" smtClean="0"/>
+              <a:t>Containment</a:t>
+            </a:r>
+          </a:p>
+          <a:p>
+            <a:pPr>
+              <a:buNone/>
+            </a:pPr>
+            <a:r>
+              <a:rPr lang="en-US" dirty="0" smtClean="0"/>
+              <a:t>		</a:t>
+            </a:r>
+            <a:endParaRPr lang="en-US" dirty="0"/>
+          </a:p>
+        </p:txBody>
+      </p:sp>
+    </p:spTree>
+    <p:extLst>
+      <p:ext uri="{BB962C8B-B14F-4D97-AF65-F5344CB8AC3E}">
+        <p14:creationId xmlns:p14="http://schemas.microsoft.com/office/powerpoint/2010/main" val="1247059405"/>
+      </p:ext>
+    </p:extLst>
+  </p:cSld>
+  <p:clrMapOvr>
+    <a:masterClrMapping/>
+  </p:clrMapOvr>
+  <p:timing>
+    <p:tnLst>
+      <p:par>
+        <p:cTn id="1" dur="indefinite" restart="never" nodeType="tmRoot"/>
+      </p:par>
+    </p:tnLst>
+  </p:timing>
+</p:sld>
+</file>
+
+<file path=ppt/slides/slide15.xml><?xml version="1.0" encoding="utf-8"?>
+<p:sld xmlns:a="http://schemas.openxmlformats.org/drawingml/2006/main" xmlns:r="http://schemas.openxmlformats.org/officeDocument/2006/relationships" xmlns:p="http://schemas.openxmlformats.org/presentationml/2006/main">
+  <p:cSld>
+    <p:spTree>
+      <p:nvGrpSpPr>
+        <p:cNvPr id="1" name=""/>
+        <p:cNvGrpSpPr/>
+        <p:nvPr/>
+      </p:nvGrpSpPr>
+      <p:grpSpPr>
+        <a:xfrm>
+          <a:off x="0" y="0"/>
+          <a:ext cx="0" cy="0"/>
+          <a:chOff x="0" y="0"/>
+          <a:chExt cx="0" cy="0"/>
+        </a:xfrm>
+      </p:grpSpPr>
+      <p:sp>
+        <p:nvSpPr>
+          <p:cNvPr id="2" name="Title 1"/>
+          <p:cNvSpPr>
+            <a:spLocks noGrp="1"/>
+          </p:cNvSpPr>
+          <p:nvPr>
+            <p:ph type="title"/>
+          </p:nvPr>
+        </p:nvSpPr>
+        <p:spPr/>
+        <p:txBody>
+          <a:bodyPr/>
+          <a:lstStyle/>
+          <a:p>
+            <a:r>
+              <a:rPr lang="en-US" dirty="0" smtClean="0"/>
               <a:t>Prevention and Detection</a:t>
             </a:r>
             <a:endParaRPr lang="en-US" dirty="0"/>
@@ -6823,7 +7659,7 @@
 </p:sld>
 </file>
 
-<file path=ppt/slides/slide15.xml><?xml version="1.0" encoding="utf-8"?>
+<file path=ppt/slides/slide16.xml><?xml version="1.0" encoding="utf-8"?>
 <p:sld xmlns:a="http://schemas.openxmlformats.org/drawingml/2006/main" xmlns:r="http://schemas.openxmlformats.org/officeDocument/2006/relationships" xmlns:p="http://schemas.openxmlformats.org/presentationml/2006/main">
   <p:cSld>
     <p:spTree>
@@ -6919,7 +7755,7 @@
 </p:sld>
 </file>
 
-<file path=ppt/slides/slide16.xml><?xml version="1.0" encoding="utf-8"?>
+<file path=ppt/slides/slide17.xml><?xml version="1.0" encoding="utf-8"?>
 <p:sld xmlns:a="http://schemas.openxmlformats.org/drawingml/2006/main" xmlns:r="http://schemas.openxmlformats.org/officeDocument/2006/relationships" xmlns:p="http://schemas.openxmlformats.org/presentationml/2006/main">
   <p:cSld>
     <p:spTree>
@@ -7032,7 +7868,7 @@
 </p:sld>
 </file>
 
-<file path=ppt/slides/slide17.xml><?xml version="1.0" encoding="utf-8"?>
+<file path=ppt/slides/slide18.xml><?xml version="1.0" encoding="utf-8"?>
 <p:sld xmlns:a="http://schemas.openxmlformats.org/drawingml/2006/main" xmlns:r="http://schemas.openxmlformats.org/officeDocument/2006/relationships" xmlns:p="http://schemas.openxmlformats.org/presentationml/2006/main">
   <p:cSld>
     <p:spTree>
@@ -7112,7 +7948,7 @@
 </p:sld>
 </file>
 
-<file path=ppt/slides/slide18.xml><?xml version="1.0" encoding="utf-8"?>
+<file path=ppt/slides/slide19.xml><?xml version="1.0" encoding="utf-8"?>
 <p:sld xmlns:a="http://schemas.openxmlformats.org/drawingml/2006/main" xmlns:r="http://schemas.openxmlformats.org/officeDocument/2006/relationships" xmlns:p="http://schemas.openxmlformats.org/presentationml/2006/main">
   <p:cSld>
     <p:spTree>
@@ -7254,20 +8090,36 @@
               <a:rPr lang="en-US" dirty="0" smtClean="0"/>
               <a:t> </a:t>
             </a:r>
+            <a:endParaRPr lang="en-US" dirty="0" smtClean="0"/>
           </a:p>
           <a:p>
             <a:pPr lvl="1"/>
             <a:r>
+              <a:rPr lang="en-US" dirty="0" smtClean="0"/>
+              <a:t>Enable </a:t>
+            </a:r>
+            <a:r>
               <a:rPr lang="en-US" dirty="0"/>
-              <a:t>E</a:t>
-            </a:r>
-            <a:r>
-              <a:rPr lang="en-US" dirty="0" smtClean="0"/>
-              <a:t>nable </a:t>
-            </a:r>
-            <a:r>
-              <a:rPr lang="en-US" dirty="0"/>
-              <a:t>continued privileged access to a computer, while actively hiding its presence from administrators </a:t>
+              <a:t>continued privileged access to a computer, while actively hiding its presence from </a:t>
+            </a:r>
+            <a:r>
+              <a:rPr lang="en-US" dirty="0" smtClean="0"/>
+              <a:t>administrators</a:t>
+            </a:r>
+          </a:p>
+          <a:p>
+            <a:pPr lvl="1"/>
+            <a:r>
+              <a:rPr lang="en-US" dirty="0" smtClean="0"/>
+              <a:t>Have been around for over 20 years</a:t>
+            </a:r>
+            <a:endParaRPr lang="en-US" dirty="0" smtClean="0"/>
+          </a:p>
+          <a:p>
+            <a:pPr lvl="1"/>
+            <a:r>
+              <a:rPr lang="en-US" dirty="0" smtClean="0"/>
+              <a:t>Many rootkits and detectors/methods of prevention </a:t>
             </a:r>
             <a:endParaRPr lang="en-US" dirty="0" smtClean="0"/>
           </a:p>
@@ -7288,7 +8140,25 @@
             <a:pPr lvl="1"/>
             <a:r>
               <a:rPr lang="en-US" dirty="0" smtClean="0"/>
-              <a:t>Difficult to detect from inside the target OS</a:t>
+              <a:t>Difficult to detect from inside the target </a:t>
+            </a:r>
+            <a:r>
+              <a:rPr lang="en-US" dirty="0" smtClean="0"/>
+              <a:t>OS</a:t>
+            </a:r>
+          </a:p>
+          <a:p>
+            <a:pPr lvl="1"/>
+            <a:r>
+              <a:rPr lang="en-US" dirty="0" smtClean="0"/>
+              <a:t>First proof-of-concept VMBR was introduced in 2006</a:t>
+            </a:r>
+          </a:p>
+          <a:p>
+            <a:pPr lvl="1"/>
+            <a:r>
+              <a:rPr lang="en-US" dirty="0" smtClean="0"/>
+              <a:t>Few known VMBRs and VMBR detectors</a:t>
             </a:r>
             <a:endParaRPr lang="en-US" dirty="0"/>
           </a:p>
@@ -7759,7 +8629,26 @@
             </a:r>
             <a:r>
               <a:rPr lang="en-US" dirty="0"/>
-              <a:t>virtual disk, VMM translates address to equivalent location on physical </a:t>
+              <a:t>virtual </a:t>
+            </a:r>
+            <a:r>
+              <a:rPr lang="en-US" dirty="0" smtClean="0"/>
+              <a:t>disk</a:t>
+            </a:r>
+          </a:p>
+          <a:p>
+            <a:pPr lvl="1"/>
+            <a:r>
+              <a:rPr lang="en-US" dirty="0" smtClean="0"/>
+              <a:t>VMM </a:t>
+            </a:r>
+            <a:r>
+              <a:rPr lang="en-US" dirty="0"/>
+              <a:t>translates address to equivalent location on </a:t>
+            </a:r>
+            <a:r>
+              <a:rPr lang="en-US" dirty="0" smtClean="0"/>
+              <a:t>phys. </a:t>
             </a:r>
             <a:r>
               <a:rPr lang="en-US" dirty="0" smtClean="0"/>
@@ -7853,134 +8742,52 @@
           <a:p>
             <a:r>
               <a:rPr lang="en-US" dirty="0" smtClean="0"/>
-              <a:t>Forms of Attack</a:t>
+              <a:t>Installation Cont.</a:t>
             </a:r>
             <a:endParaRPr lang="en-US" dirty="0"/>
           </a:p>
         </p:txBody>
       </p:sp>
-      <p:sp>
-        <p:nvSpPr>
-          <p:cNvPr id="3" name="Content Placeholder 2"/>
-          <p:cNvSpPr>
-            <a:spLocks noGrp="1"/>
-          </p:cNvSpPr>
-          <p:nvPr>
-            <p:ph idx="1"/>
-          </p:nvPr>
-        </p:nvSpPr>
-        <p:spPr/>
-        <p:txBody>
-          <a:bodyPr>
-            <a:normAutofit/>
-          </a:bodyPr>
-          <a:lstStyle/>
-          <a:p>
-            <a:pPr lvl="0"/>
-            <a:r>
-              <a:rPr lang="en-US" dirty="0"/>
-              <a:t>No interaction with target system</a:t>
-            </a:r>
-            <a:endParaRPr lang="en-US" sz="2000" dirty="0"/>
-          </a:p>
-          <a:p>
-            <a:pPr lvl="1"/>
-            <a:r>
-              <a:rPr lang="en-US" dirty="0" smtClean="0"/>
-              <a:t>Spam </a:t>
-            </a:r>
-            <a:r>
-              <a:rPr lang="en-US" dirty="0"/>
-              <a:t>relays, denial of service zombies, phishing web </a:t>
-            </a:r>
-            <a:r>
-              <a:rPr lang="en-US" dirty="0" smtClean="0"/>
-              <a:t>servers, etc.</a:t>
-            </a:r>
-            <a:endParaRPr lang="en-US" sz="1800" dirty="0"/>
-          </a:p>
-          <a:p>
-            <a:pPr lvl="0"/>
-            <a:r>
-              <a:rPr lang="en-US" dirty="0"/>
-              <a:t>Target system </a:t>
-            </a:r>
-            <a:r>
-              <a:rPr lang="en-US" dirty="0" smtClean="0"/>
-              <a:t>observers</a:t>
-            </a:r>
-          </a:p>
-          <a:p>
-            <a:pPr lvl="1"/>
-            <a:r>
-              <a:rPr lang="en-US" dirty="0" smtClean="0"/>
-              <a:t>Logging </a:t>
-            </a:r>
-            <a:r>
-              <a:rPr lang="en-US" dirty="0"/>
-              <a:t>of hardware-level data via modification of VMM’s device emulation software</a:t>
-            </a:r>
-            <a:endParaRPr lang="en-US" sz="1400" dirty="0"/>
-          </a:p>
-          <a:p>
-            <a:pPr lvl="1"/>
-            <a:r>
-              <a:rPr lang="en-US" dirty="0"/>
-              <a:t>Virtual machine introspection</a:t>
-            </a:r>
-            <a:endParaRPr lang="en-US" sz="1800" dirty="0"/>
-          </a:p>
-          <a:p>
-            <a:pPr lvl="0"/>
-            <a:r>
-              <a:rPr lang="en-US" dirty="0"/>
-              <a:t>Target system modifiers</a:t>
-            </a:r>
-            <a:endParaRPr lang="en-US" sz="2000" dirty="0"/>
-          </a:p>
-          <a:p>
-            <a:pPr lvl="1"/>
-            <a:r>
-              <a:rPr lang="en-US" dirty="0" smtClean="0"/>
-              <a:t>Modifying </a:t>
-            </a:r>
-            <a:r>
-              <a:rPr lang="en-US" dirty="0"/>
-              <a:t>network communication, e-mails, </a:t>
-            </a:r>
-            <a:r>
-              <a:rPr lang="en-US" dirty="0" smtClean="0"/>
-              <a:t>target applications, etc.</a:t>
-            </a:r>
-            <a:endParaRPr lang="en-US" sz="1800" dirty="0"/>
-          </a:p>
-          <a:p>
-            <a:pPr lvl="1"/>
-            <a:r>
-              <a:rPr lang="en-US" dirty="0"/>
-              <a:t>Virtual machine introspection</a:t>
-            </a:r>
-            <a:endParaRPr lang="en-US" sz="1800" dirty="0"/>
-          </a:p>
-        </p:txBody>
-      </p:sp>
+      <p:pic>
+        <p:nvPicPr>
+          <p:cNvPr id="3" name="Picture 2"/>
+          <p:cNvPicPr>
+            <a:picLocks noChangeAspect="1"/>
+          </p:cNvPicPr>
+          <p:nvPr/>
+        </p:nvPicPr>
+        <p:blipFill>
+          <a:blip r:embed="rId3">
+            <a:extLst>
+              <a:ext uri="{28A0092B-C50C-407E-A947-70E740481C1C}">
+                <a14:useLocalDpi xmlns:a14="http://schemas.microsoft.com/office/drawing/2010/main" val="0"/>
+              </a:ext>
+            </a:extLst>
+          </a:blip>
+          <a:stretch>
+            <a:fillRect/>
+          </a:stretch>
+        </p:blipFill>
+        <p:spPr>
+          <a:xfrm>
+            <a:off x="282388" y="1855724"/>
+            <a:ext cx="8556812" cy="4621276"/>
+          </a:xfrm>
+          <a:prstGeom prst="rect">
+            <a:avLst/>
+          </a:prstGeom>
+        </p:spPr>
+      </p:pic>
     </p:spTree>
     <p:extLst>
       <p:ext uri="{BB962C8B-B14F-4D97-AF65-F5344CB8AC3E}">
-        <p14:creationId xmlns:p14="http://schemas.microsoft.com/office/powerpoint/2010/main" val="2687441504"/>
+        <p14:creationId xmlns:p14="http://schemas.microsoft.com/office/powerpoint/2010/main" val="3199163825"/>
       </p:ext>
     </p:extLst>
   </p:cSld>
   <p:clrMapOvr>
     <a:masterClrMapping/>
   </p:clrMapOvr>
-  <p:timing>
-    <p:tnLst>
-      <p:par>
-        <p:cTn id="1" dur="indefinite" restart="never" nodeType="tmRoot"/>
-      </p:par>
-    </p:tnLst>
-  </p:timing>
 </p:sld>
 </file>
 
@@ -8018,33 +8825,7 @@
           <a:p>
             <a:r>
               <a:rPr lang="en-US" dirty="0" smtClean="0"/>
-              <a:t>How VMBR Maintains </a:t>
-            </a:r>
-            <a:r>
-              <a:rPr lang="en-US" dirty="0"/>
-              <a:t>Control</a:t>
-            </a:r>
-          </a:p>
-        </p:txBody>
-      </p:sp>
-      <p:sp>
-        <p:nvSpPr>
-          <p:cNvPr id="3" name="Text Placeholder 2"/>
-          <p:cNvSpPr>
-            <a:spLocks noGrp="1"/>
-          </p:cNvSpPr>
-          <p:nvPr>
-            <p:ph type="body" idx="1"/>
-          </p:nvPr>
-        </p:nvSpPr>
-        <p:spPr/>
-        <p:txBody>
-          <a:bodyPr/>
-          <a:lstStyle/>
-          <a:p>
-            <a:r>
-              <a:rPr lang="en-US" dirty="0" smtClean="0"/>
-              <a:t>Control</a:t>
+              <a:t>Forms of Attack</a:t>
             </a:r>
             <a:endParaRPr lang="en-US" dirty="0"/>
           </a:p>
@@ -8052,12 +8833,12 @@
       </p:sp>
       <p:sp>
         <p:nvSpPr>
-          <p:cNvPr id="4" name="Content Placeholder 3"/>
-          <p:cNvSpPr>
-            <a:spLocks noGrp="1"/>
-          </p:cNvSpPr>
-          <p:nvPr>
-            <p:ph sz="half" idx="2"/>
+          <p:cNvPr id="3" name="Content Placeholder 2"/>
+          <p:cNvSpPr>
+            <a:spLocks noGrp="1"/>
+          </p:cNvSpPr>
+          <p:nvPr>
+            <p:ph idx="1"/>
           </p:nvPr>
         </p:nvSpPr>
         <p:spPr/>
@@ -8067,113 +8848,98 @@
           </a:bodyPr>
           <a:lstStyle/>
           <a:p>
-            <a:r>
-              <a:rPr lang="en-US" dirty="0" smtClean="0"/>
-              <a:t>Restarting only the virtual hardware</a:t>
-            </a:r>
+            <a:pPr lvl="0"/>
+            <a:r>
+              <a:rPr lang="en-US" dirty="0"/>
+              <a:t>No interaction with target system</a:t>
+            </a:r>
+            <a:endParaRPr lang="en-US" sz="2000" dirty="0"/>
           </a:p>
           <a:p>
             <a:pPr lvl="1"/>
             <a:r>
               <a:rPr lang="en-US" dirty="0" smtClean="0"/>
-              <a:t>Prevents physical hardware from restarting</a:t>
-            </a:r>
-          </a:p>
-          <a:p>
-            <a:r>
-              <a:rPr lang="en-US" dirty="0" smtClean="0"/>
-              <a:t>Emulating system shutdowns</a:t>
+              <a:t>Spam </a:t>
+            </a:r>
+            <a:r>
+              <a:rPr lang="en-US" dirty="0"/>
+              <a:t>relays, denial of service zombies, phishing web </a:t>
+            </a:r>
+            <a:r>
+              <a:rPr lang="en-US" dirty="0" smtClean="0"/>
+              <a:t>servers, etc.</a:t>
+            </a:r>
+            <a:endParaRPr lang="en-US" sz="1800" dirty="0"/>
+          </a:p>
+          <a:p>
+            <a:pPr lvl="0"/>
+            <a:r>
+              <a:rPr lang="en-US" dirty="0"/>
+              <a:t>Target system </a:t>
+            </a:r>
+            <a:r>
+              <a:rPr lang="en-US" dirty="0" smtClean="0"/>
+              <a:t>observers</a:t>
             </a:r>
           </a:p>
           <a:p>
             <a:pPr lvl="1"/>
             <a:r>
               <a:rPr lang="en-US" dirty="0" smtClean="0"/>
-              <a:t>Low-power state</a:t>
-            </a:r>
+              <a:t>Logging </a:t>
+            </a:r>
+            <a:r>
+              <a:rPr lang="en-US" dirty="0"/>
+              <a:t>of hardware-level data via modification of VMM’s device emulation software</a:t>
+            </a:r>
+            <a:endParaRPr lang="en-US" sz="1400" dirty="0"/>
           </a:p>
           <a:p>
             <a:pPr lvl="1"/>
             <a:r>
-              <a:rPr lang="en-US" dirty="0" smtClean="0"/>
-              <a:t>VMBR lives inside the contents of RAM</a:t>
-            </a:r>
-          </a:p>
-          <a:p>
-            <a:endParaRPr lang="en-US" dirty="0"/>
-          </a:p>
-        </p:txBody>
-      </p:sp>
-      <p:sp>
-        <p:nvSpPr>
-          <p:cNvPr id="5" name="Text Placeholder 4"/>
-          <p:cNvSpPr>
-            <a:spLocks noGrp="1"/>
-          </p:cNvSpPr>
-          <p:nvPr>
-            <p:ph type="body" sz="quarter" idx="3"/>
-          </p:nvPr>
-        </p:nvSpPr>
-        <p:spPr/>
-        <p:txBody>
-          <a:bodyPr/>
-          <a:lstStyle/>
-          <a:p>
-            <a:r>
-              <a:rPr lang="en-US" dirty="0" smtClean="0"/>
-              <a:t>Stealth</a:t>
-            </a:r>
-            <a:endParaRPr lang="en-US" dirty="0"/>
-          </a:p>
-        </p:txBody>
-      </p:sp>
-      <p:sp>
-        <p:nvSpPr>
-          <p:cNvPr id="6" name="Content Placeholder 5"/>
-          <p:cNvSpPr>
-            <a:spLocks noGrp="1"/>
-          </p:cNvSpPr>
-          <p:nvPr>
-            <p:ph sz="quarter" idx="4"/>
-          </p:nvPr>
-        </p:nvSpPr>
-        <p:spPr/>
-        <p:txBody>
-          <a:bodyPr/>
-          <a:lstStyle/>
-          <a:p>
-            <a:r>
-              <a:rPr lang="en-US" dirty="0" smtClean="0"/>
-              <a:t>Manipulate antivirus code</a:t>
-            </a:r>
+              <a:rPr lang="en-US" dirty="0"/>
+              <a:t>Virtual machine introspection</a:t>
+            </a:r>
+            <a:endParaRPr lang="en-US" sz="1800" dirty="0"/>
+          </a:p>
+          <a:p>
+            <a:pPr lvl="0"/>
+            <a:r>
+              <a:rPr lang="en-US" dirty="0"/>
+              <a:t>Target system modifiers</a:t>
+            </a:r>
+            <a:endParaRPr lang="en-US" sz="2000" dirty="0"/>
           </a:p>
           <a:p>
             <a:pPr lvl="1"/>
             <a:r>
               <a:rPr lang="en-US" dirty="0" smtClean="0"/>
-              <a:t>Deems antivirus completely useless</a:t>
-            </a:r>
-          </a:p>
-          <a:p>
-            <a:r>
-              <a:rPr lang="en-US" dirty="0" smtClean="0"/>
-              <a:t>Running behind the scenes</a:t>
-            </a:r>
+              <a:t>Modifying </a:t>
+            </a:r>
+            <a:r>
+              <a:rPr lang="en-US" dirty="0"/>
+              <a:t>network communication, e-mails, </a:t>
+            </a:r>
+            <a:r>
+              <a:rPr lang="en-US" dirty="0" smtClean="0"/>
+              <a:t>target applications, etc.</a:t>
+            </a:r>
+            <a:endParaRPr lang="en-US" sz="1800" dirty="0"/>
           </a:p>
           <a:p>
             <a:pPr lvl="1"/>
             <a:r>
-              <a:rPr lang="en-US" dirty="0" smtClean="0"/>
-              <a:t>Running undetected by the humans and OS alike</a:t>
-            </a:r>
-            <a:endParaRPr lang="en-US" dirty="0"/>
+              <a:rPr lang="en-US" dirty="0"/>
+              <a:t>Virtual machine introspection</a:t>
+            </a:r>
+            <a:endParaRPr lang="en-US" sz="1800" dirty="0"/>
           </a:p>
         </p:txBody>
       </p:sp>
     </p:spTree>
     <p:extLst>
       <p:ext uri="{BB962C8B-B14F-4D97-AF65-F5344CB8AC3E}">
-        <p14:creationId xmlns:p14="http://schemas.microsoft.com/office/powerpoint/2010/main" val="1249372831"/>
+        <p14:creationId xmlns:p14="http://schemas.microsoft.com/office/powerpoint/2010/main" val="2687441504"/>
       </p:ext>
     </p:extLst>
   </p:cSld>
@@ -8224,7 +8990,33 @@
           <a:p>
             <a:r>
               <a:rPr lang="en-US" dirty="0" smtClean="0"/>
-              <a:t>Existing Rootkits</a:t>
+              <a:t>How VMBR Maintains </a:t>
+            </a:r>
+            <a:r>
+              <a:rPr lang="en-US" dirty="0"/>
+              <a:t>Control</a:t>
+            </a:r>
+          </a:p>
+        </p:txBody>
+      </p:sp>
+      <p:sp>
+        <p:nvSpPr>
+          <p:cNvPr id="3" name="Text Placeholder 2"/>
+          <p:cNvSpPr>
+            <a:spLocks noGrp="1"/>
+          </p:cNvSpPr>
+          <p:nvPr>
+            <p:ph type="body" idx="1"/>
+          </p:nvPr>
+        </p:nvSpPr>
+        <p:spPr/>
+        <p:txBody>
+          <a:bodyPr/>
+          <a:lstStyle/>
+          <a:p>
+            <a:r>
+              <a:rPr lang="en-US" dirty="0" smtClean="0"/>
+              <a:t>Control</a:t>
             </a:r>
             <a:endParaRPr lang="en-US" dirty="0"/>
           </a:p>
@@ -8232,12 +9024,66 @@
       </p:sp>
       <p:sp>
         <p:nvSpPr>
-          <p:cNvPr id="3" name="Content Placeholder 2"/>
-          <p:cNvSpPr>
-            <a:spLocks noGrp="1"/>
-          </p:cNvSpPr>
-          <p:nvPr>
-            <p:ph idx="1"/>
+          <p:cNvPr id="4" name="Content Placeholder 3"/>
+          <p:cNvSpPr>
+            <a:spLocks noGrp="1"/>
+          </p:cNvSpPr>
+          <p:nvPr>
+            <p:ph sz="half" idx="2"/>
+          </p:nvPr>
+        </p:nvSpPr>
+        <p:spPr/>
+        <p:txBody>
+          <a:bodyPr>
+            <a:normAutofit/>
+          </a:bodyPr>
+          <a:lstStyle/>
+          <a:p>
+            <a:r>
+              <a:rPr lang="en-US" dirty="0" smtClean="0"/>
+              <a:t>Restarting only the virtual hardware</a:t>
+            </a:r>
+          </a:p>
+          <a:p>
+            <a:pPr lvl="1"/>
+            <a:r>
+              <a:rPr lang="en-US" dirty="0" smtClean="0"/>
+              <a:t>Prevents physical hardware from restarting</a:t>
+            </a:r>
+          </a:p>
+          <a:p>
+            <a:r>
+              <a:rPr lang="en-US" dirty="0" smtClean="0"/>
+              <a:t>Emulating system shutdowns</a:t>
+            </a:r>
+          </a:p>
+          <a:p>
+            <a:pPr lvl="1"/>
+            <a:r>
+              <a:rPr lang="en-US" dirty="0" smtClean="0"/>
+              <a:t>Low-power state</a:t>
+            </a:r>
+          </a:p>
+          <a:p>
+            <a:pPr lvl="1"/>
+            <a:r>
+              <a:rPr lang="en-US" dirty="0" smtClean="0"/>
+              <a:t>VMBR lives inside the contents of RAM</a:t>
+            </a:r>
+          </a:p>
+          <a:p>
+            <a:endParaRPr lang="en-US" dirty="0"/>
+          </a:p>
+        </p:txBody>
+      </p:sp>
+      <p:sp>
+        <p:nvSpPr>
+          <p:cNvPr id="5" name="Text Placeholder 4"/>
+          <p:cNvSpPr>
+            <a:spLocks noGrp="1"/>
+          </p:cNvSpPr>
+          <p:nvPr>
+            <p:ph type="body" sz="quarter" idx="3"/>
           </p:nvPr>
         </p:nvSpPr>
         <p:spPr/>
@@ -8247,110 +9093,59 @@
           <a:p>
             <a:r>
               <a:rPr lang="en-US" dirty="0" smtClean="0"/>
-              <a:t>Two experimental VMBRs</a:t>
+              <a:t>Stealth</a:t>
             </a:r>
             <a:endParaRPr lang="en-US" dirty="0"/>
           </a:p>
+        </p:txBody>
+      </p:sp>
+      <p:sp>
+        <p:nvSpPr>
+          <p:cNvPr id="6" name="Content Placeholder 5"/>
+          <p:cNvSpPr>
+            <a:spLocks noGrp="1"/>
+          </p:cNvSpPr>
+          <p:nvPr>
+            <p:ph sz="quarter" idx="4"/>
+          </p:nvPr>
+        </p:nvSpPr>
+        <p:spPr/>
+        <p:txBody>
+          <a:bodyPr/>
+          <a:lstStyle/>
+          <a:p>
+            <a:r>
+              <a:rPr lang="en-US" dirty="0" smtClean="0"/>
+              <a:t>Manipulate antivirus code</a:t>
+            </a:r>
+          </a:p>
           <a:p>
             <a:pPr lvl="1"/>
             <a:r>
-              <a:rPr lang="en-US" dirty="0" err="1" smtClean="0"/>
-              <a:t>SubVirt</a:t>
-            </a:r>
-            <a:endParaRPr lang="en-US" dirty="0" smtClean="0"/>
-          </a:p>
-          <a:p>
-            <a:pPr lvl="2"/>
-            <a:r>
-              <a:rPr lang="en-US" dirty="0" smtClean="0"/>
-              <a:t>Created by Microsoft researches at University of Michigan</a:t>
-            </a:r>
-            <a:endParaRPr lang="en-US" dirty="0" smtClean="0"/>
-          </a:p>
-          <a:p>
-            <a:pPr lvl="2"/>
-            <a:r>
-              <a:rPr lang="en-US" dirty="0" smtClean="0"/>
-              <a:t>Adds another layer in between Host OS and Guest OS (VMM)</a:t>
-            </a:r>
-          </a:p>
-          <a:p>
-            <a:pPr lvl="2"/>
-            <a:r>
-              <a:rPr lang="en-US" dirty="0" smtClean="0"/>
-              <a:t>Targets x86 systems</a:t>
-            </a:r>
-            <a:endParaRPr lang="en-US" dirty="0" smtClean="0"/>
+              <a:rPr lang="en-US" dirty="0" smtClean="0"/>
+              <a:t>Deems antivirus completely useless</a:t>
+            </a:r>
+          </a:p>
+          <a:p>
+            <a:r>
+              <a:rPr lang="en-US" dirty="0" smtClean="0"/>
+              <a:t>Running behind the scenes</a:t>
+            </a:r>
           </a:p>
           <a:p>
             <a:pPr lvl="1"/>
             <a:r>
-              <a:rPr lang="en-US" dirty="0" err="1" smtClean="0"/>
-              <a:t>BluePill</a:t>
-            </a:r>
-            <a:endParaRPr lang="en-US" dirty="0" smtClean="0"/>
-          </a:p>
-          <a:p>
-            <a:pPr lvl="2"/>
-            <a:r>
-              <a:rPr lang="en-US" dirty="0" smtClean="0"/>
-              <a:t>Created by a Polish security </a:t>
-            </a:r>
-            <a:r>
-              <a:rPr lang="en-US" dirty="0"/>
-              <a:t>r</a:t>
-            </a:r>
-            <a:r>
-              <a:rPr lang="en-US" dirty="0" smtClean="0"/>
-              <a:t>esearcher Joanna </a:t>
-            </a:r>
-            <a:r>
-              <a:rPr lang="en-US" dirty="0" err="1" smtClean="0"/>
-              <a:t>Rutkowska</a:t>
-            </a:r>
-            <a:endParaRPr lang="en-US" dirty="0" smtClean="0"/>
-          </a:p>
-          <a:p>
-            <a:pPr lvl="2"/>
-            <a:r>
-              <a:rPr lang="en-US" dirty="0" smtClean="0"/>
-              <a:t>Code publicly known</a:t>
-            </a:r>
-          </a:p>
-          <a:p>
-            <a:pPr lvl="2"/>
-            <a:r>
-              <a:rPr lang="en-US" dirty="0" smtClean="0"/>
-              <a:t>Exploits AMD64 SVM (Secure Virtual Machine) extensions</a:t>
-            </a:r>
-          </a:p>
-          <a:p>
-            <a:pPr lvl="2"/>
-            <a:r>
-              <a:rPr lang="en-US" dirty="0" smtClean="0"/>
-              <a:t>Installs itself on the fly</a:t>
-            </a:r>
-          </a:p>
-          <a:p>
-            <a:pPr lvl="2"/>
-            <a:r>
-              <a:rPr lang="en-US" dirty="0" smtClean="0"/>
-              <a:t>Does not survive system reboot</a:t>
-            </a:r>
-          </a:p>
-          <a:p>
-            <a:pPr lvl="3"/>
-            <a:r>
-              <a:rPr lang="en-US" dirty="0" smtClean="0"/>
-              <a:t>Still effective because servers are rarely restarted anyways</a:t>
-            </a:r>
+              <a:rPr lang="en-US" dirty="0" smtClean="0"/>
+              <a:t>Running undetected by the humans and OS alike</a:t>
+            </a:r>
+            <a:endParaRPr lang="en-US" dirty="0"/>
           </a:p>
         </p:txBody>
       </p:sp>
     </p:spTree>
     <p:extLst>
       <p:ext uri="{BB962C8B-B14F-4D97-AF65-F5344CB8AC3E}">
-        <p14:creationId xmlns:p14="http://schemas.microsoft.com/office/powerpoint/2010/main" val="2405789898"/>
+        <p14:creationId xmlns:p14="http://schemas.microsoft.com/office/powerpoint/2010/main" val="1249372831"/>
       </p:ext>
     </p:extLst>
   </p:cSld>
@@ -8401,7 +9196,7 @@
           <a:p>
             <a:r>
               <a:rPr lang="en-US" dirty="0" smtClean="0"/>
-              <a:t>Methods of Defense</a:t>
+              <a:t>Existing Rootkits</a:t>
             </a:r>
             <a:endParaRPr lang="en-US" dirty="0"/>
           </a:p>
@@ -8424,36 +9219,108 @@
           <a:p>
             <a:r>
               <a:rPr lang="en-US" dirty="0" smtClean="0"/>
-              <a:t>Two Ways:</a:t>
-            </a:r>
-          </a:p>
-          <a:p>
+              <a:t>Two experimental VMBRs</a:t>
+            </a:r>
+            <a:endParaRPr lang="en-US" dirty="0"/>
+          </a:p>
+          <a:p>
+            <a:pPr lvl="1"/>
+            <a:r>
+              <a:rPr lang="en-US" dirty="0" err="1" smtClean="0"/>
+              <a:t>SubVirt</a:t>
+            </a:r>
             <a:endParaRPr lang="en-US" dirty="0" smtClean="0"/>
           </a:p>
           <a:p>
+            <a:pPr lvl="2"/>
+            <a:r>
+              <a:rPr lang="en-US" dirty="0" smtClean="0"/>
+              <a:t>Created by Microsoft researches at University of Michigan</a:t>
+            </a:r>
+          </a:p>
+          <a:p>
+            <a:pPr lvl="2"/>
+            <a:r>
+              <a:rPr lang="en-US" dirty="0" smtClean="0"/>
+              <a:t>Adds another layer in between Host OS and Guest OS (VMM)</a:t>
+            </a:r>
+          </a:p>
+          <a:p>
+            <a:pPr lvl="2"/>
+            <a:r>
+              <a:rPr lang="en-US" dirty="0" smtClean="0"/>
+              <a:t>Targets x86 systems</a:t>
+            </a:r>
+          </a:p>
+          <a:p>
             <a:pPr lvl="1"/>
             <a:r>
-              <a:rPr lang="en-US" dirty="0" smtClean="0"/>
-              <a:t>Security software below the VMBR</a:t>
-            </a:r>
-          </a:p>
-          <a:p>
-            <a:pPr lvl="1"/>
-            <a:r>
-              <a:rPr lang="en-US" dirty="0" smtClean="0"/>
-              <a:t>Security  software above the VMBR</a:t>
-            </a:r>
-          </a:p>
-          <a:p>
-            <a:pPr lvl="1"/>
-            <a:endParaRPr lang="en-US" dirty="0"/>
+              <a:rPr lang="en-US" dirty="0" err="1" smtClean="0"/>
+              <a:t>BluePill</a:t>
+            </a:r>
+            <a:endParaRPr lang="en-US" dirty="0" smtClean="0"/>
+          </a:p>
+          <a:p>
+            <a:pPr lvl="2"/>
+            <a:r>
+              <a:rPr lang="en-US" dirty="0" smtClean="0"/>
+              <a:t>Created by a Polish security </a:t>
+            </a:r>
+            <a:r>
+              <a:rPr lang="en-US" dirty="0"/>
+              <a:t>r</a:t>
+            </a:r>
+            <a:r>
+              <a:rPr lang="en-US" dirty="0" smtClean="0"/>
+              <a:t>esearcher Joanna </a:t>
+            </a:r>
+            <a:r>
+              <a:rPr lang="en-US" dirty="0" err="1" smtClean="0"/>
+              <a:t>Rutkowska</a:t>
+            </a:r>
+            <a:endParaRPr lang="en-US" dirty="0" smtClean="0"/>
+          </a:p>
+          <a:p>
+            <a:pPr lvl="2"/>
+            <a:r>
+              <a:rPr lang="en-US" dirty="0" smtClean="0"/>
+              <a:t>Code publicly known</a:t>
+            </a:r>
+          </a:p>
+          <a:p>
+            <a:pPr lvl="2"/>
+            <a:r>
+              <a:rPr lang="en-US" dirty="0" smtClean="0"/>
+              <a:t>Exploits AMD64 SVM (Secure Virtual Machine) extensions</a:t>
+            </a:r>
+          </a:p>
+          <a:p>
+            <a:pPr lvl="2"/>
+            <a:r>
+              <a:rPr lang="en-US" dirty="0" smtClean="0"/>
+              <a:t>Installs itself on the fly</a:t>
+            </a:r>
+          </a:p>
+          <a:p>
+            <a:pPr lvl="2"/>
+            <a:r>
+              <a:rPr lang="en-US" dirty="0" smtClean="0"/>
+              <a:t>Does not survive system reboot</a:t>
+            </a:r>
+          </a:p>
+          <a:p>
+            <a:pPr lvl="3"/>
+            <a:r>
+              <a:rPr lang="en-US" dirty="0" smtClean="0"/>
+              <a:t>Still effective because servers are rarely restarted anyways</a:t>
+            </a:r>
           </a:p>
         </p:txBody>
       </p:sp>
     </p:spTree>
     <p:extLst>
       <p:ext uri="{BB962C8B-B14F-4D97-AF65-F5344CB8AC3E}">
-        <p14:creationId xmlns:p14="http://schemas.microsoft.com/office/powerpoint/2010/main" val="19357863"/>
+        <p14:creationId xmlns:p14="http://schemas.microsoft.com/office/powerpoint/2010/main" val="2405789898"/>
       </p:ext>
     </p:extLst>
   </p:cSld>

</xml_diff>

<commit_message>
Updated new order of slides for presentation
</commit_message>
<xml_diff>
--- a/VMBR_Presentation.pptx
+++ b/VMBR_Presentation.pptx
@@ -12,11 +12,11 @@
     <p:sldId id="257" r:id="rId3"/>
     <p:sldId id="273" r:id="rId4"/>
     <p:sldId id="274" r:id="rId5"/>
-    <p:sldId id="259" r:id="rId6"/>
-    <p:sldId id="276" r:id="rId7"/>
-    <p:sldId id="262" r:id="rId8"/>
-    <p:sldId id="275" r:id="rId9"/>
-    <p:sldId id="264" r:id="rId10"/>
+    <p:sldId id="278" r:id="rId6"/>
+    <p:sldId id="277" r:id="rId7"/>
+    <p:sldId id="259" r:id="rId8"/>
+    <p:sldId id="276" r:id="rId9"/>
+    <p:sldId id="275" r:id="rId10"/>
     <p:sldId id="261" r:id="rId11"/>
     <p:sldId id="267" r:id="rId12"/>
     <p:sldId id="268" r:id="rId13"/>
@@ -211,7 +211,7 @@
             <a:fld id="{433E2ACD-1F68-4C8F-9506-7149504EC2F1}" type="datetimeFigureOut">
               <a:rPr lang="en-US" smtClean="0"/>
               <a:pPr/>
-              <a:t>4/22/2013</a:t>
+              <a:t>4/23/2013</a:t>
             </a:fld>
             <a:endParaRPr lang="en-US"/>
           </a:p>
@@ -1266,6 +1266,95 @@
 </p:notes>
 </file>
 
+<file path=ppt/notesSlides/notesSlide15.xml><?xml version="1.0" encoding="utf-8"?>
+<p:notes xmlns:a="http://schemas.openxmlformats.org/drawingml/2006/main" xmlns:r="http://schemas.openxmlformats.org/officeDocument/2006/relationships" xmlns:p="http://schemas.openxmlformats.org/presentationml/2006/main">
+  <p:cSld>
+    <p:spTree>
+      <p:nvGrpSpPr>
+        <p:cNvPr id="1" name=""/>
+        <p:cNvGrpSpPr/>
+        <p:nvPr/>
+      </p:nvGrpSpPr>
+      <p:grpSpPr>
+        <a:xfrm>
+          <a:off x="0" y="0"/>
+          <a:ext cx="0" cy="0"/>
+          <a:chOff x="0" y="0"/>
+          <a:chExt cx="0" cy="0"/>
+        </a:xfrm>
+      </p:grpSpPr>
+      <p:sp>
+        <p:nvSpPr>
+          <p:cNvPr id="2" name="Slide Image Placeholder 1"/>
+          <p:cNvSpPr>
+            <a:spLocks noGrp="1" noRot="1" noChangeAspect="1"/>
+          </p:cNvSpPr>
+          <p:nvPr>
+            <p:ph type="sldImg"/>
+          </p:nvPr>
+        </p:nvSpPr>
+        <p:spPr/>
+      </p:sp>
+      <p:sp>
+        <p:nvSpPr>
+          <p:cNvPr id="3" name="Notes Placeholder 2"/>
+          <p:cNvSpPr>
+            <a:spLocks noGrp="1"/>
+          </p:cNvSpPr>
+          <p:nvPr>
+            <p:ph type="body" idx="1"/>
+          </p:nvPr>
+        </p:nvSpPr>
+        <p:spPr/>
+        <p:txBody>
+          <a:bodyPr/>
+          <a:lstStyle/>
+          <a:p>
+            <a:r>
+              <a:rPr lang="en-US" dirty="0" smtClean="0"/>
+              <a:t>Mike</a:t>
+            </a:r>
+            <a:endParaRPr lang="en-US" dirty="0"/>
+          </a:p>
+        </p:txBody>
+      </p:sp>
+      <p:sp>
+        <p:nvSpPr>
+          <p:cNvPr id="4" name="Slide Number Placeholder 3"/>
+          <p:cNvSpPr>
+            <a:spLocks noGrp="1"/>
+          </p:cNvSpPr>
+          <p:nvPr>
+            <p:ph type="sldNum" sz="quarter" idx="10"/>
+          </p:nvPr>
+        </p:nvSpPr>
+        <p:spPr/>
+        <p:txBody>
+          <a:bodyPr/>
+          <a:lstStyle/>
+          <a:p>
+            <a:fld id="{72141A60-0A97-4B4C-A98B-2EDC5A7E8FE4}" type="slidenum">
+              <a:rPr lang="en-US" smtClean="0"/>
+              <a:pPr/>
+              <a:t>19</a:t>
+            </a:fld>
+            <a:endParaRPr lang="en-US"/>
+          </a:p>
+        </p:txBody>
+      </p:sp>
+    </p:spTree>
+    <p:extLst>
+      <p:ext uri="{BB962C8B-B14F-4D97-AF65-F5344CB8AC3E}">
+        <p14:creationId xmlns:p14="http://schemas.microsoft.com/office/powerpoint/2010/main" val="2089592773"/>
+      </p:ext>
+    </p:extLst>
+  </p:cSld>
+  <p:clrMapOvr>
+    <a:masterClrMapping/>
+  </p:clrMapOvr>
+</p:notes>
+</file>
+
 <file path=ppt/notesSlides/notesSlide2.xml><?xml version="1.0" encoding="utf-8"?>
 <p:notes xmlns:a="http://schemas.openxmlformats.org/drawingml/2006/main" xmlns:r="http://schemas.openxmlformats.org/officeDocument/2006/relationships" xmlns:p="http://schemas.openxmlformats.org/presentationml/2006/main">
   <p:cSld>
@@ -1483,6 +1572,198 @@
               <a:rPr lang="en-US" dirty="0" smtClean="0"/>
               <a:t>Mike</a:t>
             </a:r>
+          </a:p>
+          <a:p>
+            <a:r>
+              <a:rPr lang="en-US" sz="1200" kern="1200" dirty="0" smtClean="0">
+                <a:solidFill>
+                  <a:schemeClr val="tx1"/>
+                </a:solidFill>
+                <a:effectLst/>
+                <a:latin typeface="+mn-lt"/>
+                <a:ea typeface="+mn-ea"/>
+                <a:cs typeface="+mn-cs"/>
+              </a:rPr>
+              <a:t>A</a:t>
+            </a:r>
+            <a:r>
+              <a:rPr lang="x-none" sz="1200" kern="1200" smtClean="0">
+                <a:solidFill>
+                  <a:schemeClr val="tx1"/>
+                </a:solidFill>
+                <a:effectLst/>
+                <a:latin typeface="+mn-lt"/>
+                <a:ea typeface="+mn-ea"/>
+                <a:cs typeface="+mn-cs"/>
+              </a:rPr>
+              <a:t> virtual machine </a:t>
+            </a:r>
+            <a:r>
+              <a:rPr lang="en-US" sz="1200" kern="1200" dirty="0" smtClean="0">
+                <a:solidFill>
+                  <a:schemeClr val="tx1"/>
+                </a:solidFill>
+                <a:effectLst/>
+                <a:latin typeface="+mn-lt"/>
+                <a:ea typeface="+mn-ea"/>
+                <a:cs typeface="+mn-cs"/>
+              </a:rPr>
+              <a:t>(VM) </a:t>
+            </a:r>
+            <a:r>
+              <a:rPr lang="x-none" sz="1200" kern="1200" smtClean="0">
+                <a:solidFill>
+                  <a:schemeClr val="tx1"/>
+                </a:solidFill>
+                <a:effectLst/>
+                <a:latin typeface="+mn-lt"/>
+                <a:ea typeface="+mn-ea"/>
+                <a:cs typeface="+mn-cs"/>
+              </a:rPr>
+              <a:t>creates a completely isolated operating system on one computer that will execute programs just like a physical computer. </a:t>
+            </a:r>
+            <a:r>
+              <a:rPr lang="en-US" sz="1200" kern="1200" dirty="0" smtClean="0">
+                <a:solidFill>
+                  <a:schemeClr val="tx1"/>
+                </a:solidFill>
+                <a:effectLst/>
+                <a:latin typeface="+mn-lt"/>
+                <a:ea typeface="+mn-ea"/>
+                <a:cs typeface="+mn-cs"/>
+              </a:rPr>
+              <a:t>Virtual machines were designed to satisfy the want and need to have multiple operating systems on one computer. This technology provided savings in not only money, but also time as well.</a:t>
+            </a:r>
+          </a:p>
+          <a:p>
+            <a:r>
+              <a:rPr lang="en-US" sz="1200" kern="1200" dirty="0" smtClean="0">
+                <a:solidFill>
+                  <a:schemeClr val="tx1"/>
+                </a:solidFill>
+                <a:effectLst/>
+                <a:latin typeface="+mn-lt"/>
+                <a:ea typeface="+mn-ea"/>
+                <a:cs typeface="+mn-cs"/>
+              </a:rPr>
+              <a:t>VMs can be categorized into two different types: emulated VMs and virtualized VMs. The following section will compare and contrast the two different types of virtual machines.</a:t>
+            </a:r>
+          </a:p>
+          <a:p>
+            <a:endParaRPr lang="en-US" sz="1200" kern="1200" dirty="0" smtClean="0">
+              <a:solidFill>
+                <a:schemeClr val="tx1"/>
+              </a:solidFill>
+              <a:effectLst/>
+              <a:latin typeface="+mn-lt"/>
+              <a:ea typeface="+mn-ea"/>
+              <a:cs typeface="+mn-cs"/>
+            </a:endParaRPr>
+          </a:p>
+          <a:p>
+            <a:pPr lvl="1" fontAlgn="base"/>
+            <a:r>
+              <a:rPr lang="en-US" sz="1200" b="1" i="1" u="none" strike="noStrike" kern="1200" dirty="0" smtClean="0">
+                <a:solidFill>
+                  <a:schemeClr val="tx1"/>
+                </a:solidFill>
+                <a:effectLst/>
+                <a:latin typeface="+mn-lt"/>
+                <a:ea typeface="+mn-ea"/>
+                <a:cs typeface="+mn-cs"/>
+              </a:rPr>
+              <a:t>Emulated VMs</a:t>
+            </a:r>
+            <a:endParaRPr lang="en-US" sz="1200" kern="1200" dirty="0" smtClean="0">
+              <a:solidFill>
+                <a:schemeClr val="tx1"/>
+              </a:solidFill>
+              <a:effectLst/>
+              <a:latin typeface="+mn-lt"/>
+              <a:ea typeface="+mn-ea"/>
+              <a:cs typeface="+mn-cs"/>
+            </a:endParaRPr>
+          </a:p>
+          <a:p>
+            <a:pPr lvl="1" fontAlgn="base"/>
+            <a:r>
+              <a:rPr lang="en-US" dirty="0" smtClean="0">
+                <a:effectLst/>
+              </a:rPr>
+              <a:t>An emulated VM, also known as a system virtual machine, is the second of the two types of VMs. This type of VM provides a better separation between the guest OS and the host OS, which allows for multiple </a:t>
+            </a:r>
+            <a:r>
+              <a:rPr lang="en-US" dirty="0" err="1" smtClean="0">
+                <a:effectLst/>
+              </a:rPr>
+              <a:t>OSes</a:t>
+            </a:r>
+            <a:r>
+              <a:rPr lang="en-US" dirty="0" smtClean="0">
+                <a:effectLst/>
+              </a:rPr>
+              <a:t> to coexist on the same host computer. This separation provides a layer of indirection and translation that allows for the host to provide a type of chipset. Although this layer of indirection helps separate the VM from the hardware of the host, it is significantly slower than a virtualized VM. </a:t>
+            </a:r>
+          </a:p>
+          <a:p>
+            <a:pPr lvl="1" fontAlgn="base"/>
+            <a:endParaRPr lang="en-US" sz="1000" b="1" i="1" u="none" strike="noStrike" kern="1200" dirty="0" smtClean="0">
+              <a:solidFill>
+                <a:schemeClr val="tx1"/>
+              </a:solidFill>
+              <a:effectLst/>
+              <a:latin typeface="+mn-lt"/>
+              <a:ea typeface="+mn-ea"/>
+              <a:cs typeface="+mn-cs"/>
+            </a:endParaRPr>
+          </a:p>
+          <a:p>
+            <a:pPr lvl="1" fontAlgn="base"/>
+            <a:r>
+              <a:rPr lang="en-US" sz="1000" b="1" i="1" u="none" strike="noStrike" kern="1200" dirty="0" smtClean="0">
+                <a:solidFill>
+                  <a:schemeClr val="tx1"/>
+                </a:solidFill>
+                <a:effectLst/>
+                <a:latin typeface="+mn-lt"/>
+                <a:ea typeface="+mn-ea"/>
+                <a:cs typeface="+mn-cs"/>
+              </a:rPr>
+              <a:t>Virtualized VMs</a:t>
+            </a:r>
+          </a:p>
+          <a:p>
+            <a:pPr lvl="1"/>
+            <a:r>
+              <a:rPr lang="en-US" sz="1200" kern="1200" dirty="0" smtClean="0">
+                <a:solidFill>
+                  <a:schemeClr val="tx1"/>
+                </a:solidFill>
+                <a:effectLst/>
+                <a:latin typeface="+mn-lt"/>
+                <a:ea typeface="+mn-ea"/>
+                <a:cs typeface="+mn-cs"/>
+              </a:rPr>
+              <a:t>A virtualized VM, also known as a process virtual machine, is the faster of the two VMs. This is mainly due to the fact that the virtualized VM uses the same hardware as the host computer. There is one catch. The virtual machine’s hardware requirements must match the host’s provided set of chips.</a:t>
+            </a:r>
+          </a:p>
+          <a:p>
+            <a:pPr lvl="1"/>
+            <a:r>
+              <a:rPr lang="en-US" sz="1200" kern="1200" dirty="0" smtClean="0">
+                <a:solidFill>
+                  <a:schemeClr val="tx1"/>
+                </a:solidFill>
+                <a:effectLst/>
+                <a:latin typeface="+mn-lt"/>
+                <a:ea typeface="+mn-ea"/>
+                <a:cs typeface="+mn-cs"/>
+              </a:rPr>
+              <a:t>A virtualized VM is installed as an application on the host computer that only supports a single process. Just like any other program, the process is created on start up and destroyed upon exiting the VM application.</a:t>
+            </a:r>
+          </a:p>
+          <a:p>
+            <a:pPr lvl="1"/>
             <a:endParaRPr lang="en-US" dirty="0"/>
           </a:p>
         </p:txBody>
@@ -1572,6 +1853,9 @@
               <a:t>Mike</a:t>
             </a:r>
           </a:p>
+          <a:p>
+            <a:endParaRPr lang="en-US" dirty="0" smtClean="0"/>
+          </a:p>
         </p:txBody>
       </p:sp>
       <p:sp>
@@ -1656,7 +1940,122 @@
           <a:p>
             <a:r>
               <a:rPr lang="en-US" dirty="0" smtClean="0"/>
-              <a:t>1. Obtain root privileges: via </a:t>
+              <a:t>A rootkit could technically be</a:t>
+            </a:r>
+            <a:r>
+              <a:rPr lang="en-US" baseline="0" dirty="0" smtClean="0"/>
+              <a:t> installed and do/cause no harm, but it is typically bundled with some sort of malware.</a:t>
+            </a:r>
+          </a:p>
+          <a:p>
+            <a:endParaRPr lang="en-US" baseline="0" dirty="0" smtClean="0"/>
+          </a:p>
+          <a:p>
+            <a:r>
+              <a:rPr lang="en-US" baseline="0" dirty="0" smtClean="0"/>
+              <a:t>There are three forms of attack:</a:t>
+            </a:r>
+          </a:p>
+          <a:p>
+            <a:pPr marL="228600" indent="-228600">
+              <a:buAutoNum type="arabicPeriod"/>
+            </a:pPr>
+            <a:r>
+              <a:rPr lang="en-US" baseline="0" dirty="0" smtClean="0"/>
+              <a:t>No interaction with the target system</a:t>
+            </a:r>
+          </a:p>
+          <a:p>
+            <a:pPr marL="628650" lvl="1" indent="-171450">
+              <a:buFontTx/>
+              <a:buChar char="-"/>
+            </a:pPr>
+            <a:r>
+              <a:rPr lang="en-US" baseline="0" dirty="0" smtClean="0"/>
+              <a:t>In this case the malicious services are carried out on a separate OS and ideally the target OS sees nothing</a:t>
+            </a:r>
+          </a:p>
+          <a:p>
+            <a:pPr marL="228600" lvl="0" indent="-228600">
+              <a:buFontTx/>
+              <a:buAutoNum type="arabicPeriod" startAt="2"/>
+            </a:pPr>
+            <a:r>
+              <a:rPr lang="en-US" baseline="0" dirty="0" smtClean="0"/>
+              <a:t>Target system observers </a:t>
+            </a:r>
+          </a:p>
+          <a:p>
+            <a:pPr marL="457200" lvl="1" indent="0">
+              <a:buFontTx/>
+              <a:buNone/>
+            </a:pPr>
+            <a:r>
+              <a:rPr lang="en-US" baseline="0" dirty="0" smtClean="0"/>
+              <a:t>-  Logging of hardware-level data</a:t>
+            </a:r>
+          </a:p>
+          <a:p>
+            <a:pPr marL="628650" lvl="1" indent="-171450">
+              <a:buFontTx/>
+              <a:buChar char="-"/>
+            </a:pPr>
+            <a:r>
+              <a:rPr lang="en-US" baseline="0" dirty="0" smtClean="0"/>
+              <a:t>Introspection: </a:t>
+            </a:r>
+          </a:p>
+          <a:p>
+            <a:pPr marL="1085850" marR="0" lvl="2" indent="-171450" algn="l" defTabSz="914400" rtl="0" eaLnBrk="1" fontAlgn="auto" latinLnBrk="0" hangingPunct="1">
+              <a:lnSpc>
+                <a:spcPct val="100000"/>
+              </a:lnSpc>
+              <a:spcBef>
+                <a:spcPts val="0"/>
+              </a:spcBef>
+              <a:spcAft>
+                <a:spcPts val="0"/>
+              </a:spcAft>
+              <a:buClrTx/>
+              <a:buSzTx/>
+              <a:buFontTx/>
+              <a:buChar char="-"/>
+              <a:tabLst/>
+              <a:defRPr/>
+            </a:pPr>
+            <a:r>
+              <a:rPr lang="en-US" sz="1200" b="0" i="0" u="none" strike="noStrike" kern="1200" baseline="0" dirty="0" smtClean="0">
+                <a:solidFill>
+                  <a:schemeClr val="tx1"/>
+                </a:solidFill>
+                <a:latin typeface="+mn-lt"/>
+                <a:ea typeface="+mn-ea"/>
+                <a:cs typeface="+mn-cs"/>
+              </a:rPr>
+              <a:t>techniques that enable VM service to understand and modify states and events within a guest</a:t>
+            </a:r>
+            <a:endParaRPr lang="en-US" baseline="0" dirty="0" smtClean="0"/>
+          </a:p>
+          <a:p>
+            <a:pPr marL="1085850" lvl="2" indent="-171450">
+              <a:buFontTx/>
+              <a:buChar char="-"/>
+            </a:pPr>
+            <a:r>
+              <a:rPr lang="en-US" baseline="0" dirty="0" smtClean="0"/>
+              <a:t>Normally used to increase security for VM users by closely monitoring the VM. But </a:t>
+            </a:r>
+            <a:r>
+              <a:rPr lang="en-US" sz="1200" kern="1200" baseline="0" dirty="0" smtClean="0">
+                <a:solidFill>
+                  <a:schemeClr val="tx1"/>
+                </a:solidFill>
+                <a:effectLst/>
+                <a:latin typeface="+mn-lt"/>
+                <a:ea typeface="+mn-ea"/>
+                <a:cs typeface="+mn-cs"/>
+              </a:rPr>
+              <a:t>M</a:t>
             </a:r>
             <a:r>
               <a:rPr lang="en-US" sz="1200" kern="1200" dirty="0" smtClean="0">
@@ -1668,132 +2067,39 @@
                 <a:ea typeface="+mn-ea"/>
                 <a:cs typeface="+mn-cs"/>
               </a:rPr>
-              <a:t>exploit a remote vulnerability, boot from a bad CD-ROM/DVD, malicious software installed with root privileges. </a:t>
-            </a:r>
-          </a:p>
-          <a:p>
-            <a:r>
-              <a:rPr lang="en-US" sz="1200" kern="1200" dirty="0" smtClean="0">
-                <a:solidFill>
-                  <a:schemeClr val="tx1"/>
-                </a:solidFill>
-                <a:effectLst/>
-                <a:latin typeface="+mn-lt"/>
-                <a:ea typeface="+mn-ea"/>
-                <a:cs typeface="+mn-cs"/>
-              </a:rPr>
-              <a:t>	Corrupt vendors could also sell this kind of information or exploit it themselves after selling the hardware to customers. </a:t>
-            </a:r>
-          </a:p>
-          <a:p>
-            <a:r>
-              <a:rPr lang="en-US" sz="1200" kern="1200" dirty="0" smtClean="0">
-                <a:solidFill>
-                  <a:schemeClr val="tx1"/>
-                </a:solidFill>
-                <a:effectLst/>
-                <a:latin typeface="+mn-lt"/>
-                <a:ea typeface="+mn-ea"/>
-                <a:cs typeface="+mn-cs"/>
-              </a:rPr>
-              <a:t>2.</a:t>
-            </a:r>
-            <a:r>
-              <a:rPr lang="en-US" sz="1200" kern="1200" baseline="0" dirty="0" smtClean="0">
-                <a:solidFill>
-                  <a:schemeClr val="tx1"/>
-                </a:solidFill>
-                <a:effectLst/>
-                <a:latin typeface="+mn-lt"/>
-                <a:ea typeface="+mn-ea"/>
-                <a:cs typeface="+mn-cs"/>
-              </a:rPr>
-              <a:t> Install via root privileges</a:t>
-            </a:r>
-          </a:p>
-          <a:p>
-            <a:r>
-              <a:rPr lang="en-US" sz="1200" kern="1200" baseline="0" dirty="0" smtClean="0">
-                <a:solidFill>
-                  <a:schemeClr val="tx1"/>
-                </a:solidFill>
-                <a:effectLst/>
-                <a:latin typeface="+mn-lt"/>
-                <a:ea typeface="+mn-ea"/>
-                <a:cs typeface="+mn-cs"/>
-              </a:rPr>
-              <a:t>3. Modify boot records in final stages of shutdown</a:t>
-            </a:r>
-          </a:p>
-          <a:p>
-            <a:r>
-              <a:rPr lang="en-US" sz="1200" kern="1200" baseline="0" dirty="0" smtClean="0">
-                <a:solidFill>
-                  <a:schemeClr val="tx1"/>
-                </a:solidFill>
-                <a:effectLst/>
-                <a:latin typeface="+mn-lt"/>
-                <a:ea typeface="+mn-ea"/>
-                <a:cs typeface="+mn-cs"/>
-              </a:rPr>
-              <a:t>	This is done here because anti-malware applications will have already been shut down and the VMBR can bypass those protections</a:t>
-            </a:r>
-          </a:p>
-          <a:p>
-            <a:r>
-              <a:rPr lang="en-US" sz="1200" kern="1200" baseline="0" dirty="0" smtClean="0">
-                <a:solidFill>
-                  <a:schemeClr val="tx1"/>
-                </a:solidFill>
-                <a:effectLst/>
-                <a:latin typeface="+mn-lt"/>
-                <a:ea typeface="+mn-ea"/>
-                <a:cs typeface="+mn-cs"/>
-              </a:rPr>
-              <a:t>4. Target System hoisted into VMM</a:t>
-            </a:r>
-          </a:p>
-          <a:p>
-            <a:r>
-              <a:rPr lang="en-US" sz="1200" kern="1200" baseline="0" dirty="0" smtClean="0">
-                <a:solidFill>
-                  <a:schemeClr val="tx1"/>
-                </a:solidFill>
-                <a:effectLst/>
-                <a:latin typeface="+mn-lt"/>
-                <a:ea typeface="+mn-ea"/>
-                <a:cs typeface="+mn-cs"/>
-              </a:rPr>
-              <a:t>	The VMBR puts the Target systems disk space in a virtual disk and translates the addresses to the actual physical disk at runtime</a:t>
-            </a:r>
-          </a:p>
-          <a:p>
-            <a:r>
-              <a:rPr lang="en-US" sz="1200" kern="1200" baseline="0" dirty="0" smtClean="0">
-                <a:solidFill>
-                  <a:schemeClr val="tx1"/>
-                </a:solidFill>
-                <a:effectLst/>
-                <a:latin typeface="+mn-lt"/>
-                <a:ea typeface="+mn-ea"/>
-                <a:cs typeface="+mn-cs"/>
-              </a:rPr>
-              <a:t>	</a:t>
-            </a:r>
-            <a:r>
-              <a:rPr lang="en-US" sz="1200" kern="1200" baseline="0" dirty="0" smtClean="0">
-                <a:solidFill>
-                  <a:schemeClr val="tx1"/>
-                </a:solidFill>
-                <a:effectLst/>
-                <a:latin typeface="+mn-lt"/>
-                <a:ea typeface="+mn-ea"/>
-                <a:cs typeface="+mn-cs"/>
-                <a:sym typeface="Wingdings" pitchFamily="2" charset="2"/>
-              </a:rPr>
-              <a:t>Rootkit has control of the system</a:t>
-            </a:r>
-            <a:endParaRPr lang="en-US" dirty="0"/>
+              <a:t>alicious services can use it to reconstruct the data and abstractions from the target system when a VMBR is in control</a:t>
+            </a:r>
+            <a:endParaRPr lang="en-US" baseline="0" dirty="0" smtClean="0"/>
+          </a:p>
+          <a:p>
+            <a:pPr marL="228600" lvl="0" indent="-228600">
+              <a:buFontTx/>
+              <a:buAutoNum type="arabicPeriod" startAt="2"/>
+            </a:pPr>
+            <a:r>
+              <a:rPr lang="en-US" baseline="0" dirty="0" smtClean="0"/>
+              <a:t>Target system modifiers</a:t>
+            </a:r>
+          </a:p>
+          <a:p>
+            <a:pPr marL="628650" lvl="1" indent="-171450">
+              <a:buFontTx/>
+              <a:buChar char="-"/>
+            </a:pPr>
+            <a:r>
+              <a:rPr lang="en-US" baseline="0" dirty="0" smtClean="0"/>
+              <a:t>Network communication, tampering with emails etc.</a:t>
+            </a:r>
+          </a:p>
+          <a:p>
+            <a:pPr marL="628650" lvl="1" indent="-171450">
+              <a:buFontTx/>
+              <a:buChar char="-"/>
+            </a:pPr>
+            <a:r>
+              <a:rPr lang="en-US" baseline="0" dirty="0" smtClean="0"/>
+              <a:t>Introspection can also be used to modify the guest OS</a:t>
+            </a:r>
           </a:p>
         </p:txBody>
       </p:sp>
@@ -1824,7 +2130,7 @@
     </p:spTree>
     <p:extLst>
       <p:ext uri="{BB962C8B-B14F-4D97-AF65-F5344CB8AC3E}">
-        <p14:creationId xmlns:p14="http://schemas.microsoft.com/office/powerpoint/2010/main" val="2757083414"/>
+        <p14:creationId xmlns:p14="http://schemas.microsoft.com/office/powerpoint/2010/main" val="1153073892"/>
       </p:ext>
     </p:extLst>
   </p:cSld>
@@ -1880,11 +2186,7 @@
           <a:p>
             <a:r>
               <a:rPr lang="en-US" dirty="0" smtClean="0"/>
-              <a:t>Here there was no VM</a:t>
-            </a:r>
-            <a:r>
-              <a:rPr lang="en-US" baseline="0" dirty="0" smtClean="0"/>
-              <a:t> present before the installation. You can see how the VMM layer is installed directly on top of the hardware and the target OS is hoisted above it. This way the malicious services on the left are invisible to the target OS.</a:t>
+              <a:t>Mike</a:t>
             </a:r>
             <a:endParaRPr lang="en-US" dirty="0"/>
           </a:p>
@@ -1917,7 +2219,7 @@
     </p:spTree>
     <p:extLst>
       <p:ext uri="{BB962C8B-B14F-4D97-AF65-F5344CB8AC3E}">
-        <p14:creationId xmlns:p14="http://schemas.microsoft.com/office/powerpoint/2010/main" val="3659421481"/>
+        <p14:creationId xmlns:p14="http://schemas.microsoft.com/office/powerpoint/2010/main" val="2598429233"/>
       </p:ext>
     </p:extLst>
   </p:cSld>
@@ -1973,110 +2275,47 @@
           <a:p>
             <a:r>
               <a:rPr lang="en-US" dirty="0" smtClean="0"/>
-              <a:t>A rootkit could technically be</a:t>
-            </a:r>
-            <a:r>
-              <a:rPr lang="en-US" baseline="0" dirty="0" smtClean="0"/>
-              <a:t> installed and do/cause no harm, but it is typically bundled with some sort of malware.</a:t>
-            </a:r>
-          </a:p>
-          <a:p>
-            <a:endParaRPr lang="en-US" baseline="0" dirty="0" smtClean="0"/>
-          </a:p>
-          <a:p>
-            <a:r>
-              <a:rPr lang="en-US" baseline="0" dirty="0" smtClean="0"/>
-              <a:t>There are three forms of attack:</a:t>
-            </a:r>
-          </a:p>
-          <a:p>
-            <a:pPr marL="228600" indent="-228600">
-              <a:buAutoNum type="arabicPeriod"/>
-            </a:pPr>
-            <a:r>
-              <a:rPr lang="en-US" baseline="0" dirty="0" smtClean="0"/>
-              <a:t>No interaction with the target system</a:t>
-            </a:r>
-          </a:p>
-          <a:p>
-            <a:pPr marL="628650" lvl="1" indent="-171450">
-              <a:buFontTx/>
-              <a:buChar char="-"/>
-            </a:pPr>
-            <a:r>
-              <a:rPr lang="en-US" baseline="0" dirty="0" smtClean="0"/>
-              <a:t>In this case the malicious services are carried out on a separate OS and ideally the target OS sees nothing</a:t>
-            </a:r>
-          </a:p>
-          <a:p>
-            <a:pPr marL="228600" lvl="0" indent="-228600">
-              <a:buFontTx/>
-              <a:buAutoNum type="arabicPeriod" startAt="2"/>
-            </a:pPr>
-            <a:r>
-              <a:rPr lang="en-US" baseline="0" dirty="0" smtClean="0"/>
-              <a:t>Target system observers </a:t>
-            </a:r>
-          </a:p>
-          <a:p>
-            <a:pPr marL="457200" lvl="1" indent="0">
-              <a:buFontTx/>
-              <a:buNone/>
-            </a:pPr>
-            <a:r>
-              <a:rPr lang="en-US" baseline="0" dirty="0" smtClean="0"/>
-              <a:t>-  Logging of hardware-level data</a:t>
-            </a:r>
-          </a:p>
-          <a:p>
-            <a:pPr marL="628650" lvl="1" indent="-171450">
-              <a:buFontTx/>
-              <a:buChar char="-"/>
-            </a:pPr>
-            <a:r>
-              <a:rPr lang="en-US" baseline="0" dirty="0" smtClean="0"/>
-              <a:t>Introspection: </a:t>
-            </a:r>
-          </a:p>
-          <a:p>
-            <a:pPr marL="1085850" marR="0" lvl="2" indent="-171450" algn="l" defTabSz="914400" rtl="0" eaLnBrk="1" fontAlgn="auto" latinLnBrk="0" hangingPunct="1">
-              <a:lnSpc>
-                <a:spcPct val="100000"/>
-              </a:lnSpc>
-              <a:spcBef>
-                <a:spcPts val="0"/>
-              </a:spcBef>
-              <a:spcAft>
-                <a:spcPts val="0"/>
-              </a:spcAft>
-              <a:buClrTx/>
-              <a:buSzTx/>
-              <a:buFontTx/>
-              <a:buChar char="-"/>
-              <a:tabLst/>
-              <a:defRPr/>
-            </a:pPr>
-            <a:r>
-              <a:rPr lang="en-US" sz="1200" b="0" i="0" u="none" strike="noStrike" kern="1200" baseline="0" dirty="0" smtClean="0">
+              <a:t>1. Obtain root privileges: via </a:t>
+            </a:r>
+            <a:r>
+              <a:rPr lang="en-US" sz="1200" kern="1200" dirty="0" smtClean="0">
                 <a:solidFill>
                   <a:schemeClr val="tx1"/>
                 </a:solidFill>
+                <a:effectLst/>
                 <a:latin typeface="+mn-lt"/>
                 <a:ea typeface="+mn-ea"/>
                 <a:cs typeface="+mn-cs"/>
               </a:rPr>
-              <a:t>techniques that enable VM service to understand and modify states and events within a guest</a:t>
-            </a:r>
-            <a:endParaRPr lang="en-US" baseline="0" dirty="0" smtClean="0"/>
-          </a:p>
-          <a:p>
-            <a:pPr marL="1085850" lvl="2" indent="-171450">
-              <a:buFontTx/>
-              <a:buChar char="-"/>
-            </a:pPr>
-            <a:r>
-              <a:rPr lang="en-US" baseline="0" dirty="0" smtClean="0"/>
-              <a:t>Normally used to increase security for VM users by closely monitoring the VM. But </a:t>
+              <a:t>exploit a remote vulnerability, boot from a bad CD-ROM/DVD, malicious software installed with root privileges. </a:t>
+            </a:r>
+          </a:p>
+          <a:p>
+            <a:r>
+              <a:rPr lang="en-US" sz="1200" kern="1200" dirty="0" smtClean="0">
+                <a:solidFill>
+                  <a:schemeClr val="tx1"/>
+                </a:solidFill>
+                <a:effectLst/>
+                <a:latin typeface="+mn-lt"/>
+                <a:ea typeface="+mn-ea"/>
+                <a:cs typeface="+mn-cs"/>
+              </a:rPr>
+              <a:t>	Corrupt vendors could also sell this kind of information or exploit it themselves after selling the hardware to customers. </a:t>
+            </a:r>
+          </a:p>
+          <a:p>
+            <a:r>
+              <a:rPr lang="en-US" sz="1200" kern="1200" dirty="0" smtClean="0">
+                <a:solidFill>
+                  <a:schemeClr val="tx1"/>
+                </a:solidFill>
+                <a:effectLst/>
+                <a:latin typeface="+mn-lt"/>
+                <a:ea typeface="+mn-ea"/>
+                <a:cs typeface="+mn-cs"/>
+              </a:rPr>
+              <a:t>2.</a:t>
             </a:r>
             <a:r>
               <a:rPr lang="en-US" sz="1200" kern="1200" baseline="0" dirty="0" smtClean="0">
@@ -2088,10 +2327,12 @@
                 <a:ea typeface="+mn-ea"/>
                 <a:cs typeface="+mn-cs"/>
               </a:rPr>
-              <a:t>M</a:t>
-            </a:r>
-            <a:r>
-              <a:rPr lang="en-US" sz="1200" kern="1200" dirty="0" smtClean="0">
+              <a:t> Install via root privileges</a:t>
+            </a:r>
+          </a:p>
+          <a:p>
+            <a:r>
+              <a:rPr lang="en-US" sz="1200" kern="1200" baseline="0" dirty="0" smtClean="0">
                 <a:solidFill>
                   <a:schemeClr val="tx1"/>
                 </a:solidFill>
@@ -2100,39 +2341,78 @@
                 <a:ea typeface="+mn-ea"/>
                 <a:cs typeface="+mn-cs"/>
               </a:rPr>
-              <a:t>alicious services can use it to reconstruct the data and abstractions from the target system when a VMBR is in control</a:t>
-            </a:r>
-            <a:endParaRPr lang="en-US" baseline="0" dirty="0" smtClean="0"/>
-          </a:p>
-          <a:p>
-            <a:pPr marL="228600" lvl="0" indent="-228600">
-              <a:buFontTx/>
-              <a:buAutoNum type="arabicPeriod" startAt="2"/>
-            </a:pPr>
-            <a:r>
-              <a:rPr lang="en-US" baseline="0" dirty="0" smtClean="0"/>
-              <a:t>Target system modifiers</a:t>
-            </a:r>
-          </a:p>
-          <a:p>
-            <a:pPr marL="628650" lvl="1" indent="-171450">
-              <a:buFontTx/>
-              <a:buChar char="-"/>
-            </a:pPr>
-            <a:r>
-              <a:rPr lang="en-US" baseline="0" dirty="0" smtClean="0"/>
-              <a:t>Network communication, tampering with emails etc.</a:t>
-            </a:r>
-          </a:p>
-          <a:p>
-            <a:pPr marL="628650" lvl="1" indent="-171450">
-              <a:buFontTx/>
-              <a:buChar char="-"/>
-            </a:pPr>
-            <a:r>
-              <a:rPr lang="en-US" baseline="0" dirty="0" smtClean="0"/>
-              <a:t>Introspection can also be used to modify the guest OS</a:t>
-            </a:r>
+              <a:t>3. Modify boot records in final stages of shutdown</a:t>
+            </a:r>
+          </a:p>
+          <a:p>
+            <a:r>
+              <a:rPr lang="en-US" sz="1200" kern="1200" baseline="0" dirty="0" smtClean="0">
+                <a:solidFill>
+                  <a:schemeClr val="tx1"/>
+                </a:solidFill>
+                <a:effectLst/>
+                <a:latin typeface="+mn-lt"/>
+                <a:ea typeface="+mn-ea"/>
+                <a:cs typeface="+mn-cs"/>
+              </a:rPr>
+              <a:t>	This is done here because anti-malware applications will have already been shut down and the VMBR can bypass those protections</a:t>
+            </a:r>
+          </a:p>
+          <a:p>
+            <a:r>
+              <a:rPr lang="en-US" sz="1200" kern="1200" baseline="0" dirty="0" smtClean="0">
+                <a:solidFill>
+                  <a:schemeClr val="tx1"/>
+                </a:solidFill>
+                <a:effectLst/>
+                <a:latin typeface="+mn-lt"/>
+                <a:ea typeface="+mn-ea"/>
+                <a:cs typeface="+mn-cs"/>
+              </a:rPr>
+              <a:t>4. Target System hoisted into VMM</a:t>
+            </a:r>
+          </a:p>
+          <a:p>
+            <a:r>
+              <a:rPr lang="en-US" sz="1200" kern="1200" baseline="0" dirty="0" smtClean="0">
+                <a:solidFill>
+                  <a:schemeClr val="tx1"/>
+                </a:solidFill>
+                <a:effectLst/>
+                <a:latin typeface="+mn-lt"/>
+                <a:ea typeface="+mn-ea"/>
+                <a:cs typeface="+mn-cs"/>
+              </a:rPr>
+              <a:t>	The VMBR puts the Target systems disk space in a virtual disk and translates the addresses to the actual physical disk at runtime</a:t>
+            </a:r>
+          </a:p>
+          <a:p>
+            <a:r>
+              <a:rPr lang="en-US" sz="1200" kern="1200" baseline="0" dirty="0" smtClean="0">
+                <a:solidFill>
+                  <a:schemeClr val="tx1"/>
+                </a:solidFill>
+                <a:effectLst/>
+                <a:latin typeface="+mn-lt"/>
+                <a:ea typeface="+mn-ea"/>
+                <a:cs typeface="+mn-cs"/>
+              </a:rPr>
+              <a:t>	</a:t>
+            </a:r>
+            <a:r>
+              <a:rPr lang="en-US" sz="1200" kern="1200" baseline="0" dirty="0" smtClean="0">
+                <a:solidFill>
+                  <a:schemeClr val="tx1"/>
+                </a:solidFill>
+                <a:effectLst/>
+                <a:latin typeface="+mn-lt"/>
+                <a:ea typeface="+mn-ea"/>
+                <a:cs typeface="+mn-cs"/>
+                <a:sym typeface="Wingdings" pitchFamily="2" charset="2"/>
+              </a:rPr>
+              <a:t>Rootkit has control of the system</a:t>
+            </a:r>
+            <a:endParaRPr lang="en-US" dirty="0"/>
           </a:p>
         </p:txBody>
       </p:sp>
@@ -2163,7 +2443,7 @@
     </p:spTree>
     <p:extLst>
       <p:ext uri="{BB962C8B-B14F-4D97-AF65-F5344CB8AC3E}">
-        <p14:creationId xmlns:p14="http://schemas.microsoft.com/office/powerpoint/2010/main" val="1153073892"/>
+        <p14:creationId xmlns:p14="http://schemas.microsoft.com/office/powerpoint/2010/main" val="2757083414"/>
       </p:ext>
     </p:extLst>
   </p:cSld>
@@ -2219,7 +2499,11 @@
           <a:p>
             <a:r>
               <a:rPr lang="en-US" dirty="0" smtClean="0"/>
-              <a:t>Mike</a:t>
+              <a:t>Here there was no VM</a:t>
+            </a:r>
+            <a:r>
+              <a:rPr lang="en-US" baseline="0" dirty="0" smtClean="0"/>
+              <a:t> present before the installation. You can see how the VMM layer is installed directly on top of the hardware and the target OS is hoisted above it. This way the malicious services on the left are invisible to the target OS.</a:t>
             </a:r>
             <a:endParaRPr lang="en-US" dirty="0"/>
           </a:p>
@@ -2240,8 +2524,9 @@
           <a:bodyPr/>
           <a:lstStyle/>
           <a:p>
-            <a:fld id="{FC4DA58B-212D-4CB1-A82C-2E2734039AFF}" type="slidenum">
-              <a:rPr lang="en-US" smtClean="0"/>
+            <a:fld id="{72141A60-0A97-4B4C-A98B-2EDC5A7E8FE4}" type="slidenum">
+              <a:rPr lang="en-US" smtClean="0"/>
+              <a:pPr/>
               <a:t>8</a:t>
             </a:fld>
             <a:endParaRPr lang="en-US"/>
@@ -2251,7 +2536,7 @@
     </p:spTree>
     <p:extLst>
       <p:ext uri="{BB962C8B-B14F-4D97-AF65-F5344CB8AC3E}">
-        <p14:creationId xmlns:p14="http://schemas.microsoft.com/office/powerpoint/2010/main" val="2266588369"/>
+        <p14:creationId xmlns:p14="http://schemas.microsoft.com/office/powerpoint/2010/main" val="3659421481"/>
       </p:ext>
     </p:extLst>
   </p:cSld>
@@ -2309,6 +2594,169 @@
               <a:rPr lang="en-US" dirty="0" smtClean="0"/>
               <a:t>Mike</a:t>
             </a:r>
+          </a:p>
+          <a:p>
+            <a:r>
+              <a:rPr lang="en-US" dirty="0" smtClean="0"/>
+              <a:t>Control</a:t>
+            </a:r>
+          </a:p>
+          <a:p>
+            <a:r>
+              <a:rPr lang="en-US" sz="1200" kern="1200" dirty="0" smtClean="0">
+                <a:solidFill>
+                  <a:schemeClr val="tx1"/>
+                </a:solidFill>
+                <a:effectLst/>
+                <a:latin typeface="+mn-lt"/>
+                <a:ea typeface="+mn-ea"/>
+                <a:cs typeface="+mn-cs"/>
+              </a:rPr>
+              <a:t> </a:t>
+            </a:r>
+          </a:p>
+          <a:p>
+            <a:pPr lvl="0" fontAlgn="base"/>
+            <a:r>
+              <a:rPr lang="en-US" sz="1200" i="1" u="none" strike="noStrike" kern="1200" dirty="0" smtClean="0">
+                <a:solidFill>
+                  <a:schemeClr val="tx1"/>
+                </a:solidFill>
+                <a:effectLst/>
+                <a:latin typeface="+mn-lt"/>
+                <a:ea typeface="+mn-ea"/>
+                <a:cs typeface="+mn-cs"/>
+              </a:rPr>
+              <a:t>Restarting only the virtual hardware: </a:t>
+            </a:r>
+            <a:r>
+              <a:rPr lang="en-US" sz="1200" u="none" strike="noStrike" kern="1200" dirty="0" smtClean="0">
+                <a:solidFill>
+                  <a:schemeClr val="tx1"/>
+                </a:solidFill>
+                <a:effectLst/>
+                <a:latin typeface="+mn-lt"/>
+                <a:ea typeface="+mn-ea"/>
+                <a:cs typeface="+mn-cs"/>
+              </a:rPr>
+              <a:t>This approach is successful mainly because the VMBR prevents the physical hardware from restarting, which leaves the OS, BIOS, and other low-level process to stay in the same state. This then allows for any other process run after a virtual hardware shutdown to be controlled by the VMBR.</a:t>
+            </a:r>
+          </a:p>
+          <a:p>
+            <a:r>
+              <a:rPr lang="en-US" sz="1200" i="1" kern="1200" dirty="0" smtClean="0">
+                <a:solidFill>
+                  <a:schemeClr val="tx1"/>
+                </a:solidFill>
+                <a:effectLst/>
+                <a:latin typeface="+mn-lt"/>
+                <a:ea typeface="+mn-ea"/>
+                <a:cs typeface="+mn-cs"/>
+              </a:rPr>
+              <a:t> </a:t>
+            </a:r>
+            <a:endParaRPr lang="en-US" sz="1200" kern="1200" dirty="0" smtClean="0">
+              <a:solidFill>
+                <a:schemeClr val="tx1"/>
+              </a:solidFill>
+              <a:effectLst/>
+              <a:latin typeface="+mn-lt"/>
+              <a:ea typeface="+mn-ea"/>
+              <a:cs typeface="+mn-cs"/>
+            </a:endParaRPr>
+          </a:p>
+          <a:p>
+            <a:r>
+              <a:rPr lang="en-US" sz="1200" i="1" kern="1200" dirty="0" smtClean="0">
+                <a:solidFill>
+                  <a:schemeClr val="tx1"/>
+                </a:solidFill>
+                <a:effectLst/>
+                <a:latin typeface="+mn-lt"/>
+                <a:ea typeface="+mn-ea"/>
+                <a:cs typeface="+mn-cs"/>
+              </a:rPr>
+              <a:t>Emulate system shutdowns:</a:t>
+            </a:r>
+            <a:r>
+              <a:rPr lang="en-US" sz="1200" kern="1200" dirty="0" smtClean="0">
+                <a:solidFill>
+                  <a:schemeClr val="tx1"/>
+                </a:solidFill>
+                <a:effectLst/>
+                <a:latin typeface="+mn-lt"/>
+                <a:ea typeface="+mn-ea"/>
+                <a:cs typeface="+mn-cs"/>
+              </a:rPr>
+              <a:t> This type of mitigation occurs when the VMBR emulates what appears to be a system shutdown to a user. What really happens is the system is merely put into a low-power state, similar to a hibernate option instead of shut down. This type of power mode turns off almost all of the computer’s systems, including the hard drive disks, fans, LEDs (may vary per system), graphics cards, and other higher level systems. This allows the VMBR to live in the confinements of RAM, which still have power, where it is safe from this type of power mode. This means that the VMBR does not surrender its control of the system. When the system is then “started up”, the VMBR picks up right where it was left off. This way, any other type of process run upon boot up will run under the control of the VMBR.</a:t>
+            </a:r>
+          </a:p>
+          <a:p>
+            <a:endParaRPr lang="en-US" sz="1200" kern="1200" dirty="0" smtClean="0">
+              <a:solidFill>
+                <a:schemeClr val="tx1"/>
+              </a:solidFill>
+              <a:effectLst/>
+              <a:latin typeface="+mn-lt"/>
+              <a:ea typeface="+mn-ea"/>
+              <a:cs typeface="+mn-cs"/>
+            </a:endParaRPr>
+          </a:p>
+          <a:p>
+            <a:r>
+              <a:rPr lang="en-US" sz="1200" kern="1200" dirty="0" smtClean="0">
+                <a:solidFill>
+                  <a:schemeClr val="tx1"/>
+                </a:solidFill>
+                <a:effectLst/>
+                <a:latin typeface="+mn-lt"/>
+                <a:ea typeface="+mn-ea"/>
+                <a:cs typeface="+mn-cs"/>
+              </a:rPr>
+              <a:t>Stealth</a:t>
+            </a:r>
+          </a:p>
+          <a:p>
+            <a:pPr marL="0" marR="0" indent="0" algn="l" defTabSz="914400" rtl="0" eaLnBrk="1" fontAlgn="auto" latinLnBrk="0" hangingPunct="1">
+              <a:lnSpc>
+                <a:spcPct val="100000"/>
+              </a:lnSpc>
+              <a:spcBef>
+                <a:spcPts val="0"/>
+              </a:spcBef>
+              <a:spcAft>
+                <a:spcPts val="0"/>
+              </a:spcAft>
+              <a:buClrTx/>
+              <a:buSzTx/>
+              <a:buFontTx/>
+              <a:buNone/>
+              <a:tabLst/>
+              <a:defRPr/>
+            </a:pPr>
+            <a:r>
+              <a:rPr lang="x-none" sz="1200" kern="1200" smtClean="0">
+                <a:solidFill>
+                  <a:schemeClr val="tx1"/>
+                </a:solidFill>
+                <a:effectLst/>
+                <a:latin typeface="+mn-lt"/>
+                <a:ea typeface="+mn-ea"/>
+                <a:cs typeface="+mn-cs"/>
+              </a:rPr>
+              <a:t>One main attributes of a rootkit is to have the ability to not be detected by either human or OS. There have been cases where a rootkit actually manipulated an antivirus’ code so that it left the antivirus useless. This is what makes a rootkit so dangerous and so persistent. By allowing the rootkit to go undetected and granting itself root access, the rootkit may do whatever it pleases. This type of control is more difficult in a virtual machine environment, but rootkits have adapted.</a:t>
+            </a:r>
+            <a:endParaRPr lang="en-US" sz="1200" kern="1200" dirty="0" smtClean="0">
+              <a:solidFill>
+                <a:schemeClr val="tx1"/>
+              </a:solidFill>
+              <a:effectLst/>
+              <a:latin typeface="+mn-lt"/>
+              <a:ea typeface="+mn-ea"/>
+              <a:cs typeface="+mn-cs"/>
+            </a:endParaRPr>
+          </a:p>
+          <a:p>
             <a:endParaRPr lang="en-US" dirty="0"/>
           </a:p>
         </p:txBody>
@@ -2328,9 +2776,8 @@
           <a:bodyPr/>
           <a:lstStyle/>
           <a:p>
-            <a:fld id="{72141A60-0A97-4B4C-A98B-2EDC5A7E8FE4}" type="slidenum">
-              <a:rPr lang="en-US" smtClean="0"/>
-              <a:pPr/>
+            <a:fld id="{FC4DA58B-212D-4CB1-A82C-2E2734039AFF}" type="slidenum">
+              <a:rPr lang="en-US" smtClean="0"/>
               <a:t>9</a:t>
             </a:fld>
             <a:endParaRPr lang="en-US"/>
@@ -2340,7 +2787,7 @@
     </p:spTree>
     <p:extLst>
       <p:ext uri="{BB962C8B-B14F-4D97-AF65-F5344CB8AC3E}">
-        <p14:creationId xmlns:p14="http://schemas.microsoft.com/office/powerpoint/2010/main" val="2598429233"/>
+        <p14:creationId xmlns:p14="http://schemas.microsoft.com/office/powerpoint/2010/main" val="2266588369"/>
       </p:ext>
     </p:extLst>
   </p:cSld>
@@ -2476,7 +2923,7 @@
             <a:fld id="{B016CCD6-CAA2-4041-8C9A-E9376DD8C3A2}" type="datetimeFigureOut">
               <a:rPr lang="en-US" smtClean="0"/>
               <a:pPr/>
-              <a:t>4/22/2013</a:t>
+              <a:t>4/23/2013</a:t>
             </a:fld>
             <a:endParaRPr lang="en-US"/>
           </a:p>
@@ -3111,7 +3558,7 @@
             <a:fld id="{B016CCD6-CAA2-4041-8C9A-E9376DD8C3A2}" type="datetimeFigureOut">
               <a:rPr lang="en-US" smtClean="0"/>
               <a:pPr/>
-              <a:t>4/22/2013</a:t>
+              <a:t>4/23/2013</a:t>
             </a:fld>
             <a:endParaRPr lang="en-US"/>
           </a:p>
@@ -3390,7 +3837,7 @@
             <a:fld id="{B016CCD6-CAA2-4041-8C9A-E9376DD8C3A2}" type="datetimeFigureOut">
               <a:rPr lang="en-US" smtClean="0"/>
               <a:pPr/>
-              <a:t>4/22/2013</a:t>
+              <a:t>4/23/2013</a:t>
             </a:fld>
             <a:endParaRPr lang="en-US"/>
           </a:p>
@@ -3557,7 +4004,7 @@
             <a:fld id="{B016CCD6-CAA2-4041-8C9A-E9376DD8C3A2}" type="datetimeFigureOut">
               <a:rPr lang="en-US" smtClean="0"/>
               <a:pPr/>
-              <a:t>4/22/2013</a:t>
+              <a:t>4/23/2013</a:t>
             </a:fld>
             <a:endParaRPr lang="en-US"/>
           </a:p>
@@ -3740,7 +4187,7 @@
             <a:fld id="{B016CCD6-CAA2-4041-8C9A-E9376DD8C3A2}" type="datetimeFigureOut">
               <a:rPr lang="en-US" smtClean="0"/>
               <a:pPr/>
-              <a:t>4/22/2013</a:t>
+              <a:t>4/23/2013</a:t>
             </a:fld>
             <a:endParaRPr lang="en-US"/>
           </a:p>
@@ -4387,7 +4834,7 @@
             <a:fld id="{B016CCD6-CAA2-4041-8C9A-E9376DD8C3A2}" type="datetimeFigureOut">
               <a:rPr lang="en-US" smtClean="0"/>
               <a:pPr/>
-              <a:t>4/22/2013</a:t>
+              <a:t>4/23/2013</a:t>
             </a:fld>
             <a:endParaRPr lang="en-US"/>
           </a:p>
@@ -4815,7 +5262,7 @@
             <a:fld id="{B016CCD6-CAA2-4041-8C9A-E9376DD8C3A2}" type="datetimeFigureOut">
               <a:rPr lang="en-US" smtClean="0"/>
               <a:pPr/>
-              <a:t>4/22/2013</a:t>
+              <a:t>4/23/2013</a:t>
             </a:fld>
             <a:endParaRPr lang="en-US"/>
           </a:p>
@@ -4930,7 +5377,7 @@
             <a:fld id="{B016CCD6-CAA2-4041-8C9A-E9376DD8C3A2}" type="datetimeFigureOut">
               <a:rPr lang="en-US" smtClean="0"/>
               <a:pPr/>
-              <a:t>4/22/2013</a:t>
+              <a:t>4/23/2013</a:t>
             </a:fld>
             <a:endParaRPr lang="en-US"/>
           </a:p>
@@ -5113,7 +5560,7 @@
             <a:fld id="{B016CCD6-CAA2-4041-8C9A-E9376DD8C3A2}" type="datetimeFigureOut">
               <a:rPr lang="en-US" smtClean="0"/>
               <a:pPr/>
-              <a:t>4/22/2013</a:t>
+              <a:t>4/23/2013</a:t>
             </a:fld>
             <a:endParaRPr lang="en-US"/>
           </a:p>
@@ -5381,7 +5828,7 @@
             <a:fld id="{B016CCD6-CAA2-4041-8C9A-E9376DD8C3A2}" type="datetimeFigureOut">
               <a:rPr lang="en-US" smtClean="0"/>
               <a:pPr/>
-              <a:t>4/22/2013</a:t>
+              <a:t>4/23/2013</a:t>
             </a:fld>
             <a:endParaRPr lang="en-US"/>
           </a:p>
@@ -5853,7 +6300,7 @@
             <a:fld id="{B016CCD6-CAA2-4041-8C9A-E9376DD8C3A2}" type="datetimeFigureOut">
               <a:rPr lang="en-US" smtClean="0"/>
               <a:pPr/>
-              <a:t>4/22/2013</a:t>
+              <a:t>4/23/2013</a:t>
             </a:fld>
             <a:endParaRPr lang="en-US"/>
           </a:p>
@@ -6415,7 +6862,7 @@
             <a:fld id="{B016CCD6-CAA2-4041-8C9A-E9376DD8C3A2}" type="datetimeFigureOut">
               <a:rPr lang="en-US" smtClean="0"/>
               <a:pPr/>
-              <a:t>4/22/2013</a:t>
+              <a:t>4/23/2013</a:t>
             </a:fld>
             <a:endParaRPr lang="en-US"/>
           </a:p>
@@ -7982,7 +8429,7 @@
           <a:p>
             <a:r>
               <a:rPr lang="en-US" dirty="0" smtClean="0"/>
-              <a:t>Conclusion/Questions</a:t>
+              <a:t>Conclusion</a:t>
             </a:r>
             <a:endParaRPr lang="en-US" dirty="0"/>
           </a:p>
@@ -8003,7 +8450,57 @@
           <a:bodyPr/>
           <a:lstStyle/>
           <a:p>
-            <a:endParaRPr lang="en-US"/>
+            <a:r>
+              <a:rPr lang="en-US" dirty="0" smtClean="0"/>
+              <a:t>VMBRs are a real threat and are more difficult to detect than regular rootkits</a:t>
+            </a:r>
+          </a:p>
+          <a:p>
+            <a:pPr lvl="1"/>
+            <a:r>
+              <a:rPr lang="en-US" dirty="0"/>
+              <a:t>B</a:t>
+            </a:r>
+            <a:r>
+              <a:rPr lang="en-US" dirty="0" smtClean="0"/>
+              <a:t>ut they can be detected</a:t>
+            </a:r>
+          </a:p>
+          <a:p>
+            <a:endParaRPr lang="en-US" dirty="0"/>
+          </a:p>
+          <a:p>
+            <a:r>
+              <a:rPr lang="en-US" dirty="0" smtClean="0"/>
+              <a:t>Detectors </a:t>
+            </a:r>
+            <a:r>
+              <a:rPr lang="en-US" dirty="0"/>
+              <a:t>like Paladin have proven to be a good solution to a VMBR threat</a:t>
+            </a:r>
+          </a:p>
+          <a:p>
+            <a:pPr marL="411480" lvl="1" indent="0">
+              <a:buNone/>
+            </a:pPr>
+            <a:endParaRPr lang="en-US" dirty="0" smtClean="0"/>
+          </a:p>
+          <a:p>
+            <a:r>
+              <a:rPr lang="en-US" dirty="0" smtClean="0"/>
+              <a:t>VMBRs may evolve in the future</a:t>
+            </a:r>
+          </a:p>
+          <a:p>
+            <a:pPr lvl="1"/>
+            <a:r>
+              <a:rPr lang="en-US" dirty="0" smtClean="0"/>
+              <a:t>And detection must evolve with it as well</a:t>
+            </a:r>
+          </a:p>
+          <a:p>
+            <a:pPr lvl="1"/>
+            <a:endParaRPr lang="en-US" dirty="0"/>
           </a:p>
         </p:txBody>
       </p:sp>
@@ -8090,7 +8587,6 @@
               <a:rPr lang="en-US" dirty="0" smtClean="0"/>
               <a:t> </a:t>
             </a:r>
-            <a:endParaRPr lang="en-US" dirty="0" smtClean="0"/>
           </a:p>
           <a:p>
             <a:pPr lvl="1"/>
@@ -8113,7 +8609,6 @@
               <a:rPr lang="en-US" dirty="0" smtClean="0"/>
               <a:t>Have been around for over 20 years</a:t>
             </a:r>
-            <a:endParaRPr lang="en-US" dirty="0" smtClean="0"/>
           </a:p>
           <a:p>
             <a:pPr lvl="1"/>
@@ -8121,7 +8616,6 @@
               <a:rPr lang="en-US" dirty="0" smtClean="0"/>
               <a:t>Many rootkits and detectors/methods of prevention </a:t>
             </a:r>
-            <a:endParaRPr lang="en-US" dirty="0" smtClean="0"/>
           </a:p>
           <a:p>
             <a:r>
@@ -8140,11 +8634,7 @@
             <a:pPr lvl="1"/>
             <a:r>
               <a:rPr lang="en-US" dirty="0" smtClean="0"/>
-              <a:t>Difficult to detect from inside the target </a:t>
-            </a:r>
-            <a:r>
-              <a:rPr lang="en-US" dirty="0" smtClean="0"/>
-              <a:t>OS</a:t>
+              <a:t>Difficult to detect from inside the target OS</a:t>
             </a:r>
           </a:p>
           <a:p>
@@ -8250,10 +8740,12 @@
             <a:pPr lvl="1"/>
             <a:r>
               <a:rPr lang="en-US" dirty="0" smtClean="0"/>
-              <a:t>Saves time and money</a:t>
-            </a:r>
-          </a:p>
-          <a:p>
+              <a:t>Saves time and </a:t>
+            </a:r>
+            <a:r>
+              <a:rPr lang="en-US" dirty="0" smtClean="0"/>
+              <a:t>money</a:t>
+            </a:r>
             <a:endParaRPr lang="en-US" dirty="0" smtClean="0"/>
           </a:p>
           <a:p>
@@ -8265,62 +8757,107 @@
           <a:p>
             <a:pPr lvl="1"/>
             <a:r>
-              <a:rPr lang="en-US" dirty="0" smtClean="0"/>
-              <a:t>Emulated (System) VMs</a:t>
+              <a:rPr lang="en-US" dirty="0"/>
+              <a:t>Type I (Process) VMs</a:t>
             </a:r>
           </a:p>
           <a:p>
             <a:pPr lvl="2"/>
             <a:r>
-              <a:rPr lang="en-US" dirty="0" smtClean="0"/>
-              <a:t>Provides better separation</a:t>
+              <a:rPr lang="en-US" dirty="0"/>
+              <a:t>Uses same hardware as the Host OS</a:t>
             </a:r>
           </a:p>
           <a:p>
             <a:pPr lvl="2"/>
             <a:r>
-              <a:rPr lang="en-US" dirty="0" smtClean="0"/>
-              <a:t>Significantly slower</a:t>
-            </a:r>
+              <a:rPr lang="en-US" dirty="0"/>
+              <a:t>Single process</a:t>
+            </a:r>
+          </a:p>
+          <a:p>
+            <a:pPr lvl="2"/>
+            <a:r>
+              <a:rPr lang="en-US" dirty="0" smtClean="0"/>
+              <a:t>Faster</a:t>
+            </a:r>
+          </a:p>
+          <a:p>
+            <a:pPr lvl="2"/>
+            <a:r>
+              <a:rPr lang="en-US" dirty="0" smtClean="0"/>
+              <a:t>Generally used for servers (</a:t>
+            </a:r>
+            <a:r>
+              <a:rPr lang="en-US" dirty="0" err="1" smtClean="0"/>
+              <a:t>VMWare</a:t>
+            </a:r>
+            <a:r>
+              <a:rPr lang="en-US" dirty="0" smtClean="0"/>
+              <a:t> ESX Server)</a:t>
+            </a:r>
+            <a:endParaRPr lang="en-US" dirty="0" smtClean="0"/>
           </a:p>
           <a:p>
             <a:pPr lvl="1"/>
             <a:r>
-              <a:rPr lang="en-US" dirty="0"/>
-              <a:t>Virtualized (Process) </a:t>
-            </a:r>
-            <a:r>
-              <a:rPr lang="en-US" dirty="0" smtClean="0"/>
-              <a:t>VMs</a:t>
+              <a:rPr lang="en-US" dirty="0" smtClean="0"/>
+              <a:t>Type II (System</a:t>
+            </a:r>
+            <a:r>
+              <a:rPr lang="en-US" dirty="0" smtClean="0"/>
+              <a:t>) VMs</a:t>
             </a:r>
           </a:p>
           <a:p>
             <a:pPr lvl="2"/>
             <a:r>
               <a:rPr lang="en-US" dirty="0" smtClean="0"/>
-              <a:t>Uses same hardware as the Host OS</a:t>
+              <a:t>Provides better </a:t>
+            </a:r>
+            <a:r>
+              <a:rPr lang="en-US" dirty="0" smtClean="0"/>
+              <a:t>separation</a:t>
             </a:r>
           </a:p>
           <a:p>
             <a:pPr lvl="2"/>
             <a:r>
               <a:rPr lang="en-US" dirty="0" smtClean="0"/>
-              <a:t>Single process</a:t>
-            </a:r>
+              <a:t>Simulates hardware</a:t>
+            </a:r>
+            <a:endParaRPr lang="en-US" dirty="0" smtClean="0"/>
           </a:p>
           <a:p>
             <a:pPr lvl="2"/>
             <a:r>
               <a:rPr lang="en-US" dirty="0" smtClean="0"/>
-              <a:t>Faster</a:t>
+              <a:t>Significantly </a:t>
+            </a:r>
+            <a:r>
+              <a:rPr lang="en-US" dirty="0" smtClean="0"/>
+              <a:t>slower</a:t>
             </a:r>
           </a:p>
           <a:p>
             <a:pPr lvl="2"/>
             <a:r>
-              <a:rPr lang="en-US" dirty="0" smtClean="0"/>
-              <a:t>Target of VMBRs</a:t>
-            </a:r>
+              <a:rPr lang="en-US" dirty="0" err="1" smtClean="0"/>
+              <a:t>VMWare</a:t>
+            </a:r>
+            <a:r>
+              <a:rPr lang="en-US" dirty="0" smtClean="0"/>
+              <a:t>, </a:t>
+            </a:r>
+            <a:r>
+              <a:rPr lang="en-US" dirty="0" err="1" smtClean="0"/>
+              <a:t>VirtualBox</a:t>
+            </a:r>
+            <a:r>
+              <a:rPr lang="en-US" dirty="0" smtClean="0"/>
+              <a:t>, etc…</a:t>
+            </a:r>
+            <a:endParaRPr lang="en-US" dirty="0" smtClean="0"/>
           </a:p>
         </p:txBody>
       </p:sp>
@@ -8386,16 +8923,16 @@
       </p:sp>
       <p:grpSp>
         <p:nvGrpSpPr>
-          <p:cNvPr id="7" name="Group 6"/>
+          <p:cNvPr id="3" name="Group 2"/>
           <p:cNvGrpSpPr/>
           <p:nvPr/>
         </p:nvGrpSpPr>
         <p:grpSpPr>
           <a:xfrm>
-            <a:off x="844554" y="2286000"/>
-            <a:ext cx="7461246" cy="3871455"/>
-            <a:chOff x="762000" y="2600941"/>
-            <a:chExt cx="7461246" cy="3871455"/>
+            <a:off x="844554" y="2234625"/>
+            <a:ext cx="7461246" cy="3922830"/>
+            <a:chOff x="844554" y="2234625"/>
+            <a:chExt cx="7461246" cy="3922830"/>
           </a:xfrm>
         </p:grpSpPr>
         <p:pic>
@@ -8420,7 +8957,7 @@
           </p:blipFill>
           <p:spPr>
             <a:xfrm>
-              <a:off x="762000" y="3200400"/>
+              <a:off x="844554" y="2885459"/>
               <a:ext cx="7461246" cy="3271996"/>
             </a:xfrm>
             <a:prstGeom prst="rect">
@@ -8430,14 +8967,14 @@
         </p:pic>
         <p:sp>
           <p:nvSpPr>
-            <p:cNvPr id="5" name="TextBox 4"/>
+            <p:cNvPr id="6" name="TextBox 5"/>
             <p:cNvSpPr txBox="1"/>
             <p:nvPr/>
           </p:nvSpPr>
           <p:spPr>
             <a:xfrm>
-              <a:off x="1524000" y="2600941"/>
-              <a:ext cx="2087431" cy="584775"/>
+              <a:off x="5889810" y="2286000"/>
+              <a:ext cx="1425390" cy="584775"/>
             </a:xfrm>
             <a:prstGeom prst="rect">
               <a:avLst/>
@@ -8452,22 +8989,22 @@
             <a:p>
               <a:r>
                 <a:rPr lang="en-US" sz="3200" dirty="0" smtClean="0"/>
-                <a:t>Emulated</a:t>
+                <a:t>Type II</a:t>
               </a:r>
-              <a:endParaRPr lang="en-US" sz="3200" dirty="0"/>
+              <a:endParaRPr lang="en-US" dirty="0" smtClean="0"/>
             </a:p>
           </p:txBody>
         </p:sp>
         <p:sp>
           <p:nvSpPr>
-            <p:cNvPr id="6" name="TextBox 5"/>
+            <p:cNvPr id="8" name="TextBox 7"/>
             <p:cNvSpPr txBox="1"/>
             <p:nvPr/>
           </p:nvSpPr>
           <p:spPr>
             <a:xfrm>
-              <a:off x="5486400" y="2600941"/>
-              <a:ext cx="2233304" cy="584775"/>
+              <a:off x="1927410" y="2234625"/>
+              <a:ext cx="1332416" cy="584775"/>
             </a:xfrm>
             <a:prstGeom prst="rect">
               <a:avLst/>
@@ -8482,7 +9019,7 @@
             <a:p>
               <a:r>
                 <a:rPr lang="en-US" sz="3200" dirty="0" smtClean="0"/>
-                <a:t>Virtualized</a:t>
+                <a:t>Type I</a:t>
               </a:r>
               <a:endParaRPr lang="en-US" dirty="0" smtClean="0"/>
             </a:p>
@@ -8543,7 +9080,7 @@
           <a:p>
             <a:r>
               <a:rPr lang="en-US" dirty="0" smtClean="0"/>
-              <a:t>Installation</a:t>
+              <a:t>Forms of Attack</a:t>
             </a:r>
             <a:endParaRPr lang="en-US" dirty="0"/>
           </a:p>
@@ -8569,6 +9106,346 @@
             <a:pPr lvl="0"/>
             <a:r>
               <a:rPr lang="en-US" dirty="0"/>
+              <a:t>No interaction with target system</a:t>
+            </a:r>
+            <a:endParaRPr lang="en-US" sz="2000" dirty="0"/>
+          </a:p>
+          <a:p>
+            <a:pPr lvl="1"/>
+            <a:r>
+              <a:rPr lang="en-US" dirty="0" smtClean="0"/>
+              <a:t>Spam </a:t>
+            </a:r>
+            <a:r>
+              <a:rPr lang="en-US" dirty="0"/>
+              <a:t>relays, denial of service zombies, phishing web </a:t>
+            </a:r>
+            <a:r>
+              <a:rPr lang="en-US" dirty="0" smtClean="0"/>
+              <a:t>servers, etc.</a:t>
+            </a:r>
+            <a:endParaRPr lang="en-US" sz="1800" dirty="0"/>
+          </a:p>
+          <a:p>
+            <a:pPr lvl="0"/>
+            <a:r>
+              <a:rPr lang="en-US" dirty="0"/>
+              <a:t>Target system </a:t>
+            </a:r>
+            <a:r>
+              <a:rPr lang="en-US" dirty="0" smtClean="0"/>
+              <a:t>observers</a:t>
+            </a:r>
+          </a:p>
+          <a:p>
+            <a:pPr lvl="1"/>
+            <a:r>
+              <a:rPr lang="en-US" dirty="0" smtClean="0"/>
+              <a:t>Logging </a:t>
+            </a:r>
+            <a:r>
+              <a:rPr lang="en-US" dirty="0"/>
+              <a:t>of hardware-level data via modification of VMM’s device emulation software</a:t>
+            </a:r>
+            <a:endParaRPr lang="en-US" sz="1400" dirty="0"/>
+          </a:p>
+          <a:p>
+            <a:pPr lvl="1"/>
+            <a:r>
+              <a:rPr lang="en-US" dirty="0"/>
+              <a:t>Virtual machine introspection</a:t>
+            </a:r>
+            <a:endParaRPr lang="en-US" sz="1800" dirty="0"/>
+          </a:p>
+          <a:p>
+            <a:pPr lvl="0"/>
+            <a:r>
+              <a:rPr lang="en-US" dirty="0"/>
+              <a:t>Target system modifiers</a:t>
+            </a:r>
+            <a:endParaRPr lang="en-US" sz="2000" dirty="0"/>
+          </a:p>
+          <a:p>
+            <a:pPr lvl="1"/>
+            <a:r>
+              <a:rPr lang="en-US" dirty="0" smtClean="0"/>
+              <a:t>Modifying </a:t>
+            </a:r>
+            <a:r>
+              <a:rPr lang="en-US" dirty="0"/>
+              <a:t>network communication, e-mails, </a:t>
+            </a:r>
+            <a:r>
+              <a:rPr lang="en-US" dirty="0" smtClean="0"/>
+              <a:t>target applications, etc.</a:t>
+            </a:r>
+            <a:endParaRPr lang="en-US" sz="1800" dirty="0"/>
+          </a:p>
+          <a:p>
+            <a:pPr lvl="1"/>
+            <a:r>
+              <a:rPr lang="en-US" dirty="0"/>
+              <a:t>Virtual machine introspection</a:t>
+            </a:r>
+            <a:endParaRPr lang="en-US" sz="1800" dirty="0"/>
+          </a:p>
+        </p:txBody>
+      </p:sp>
+    </p:spTree>
+    <p:extLst>
+      <p:ext uri="{BB962C8B-B14F-4D97-AF65-F5344CB8AC3E}">
+        <p14:creationId xmlns:p14="http://schemas.microsoft.com/office/powerpoint/2010/main" val="2062001084"/>
+      </p:ext>
+    </p:extLst>
+  </p:cSld>
+  <p:clrMapOvr>
+    <a:masterClrMapping/>
+  </p:clrMapOvr>
+  <p:timing>
+    <p:tnLst>
+      <p:par>
+        <p:cTn id="1" dur="indefinite" restart="never" nodeType="tmRoot"/>
+      </p:par>
+    </p:tnLst>
+  </p:timing>
+</p:sld>
+</file>
+
+<file path=ppt/slides/slide6.xml><?xml version="1.0" encoding="utf-8"?>
+<p:sld xmlns:a="http://schemas.openxmlformats.org/drawingml/2006/main" xmlns:r="http://schemas.openxmlformats.org/officeDocument/2006/relationships" xmlns:p="http://schemas.openxmlformats.org/presentationml/2006/main">
+  <p:cSld>
+    <p:spTree>
+      <p:nvGrpSpPr>
+        <p:cNvPr id="1" name=""/>
+        <p:cNvGrpSpPr/>
+        <p:nvPr/>
+      </p:nvGrpSpPr>
+      <p:grpSpPr>
+        <a:xfrm>
+          <a:off x="0" y="0"/>
+          <a:ext cx="0" cy="0"/>
+          <a:chOff x="0" y="0"/>
+          <a:chExt cx="0" cy="0"/>
+        </a:xfrm>
+      </p:grpSpPr>
+      <p:sp>
+        <p:nvSpPr>
+          <p:cNvPr id="2" name="Title 1"/>
+          <p:cNvSpPr>
+            <a:spLocks noGrp="1"/>
+          </p:cNvSpPr>
+          <p:nvPr>
+            <p:ph type="title"/>
+          </p:nvPr>
+        </p:nvSpPr>
+        <p:spPr/>
+        <p:txBody>
+          <a:bodyPr/>
+          <a:lstStyle/>
+          <a:p>
+            <a:r>
+              <a:rPr lang="en-US" dirty="0" smtClean="0"/>
+              <a:t>Existing Rootkits</a:t>
+            </a:r>
+            <a:endParaRPr lang="en-US" dirty="0"/>
+          </a:p>
+        </p:txBody>
+      </p:sp>
+      <p:sp>
+        <p:nvSpPr>
+          <p:cNvPr id="3" name="Content Placeholder 2"/>
+          <p:cNvSpPr>
+            <a:spLocks noGrp="1"/>
+          </p:cNvSpPr>
+          <p:nvPr>
+            <p:ph idx="1"/>
+          </p:nvPr>
+        </p:nvSpPr>
+        <p:spPr/>
+        <p:txBody>
+          <a:bodyPr/>
+          <a:lstStyle/>
+          <a:p>
+            <a:r>
+              <a:rPr lang="en-US" dirty="0" smtClean="0"/>
+              <a:t>Two experimental VMBRs</a:t>
+            </a:r>
+            <a:endParaRPr lang="en-US" dirty="0"/>
+          </a:p>
+          <a:p>
+            <a:pPr lvl="1"/>
+            <a:r>
+              <a:rPr lang="en-US" dirty="0" err="1" smtClean="0"/>
+              <a:t>SubVirt</a:t>
+            </a:r>
+            <a:endParaRPr lang="en-US" dirty="0" smtClean="0"/>
+          </a:p>
+          <a:p>
+            <a:pPr lvl="2"/>
+            <a:r>
+              <a:rPr lang="en-US" dirty="0" smtClean="0"/>
+              <a:t>Created by Microsoft researches at University of Michigan</a:t>
+            </a:r>
+          </a:p>
+          <a:p>
+            <a:pPr lvl="2"/>
+            <a:r>
+              <a:rPr lang="en-US" dirty="0" smtClean="0"/>
+              <a:t>Adds another layer in between Host OS and Guest OS (VMM)</a:t>
+            </a:r>
+          </a:p>
+          <a:p>
+            <a:pPr lvl="2"/>
+            <a:r>
+              <a:rPr lang="en-US" dirty="0" smtClean="0"/>
+              <a:t>Targets x86 systems</a:t>
+            </a:r>
+          </a:p>
+          <a:p>
+            <a:pPr lvl="1"/>
+            <a:r>
+              <a:rPr lang="en-US" dirty="0" err="1" smtClean="0"/>
+              <a:t>BluePill</a:t>
+            </a:r>
+            <a:endParaRPr lang="en-US" dirty="0" smtClean="0"/>
+          </a:p>
+          <a:p>
+            <a:pPr lvl="2"/>
+            <a:r>
+              <a:rPr lang="en-US" dirty="0" smtClean="0"/>
+              <a:t>Created by a Polish security </a:t>
+            </a:r>
+            <a:r>
+              <a:rPr lang="en-US" dirty="0"/>
+              <a:t>r</a:t>
+            </a:r>
+            <a:r>
+              <a:rPr lang="en-US" dirty="0" smtClean="0"/>
+              <a:t>esearcher Joanna </a:t>
+            </a:r>
+            <a:r>
+              <a:rPr lang="en-US" dirty="0" err="1" smtClean="0"/>
+              <a:t>Rutkowska</a:t>
+            </a:r>
+            <a:endParaRPr lang="en-US" dirty="0" smtClean="0"/>
+          </a:p>
+          <a:p>
+            <a:pPr lvl="2"/>
+            <a:r>
+              <a:rPr lang="en-US" dirty="0" smtClean="0"/>
+              <a:t>Code publicly known</a:t>
+            </a:r>
+          </a:p>
+          <a:p>
+            <a:pPr lvl="2"/>
+            <a:r>
+              <a:rPr lang="en-US" dirty="0" smtClean="0"/>
+              <a:t>Exploits AMD64 SVM (Secure Virtual Machine) extensions</a:t>
+            </a:r>
+          </a:p>
+          <a:p>
+            <a:pPr lvl="2"/>
+            <a:r>
+              <a:rPr lang="en-US" dirty="0" smtClean="0"/>
+              <a:t>Installs itself on the fly</a:t>
+            </a:r>
+          </a:p>
+          <a:p>
+            <a:pPr lvl="2"/>
+            <a:r>
+              <a:rPr lang="en-US" dirty="0" smtClean="0"/>
+              <a:t>Does not survive system reboot</a:t>
+            </a:r>
+          </a:p>
+          <a:p>
+            <a:pPr lvl="3"/>
+            <a:r>
+              <a:rPr lang="en-US" dirty="0" smtClean="0"/>
+              <a:t>Still effective because servers are rarely restarted anyways</a:t>
+            </a:r>
+          </a:p>
+        </p:txBody>
+      </p:sp>
+    </p:spTree>
+    <p:extLst>
+      <p:ext uri="{BB962C8B-B14F-4D97-AF65-F5344CB8AC3E}">
+        <p14:creationId xmlns:p14="http://schemas.microsoft.com/office/powerpoint/2010/main" val="1329111042"/>
+      </p:ext>
+    </p:extLst>
+  </p:cSld>
+  <p:clrMapOvr>
+    <a:masterClrMapping/>
+  </p:clrMapOvr>
+  <p:timing>
+    <p:tnLst>
+      <p:par>
+        <p:cTn id="1" dur="indefinite" restart="never" nodeType="tmRoot"/>
+      </p:par>
+    </p:tnLst>
+  </p:timing>
+</p:sld>
+</file>
+
+<file path=ppt/slides/slide7.xml><?xml version="1.0" encoding="utf-8"?>
+<p:sld xmlns:a="http://schemas.openxmlformats.org/drawingml/2006/main" xmlns:r="http://schemas.openxmlformats.org/officeDocument/2006/relationships" xmlns:p="http://schemas.openxmlformats.org/presentationml/2006/main">
+  <p:cSld>
+    <p:spTree>
+      <p:nvGrpSpPr>
+        <p:cNvPr id="1" name=""/>
+        <p:cNvGrpSpPr/>
+        <p:nvPr/>
+      </p:nvGrpSpPr>
+      <p:grpSpPr>
+        <a:xfrm>
+          <a:off x="0" y="0"/>
+          <a:ext cx="0" cy="0"/>
+          <a:chOff x="0" y="0"/>
+          <a:chExt cx="0" cy="0"/>
+        </a:xfrm>
+      </p:grpSpPr>
+      <p:sp>
+        <p:nvSpPr>
+          <p:cNvPr id="2" name="Title 1"/>
+          <p:cNvSpPr>
+            <a:spLocks noGrp="1"/>
+          </p:cNvSpPr>
+          <p:nvPr>
+            <p:ph type="title"/>
+          </p:nvPr>
+        </p:nvSpPr>
+        <p:spPr/>
+        <p:txBody>
+          <a:bodyPr/>
+          <a:lstStyle/>
+          <a:p>
+            <a:r>
+              <a:rPr lang="en-US" dirty="0" smtClean="0"/>
+              <a:t>Installation</a:t>
+            </a:r>
+            <a:endParaRPr lang="en-US" dirty="0"/>
+          </a:p>
+        </p:txBody>
+      </p:sp>
+      <p:sp>
+        <p:nvSpPr>
+          <p:cNvPr id="3" name="Content Placeholder 2"/>
+          <p:cNvSpPr>
+            <a:spLocks noGrp="1"/>
+          </p:cNvSpPr>
+          <p:nvPr>
+            <p:ph idx="1"/>
+          </p:nvPr>
+        </p:nvSpPr>
+        <p:spPr/>
+        <p:txBody>
+          <a:bodyPr>
+            <a:normAutofit/>
+          </a:bodyPr>
+          <a:lstStyle/>
+          <a:p>
+            <a:pPr lvl="0"/>
+            <a:r>
+              <a:rPr lang="en-US" dirty="0"/>
               <a:t>Obtain root privileges/access to kernel mode </a:t>
             </a:r>
             <a:endParaRPr lang="en-US" sz="2000" dirty="0"/>
@@ -8648,11 +9525,7 @@
             </a:r>
             <a:r>
               <a:rPr lang="en-US" dirty="0" smtClean="0"/>
-              <a:t>phys. </a:t>
-            </a:r>
-            <a:r>
-              <a:rPr lang="en-US" dirty="0" smtClean="0"/>
-              <a:t>disk</a:t>
+              <a:t>phys. disk</a:t>
             </a:r>
           </a:p>
           <a:p>
@@ -8708,7 +9581,7 @@
 </p:sld>
 </file>
 
-<file path=ppt/slides/slide6.xml><?xml version="1.0" encoding="utf-8"?>
+<file path=ppt/slides/slide8.xml><?xml version="1.0" encoding="utf-8"?>
 <p:sld xmlns:a="http://schemas.openxmlformats.org/drawingml/2006/main" xmlns:r="http://schemas.openxmlformats.org/officeDocument/2006/relationships" xmlns:p="http://schemas.openxmlformats.org/presentationml/2006/main">
   <p:cSld>
     <p:spTree>
@@ -8791,377 +9664,6 @@
 </p:sld>
 </file>
 
-<file path=ppt/slides/slide7.xml><?xml version="1.0" encoding="utf-8"?>
-<p:sld xmlns:a="http://schemas.openxmlformats.org/drawingml/2006/main" xmlns:r="http://schemas.openxmlformats.org/officeDocument/2006/relationships" xmlns:p="http://schemas.openxmlformats.org/presentationml/2006/main">
-  <p:cSld>
-    <p:spTree>
-      <p:nvGrpSpPr>
-        <p:cNvPr id="1" name=""/>
-        <p:cNvGrpSpPr/>
-        <p:nvPr/>
-      </p:nvGrpSpPr>
-      <p:grpSpPr>
-        <a:xfrm>
-          <a:off x="0" y="0"/>
-          <a:ext cx="0" cy="0"/>
-          <a:chOff x="0" y="0"/>
-          <a:chExt cx="0" cy="0"/>
-        </a:xfrm>
-      </p:grpSpPr>
-      <p:sp>
-        <p:nvSpPr>
-          <p:cNvPr id="2" name="Title 1"/>
-          <p:cNvSpPr>
-            <a:spLocks noGrp="1"/>
-          </p:cNvSpPr>
-          <p:nvPr>
-            <p:ph type="title"/>
-          </p:nvPr>
-        </p:nvSpPr>
-        <p:spPr/>
-        <p:txBody>
-          <a:bodyPr/>
-          <a:lstStyle/>
-          <a:p>
-            <a:r>
-              <a:rPr lang="en-US" dirty="0" smtClean="0"/>
-              <a:t>Forms of Attack</a:t>
-            </a:r>
-            <a:endParaRPr lang="en-US" dirty="0"/>
-          </a:p>
-        </p:txBody>
-      </p:sp>
-      <p:sp>
-        <p:nvSpPr>
-          <p:cNvPr id="3" name="Content Placeholder 2"/>
-          <p:cNvSpPr>
-            <a:spLocks noGrp="1"/>
-          </p:cNvSpPr>
-          <p:nvPr>
-            <p:ph idx="1"/>
-          </p:nvPr>
-        </p:nvSpPr>
-        <p:spPr/>
-        <p:txBody>
-          <a:bodyPr>
-            <a:normAutofit/>
-          </a:bodyPr>
-          <a:lstStyle/>
-          <a:p>
-            <a:pPr lvl="0"/>
-            <a:r>
-              <a:rPr lang="en-US" dirty="0"/>
-              <a:t>No interaction with target system</a:t>
-            </a:r>
-            <a:endParaRPr lang="en-US" sz="2000" dirty="0"/>
-          </a:p>
-          <a:p>
-            <a:pPr lvl="1"/>
-            <a:r>
-              <a:rPr lang="en-US" dirty="0" smtClean="0"/>
-              <a:t>Spam </a:t>
-            </a:r>
-            <a:r>
-              <a:rPr lang="en-US" dirty="0"/>
-              <a:t>relays, denial of service zombies, phishing web </a:t>
-            </a:r>
-            <a:r>
-              <a:rPr lang="en-US" dirty="0" smtClean="0"/>
-              <a:t>servers, etc.</a:t>
-            </a:r>
-            <a:endParaRPr lang="en-US" sz="1800" dirty="0"/>
-          </a:p>
-          <a:p>
-            <a:pPr lvl="0"/>
-            <a:r>
-              <a:rPr lang="en-US" dirty="0"/>
-              <a:t>Target system </a:t>
-            </a:r>
-            <a:r>
-              <a:rPr lang="en-US" dirty="0" smtClean="0"/>
-              <a:t>observers</a:t>
-            </a:r>
-          </a:p>
-          <a:p>
-            <a:pPr lvl="1"/>
-            <a:r>
-              <a:rPr lang="en-US" dirty="0" smtClean="0"/>
-              <a:t>Logging </a:t>
-            </a:r>
-            <a:r>
-              <a:rPr lang="en-US" dirty="0"/>
-              <a:t>of hardware-level data via modification of VMM’s device emulation software</a:t>
-            </a:r>
-            <a:endParaRPr lang="en-US" sz="1400" dirty="0"/>
-          </a:p>
-          <a:p>
-            <a:pPr lvl="1"/>
-            <a:r>
-              <a:rPr lang="en-US" dirty="0"/>
-              <a:t>Virtual machine introspection</a:t>
-            </a:r>
-            <a:endParaRPr lang="en-US" sz="1800" dirty="0"/>
-          </a:p>
-          <a:p>
-            <a:pPr lvl="0"/>
-            <a:r>
-              <a:rPr lang="en-US" dirty="0"/>
-              <a:t>Target system modifiers</a:t>
-            </a:r>
-            <a:endParaRPr lang="en-US" sz="2000" dirty="0"/>
-          </a:p>
-          <a:p>
-            <a:pPr lvl="1"/>
-            <a:r>
-              <a:rPr lang="en-US" dirty="0" smtClean="0"/>
-              <a:t>Modifying </a:t>
-            </a:r>
-            <a:r>
-              <a:rPr lang="en-US" dirty="0"/>
-              <a:t>network communication, e-mails, </a:t>
-            </a:r>
-            <a:r>
-              <a:rPr lang="en-US" dirty="0" smtClean="0"/>
-              <a:t>target applications, etc.</a:t>
-            </a:r>
-            <a:endParaRPr lang="en-US" sz="1800" dirty="0"/>
-          </a:p>
-          <a:p>
-            <a:pPr lvl="1"/>
-            <a:r>
-              <a:rPr lang="en-US" dirty="0"/>
-              <a:t>Virtual machine introspection</a:t>
-            </a:r>
-            <a:endParaRPr lang="en-US" sz="1800" dirty="0"/>
-          </a:p>
-        </p:txBody>
-      </p:sp>
-    </p:spTree>
-    <p:extLst>
-      <p:ext uri="{BB962C8B-B14F-4D97-AF65-F5344CB8AC3E}">
-        <p14:creationId xmlns:p14="http://schemas.microsoft.com/office/powerpoint/2010/main" val="2687441504"/>
-      </p:ext>
-    </p:extLst>
-  </p:cSld>
-  <p:clrMapOvr>
-    <a:masterClrMapping/>
-  </p:clrMapOvr>
-  <p:timing>
-    <p:tnLst>
-      <p:par>
-        <p:cTn id="1" dur="indefinite" restart="never" nodeType="tmRoot"/>
-      </p:par>
-    </p:tnLst>
-  </p:timing>
-</p:sld>
-</file>
-
-<file path=ppt/slides/slide8.xml><?xml version="1.0" encoding="utf-8"?>
-<p:sld xmlns:a="http://schemas.openxmlformats.org/drawingml/2006/main" xmlns:r="http://schemas.openxmlformats.org/officeDocument/2006/relationships" xmlns:p="http://schemas.openxmlformats.org/presentationml/2006/main">
-  <p:cSld>
-    <p:spTree>
-      <p:nvGrpSpPr>
-        <p:cNvPr id="1" name=""/>
-        <p:cNvGrpSpPr/>
-        <p:nvPr/>
-      </p:nvGrpSpPr>
-      <p:grpSpPr>
-        <a:xfrm>
-          <a:off x="0" y="0"/>
-          <a:ext cx="0" cy="0"/>
-          <a:chOff x="0" y="0"/>
-          <a:chExt cx="0" cy="0"/>
-        </a:xfrm>
-      </p:grpSpPr>
-      <p:sp>
-        <p:nvSpPr>
-          <p:cNvPr id="2" name="Title 1"/>
-          <p:cNvSpPr>
-            <a:spLocks noGrp="1"/>
-          </p:cNvSpPr>
-          <p:nvPr>
-            <p:ph type="title"/>
-          </p:nvPr>
-        </p:nvSpPr>
-        <p:spPr/>
-        <p:txBody>
-          <a:bodyPr/>
-          <a:lstStyle/>
-          <a:p>
-            <a:r>
-              <a:rPr lang="en-US" dirty="0" smtClean="0"/>
-              <a:t>How VMBR Maintains </a:t>
-            </a:r>
-            <a:r>
-              <a:rPr lang="en-US" dirty="0"/>
-              <a:t>Control</a:t>
-            </a:r>
-          </a:p>
-        </p:txBody>
-      </p:sp>
-      <p:sp>
-        <p:nvSpPr>
-          <p:cNvPr id="3" name="Text Placeholder 2"/>
-          <p:cNvSpPr>
-            <a:spLocks noGrp="1"/>
-          </p:cNvSpPr>
-          <p:nvPr>
-            <p:ph type="body" idx="1"/>
-          </p:nvPr>
-        </p:nvSpPr>
-        <p:spPr/>
-        <p:txBody>
-          <a:bodyPr/>
-          <a:lstStyle/>
-          <a:p>
-            <a:r>
-              <a:rPr lang="en-US" dirty="0" smtClean="0"/>
-              <a:t>Control</a:t>
-            </a:r>
-            <a:endParaRPr lang="en-US" dirty="0"/>
-          </a:p>
-        </p:txBody>
-      </p:sp>
-      <p:sp>
-        <p:nvSpPr>
-          <p:cNvPr id="4" name="Content Placeholder 3"/>
-          <p:cNvSpPr>
-            <a:spLocks noGrp="1"/>
-          </p:cNvSpPr>
-          <p:nvPr>
-            <p:ph sz="half" idx="2"/>
-          </p:nvPr>
-        </p:nvSpPr>
-        <p:spPr/>
-        <p:txBody>
-          <a:bodyPr>
-            <a:normAutofit/>
-          </a:bodyPr>
-          <a:lstStyle/>
-          <a:p>
-            <a:r>
-              <a:rPr lang="en-US" dirty="0" smtClean="0"/>
-              <a:t>Restarting only the virtual hardware</a:t>
-            </a:r>
-          </a:p>
-          <a:p>
-            <a:pPr lvl="1"/>
-            <a:r>
-              <a:rPr lang="en-US" dirty="0" smtClean="0"/>
-              <a:t>Prevents physical hardware from restarting</a:t>
-            </a:r>
-          </a:p>
-          <a:p>
-            <a:r>
-              <a:rPr lang="en-US" dirty="0" smtClean="0"/>
-              <a:t>Emulating system shutdowns</a:t>
-            </a:r>
-          </a:p>
-          <a:p>
-            <a:pPr lvl="1"/>
-            <a:r>
-              <a:rPr lang="en-US" dirty="0" smtClean="0"/>
-              <a:t>Low-power state</a:t>
-            </a:r>
-          </a:p>
-          <a:p>
-            <a:pPr lvl="1"/>
-            <a:r>
-              <a:rPr lang="en-US" dirty="0" smtClean="0"/>
-              <a:t>VMBR lives inside the contents of RAM</a:t>
-            </a:r>
-          </a:p>
-          <a:p>
-            <a:endParaRPr lang="en-US" dirty="0"/>
-          </a:p>
-        </p:txBody>
-      </p:sp>
-      <p:sp>
-        <p:nvSpPr>
-          <p:cNvPr id="5" name="Text Placeholder 4"/>
-          <p:cNvSpPr>
-            <a:spLocks noGrp="1"/>
-          </p:cNvSpPr>
-          <p:nvPr>
-            <p:ph type="body" sz="quarter" idx="3"/>
-          </p:nvPr>
-        </p:nvSpPr>
-        <p:spPr/>
-        <p:txBody>
-          <a:bodyPr/>
-          <a:lstStyle/>
-          <a:p>
-            <a:r>
-              <a:rPr lang="en-US" dirty="0" smtClean="0"/>
-              <a:t>Stealth</a:t>
-            </a:r>
-            <a:endParaRPr lang="en-US" dirty="0"/>
-          </a:p>
-        </p:txBody>
-      </p:sp>
-      <p:sp>
-        <p:nvSpPr>
-          <p:cNvPr id="6" name="Content Placeholder 5"/>
-          <p:cNvSpPr>
-            <a:spLocks noGrp="1"/>
-          </p:cNvSpPr>
-          <p:nvPr>
-            <p:ph sz="quarter" idx="4"/>
-          </p:nvPr>
-        </p:nvSpPr>
-        <p:spPr/>
-        <p:txBody>
-          <a:bodyPr/>
-          <a:lstStyle/>
-          <a:p>
-            <a:r>
-              <a:rPr lang="en-US" dirty="0" smtClean="0"/>
-              <a:t>Manipulate antivirus code</a:t>
-            </a:r>
-          </a:p>
-          <a:p>
-            <a:pPr lvl="1"/>
-            <a:r>
-              <a:rPr lang="en-US" dirty="0" smtClean="0"/>
-              <a:t>Deems antivirus completely useless</a:t>
-            </a:r>
-          </a:p>
-          <a:p>
-            <a:r>
-              <a:rPr lang="en-US" dirty="0" smtClean="0"/>
-              <a:t>Running behind the scenes</a:t>
-            </a:r>
-          </a:p>
-          <a:p>
-            <a:pPr lvl="1"/>
-            <a:r>
-              <a:rPr lang="en-US" dirty="0" smtClean="0"/>
-              <a:t>Running undetected by the humans and OS alike</a:t>
-            </a:r>
-            <a:endParaRPr lang="en-US" dirty="0"/>
-          </a:p>
-        </p:txBody>
-      </p:sp>
-    </p:spTree>
-    <p:extLst>
-      <p:ext uri="{BB962C8B-B14F-4D97-AF65-F5344CB8AC3E}">
-        <p14:creationId xmlns:p14="http://schemas.microsoft.com/office/powerpoint/2010/main" val="1249372831"/>
-      </p:ext>
-    </p:extLst>
-  </p:cSld>
-  <p:clrMapOvr>
-    <a:masterClrMapping/>
-  </p:clrMapOvr>
-  <p:timing>
-    <p:tnLst>
-      <p:par>
-        <p:cTn id="1" dur="indefinite" restart="never" nodeType="tmRoot"/>
-      </p:par>
-    </p:tnLst>
-  </p:timing>
-</p:sld>
-</file>
-
 <file path=ppt/slides/slide9.xml><?xml version="1.0" encoding="utf-8"?>
 <p:sld xmlns:a="http://schemas.openxmlformats.org/drawingml/2006/main" xmlns:r="http://schemas.openxmlformats.org/officeDocument/2006/relationships" xmlns:p="http://schemas.openxmlformats.org/presentationml/2006/main">
   <p:cSld>
@@ -9196,7 +9698,33 @@
           <a:p>
             <a:r>
               <a:rPr lang="en-US" dirty="0" smtClean="0"/>
-              <a:t>Existing Rootkits</a:t>
+              <a:t>How VMBR Maintains </a:t>
+            </a:r>
+            <a:r>
+              <a:rPr lang="en-US" dirty="0"/>
+              <a:t>Control</a:t>
+            </a:r>
+          </a:p>
+        </p:txBody>
+      </p:sp>
+      <p:sp>
+        <p:nvSpPr>
+          <p:cNvPr id="3" name="Text Placeholder 2"/>
+          <p:cNvSpPr>
+            <a:spLocks noGrp="1"/>
+          </p:cNvSpPr>
+          <p:nvPr>
+            <p:ph type="body" idx="1"/>
+          </p:nvPr>
+        </p:nvSpPr>
+        <p:spPr/>
+        <p:txBody>
+          <a:bodyPr/>
+          <a:lstStyle/>
+          <a:p>
+            <a:r>
+              <a:rPr lang="en-US" dirty="0" smtClean="0"/>
+              <a:t>Control</a:t>
             </a:r>
             <a:endParaRPr lang="en-US" dirty="0"/>
           </a:p>
@@ -9204,12 +9732,64 @@
       </p:sp>
       <p:sp>
         <p:nvSpPr>
-          <p:cNvPr id="3" name="Content Placeholder 2"/>
-          <p:cNvSpPr>
-            <a:spLocks noGrp="1"/>
-          </p:cNvSpPr>
-          <p:nvPr>
-            <p:ph idx="1"/>
+          <p:cNvPr id="4" name="Content Placeholder 3"/>
+          <p:cNvSpPr>
+            <a:spLocks noGrp="1"/>
+          </p:cNvSpPr>
+          <p:nvPr>
+            <p:ph sz="half" idx="2"/>
+          </p:nvPr>
+        </p:nvSpPr>
+        <p:spPr/>
+        <p:txBody>
+          <a:bodyPr>
+            <a:normAutofit/>
+          </a:bodyPr>
+          <a:lstStyle/>
+          <a:p>
+            <a:r>
+              <a:rPr lang="en-US" dirty="0" smtClean="0"/>
+              <a:t>Restarting only the virtual hardware</a:t>
+            </a:r>
+          </a:p>
+          <a:p>
+            <a:pPr lvl="1"/>
+            <a:r>
+              <a:rPr lang="en-US" dirty="0" smtClean="0"/>
+              <a:t>Prevents physical hardware from restarting</a:t>
+            </a:r>
+          </a:p>
+          <a:p>
+            <a:r>
+              <a:rPr lang="en-US" dirty="0" smtClean="0"/>
+              <a:t>Emulating system shutdowns</a:t>
+            </a:r>
+          </a:p>
+          <a:p>
+            <a:pPr lvl="1"/>
+            <a:r>
+              <a:rPr lang="en-US" dirty="0" smtClean="0"/>
+              <a:t>Low-power state</a:t>
+            </a:r>
+          </a:p>
+          <a:p>
+            <a:pPr lvl="1"/>
+            <a:r>
+              <a:rPr lang="en-US" dirty="0" smtClean="0"/>
+              <a:t>VMBR remains on the top of the system Boot Sector</a:t>
+            </a:r>
+            <a:endParaRPr lang="en-US" dirty="0"/>
+          </a:p>
+        </p:txBody>
+      </p:sp>
+      <p:sp>
+        <p:nvSpPr>
+          <p:cNvPr id="5" name="Text Placeholder 4"/>
+          <p:cNvSpPr>
+            <a:spLocks noGrp="1"/>
+          </p:cNvSpPr>
+          <p:nvPr>
+            <p:ph type="body" sz="quarter" idx="3"/>
           </p:nvPr>
         </p:nvSpPr>
         <p:spPr/>
@@ -9219,108 +9799,59 @@
           <a:p>
             <a:r>
               <a:rPr lang="en-US" dirty="0" smtClean="0"/>
-              <a:t>Two experimental VMBRs</a:t>
+              <a:t>Stealth</a:t>
             </a:r>
             <a:endParaRPr lang="en-US" dirty="0"/>
           </a:p>
+        </p:txBody>
+      </p:sp>
+      <p:sp>
+        <p:nvSpPr>
+          <p:cNvPr id="6" name="Content Placeholder 5"/>
+          <p:cNvSpPr>
+            <a:spLocks noGrp="1"/>
+          </p:cNvSpPr>
+          <p:nvPr>
+            <p:ph sz="quarter" idx="4"/>
+          </p:nvPr>
+        </p:nvSpPr>
+        <p:spPr/>
+        <p:txBody>
+          <a:bodyPr/>
+          <a:lstStyle/>
+          <a:p>
+            <a:r>
+              <a:rPr lang="en-US" dirty="0" smtClean="0"/>
+              <a:t>Manipulate antivirus code</a:t>
+            </a:r>
+          </a:p>
           <a:p>
             <a:pPr lvl="1"/>
             <a:r>
-              <a:rPr lang="en-US" dirty="0" err="1" smtClean="0"/>
-              <a:t>SubVirt</a:t>
-            </a:r>
-            <a:endParaRPr lang="en-US" dirty="0" smtClean="0"/>
-          </a:p>
-          <a:p>
-            <a:pPr lvl="2"/>
-            <a:r>
-              <a:rPr lang="en-US" dirty="0" smtClean="0"/>
-              <a:t>Created by Microsoft researches at University of Michigan</a:t>
-            </a:r>
-          </a:p>
-          <a:p>
-            <a:pPr lvl="2"/>
-            <a:r>
-              <a:rPr lang="en-US" dirty="0" smtClean="0"/>
-              <a:t>Adds another layer in between Host OS and Guest OS (VMM)</a:t>
-            </a:r>
-          </a:p>
-          <a:p>
-            <a:pPr lvl="2"/>
-            <a:r>
-              <a:rPr lang="en-US" dirty="0" smtClean="0"/>
-              <a:t>Targets x86 systems</a:t>
+              <a:rPr lang="en-US" dirty="0" smtClean="0"/>
+              <a:t>Deems antivirus completely useless</a:t>
+            </a:r>
+          </a:p>
+          <a:p>
+            <a:r>
+              <a:rPr lang="en-US" dirty="0" smtClean="0"/>
+              <a:t>Running behind the scenes</a:t>
             </a:r>
           </a:p>
           <a:p>
             <a:pPr lvl="1"/>
             <a:r>
-              <a:rPr lang="en-US" dirty="0" err="1" smtClean="0"/>
-              <a:t>BluePill</a:t>
-            </a:r>
-            <a:endParaRPr lang="en-US" dirty="0" smtClean="0"/>
-          </a:p>
-          <a:p>
-            <a:pPr lvl="2"/>
-            <a:r>
-              <a:rPr lang="en-US" dirty="0" smtClean="0"/>
-              <a:t>Created by a Polish security </a:t>
-            </a:r>
-            <a:r>
-              <a:rPr lang="en-US" dirty="0"/>
-              <a:t>r</a:t>
-            </a:r>
-            <a:r>
-              <a:rPr lang="en-US" dirty="0" smtClean="0"/>
-              <a:t>esearcher Joanna </a:t>
-            </a:r>
-            <a:r>
-              <a:rPr lang="en-US" dirty="0" err="1" smtClean="0"/>
-              <a:t>Rutkowska</a:t>
-            </a:r>
-            <a:endParaRPr lang="en-US" dirty="0" smtClean="0"/>
-          </a:p>
-          <a:p>
-            <a:pPr lvl="2"/>
-            <a:r>
-              <a:rPr lang="en-US" dirty="0" smtClean="0"/>
-              <a:t>Code publicly known</a:t>
-            </a:r>
-          </a:p>
-          <a:p>
-            <a:pPr lvl="2"/>
-            <a:r>
-              <a:rPr lang="en-US" dirty="0" smtClean="0"/>
-              <a:t>Exploits AMD64 SVM (Secure Virtual Machine) extensions</a:t>
-            </a:r>
-          </a:p>
-          <a:p>
-            <a:pPr lvl="2"/>
-            <a:r>
-              <a:rPr lang="en-US" dirty="0" smtClean="0"/>
-              <a:t>Installs itself on the fly</a:t>
-            </a:r>
-          </a:p>
-          <a:p>
-            <a:pPr lvl="2"/>
-            <a:r>
-              <a:rPr lang="en-US" dirty="0" smtClean="0"/>
-              <a:t>Does not survive system reboot</a:t>
-            </a:r>
-          </a:p>
-          <a:p>
-            <a:pPr lvl="3"/>
-            <a:r>
-              <a:rPr lang="en-US" dirty="0" smtClean="0"/>
-              <a:t>Still effective because servers are rarely restarted anyways</a:t>
-            </a:r>
+              <a:rPr lang="en-US" dirty="0" smtClean="0"/>
+              <a:t>Running undetected by the humans and OS alike</a:t>
+            </a:r>
+            <a:endParaRPr lang="en-US" dirty="0"/>
           </a:p>
         </p:txBody>
       </p:sp>
     </p:spTree>
     <p:extLst>
       <p:ext uri="{BB962C8B-B14F-4D97-AF65-F5344CB8AC3E}">
-        <p14:creationId xmlns:p14="http://schemas.microsoft.com/office/powerpoint/2010/main" val="2405789898"/>
+        <p14:creationId xmlns:p14="http://schemas.microsoft.com/office/powerpoint/2010/main" val="1249372831"/>
       </p:ext>
     </p:extLst>
   </p:cSld>

</xml_diff>

<commit_message>
made changes to my slide
</commit_message>
<xml_diff>
--- a/VMBR_Presentation.pptx
+++ b/VMBR_Presentation.pptx
@@ -5,7 +5,7 @@
     <p:sldMasterId id="2147483660" r:id="rId1"/>
   </p:sldMasterIdLst>
   <p:notesMasterIdLst>
-    <p:notesMasterId r:id="rId22"/>
+    <p:notesMasterId r:id="rId23"/>
   </p:notesMasterIdLst>
   <p:sldIdLst>
     <p:sldId id="256" r:id="rId2"/>
@@ -27,7 +27,8 @@
     <p:sldId id="269" r:id="rId18"/>
     <p:sldId id="271" r:id="rId19"/>
     <p:sldId id="272" r:id="rId20"/>
-    <p:sldId id="266" r:id="rId21"/>
+    <p:sldId id="280" r:id="rId21"/>
+    <p:sldId id="266" r:id="rId22"/>
   </p:sldIdLst>
   <p:sldSz cx="9144000" cy="6858000" type="screen4x3"/>
   <p:notesSz cx="6858000" cy="9144000"/>
@@ -212,7 +213,7 @@
             <a:fld id="{433E2ACD-1F68-4C8F-9506-7149504EC2F1}" type="datetimeFigureOut">
               <a:rPr lang="en-US" smtClean="0"/>
               <a:pPr/>
-              <a:t>4/23/2013</a:t>
+              <a:t>4/24/2013</a:t>
             </a:fld>
             <a:endParaRPr lang="en-US"/>
           </a:p>
@@ -383,7 +384,7 @@
     </p:spTree>
     <p:extLst>
       <p:ext uri="{BB962C8B-B14F-4D97-AF65-F5344CB8AC3E}">
-        <p14:creationId xmlns:p14="http://schemas.microsoft.com/office/powerpoint/2010/main" val="846735352"/>
+        <p14:creationId xmlns:p14="http://schemas.microsoft.com/office/powerpoint/2010/main" xmlns="" val="846735352"/>
       </p:ext>
     </p:extLst>
   </p:cSld>
@@ -1337,7 +1338,7 @@
             <a:fld id="{72141A60-0A97-4B4C-A98B-2EDC5A7E8FE4}" type="slidenum">
               <a:rPr lang="en-US" smtClean="0"/>
               <a:pPr/>
-              <a:t>20</a:t>
+              <a:t>21</a:t>
             </a:fld>
             <a:endParaRPr lang="en-US"/>
           </a:p>
@@ -1346,7 +1347,7 @@
     </p:spTree>
     <p:extLst>
       <p:ext uri="{BB962C8B-B14F-4D97-AF65-F5344CB8AC3E}">
-        <p14:creationId xmlns:p14="http://schemas.microsoft.com/office/powerpoint/2010/main" val="2089592773"/>
+        <p14:creationId xmlns:p14="http://schemas.microsoft.com/office/powerpoint/2010/main" xmlns="" val="2089592773"/>
       </p:ext>
     </p:extLst>
   </p:cSld>
@@ -1515,7 +1516,7 @@
     </p:spTree>
     <p:extLst>
       <p:ext uri="{BB962C8B-B14F-4D97-AF65-F5344CB8AC3E}">
-        <p14:creationId xmlns:p14="http://schemas.microsoft.com/office/powerpoint/2010/main" val="3098580096"/>
+        <p14:creationId xmlns:p14="http://schemas.microsoft.com/office/powerpoint/2010/main" xmlns="" val="3098580096"/>
       </p:ext>
     </p:extLst>
   </p:cSld>
@@ -1786,6 +1787,7 @@
           <a:p>
             <a:fld id="{FC4DA58B-212D-4CB1-A82C-2E2734039AFF}" type="slidenum">
               <a:rPr lang="en-US" smtClean="0"/>
+              <a:pPr/>
               <a:t>3</a:t>
             </a:fld>
             <a:endParaRPr lang="en-US"/>
@@ -1795,7 +1797,7 @@
     </p:spTree>
     <p:extLst>
       <p:ext uri="{BB962C8B-B14F-4D97-AF65-F5344CB8AC3E}">
-        <p14:creationId xmlns:p14="http://schemas.microsoft.com/office/powerpoint/2010/main" val="875293555"/>
+        <p14:creationId xmlns:p14="http://schemas.microsoft.com/office/powerpoint/2010/main" xmlns="" val="875293555"/>
       </p:ext>
     </p:extLst>
   </p:cSld>
@@ -1876,6 +1878,7 @@
           <a:p>
             <a:fld id="{FC4DA58B-212D-4CB1-A82C-2E2734039AFF}" type="slidenum">
               <a:rPr lang="en-US" smtClean="0"/>
+              <a:pPr/>
               <a:t>4</a:t>
             </a:fld>
             <a:endParaRPr lang="en-US"/>
@@ -1885,7 +1888,7 @@
     </p:spTree>
     <p:extLst>
       <p:ext uri="{BB962C8B-B14F-4D97-AF65-F5344CB8AC3E}">
-        <p14:creationId xmlns:p14="http://schemas.microsoft.com/office/powerpoint/2010/main" val="3004174998"/>
+        <p14:creationId xmlns:p14="http://schemas.microsoft.com/office/powerpoint/2010/main" xmlns="" val="3004174998"/>
       </p:ext>
     </p:extLst>
   </p:cSld>
@@ -2131,7 +2134,7 @@
     </p:spTree>
     <p:extLst>
       <p:ext uri="{BB962C8B-B14F-4D97-AF65-F5344CB8AC3E}">
-        <p14:creationId xmlns:p14="http://schemas.microsoft.com/office/powerpoint/2010/main" val="1153073892"/>
+        <p14:creationId xmlns:p14="http://schemas.microsoft.com/office/powerpoint/2010/main" xmlns="" val="1153073892"/>
       </p:ext>
     </p:extLst>
   </p:cSld>
@@ -2220,7 +2223,7 @@
     </p:spTree>
     <p:extLst>
       <p:ext uri="{BB962C8B-B14F-4D97-AF65-F5344CB8AC3E}">
-        <p14:creationId xmlns:p14="http://schemas.microsoft.com/office/powerpoint/2010/main" val="2598429233"/>
+        <p14:creationId xmlns:p14="http://schemas.microsoft.com/office/powerpoint/2010/main" xmlns="" val="2598429233"/>
       </p:ext>
     </p:extLst>
   </p:cSld>
@@ -2444,7 +2447,7 @@
     </p:spTree>
     <p:extLst>
       <p:ext uri="{BB962C8B-B14F-4D97-AF65-F5344CB8AC3E}">
-        <p14:creationId xmlns:p14="http://schemas.microsoft.com/office/powerpoint/2010/main" val="2757083414"/>
+        <p14:creationId xmlns:p14="http://schemas.microsoft.com/office/powerpoint/2010/main" xmlns="" val="2757083414"/>
       </p:ext>
     </p:extLst>
   </p:cSld>
@@ -2537,7 +2540,7 @@
     </p:spTree>
     <p:extLst>
       <p:ext uri="{BB962C8B-B14F-4D97-AF65-F5344CB8AC3E}">
-        <p14:creationId xmlns:p14="http://schemas.microsoft.com/office/powerpoint/2010/main" val="3659421481"/>
+        <p14:creationId xmlns:p14="http://schemas.microsoft.com/office/powerpoint/2010/main" xmlns="" val="3659421481"/>
       </p:ext>
     </p:extLst>
   </p:cSld>
@@ -2779,6 +2782,7 @@
           <a:p>
             <a:fld id="{FC4DA58B-212D-4CB1-A82C-2E2734039AFF}" type="slidenum">
               <a:rPr lang="en-US" smtClean="0"/>
+              <a:pPr/>
               <a:t>10</a:t>
             </a:fld>
             <a:endParaRPr lang="en-US"/>
@@ -2788,7 +2792,7 @@
     </p:spTree>
     <p:extLst>
       <p:ext uri="{BB962C8B-B14F-4D97-AF65-F5344CB8AC3E}">
-        <p14:creationId xmlns:p14="http://schemas.microsoft.com/office/powerpoint/2010/main" val="2266588369"/>
+        <p14:creationId xmlns:p14="http://schemas.microsoft.com/office/powerpoint/2010/main" xmlns="" val="2266588369"/>
       </p:ext>
     </p:extLst>
   </p:cSld>
@@ -2924,7 +2928,7 @@
             <a:fld id="{B016CCD6-CAA2-4041-8C9A-E9376DD8C3A2}" type="datetimeFigureOut">
               <a:rPr lang="en-US" smtClean="0"/>
               <a:pPr/>
-              <a:t>4/23/2013</a:t>
+              <a:t>4/24/2013</a:t>
             </a:fld>
             <a:endParaRPr lang="en-US"/>
           </a:p>
@@ -3559,7 +3563,7 @@
             <a:fld id="{B016CCD6-CAA2-4041-8C9A-E9376DD8C3A2}" type="datetimeFigureOut">
               <a:rPr lang="en-US" smtClean="0"/>
               <a:pPr/>
-              <a:t>4/23/2013</a:t>
+              <a:t>4/24/2013</a:t>
             </a:fld>
             <a:endParaRPr lang="en-US"/>
           </a:p>
@@ -3838,7 +3842,7 @@
             <a:fld id="{B016CCD6-CAA2-4041-8C9A-E9376DD8C3A2}" type="datetimeFigureOut">
               <a:rPr lang="en-US" smtClean="0"/>
               <a:pPr/>
-              <a:t>4/23/2013</a:t>
+              <a:t>4/24/2013</a:t>
             </a:fld>
             <a:endParaRPr lang="en-US"/>
           </a:p>
@@ -4005,7 +4009,7 @@
             <a:fld id="{B016CCD6-CAA2-4041-8C9A-E9376DD8C3A2}" type="datetimeFigureOut">
               <a:rPr lang="en-US" smtClean="0"/>
               <a:pPr/>
-              <a:t>4/23/2013</a:t>
+              <a:t>4/24/2013</a:t>
             </a:fld>
             <a:endParaRPr lang="en-US"/>
           </a:p>
@@ -4188,7 +4192,7 @@
             <a:fld id="{B016CCD6-CAA2-4041-8C9A-E9376DD8C3A2}" type="datetimeFigureOut">
               <a:rPr lang="en-US" smtClean="0"/>
               <a:pPr/>
-              <a:t>4/23/2013</a:t>
+              <a:t>4/24/2013</a:t>
             </a:fld>
             <a:endParaRPr lang="en-US"/>
           </a:p>
@@ -4835,7 +4839,7 @@
             <a:fld id="{B016CCD6-CAA2-4041-8C9A-E9376DD8C3A2}" type="datetimeFigureOut">
               <a:rPr lang="en-US" smtClean="0"/>
               <a:pPr/>
-              <a:t>4/23/2013</a:t>
+              <a:t>4/24/2013</a:t>
             </a:fld>
             <a:endParaRPr lang="en-US"/>
           </a:p>
@@ -5263,7 +5267,7 @@
             <a:fld id="{B016CCD6-CAA2-4041-8C9A-E9376DD8C3A2}" type="datetimeFigureOut">
               <a:rPr lang="en-US" smtClean="0"/>
               <a:pPr/>
-              <a:t>4/23/2013</a:t>
+              <a:t>4/24/2013</a:t>
             </a:fld>
             <a:endParaRPr lang="en-US"/>
           </a:p>
@@ -5378,7 +5382,7 @@
             <a:fld id="{B016CCD6-CAA2-4041-8C9A-E9376DD8C3A2}" type="datetimeFigureOut">
               <a:rPr lang="en-US" smtClean="0"/>
               <a:pPr/>
-              <a:t>4/23/2013</a:t>
+              <a:t>4/24/2013</a:t>
             </a:fld>
             <a:endParaRPr lang="en-US"/>
           </a:p>
@@ -5561,7 +5565,7 @@
             <a:fld id="{B016CCD6-CAA2-4041-8C9A-E9376DD8C3A2}" type="datetimeFigureOut">
               <a:rPr lang="en-US" smtClean="0"/>
               <a:pPr/>
-              <a:t>4/23/2013</a:t>
+              <a:t>4/24/2013</a:t>
             </a:fld>
             <a:endParaRPr lang="en-US"/>
           </a:p>
@@ -5829,7 +5833,7 @@
             <a:fld id="{B016CCD6-CAA2-4041-8C9A-E9376DD8C3A2}" type="datetimeFigureOut">
               <a:rPr lang="en-US" smtClean="0"/>
               <a:pPr/>
-              <a:t>4/23/2013</a:t>
+              <a:t>4/24/2013</a:t>
             </a:fld>
             <a:endParaRPr lang="en-US"/>
           </a:p>
@@ -6301,7 +6305,7 @@
             <a:fld id="{B016CCD6-CAA2-4041-8C9A-E9376DD8C3A2}" type="datetimeFigureOut">
               <a:rPr lang="en-US" smtClean="0"/>
               <a:pPr/>
-              <a:t>4/23/2013</a:t>
+              <a:t>4/24/2013</a:t>
             </a:fld>
             <a:endParaRPr lang="en-US"/>
           </a:p>
@@ -6863,7 +6867,7 @@
             <a:fld id="{B016CCD6-CAA2-4041-8C9A-E9376DD8C3A2}" type="datetimeFigureOut">
               <a:rPr lang="en-US" smtClean="0"/>
               <a:pPr/>
-              <a:t>4/23/2013</a:t>
+              <a:t>4/24/2013</a:t>
             </a:fld>
             <a:endParaRPr lang="en-US"/>
           </a:p>
@@ -7455,7 +7459,7 @@
     </p:spTree>
     <p:extLst>
       <p:ext uri="{BB962C8B-B14F-4D97-AF65-F5344CB8AC3E}">
-        <p14:creationId xmlns:p14="http://schemas.microsoft.com/office/powerpoint/2010/main" val="2462047465"/>
+        <p14:creationId xmlns:p14="http://schemas.microsoft.com/office/powerpoint/2010/main" xmlns="" val="2462047465"/>
       </p:ext>
     </p:extLst>
   </p:cSld>
@@ -7659,7 +7663,7 @@
     </p:spTree>
     <p:extLst>
       <p:ext uri="{BB962C8B-B14F-4D97-AF65-F5344CB8AC3E}">
-        <p14:creationId xmlns:p14="http://schemas.microsoft.com/office/powerpoint/2010/main" val="1249372831"/>
+        <p14:creationId xmlns:p14="http://schemas.microsoft.com/office/powerpoint/2010/main" xmlns="" val="1249372831"/>
       </p:ext>
     </p:extLst>
   </p:cSld>
@@ -7733,10 +7737,12 @@
           <a:p>
             <a:r>
               <a:rPr lang="en-US" dirty="0" smtClean="0"/>
-              <a:t>Two Ways:</a:t>
-            </a:r>
-          </a:p>
-          <a:p>
+              <a:t>Two Ways</a:t>
+            </a:r>
+            <a:r>
+              <a:rPr lang="en-US" dirty="0" smtClean="0"/>
+              <a:t>:</a:t>
+            </a:r>
             <a:endParaRPr lang="en-US" dirty="0" smtClean="0"/>
           </a:p>
           <a:p>
@@ -7762,7 +7768,7 @@
     </p:spTree>
     <p:extLst>
       <p:ext uri="{BB962C8B-B14F-4D97-AF65-F5344CB8AC3E}">
-        <p14:creationId xmlns:p14="http://schemas.microsoft.com/office/powerpoint/2010/main" val="19357863"/>
+        <p14:creationId xmlns:p14="http://schemas.microsoft.com/office/powerpoint/2010/main" xmlns="" val="19357863"/>
       </p:ext>
     </p:extLst>
   </p:cSld>
@@ -7846,28 +7852,43 @@
           <a:p>
             <a:r>
               <a:rPr lang="en-US" dirty="0" smtClean="0"/>
-              <a:t>Read physical memory of disk and look for signatures and anomalies that indicate the presence of VMBR</a:t>
-            </a:r>
-          </a:p>
-          <a:p>
+              <a:t>Read physical memory of disk and look for signatures and anomalies that indicate the presence of </a:t>
+            </a:r>
+            <a:r>
+              <a:rPr lang="en-US" dirty="0" smtClean="0"/>
+              <a:t>VMBR</a:t>
+            </a:r>
+          </a:p>
+          <a:p>
+            <a:r>
+              <a:rPr lang="en-US" dirty="0" smtClean="0"/>
+              <a:t>How to gain control below VMBR??</a:t>
+            </a:r>
+            <a:endParaRPr lang="en-US" dirty="0" smtClean="0"/>
+          </a:p>
+          <a:p>
+            <a:pPr lvl="1"/>
             <a:r>
               <a:rPr lang="en-US" dirty="0" smtClean="0"/>
               <a:t>Use secure hardware</a:t>
             </a:r>
           </a:p>
           <a:p>
+            <a:pPr lvl="1"/>
             <a:r>
               <a:rPr lang="en-US" dirty="0" smtClean="0"/>
               <a:t>Boot from safe medium </a:t>
             </a:r>
           </a:p>
           <a:p>
+            <a:pPr lvl="1"/>
             <a:r>
               <a:rPr lang="en-US" dirty="0" smtClean="0"/>
               <a:t>Physically unplug the machine before reboot</a:t>
             </a:r>
           </a:p>
           <a:p>
+            <a:pPr lvl="1"/>
             <a:r>
               <a:rPr lang="en-US" dirty="0" smtClean="0"/>
               <a:t>Use  secure VMM</a:t>
@@ -7967,27 +7988,103 @@
             </a:r>
           </a:p>
           <a:p>
-            <a:r>
-              <a:rPr lang="en-US" dirty="0" smtClean="0"/>
-              <a:t>CPU time</a:t>
-            </a:r>
-          </a:p>
-          <a:p>
-            <a:r>
-              <a:rPr lang="en-US" dirty="0" smtClean="0"/>
-              <a:t>Memory and Disk space</a:t>
-            </a:r>
-          </a:p>
-          <a:p>
+            <a:pPr lvl="1"/>
+            <a:r>
+              <a:rPr lang="en-US" dirty="0" smtClean="0"/>
+              <a:t>CPU </a:t>
+            </a:r>
+            <a:r>
+              <a:rPr lang="en-US" dirty="0" smtClean="0"/>
+              <a:t>time</a:t>
+            </a:r>
+          </a:p>
+          <a:p>
+            <a:pPr lvl="1">
+              <a:buNone/>
+            </a:pPr>
+            <a:r>
+              <a:rPr lang="en-US" dirty="0" smtClean="0"/>
+              <a:t>	- compare the running time of benchmark against wall-clock time</a:t>
+            </a:r>
+            <a:endParaRPr lang="en-US" dirty="0" smtClean="0"/>
+          </a:p>
+          <a:p>
+            <a:pPr lvl="1"/>
+            <a:r>
+              <a:rPr lang="en-US" dirty="0" smtClean="0"/>
+              <a:t>Memory and Disk </a:t>
+            </a:r>
+            <a:r>
+              <a:rPr lang="en-US" dirty="0" smtClean="0"/>
+              <a:t>space</a:t>
+            </a:r>
+          </a:p>
+          <a:p>
+            <a:pPr lvl="1">
+              <a:buNone/>
+            </a:pPr>
+            <a:r>
+              <a:rPr lang="en-US" dirty="0" smtClean="0"/>
+              <a:t>	- run a program that requires entire machines memory </a:t>
+            </a:r>
+            <a:endParaRPr lang="en-US" dirty="0" smtClean="0"/>
+          </a:p>
+          <a:p>
+            <a:pPr lvl="1"/>
             <a:r>
               <a:rPr lang="en-US" dirty="0" smtClean="0"/>
               <a:t>Variety of I/O devices </a:t>
             </a:r>
-          </a:p>
-          <a:p>
-            <a:r>
-              <a:rPr lang="en-US" dirty="0" smtClean="0"/>
-              <a:t>Imperfect source of x86 processors</a:t>
+            <a:endParaRPr lang="en-US" dirty="0" smtClean="0"/>
+          </a:p>
+          <a:p>
+            <a:pPr lvl="1">
+              <a:buNone/>
+            </a:pPr>
+            <a:r>
+              <a:rPr lang="en-US" dirty="0" smtClean="0"/>
+              <a:t>	</a:t>
+            </a:r>
+            <a:r>
+              <a:rPr lang="en-US" dirty="0" smtClean="0"/>
+              <a:t>- not all I/O device are virtualized. Target OS can directly access physical memory using DMA. </a:t>
+            </a:r>
+            <a:endParaRPr lang="en-US" dirty="0" smtClean="0"/>
+          </a:p>
+          <a:p>
+            <a:pPr lvl="1"/>
+            <a:r>
+              <a:rPr lang="en-US" dirty="0" smtClean="0"/>
+              <a:t>Imperfect source of x86 </a:t>
+            </a:r>
+            <a:r>
+              <a:rPr lang="en-US" dirty="0" smtClean="0"/>
+              <a:t>processors</a:t>
+            </a:r>
+          </a:p>
+          <a:p>
+            <a:pPr lvl="1">
+              <a:buNone/>
+            </a:pPr>
+            <a:r>
+              <a:rPr lang="en-US" dirty="0" smtClean="0"/>
+              <a:t>	- ‘</a:t>
+            </a:r>
+            <a:r>
+              <a:rPr lang="en-US" dirty="0" err="1" smtClean="0"/>
+              <a:t>sidt</a:t>
+            </a:r>
+            <a:r>
+              <a:rPr lang="en-US" dirty="0" smtClean="0"/>
+              <a:t>’ instruction (</a:t>
+            </a:r>
+            <a:r>
+              <a:rPr lang="en-US" dirty="0" err="1" smtClean="0"/>
+              <a:t>redpill</a:t>
+            </a:r>
+            <a:r>
+              <a:rPr lang="en-US" dirty="0" smtClean="0"/>
+              <a:t>) for detecting on the fly VMBR</a:t>
             </a:r>
             <a:endParaRPr lang="en-US" dirty="0"/>
           </a:p>
@@ -8060,7 +8157,9 @@
         </p:nvSpPr>
         <p:spPr/>
         <p:txBody>
-          <a:bodyPr/>
+          <a:bodyPr>
+            <a:normAutofit lnSpcReduction="10000"/>
+          </a:bodyPr>
           <a:lstStyle/>
           <a:p>
             <a:r>
@@ -8070,6 +8169,14 @@
             <a:endParaRPr lang="en-US" dirty="0" smtClean="0"/>
           </a:p>
           <a:p>
+            <a:pPr lvl="1"/>
+            <a:r>
+              <a:rPr lang="en-US" dirty="0" smtClean="0"/>
+              <a:t>Provides a hook indirection layer to regulate write access hooks in the kernel</a:t>
+            </a:r>
+            <a:endParaRPr lang="en-US" dirty="0" smtClean="0"/>
+          </a:p>
+          <a:p>
             <a:r>
               <a:rPr lang="en-US" dirty="0" err="1" smtClean="0"/>
               <a:t>SecVisor</a:t>
@@ -8077,16 +8184,49 @@
             <a:endParaRPr lang="en-US" dirty="0" smtClean="0"/>
           </a:p>
           <a:p>
+            <a:pPr lvl="1"/>
+            <a:r>
+              <a:rPr lang="en-US" dirty="0" smtClean="0"/>
+              <a:t>Prevents unauthorized modification to the code in OS kernels using user specified approval policy</a:t>
+            </a:r>
+            <a:endParaRPr lang="en-US" dirty="0" smtClean="0"/>
+          </a:p>
+          <a:p>
             <a:r>
               <a:rPr lang="en-US" dirty="0" smtClean="0"/>
               <a:t>NICKLE</a:t>
             </a:r>
           </a:p>
           <a:p>
+            <a:pPr lvl="1"/>
+            <a:r>
+              <a:rPr lang="en-US" dirty="0" smtClean="0"/>
+              <a:t>Any instruction executed in the shadow space must be fetched from the shadow memory</a:t>
+            </a:r>
+            <a:endParaRPr lang="en-US" dirty="0" smtClean="0"/>
+          </a:p>
+          <a:p>
             <a:r>
               <a:rPr lang="en-US" dirty="0" smtClean="0"/>
               <a:t>Red Pill </a:t>
             </a:r>
+            <a:endParaRPr lang="en-US" dirty="0" smtClean="0"/>
+          </a:p>
+          <a:p>
+            <a:pPr lvl="1"/>
+            <a:r>
+              <a:rPr lang="en-US" dirty="0" smtClean="0"/>
+              <a:t>‘</a:t>
+            </a:r>
+            <a:r>
+              <a:rPr lang="en-US" dirty="0" err="1" smtClean="0"/>
+              <a:t>sidt</a:t>
+            </a:r>
+            <a:r>
+              <a:rPr lang="en-US" dirty="0" smtClean="0"/>
+              <a:t>’ instruction is not virtualized in x86 architecture</a:t>
+            </a:r>
+            <a:endParaRPr lang="en-US" dirty="0" smtClean="0"/>
           </a:p>
           <a:p>
             <a:r>
@@ -8100,7 +8240,7 @@
     </p:spTree>
     <p:extLst>
       <p:ext uri="{BB962C8B-B14F-4D97-AF65-F5344CB8AC3E}">
-        <p14:creationId xmlns:p14="http://schemas.microsoft.com/office/powerpoint/2010/main" val="3327195953"/>
+        <p14:creationId xmlns:p14="http://schemas.microsoft.com/office/powerpoint/2010/main" xmlns="" val="3327195953"/>
       </p:ext>
     </p:extLst>
   </p:cSld>
@@ -8213,7 +8353,7 @@
     </p:spTree>
     <p:extLst>
       <p:ext uri="{BB962C8B-B14F-4D97-AF65-F5344CB8AC3E}">
-        <p14:creationId xmlns:p14="http://schemas.microsoft.com/office/powerpoint/2010/main" val="1247059405"/>
+        <p14:creationId xmlns:p14="http://schemas.microsoft.com/office/powerpoint/2010/main" xmlns="" val="1247059405"/>
       </p:ext>
     </p:extLst>
   </p:cSld>
@@ -8270,15 +8410,78 @@
           </a:p>
         </p:txBody>
       </p:sp>
+      <p:sp>
+        <p:nvSpPr>
+          <p:cNvPr id="5" name="Content Placeholder 4"/>
+          <p:cNvSpPr>
+            <a:spLocks noGrp="1"/>
+          </p:cNvSpPr>
+          <p:nvPr>
+            <p:ph idx="1"/>
+          </p:nvPr>
+        </p:nvSpPr>
+        <p:spPr/>
+        <p:txBody>
+          <a:bodyPr/>
+          <a:lstStyle/>
+          <a:p>
+            <a:r>
+              <a:rPr lang="en-US" dirty="0" smtClean="0"/>
+              <a:t>File access control policies </a:t>
+            </a:r>
+          </a:p>
+          <a:p>
+            <a:pPr lvl="1"/>
+            <a:r>
+              <a:rPr lang="en-US" dirty="0" smtClean="0"/>
+              <a:t>Protect the system utilities from being replaced by their </a:t>
+            </a:r>
+            <a:r>
+              <a:rPr lang="en-US" dirty="0" err="1" smtClean="0"/>
+              <a:t>trojaned</a:t>
+            </a:r>
+            <a:r>
+              <a:rPr lang="en-US" dirty="0" smtClean="0"/>
+              <a:t> counterparts</a:t>
+            </a:r>
+          </a:p>
+          <a:p>
+            <a:r>
+              <a:rPr lang="en-US" dirty="0" smtClean="0"/>
+              <a:t>Memory access control policies</a:t>
+            </a:r>
+          </a:p>
+          <a:p>
+            <a:pPr lvl="1"/>
+            <a:r>
+              <a:rPr lang="en-US" dirty="0" smtClean="0"/>
+              <a:t>Protect the kernel code and data structures from being overwritten in </a:t>
+            </a:r>
+            <a:r>
+              <a:rPr lang="en-US" dirty="0" err="1" smtClean="0"/>
+              <a:t>memrory</a:t>
+            </a:r>
+            <a:endParaRPr lang="en-US" dirty="0" smtClean="0"/>
+          </a:p>
+          <a:p>
+            <a:pPr lvl="1"/>
+            <a:endParaRPr lang="en-US" dirty="0" smtClean="0"/>
+          </a:p>
+          <a:p>
+            <a:pPr lvl="1">
+              <a:buNone/>
+            </a:pPr>
+            <a:endParaRPr lang="en-US" dirty="0"/>
+          </a:p>
+        </p:txBody>
+      </p:sp>
       <p:pic>
         <p:nvPicPr>
-          <p:cNvPr id="4" name="Content Placeholder 3" descr="prevention.png"/>
+          <p:cNvPr id="6" name="Picture 5" descr="prevention.png"/>
           <p:cNvPicPr>
-            <a:picLocks noGrp="1" noChangeAspect="1"/>
+            <a:picLocks noChangeAspect="1"/>
           </p:cNvPicPr>
-          <p:nvPr>
-            <p:ph idx="1"/>
-          </p:nvPr>
+          <p:nvPr/>
         </p:nvPicPr>
         <p:blipFill>
           <a:blip r:embed="rId3" cstate="print"/>
@@ -8288,8 +8491,8 @@
         </p:blipFill>
         <p:spPr>
           <a:xfrm>
-            <a:off x="1828800" y="2209800"/>
-            <a:ext cx="6040029" cy="3000015"/>
+            <a:off x="2133599" y="4038600"/>
+            <a:ext cx="4909311" cy="2438400"/>
           </a:xfrm>
           <a:prstGeom prst="rect">
             <a:avLst/>
@@ -8733,7 +8936,7 @@
     </p:spTree>
     <p:extLst>
       <p:ext uri="{BB962C8B-B14F-4D97-AF65-F5344CB8AC3E}">
-        <p14:creationId xmlns:p14="http://schemas.microsoft.com/office/powerpoint/2010/main" val="2590845106"/>
+        <p14:creationId xmlns:p14="http://schemas.microsoft.com/office/powerpoint/2010/main" xmlns="" val="2590845106"/>
       </p:ext>
     </p:extLst>
   </p:cSld>
@@ -8783,6 +8986,101 @@
           <a:lstStyle/>
           <a:p>
             <a:r>
+              <a:rPr lang="en-US" dirty="0" err="1" smtClean="0"/>
+              <a:t>EVALUAtion</a:t>
+            </a:r>
+            <a:r>
+              <a:rPr lang="en-US" dirty="0" smtClean="0"/>
+              <a:t> (PALIDIN)</a:t>
+            </a:r>
+            <a:endParaRPr lang="en-US" dirty="0"/>
+          </a:p>
+        </p:txBody>
+      </p:sp>
+      <p:sp>
+        <p:nvSpPr>
+          <p:cNvPr id="3" name="Content Placeholder 2"/>
+          <p:cNvSpPr>
+            <a:spLocks noGrp="1"/>
+          </p:cNvSpPr>
+          <p:nvPr>
+            <p:ph idx="1"/>
+          </p:nvPr>
+        </p:nvSpPr>
+        <p:spPr/>
+        <p:txBody>
+          <a:bodyPr/>
+          <a:lstStyle/>
+          <a:p>
+            <a:endParaRPr lang="en-US"/>
+          </a:p>
+        </p:txBody>
+      </p:sp>
+      <p:pic>
+        <p:nvPicPr>
+          <p:cNvPr id="4" name="Content Placeholder 3" descr="evaluation.png"/>
+          <p:cNvPicPr>
+            <a:picLocks noChangeAspect="1"/>
+          </p:cNvPicPr>
+          <p:nvPr/>
+        </p:nvPicPr>
+        <p:blipFill>
+          <a:blip r:embed="rId2" cstate="print"/>
+          <a:stretch>
+            <a:fillRect/>
+          </a:stretch>
+        </p:blipFill>
+        <p:spPr>
+          <a:xfrm>
+            <a:off x="946430" y="1752600"/>
+            <a:ext cx="7251139" cy="4373563"/>
+          </a:xfrm>
+          <a:prstGeom prst="rect">
+            <a:avLst/>
+          </a:prstGeom>
+        </p:spPr>
+      </p:pic>
+    </p:spTree>
+  </p:cSld>
+  <p:clrMapOvr>
+    <a:masterClrMapping/>
+  </p:clrMapOvr>
+</p:sld>
+</file>
+
+<file path=ppt/slides/slide21.xml><?xml version="1.0" encoding="utf-8"?>
+<p:sld xmlns:a="http://schemas.openxmlformats.org/drawingml/2006/main" xmlns:r="http://schemas.openxmlformats.org/officeDocument/2006/relationships" xmlns:p="http://schemas.openxmlformats.org/presentationml/2006/main">
+  <p:cSld>
+    <p:spTree>
+      <p:nvGrpSpPr>
+        <p:cNvPr id="1" name=""/>
+        <p:cNvGrpSpPr/>
+        <p:nvPr/>
+      </p:nvGrpSpPr>
+      <p:grpSpPr>
+        <a:xfrm>
+          <a:off x="0" y="0"/>
+          <a:ext cx="0" cy="0"/>
+          <a:chOff x="0" y="0"/>
+          <a:chExt cx="0" cy="0"/>
+        </a:xfrm>
+      </p:grpSpPr>
+      <p:sp>
+        <p:nvSpPr>
+          <p:cNvPr id="2" name="Title 1"/>
+          <p:cNvSpPr>
+            <a:spLocks noGrp="1"/>
+          </p:cNvSpPr>
+          <p:nvPr>
+            <p:ph type="title"/>
+          </p:nvPr>
+        </p:nvSpPr>
+        <p:spPr/>
+        <p:txBody>
+          <a:bodyPr/>
+          <a:lstStyle/>
+          <a:p>
+            <a:r>
               <a:rPr lang="en-US" dirty="0" smtClean="0"/>
               <a:t>Conclusion</a:t>
             </a:r>
@@ -8862,7 +9160,7 @@
     </p:spTree>
     <p:extLst>
       <p:ext uri="{BB962C8B-B14F-4D97-AF65-F5344CB8AC3E}">
-        <p14:creationId xmlns:p14="http://schemas.microsoft.com/office/powerpoint/2010/main" val="949291844"/>
+        <p14:creationId xmlns:p14="http://schemas.microsoft.com/office/powerpoint/2010/main" xmlns="" val="949291844"/>
       </p:ext>
     </p:extLst>
   </p:cSld>
@@ -9049,7 +9347,7 @@
     </p:spTree>
     <p:extLst>
       <p:ext uri="{BB962C8B-B14F-4D97-AF65-F5344CB8AC3E}">
-        <p14:creationId xmlns:p14="http://schemas.microsoft.com/office/powerpoint/2010/main" val="587743907"/>
+        <p14:creationId xmlns:p14="http://schemas.microsoft.com/office/powerpoint/2010/main" xmlns="" val="587743907"/>
       </p:ext>
     </p:extLst>
   </p:cSld>
@@ -9129,10 +9427,10 @@
             <p:nvPr/>
           </p:nvPicPr>
           <p:blipFill>
-            <a:blip r:embed="rId3">
+            <a:blip r:embed="rId3" cstate="print">
               <a:extLst>
                 <a:ext uri="{28A0092B-C50C-407E-A947-70E740481C1C}">
-                  <a14:useLocalDpi xmlns:a14="http://schemas.microsoft.com/office/drawing/2010/main" val="0"/>
+                  <a14:useLocalDpi xmlns:a14="http://schemas.microsoft.com/office/drawing/2010/main" xmlns="" val="0"/>
                 </a:ext>
               </a:extLst>
             </a:blip>
@@ -9214,7 +9512,7 @@
     </p:spTree>
     <p:extLst>
       <p:ext uri="{BB962C8B-B14F-4D97-AF65-F5344CB8AC3E}">
-        <p14:creationId xmlns:p14="http://schemas.microsoft.com/office/powerpoint/2010/main" val="194774585"/>
+        <p14:creationId xmlns:p14="http://schemas.microsoft.com/office/powerpoint/2010/main" xmlns="" val="194774585"/>
       </p:ext>
     </p:extLst>
   </p:cSld>
@@ -9379,7 +9677,7 @@
     </p:spTree>
     <p:extLst>
       <p:ext uri="{BB962C8B-B14F-4D97-AF65-F5344CB8AC3E}">
-        <p14:creationId xmlns:p14="http://schemas.microsoft.com/office/powerpoint/2010/main" val="2062001084"/>
+        <p14:creationId xmlns:p14="http://schemas.microsoft.com/office/powerpoint/2010/main" xmlns="" val="2062001084"/>
       </p:ext>
     </p:extLst>
   </p:cSld>
@@ -9430,11 +9728,7 @@
           <a:p>
             <a:r>
               <a:rPr lang="en-US" dirty="0" smtClean="0"/>
-              <a:t>Existing </a:t>
-            </a:r>
-            <a:r>
-              <a:rPr lang="en-US" dirty="0" smtClean="0"/>
-              <a:t>Rootkits</a:t>
+              <a:t>Existing Rootkits</a:t>
             </a:r>
             <a:endParaRPr lang="en-US" dirty="0"/>
           </a:p>
@@ -9465,17 +9759,12 @@
               <a:rPr lang="en-US" dirty="0" smtClean="0"/>
               <a:t> </a:t>
             </a:r>
-            <a:endParaRPr lang="en-US" dirty="0" smtClean="0"/>
           </a:p>
           <a:p>
             <a:pPr lvl="1"/>
             <a:r>
               <a:rPr lang="en-US" dirty="0" smtClean="0"/>
-              <a:t>Created by Microsoft researches at University of </a:t>
-            </a:r>
-            <a:r>
-              <a:rPr lang="en-US" dirty="0" smtClean="0"/>
-              <a:t>Michigan</a:t>
+              <a:t>Created by Microsoft researches at University of Michigan</a:t>
             </a:r>
           </a:p>
           <a:p>
@@ -9509,7 +9798,6 @@
               <a:rPr lang="en-US" dirty="0" smtClean="0"/>
               <a:t>Not released to the public</a:t>
             </a:r>
-            <a:endParaRPr lang="en-US" dirty="0" smtClean="0"/>
           </a:p>
           <a:p>
             <a:pPr lvl="1"/>
@@ -9517,14 +9805,13 @@
               <a:rPr lang="en-US" dirty="0" smtClean="0"/>
               <a:t>Targets x86 systems</a:t>
             </a:r>
-            <a:endParaRPr lang="en-US" dirty="0" smtClean="0"/>
           </a:p>
         </p:txBody>
       </p:sp>
     </p:spTree>
     <p:extLst>
       <p:ext uri="{BB962C8B-B14F-4D97-AF65-F5344CB8AC3E}">
-        <p14:creationId xmlns:p14="http://schemas.microsoft.com/office/powerpoint/2010/main" val="1329111042"/>
+        <p14:creationId xmlns:p14="http://schemas.microsoft.com/office/powerpoint/2010/main" xmlns="" val="1329111042"/>
       </p:ext>
     </p:extLst>
   </p:cSld>
@@ -9691,7 +9978,7 @@
     </p:spTree>
     <p:extLst>
       <p:ext uri="{BB962C8B-B14F-4D97-AF65-F5344CB8AC3E}">
-        <p14:creationId xmlns:p14="http://schemas.microsoft.com/office/powerpoint/2010/main" val="690207400"/>
+        <p14:creationId xmlns:p14="http://schemas.microsoft.com/office/powerpoint/2010/main" xmlns="" val="690207400"/>
       </p:ext>
     </p:extLst>
   </p:cSld>
@@ -9879,7 +10166,7 @@
     </p:spTree>
     <p:extLst>
       <p:ext uri="{BB962C8B-B14F-4D97-AF65-F5344CB8AC3E}">
-        <p14:creationId xmlns:p14="http://schemas.microsoft.com/office/powerpoint/2010/main" val="2346653610"/>
+        <p14:creationId xmlns:p14="http://schemas.microsoft.com/office/powerpoint/2010/main" xmlns="" val="2346653610"/>
       </p:ext>
     </p:extLst>
   </p:cSld>
@@ -9945,10 +10232,10 @@
           <p:nvPr/>
         </p:nvPicPr>
         <p:blipFill>
-          <a:blip r:embed="rId3">
+          <a:blip r:embed="rId3" cstate="print">
             <a:extLst>
               <a:ext uri="{28A0092B-C50C-407E-A947-70E740481C1C}">
-                <a14:useLocalDpi xmlns:a14="http://schemas.microsoft.com/office/drawing/2010/main" val="0"/>
+                <a14:useLocalDpi xmlns:a14="http://schemas.microsoft.com/office/drawing/2010/main" xmlns="" val="0"/>
               </a:ext>
             </a:extLst>
           </a:blip>
@@ -9969,7 +10256,7 @@
     </p:spTree>
     <p:extLst>
       <p:ext uri="{BB962C8B-B14F-4D97-AF65-F5344CB8AC3E}">
-        <p14:creationId xmlns:p14="http://schemas.microsoft.com/office/powerpoint/2010/main" val="3199163825"/>
+        <p14:creationId xmlns:p14="http://schemas.microsoft.com/office/powerpoint/2010/main" xmlns="" val="3199163825"/>
       </p:ext>
     </p:extLst>
   </p:cSld>

</xml_diff>

<commit_message>
Minor change to the conclusion
</commit_message>
<xml_diff>
--- a/VMBR_Presentation.pptx
+++ b/VMBR_Presentation.pptx
@@ -384,7 +384,7 @@
     </p:spTree>
     <p:extLst>
       <p:ext uri="{BB962C8B-B14F-4D97-AF65-F5344CB8AC3E}">
-        <p14:creationId xmlns="" xmlns:p14="http://schemas.microsoft.com/office/powerpoint/2010/main" val="846735352"/>
+        <p14:creationId xmlns:p14="http://schemas.microsoft.com/office/powerpoint/2010/main" val="846735352"/>
       </p:ext>
     </p:extLst>
   </p:cSld>
@@ -1553,7 +1553,7 @@
     </p:spTree>
     <p:extLst>
       <p:ext uri="{BB962C8B-B14F-4D97-AF65-F5344CB8AC3E}">
-        <p14:creationId xmlns="" xmlns:p14="http://schemas.microsoft.com/office/powerpoint/2010/main" val="2089592773"/>
+        <p14:creationId xmlns:p14="http://schemas.microsoft.com/office/powerpoint/2010/main" val="2089592773"/>
       </p:ext>
     </p:extLst>
   </p:cSld>
@@ -1722,7 +1722,7 @@
     </p:spTree>
     <p:extLst>
       <p:ext uri="{BB962C8B-B14F-4D97-AF65-F5344CB8AC3E}">
-        <p14:creationId xmlns="" xmlns:p14="http://schemas.microsoft.com/office/powerpoint/2010/main" val="3098580096"/>
+        <p14:creationId xmlns:p14="http://schemas.microsoft.com/office/powerpoint/2010/main" val="3098580096"/>
       </p:ext>
     </p:extLst>
   </p:cSld>
@@ -2003,7 +2003,7 @@
     </p:spTree>
     <p:extLst>
       <p:ext uri="{BB962C8B-B14F-4D97-AF65-F5344CB8AC3E}">
-        <p14:creationId xmlns="" xmlns:p14="http://schemas.microsoft.com/office/powerpoint/2010/main" val="875293555"/>
+        <p14:creationId xmlns:p14="http://schemas.microsoft.com/office/powerpoint/2010/main" val="875293555"/>
       </p:ext>
     </p:extLst>
   </p:cSld>
@@ -2094,7 +2094,7 @@
     </p:spTree>
     <p:extLst>
       <p:ext uri="{BB962C8B-B14F-4D97-AF65-F5344CB8AC3E}">
-        <p14:creationId xmlns="" xmlns:p14="http://schemas.microsoft.com/office/powerpoint/2010/main" val="3004174998"/>
+        <p14:creationId xmlns:p14="http://schemas.microsoft.com/office/powerpoint/2010/main" val="3004174998"/>
       </p:ext>
     </p:extLst>
   </p:cSld>
@@ -2340,7 +2340,7 @@
     </p:spTree>
     <p:extLst>
       <p:ext uri="{BB962C8B-B14F-4D97-AF65-F5344CB8AC3E}">
-        <p14:creationId xmlns="" xmlns:p14="http://schemas.microsoft.com/office/powerpoint/2010/main" val="1153073892"/>
+        <p14:creationId xmlns:p14="http://schemas.microsoft.com/office/powerpoint/2010/main" val="1153073892"/>
       </p:ext>
     </p:extLst>
   </p:cSld>
@@ -2429,7 +2429,7 @@
     </p:spTree>
     <p:extLst>
       <p:ext uri="{BB962C8B-B14F-4D97-AF65-F5344CB8AC3E}">
-        <p14:creationId xmlns="" xmlns:p14="http://schemas.microsoft.com/office/powerpoint/2010/main" val="2598429233"/>
+        <p14:creationId xmlns:p14="http://schemas.microsoft.com/office/powerpoint/2010/main" val="2598429233"/>
       </p:ext>
     </p:extLst>
   </p:cSld>
@@ -2653,7 +2653,7 @@
     </p:spTree>
     <p:extLst>
       <p:ext uri="{BB962C8B-B14F-4D97-AF65-F5344CB8AC3E}">
-        <p14:creationId xmlns="" xmlns:p14="http://schemas.microsoft.com/office/powerpoint/2010/main" val="2757083414"/>
+        <p14:creationId xmlns:p14="http://schemas.microsoft.com/office/powerpoint/2010/main" val="2757083414"/>
       </p:ext>
     </p:extLst>
   </p:cSld>
@@ -2746,7 +2746,7 @@
     </p:spTree>
     <p:extLst>
       <p:ext uri="{BB962C8B-B14F-4D97-AF65-F5344CB8AC3E}">
-        <p14:creationId xmlns="" xmlns:p14="http://schemas.microsoft.com/office/powerpoint/2010/main" val="3659421481"/>
+        <p14:creationId xmlns:p14="http://schemas.microsoft.com/office/powerpoint/2010/main" val="3659421481"/>
       </p:ext>
     </p:extLst>
   </p:cSld>
@@ -2998,7 +2998,7 @@
     </p:spTree>
     <p:extLst>
       <p:ext uri="{BB962C8B-B14F-4D97-AF65-F5344CB8AC3E}">
-        <p14:creationId xmlns="" xmlns:p14="http://schemas.microsoft.com/office/powerpoint/2010/main" val="2266588369"/>
+        <p14:creationId xmlns:p14="http://schemas.microsoft.com/office/powerpoint/2010/main" val="2266588369"/>
       </p:ext>
     </p:extLst>
   </p:cSld>
@@ -7665,7 +7665,7 @@
     </p:spTree>
     <p:extLst>
       <p:ext uri="{BB962C8B-B14F-4D97-AF65-F5344CB8AC3E}">
-        <p14:creationId xmlns="" xmlns:p14="http://schemas.microsoft.com/office/powerpoint/2010/main" val="2462047465"/>
+        <p14:creationId xmlns:p14="http://schemas.microsoft.com/office/powerpoint/2010/main" val="2462047465"/>
       </p:ext>
     </p:extLst>
   </p:cSld>
@@ -7869,7 +7869,7 @@
     </p:spTree>
     <p:extLst>
       <p:ext uri="{BB962C8B-B14F-4D97-AF65-F5344CB8AC3E}">
-        <p14:creationId xmlns="" xmlns:p14="http://schemas.microsoft.com/office/powerpoint/2010/main" val="1249372831"/>
+        <p14:creationId xmlns:p14="http://schemas.microsoft.com/office/powerpoint/2010/main" val="1249372831"/>
       </p:ext>
     </p:extLst>
   </p:cSld>
@@ -7969,7 +7969,7 @@
     </p:spTree>
     <p:extLst>
       <p:ext uri="{BB962C8B-B14F-4D97-AF65-F5344CB8AC3E}">
-        <p14:creationId xmlns="" xmlns:p14="http://schemas.microsoft.com/office/powerpoint/2010/main" val="19357863"/>
+        <p14:creationId xmlns:p14="http://schemas.microsoft.com/office/powerpoint/2010/main" val="19357863"/>
       </p:ext>
     </p:extLst>
   </p:cSld>
@@ -8057,11 +8057,7 @@
             </a:r>
             <a:r>
               <a:rPr lang="en-US" smtClean="0"/>
-              <a:t>memory </a:t>
-            </a:r>
-            <a:r>
-              <a:rPr lang="en-US" smtClean="0"/>
-              <a:t>or </a:t>
+              <a:t>memory or </a:t>
             </a:r>
             <a:r>
               <a:rPr lang="en-US" dirty="0" smtClean="0"/>
@@ -8247,19 +8243,7 @@
             <a:pPr lvl="1"/>
             <a:r>
               <a:rPr lang="en-US" dirty="0" smtClean="0"/>
-              <a:t>Imperfect </a:t>
-            </a:r>
-            <a:r>
-              <a:rPr lang="en-US" dirty="0" smtClean="0"/>
-              <a:t>virtualization</a:t>
-            </a:r>
-            <a:r>
-              <a:rPr lang="en-US" dirty="0" smtClean="0"/>
-              <a:t> </a:t>
-            </a:r>
-            <a:r>
-              <a:rPr lang="en-US" dirty="0" smtClean="0"/>
-              <a:t>of x86 processors</a:t>
+              <a:t>Imperfect virtualization of x86 processors</a:t>
             </a:r>
           </a:p>
           <a:p>
@@ -8435,7 +8419,7 @@
     </p:spTree>
     <p:extLst>
       <p:ext uri="{BB962C8B-B14F-4D97-AF65-F5344CB8AC3E}">
-        <p14:creationId xmlns="" xmlns:p14="http://schemas.microsoft.com/office/powerpoint/2010/main" val="3327195953"/>
+        <p14:creationId xmlns:p14="http://schemas.microsoft.com/office/powerpoint/2010/main" val="3327195953"/>
       </p:ext>
     </p:extLst>
   </p:cSld>
@@ -8548,7 +8532,7 @@
     </p:spTree>
     <p:extLst>
       <p:ext uri="{BB962C8B-B14F-4D97-AF65-F5344CB8AC3E}">
-        <p14:creationId xmlns="" xmlns:p14="http://schemas.microsoft.com/office/powerpoint/2010/main" val="1247059405"/>
+        <p14:creationId xmlns:p14="http://schemas.microsoft.com/office/powerpoint/2010/main" val="1247059405"/>
       </p:ext>
     </p:extLst>
   </p:cSld>
@@ -9131,7 +9115,7 @@
     </p:spTree>
     <p:extLst>
       <p:ext uri="{BB962C8B-B14F-4D97-AF65-F5344CB8AC3E}">
-        <p14:creationId xmlns="" xmlns:p14="http://schemas.microsoft.com/office/powerpoint/2010/main" val="2590845106"/>
+        <p14:creationId xmlns:p14="http://schemas.microsoft.com/office/powerpoint/2010/main" val="2590845106"/>
       </p:ext>
     </p:extLst>
   </p:cSld>
@@ -9315,6 +9299,9 @@
             </a:r>
           </a:p>
           <a:p>
+            <a:endParaRPr lang="en-US" dirty="0" smtClean="0"/>
+          </a:p>
+          <a:p>
             <a:endParaRPr lang="en-US" dirty="0"/>
           </a:p>
           <a:p>
@@ -9333,29 +9320,12 @@
             </a:pPr>
             <a:endParaRPr lang="en-US" dirty="0" smtClean="0"/>
           </a:p>
-          <a:p>
-            <a:r>
-              <a:rPr lang="en-US" dirty="0" smtClean="0"/>
-              <a:t>VMBRs may evolve in the future</a:t>
-            </a:r>
-          </a:p>
-          <a:p>
-            <a:pPr lvl="1"/>
-            <a:r>
-              <a:rPr lang="en-US" dirty="0" smtClean="0"/>
-              <a:t>And detection must evolve with it as well</a:t>
-            </a:r>
-          </a:p>
-          <a:p>
-            <a:pPr lvl="1"/>
-            <a:endParaRPr lang="en-US" dirty="0"/>
-          </a:p>
         </p:txBody>
       </p:sp>
     </p:spTree>
     <p:extLst>
       <p:ext uri="{BB962C8B-B14F-4D97-AF65-F5344CB8AC3E}">
-        <p14:creationId xmlns="" xmlns:p14="http://schemas.microsoft.com/office/powerpoint/2010/main" val="949291844"/>
+        <p14:creationId xmlns:p14="http://schemas.microsoft.com/office/powerpoint/2010/main" val="949291844"/>
       </p:ext>
     </p:extLst>
   </p:cSld>
@@ -9542,7 +9512,7 @@
     </p:spTree>
     <p:extLst>
       <p:ext uri="{BB962C8B-B14F-4D97-AF65-F5344CB8AC3E}">
-        <p14:creationId xmlns="" xmlns:p14="http://schemas.microsoft.com/office/powerpoint/2010/main" val="587743907"/>
+        <p14:creationId xmlns:p14="http://schemas.microsoft.com/office/powerpoint/2010/main" val="587743907"/>
       </p:ext>
     </p:extLst>
   </p:cSld>
@@ -9625,7 +9595,7 @@
             <a:blip r:embed="rId3" cstate="print">
               <a:extLst>
                 <a:ext uri="{28A0092B-C50C-407E-A947-70E740481C1C}">
-                  <a14:useLocalDpi xmlns="" xmlns:a14="http://schemas.microsoft.com/office/drawing/2010/main" val="0"/>
+                  <a14:useLocalDpi xmlns:a14="http://schemas.microsoft.com/office/drawing/2010/main" val="0"/>
                 </a:ext>
               </a:extLst>
             </a:blip>
@@ -9707,7 +9677,7 @@
     </p:spTree>
     <p:extLst>
       <p:ext uri="{BB962C8B-B14F-4D97-AF65-F5344CB8AC3E}">
-        <p14:creationId xmlns="" xmlns:p14="http://schemas.microsoft.com/office/powerpoint/2010/main" val="194774585"/>
+        <p14:creationId xmlns:p14="http://schemas.microsoft.com/office/powerpoint/2010/main" val="194774585"/>
       </p:ext>
     </p:extLst>
   </p:cSld>
@@ -9872,7 +9842,7 @@
     </p:spTree>
     <p:extLst>
       <p:ext uri="{BB962C8B-B14F-4D97-AF65-F5344CB8AC3E}">
-        <p14:creationId xmlns="" xmlns:p14="http://schemas.microsoft.com/office/powerpoint/2010/main" val="2062001084"/>
+        <p14:creationId xmlns:p14="http://schemas.microsoft.com/office/powerpoint/2010/main" val="2062001084"/>
       </p:ext>
     </p:extLst>
   </p:cSld>
@@ -10006,7 +9976,7 @@
     </p:spTree>
     <p:extLst>
       <p:ext uri="{BB962C8B-B14F-4D97-AF65-F5344CB8AC3E}">
-        <p14:creationId xmlns="" xmlns:p14="http://schemas.microsoft.com/office/powerpoint/2010/main" val="1329111042"/>
+        <p14:creationId xmlns:p14="http://schemas.microsoft.com/office/powerpoint/2010/main" val="1329111042"/>
       </p:ext>
     </p:extLst>
   </p:cSld>
@@ -10173,7 +10143,7 @@
     </p:spTree>
     <p:extLst>
       <p:ext uri="{BB962C8B-B14F-4D97-AF65-F5344CB8AC3E}">
-        <p14:creationId xmlns="" xmlns:p14="http://schemas.microsoft.com/office/powerpoint/2010/main" val="690207400"/>
+        <p14:creationId xmlns:p14="http://schemas.microsoft.com/office/powerpoint/2010/main" val="690207400"/>
       </p:ext>
     </p:extLst>
   </p:cSld>
@@ -10361,7 +10331,7 @@
     </p:spTree>
     <p:extLst>
       <p:ext uri="{BB962C8B-B14F-4D97-AF65-F5344CB8AC3E}">
-        <p14:creationId xmlns="" xmlns:p14="http://schemas.microsoft.com/office/powerpoint/2010/main" val="2346653610"/>
+        <p14:creationId xmlns:p14="http://schemas.microsoft.com/office/powerpoint/2010/main" val="2346653610"/>
       </p:ext>
     </p:extLst>
   </p:cSld>
@@ -10430,7 +10400,7 @@
           <a:blip r:embed="rId3" cstate="print">
             <a:extLst>
               <a:ext uri="{28A0092B-C50C-407E-A947-70E740481C1C}">
-                <a14:useLocalDpi xmlns="" xmlns:a14="http://schemas.microsoft.com/office/drawing/2010/main" val="0"/>
+                <a14:useLocalDpi xmlns:a14="http://schemas.microsoft.com/office/drawing/2010/main" val="0"/>
               </a:ext>
             </a:extLst>
           </a:blip>
@@ -10451,7 +10421,7 @@
     </p:spTree>
     <p:extLst>
       <p:ext uri="{BB962C8B-B14F-4D97-AF65-F5344CB8AC3E}">
-        <p14:creationId xmlns="" xmlns:p14="http://schemas.microsoft.com/office/powerpoint/2010/main" val="3199163825"/>
+        <p14:creationId xmlns:p14="http://schemas.microsoft.com/office/powerpoint/2010/main" val="3199163825"/>
       </p:ext>
     </p:extLst>
   </p:cSld>

</xml_diff>